<commit_message>
Modufy: AMBA/AMBA_learning.pptx 1. Add chapter 2 AHB introduction
</commit_message>
<xml_diff>
--- a/AMBA/AMBA_learning.pptx
+++ b/AMBA/AMBA_learning.pptx
@@ -14,6 +14,11 @@
     <p:sldId id="274" r:id="rId8"/>
     <p:sldId id="275" r:id="rId9"/>
     <p:sldId id="276" r:id="rId10"/>
+    <p:sldId id="278" r:id="rId11"/>
+    <p:sldId id="279" r:id="rId12"/>
+    <p:sldId id="280" r:id="rId13"/>
+    <p:sldId id="281" r:id="rId14"/>
+    <p:sldId id="277" r:id="rId15"/>
   </p:sldIdLst>
   <p:sldSz cx="12192000" cy="6858000"/>
   <p:notesSz cx="6858000" cy="9144000"/>
@@ -112,6 +117,11 @@
       </a:defRPr>
     </a:lvl9pPr>
   </p:defaultTextStyle>
+  <p:extLst>
+    <p:ext uri="{EFAFB233-063F-42B5-8137-9DF3F51BA10A}">
+      <p15:sldGuideLst xmlns:p15="http://schemas.microsoft.com/office/powerpoint/2012/main"/>
+    </p:ext>
+  </p:extLst>
 </p:presentation>
 </file>
 
@@ -262,7 +272,7 @@
           <a:p>
             <a:fld id="{277B1798-C61C-4271-ABD9-F0F48E058C48}" type="datetimeFigureOut">
               <a:rPr lang="zh-TW" altLang="en-US" smtClean="0"/>
-              <a:t>2025/6/15</a:t>
+              <a:t>2025/7/6</a:t>
             </a:fld>
             <a:endParaRPr lang="zh-TW" altLang="en-US"/>
           </a:p>
@@ -460,7 +470,7 @@
           <a:p>
             <a:fld id="{277B1798-C61C-4271-ABD9-F0F48E058C48}" type="datetimeFigureOut">
               <a:rPr lang="zh-TW" altLang="en-US" smtClean="0"/>
-              <a:t>2025/6/15</a:t>
+              <a:t>2025/7/6</a:t>
             </a:fld>
             <a:endParaRPr lang="zh-TW" altLang="en-US"/>
           </a:p>
@@ -668,7 +678,7 @@
           <a:p>
             <a:fld id="{277B1798-C61C-4271-ABD9-F0F48E058C48}" type="datetimeFigureOut">
               <a:rPr lang="zh-TW" altLang="en-US" smtClean="0"/>
-              <a:t>2025/6/15</a:t>
+              <a:t>2025/7/6</a:t>
             </a:fld>
             <a:endParaRPr lang="zh-TW" altLang="en-US"/>
           </a:p>
@@ -866,7 +876,7 @@
           <a:p>
             <a:fld id="{277B1798-C61C-4271-ABD9-F0F48E058C48}" type="datetimeFigureOut">
               <a:rPr lang="zh-TW" altLang="en-US" smtClean="0"/>
-              <a:t>2025/6/15</a:t>
+              <a:t>2025/7/6</a:t>
             </a:fld>
             <a:endParaRPr lang="zh-TW" altLang="en-US"/>
           </a:p>
@@ -1141,7 +1151,7 @@
           <a:p>
             <a:fld id="{277B1798-C61C-4271-ABD9-F0F48E058C48}" type="datetimeFigureOut">
               <a:rPr lang="zh-TW" altLang="en-US" smtClean="0"/>
-              <a:t>2025/6/15</a:t>
+              <a:t>2025/7/6</a:t>
             </a:fld>
             <a:endParaRPr lang="zh-TW" altLang="en-US"/>
           </a:p>
@@ -1406,7 +1416,7 @@
           <a:p>
             <a:fld id="{277B1798-C61C-4271-ABD9-F0F48E058C48}" type="datetimeFigureOut">
               <a:rPr lang="zh-TW" altLang="en-US" smtClean="0"/>
-              <a:t>2025/6/15</a:t>
+              <a:t>2025/7/6</a:t>
             </a:fld>
             <a:endParaRPr lang="zh-TW" altLang="en-US"/>
           </a:p>
@@ -1818,7 +1828,7 @@
           <a:p>
             <a:fld id="{277B1798-C61C-4271-ABD9-F0F48E058C48}" type="datetimeFigureOut">
               <a:rPr lang="zh-TW" altLang="en-US" smtClean="0"/>
-              <a:t>2025/6/15</a:t>
+              <a:t>2025/7/6</a:t>
             </a:fld>
             <a:endParaRPr lang="zh-TW" altLang="en-US"/>
           </a:p>
@@ -1959,7 +1969,7 @@
           <a:p>
             <a:fld id="{277B1798-C61C-4271-ABD9-F0F48E058C48}" type="datetimeFigureOut">
               <a:rPr lang="zh-TW" altLang="en-US" smtClean="0"/>
-              <a:t>2025/6/15</a:t>
+              <a:t>2025/7/6</a:t>
             </a:fld>
             <a:endParaRPr lang="zh-TW" altLang="en-US"/>
           </a:p>
@@ -2072,7 +2082,7 @@
           <a:p>
             <a:fld id="{277B1798-C61C-4271-ABD9-F0F48E058C48}" type="datetimeFigureOut">
               <a:rPr lang="zh-TW" altLang="en-US" smtClean="0"/>
-              <a:t>2025/6/15</a:t>
+              <a:t>2025/7/6</a:t>
             </a:fld>
             <a:endParaRPr lang="zh-TW" altLang="en-US"/>
           </a:p>
@@ -2383,7 +2393,7 @@
           <a:p>
             <a:fld id="{277B1798-C61C-4271-ABD9-F0F48E058C48}" type="datetimeFigureOut">
               <a:rPr lang="zh-TW" altLang="en-US" smtClean="0"/>
-              <a:t>2025/6/15</a:t>
+              <a:t>2025/7/6</a:t>
             </a:fld>
             <a:endParaRPr lang="zh-TW" altLang="en-US"/>
           </a:p>
@@ -2671,7 +2681,7 @@
           <a:p>
             <a:fld id="{277B1798-C61C-4271-ABD9-F0F48E058C48}" type="datetimeFigureOut">
               <a:rPr lang="zh-TW" altLang="en-US" smtClean="0"/>
-              <a:t>2025/6/15</a:t>
+              <a:t>2025/7/6</a:t>
             </a:fld>
             <a:endParaRPr lang="zh-TW" altLang="en-US"/>
           </a:p>
@@ -2912,7 +2922,7 @@
           <a:p>
             <a:fld id="{277B1798-C61C-4271-ABD9-F0F48E058C48}" type="datetimeFigureOut">
               <a:rPr lang="zh-TW" altLang="en-US" smtClean="0"/>
-              <a:t>2025/6/15</a:t>
+              <a:t>2025/7/6</a:t>
             </a:fld>
             <a:endParaRPr lang="zh-TW" altLang="en-US"/>
           </a:p>
@@ -3390,6 +3400,1191 @@
     <p:extLst>
       <p:ext uri="{BB962C8B-B14F-4D97-AF65-F5344CB8AC3E}">
         <p14:creationId xmlns:p14="http://schemas.microsoft.com/office/powerpoint/2010/main" val="1939508156"/>
+      </p:ext>
+    </p:extLst>
+  </p:cSld>
+  <p:clrMapOvr>
+    <a:masterClrMapping/>
+  </p:clrMapOvr>
+</p:sld>
+</file>
+
+<file path=ppt/slides/slide10.xml><?xml version="1.0" encoding="utf-8"?>
+<p:sld xmlns:a="http://schemas.openxmlformats.org/drawingml/2006/main" xmlns:r="http://schemas.openxmlformats.org/officeDocument/2006/relationships" xmlns:p="http://schemas.openxmlformats.org/presentationml/2006/main">
+  <p:cSld>
+    <p:spTree>
+      <p:nvGrpSpPr>
+        <p:cNvPr id="1" name="">
+          <a:extLst>
+            <a:ext uri="{FF2B5EF4-FFF2-40B4-BE49-F238E27FC236}">
+              <a16:creationId xmlns:a16="http://schemas.microsoft.com/office/drawing/2014/main" id="{CE0B6CEF-0DCD-E9AF-5BB2-47C26A2F91A9}"/>
+            </a:ext>
+          </a:extLst>
+        </p:cNvPr>
+        <p:cNvGrpSpPr/>
+        <p:nvPr/>
+      </p:nvGrpSpPr>
+      <p:grpSpPr>
+        <a:xfrm>
+          <a:off x="0" y="0"/>
+          <a:ext cx="0" cy="0"/>
+          <a:chOff x="0" y="0"/>
+          <a:chExt cx="0" cy="0"/>
+        </a:xfrm>
+      </p:grpSpPr>
+      <p:sp>
+        <p:nvSpPr>
+          <p:cNvPr id="2" name="標題 1">
+            <a:extLst>
+              <a:ext uri="{FF2B5EF4-FFF2-40B4-BE49-F238E27FC236}">
+                <a16:creationId xmlns:a16="http://schemas.microsoft.com/office/drawing/2014/main" id="{0ECD11D4-FF07-4336-C2F1-FE50B60C4940}"/>
+              </a:ext>
+            </a:extLst>
+          </p:cNvPr>
+          <p:cNvSpPr>
+            <a:spLocks noGrp="1"/>
+          </p:cNvSpPr>
+          <p:nvPr>
+            <p:ph type="title"/>
+          </p:nvPr>
+        </p:nvSpPr>
+        <p:spPr/>
+        <p:txBody>
+          <a:bodyPr/>
+          <a:lstStyle/>
+          <a:p>
+            <a:r>
+              <a:rPr lang="en-US" altLang="zh-TW" dirty="0"/>
+              <a:t>AHB</a:t>
+            </a:r>
+            <a:r>
+              <a:rPr lang="zh-TW" altLang="en-US" dirty="0"/>
+              <a:t> </a:t>
+            </a:r>
+            <a:r>
+              <a:rPr lang="en-US" altLang="zh-TW" dirty="0"/>
+              <a:t>introduction (1/)</a:t>
+            </a:r>
+            <a:endParaRPr lang="zh-TW" altLang="en-US" dirty="0"/>
+          </a:p>
+        </p:txBody>
+      </p:sp>
+      <p:sp>
+        <p:nvSpPr>
+          <p:cNvPr id="3" name="內容版面配置區 2">
+            <a:extLst>
+              <a:ext uri="{FF2B5EF4-FFF2-40B4-BE49-F238E27FC236}">
+                <a16:creationId xmlns:a16="http://schemas.microsoft.com/office/drawing/2014/main" id="{F56D5251-2663-26AD-3409-49E1B8B8EE63}"/>
+              </a:ext>
+            </a:extLst>
+          </p:cNvPr>
+          <p:cNvSpPr>
+            <a:spLocks noGrp="1"/>
+          </p:cNvSpPr>
+          <p:nvPr>
+            <p:ph idx="1"/>
+          </p:nvPr>
+        </p:nvSpPr>
+        <p:spPr/>
+        <p:txBody>
+          <a:bodyPr/>
+          <a:lstStyle/>
+          <a:p>
+            <a:r>
+              <a:rPr lang="en-US" altLang="zh-TW" dirty="0"/>
+              <a:t>AHB-lite block diagram</a:t>
+            </a:r>
+          </a:p>
+          <a:p>
+            <a:pPr marL="914400" lvl="1" indent="-457200">
+              <a:buFont typeface="+mj-lt"/>
+              <a:buAutoNum type="arabicPeriod"/>
+            </a:pPr>
+            <a:r>
+              <a:rPr lang="en-US" altLang="zh-TW" dirty="0"/>
+              <a:t>AHB-Lite master</a:t>
+            </a:r>
+          </a:p>
+          <a:p>
+            <a:pPr marL="914400" lvl="1" indent="-457200">
+              <a:buFont typeface="+mj-lt"/>
+              <a:buAutoNum type="arabicPeriod"/>
+            </a:pPr>
+            <a:r>
+              <a:rPr lang="en-US" altLang="zh-TW" dirty="0"/>
+              <a:t>AHB-Lite slave</a:t>
+            </a:r>
+          </a:p>
+          <a:p>
+            <a:pPr marL="914400" lvl="1" indent="-457200">
+              <a:buFont typeface="+mj-lt"/>
+              <a:buAutoNum type="arabicPeriod"/>
+            </a:pPr>
+            <a:r>
+              <a:rPr lang="en-US" altLang="zh-TW" dirty="0"/>
+              <a:t>Decoder</a:t>
+            </a:r>
+          </a:p>
+          <a:p>
+            <a:pPr marL="914400" lvl="1" indent="-457200">
+              <a:buFont typeface="+mj-lt"/>
+              <a:buAutoNum type="arabicPeriod"/>
+            </a:pPr>
+            <a:r>
+              <a:rPr lang="en-US" altLang="zh-TW" dirty="0"/>
+              <a:t>Multiplexor</a:t>
+            </a:r>
+          </a:p>
+        </p:txBody>
+      </p:sp>
+      <p:pic>
+        <p:nvPicPr>
+          <p:cNvPr id="5" name="圖片 4">
+            <a:extLst>
+              <a:ext uri="{FF2B5EF4-FFF2-40B4-BE49-F238E27FC236}">
+                <a16:creationId xmlns:a16="http://schemas.microsoft.com/office/drawing/2014/main" id="{E4DB1702-2D83-3AE4-5CF5-732F0A10C123}"/>
+              </a:ext>
+            </a:extLst>
+          </p:cNvPr>
+          <p:cNvPicPr>
+            <a:picLocks noChangeAspect="1"/>
+          </p:cNvPicPr>
+          <p:nvPr/>
+        </p:nvPicPr>
+        <p:blipFill>
+          <a:blip r:embed="rId2"/>
+          <a:stretch>
+            <a:fillRect/>
+          </a:stretch>
+        </p:blipFill>
+        <p:spPr>
+          <a:xfrm>
+            <a:off x="4775991" y="2616679"/>
+            <a:ext cx="6870087" cy="3876196"/>
+          </a:xfrm>
+          <a:prstGeom prst="rect">
+            <a:avLst/>
+          </a:prstGeom>
+          <a:ln>
+            <a:solidFill>
+              <a:schemeClr val="tx1"/>
+            </a:solidFill>
+          </a:ln>
+        </p:spPr>
+      </p:pic>
+    </p:spTree>
+    <p:extLst>
+      <p:ext uri="{BB962C8B-B14F-4D97-AF65-F5344CB8AC3E}">
+        <p14:creationId xmlns:p14="http://schemas.microsoft.com/office/powerpoint/2010/main" val="197754427"/>
+      </p:ext>
+    </p:extLst>
+  </p:cSld>
+  <p:clrMapOvr>
+    <a:masterClrMapping/>
+  </p:clrMapOvr>
+</p:sld>
+</file>
+
+<file path=ppt/slides/slide11.xml><?xml version="1.0" encoding="utf-8"?>
+<p:sld xmlns:a="http://schemas.openxmlformats.org/drawingml/2006/main" xmlns:r="http://schemas.openxmlformats.org/officeDocument/2006/relationships" xmlns:p="http://schemas.openxmlformats.org/presentationml/2006/main">
+  <p:cSld>
+    <p:spTree>
+      <p:nvGrpSpPr>
+        <p:cNvPr id="1" name="">
+          <a:extLst>
+            <a:ext uri="{FF2B5EF4-FFF2-40B4-BE49-F238E27FC236}">
+              <a16:creationId xmlns:a16="http://schemas.microsoft.com/office/drawing/2014/main" id="{A6FCF6CA-91E7-F4E3-299A-39B2F099D6A7}"/>
+            </a:ext>
+          </a:extLst>
+        </p:cNvPr>
+        <p:cNvGrpSpPr/>
+        <p:nvPr/>
+      </p:nvGrpSpPr>
+      <p:grpSpPr>
+        <a:xfrm>
+          <a:off x="0" y="0"/>
+          <a:ext cx="0" cy="0"/>
+          <a:chOff x="0" y="0"/>
+          <a:chExt cx="0" cy="0"/>
+        </a:xfrm>
+      </p:grpSpPr>
+      <p:sp>
+        <p:nvSpPr>
+          <p:cNvPr id="2" name="標題 1">
+            <a:extLst>
+              <a:ext uri="{FF2B5EF4-FFF2-40B4-BE49-F238E27FC236}">
+                <a16:creationId xmlns:a16="http://schemas.microsoft.com/office/drawing/2014/main" id="{CD3918B9-BCBB-27B5-BF56-5DEB679BBE34}"/>
+              </a:ext>
+            </a:extLst>
+          </p:cNvPr>
+          <p:cNvSpPr>
+            <a:spLocks noGrp="1"/>
+          </p:cNvSpPr>
+          <p:nvPr>
+            <p:ph type="title"/>
+          </p:nvPr>
+        </p:nvSpPr>
+        <p:spPr/>
+        <p:txBody>
+          <a:bodyPr/>
+          <a:lstStyle/>
+          <a:p>
+            <a:r>
+              <a:rPr lang="en-US" altLang="zh-TW" dirty="0"/>
+              <a:t>AHB</a:t>
+            </a:r>
+            <a:r>
+              <a:rPr lang="zh-TW" altLang="en-US" dirty="0"/>
+              <a:t> </a:t>
+            </a:r>
+            <a:r>
+              <a:rPr lang="en-US" altLang="zh-TW" dirty="0"/>
+              <a:t>introduction (2/)</a:t>
+            </a:r>
+            <a:endParaRPr lang="zh-TW" altLang="en-US" dirty="0"/>
+          </a:p>
+        </p:txBody>
+      </p:sp>
+      <p:sp>
+        <p:nvSpPr>
+          <p:cNvPr id="3" name="內容版面配置區 2">
+            <a:extLst>
+              <a:ext uri="{FF2B5EF4-FFF2-40B4-BE49-F238E27FC236}">
+                <a16:creationId xmlns:a16="http://schemas.microsoft.com/office/drawing/2014/main" id="{01307F18-FEAC-3D8A-0B5C-8BDC5C82BBCC}"/>
+              </a:ext>
+            </a:extLst>
+          </p:cNvPr>
+          <p:cNvSpPr>
+            <a:spLocks noGrp="1"/>
+          </p:cNvSpPr>
+          <p:nvPr>
+            <p:ph idx="1"/>
+          </p:nvPr>
+        </p:nvSpPr>
+        <p:spPr/>
+        <p:txBody>
+          <a:bodyPr/>
+          <a:lstStyle/>
+          <a:p>
+            <a:pPr marL="457200" indent="-457200">
+              <a:buFont typeface="+mj-lt"/>
+              <a:buAutoNum type="arabicPeriod"/>
+            </a:pPr>
+            <a:r>
+              <a:rPr lang="en-US" altLang="zh-TW" dirty="0"/>
+              <a:t>AHB-Lite master</a:t>
+            </a:r>
+          </a:p>
+          <a:p>
+            <a:pPr lvl="1"/>
+            <a:r>
+              <a:rPr lang="zh-TW" altLang="en-US" dirty="0"/>
+              <a:t>分成</a:t>
+            </a:r>
+            <a:endParaRPr lang="en-US" altLang="zh-TW" dirty="0"/>
+          </a:p>
+          <a:p>
+            <a:pPr marL="1371600" lvl="2" indent="-457200">
+              <a:buFont typeface="+mj-lt"/>
+              <a:buAutoNum type="arabicParenR"/>
+            </a:pPr>
+            <a:r>
+              <a:rPr lang="en-US" altLang="zh-TW" dirty="0"/>
+              <a:t>Global:</a:t>
+            </a:r>
+            <a:r>
+              <a:rPr lang="zh-TW" altLang="en-US" dirty="0"/>
+              <a:t> </a:t>
+            </a:r>
+            <a:r>
+              <a:rPr lang="en-US" altLang="zh-TW" dirty="0" err="1"/>
+              <a:t>clk</a:t>
+            </a:r>
+            <a:r>
+              <a:rPr lang="en-US" altLang="zh-TW" dirty="0"/>
+              <a:t> &amp; reset</a:t>
+            </a:r>
+          </a:p>
+          <a:p>
+            <a:pPr marL="1371600" lvl="2" indent="-457200">
+              <a:buFont typeface="+mj-lt"/>
+              <a:buAutoNum type="arabicParenR"/>
+            </a:pPr>
+            <a:r>
+              <a:rPr lang="en-US" altLang="zh-TW" dirty="0"/>
+              <a:t>Address phase: </a:t>
+            </a:r>
+            <a:r>
+              <a:rPr lang="zh-TW" altLang="en-US" dirty="0"/>
+              <a:t>由 </a:t>
+            </a:r>
+            <a:r>
+              <a:rPr lang="en-US" altLang="zh-TW" dirty="0"/>
+              <a:t>address &amp; control </a:t>
+            </a:r>
+            <a:r>
+              <a:rPr lang="zh-TW" altLang="en-US" dirty="0"/>
+              <a:t>組成</a:t>
+            </a:r>
+            <a:endParaRPr lang="en-US" altLang="zh-TW" dirty="0"/>
+          </a:p>
+          <a:p>
+            <a:pPr marL="1371600" lvl="2" indent="-457200">
+              <a:buFont typeface="+mj-lt"/>
+              <a:buAutoNum type="arabicParenR"/>
+            </a:pPr>
+            <a:r>
+              <a:rPr lang="en-US" altLang="zh-TW" dirty="0"/>
+              <a:t>Data phase:</a:t>
+            </a:r>
+            <a:r>
+              <a:rPr lang="zh-TW" altLang="en-US" dirty="0"/>
+              <a:t> 由</a:t>
+            </a:r>
+            <a:r>
+              <a:rPr lang="en-US" altLang="zh-TW" dirty="0"/>
+              <a:t> data &amp; transfer response </a:t>
+            </a:r>
+            <a:r>
+              <a:rPr lang="zh-TW" altLang="en-US" dirty="0"/>
+              <a:t>組成</a:t>
+            </a:r>
+            <a:endParaRPr lang="en-US" altLang="zh-TW" dirty="0"/>
+          </a:p>
+        </p:txBody>
+      </p:sp>
+      <p:pic>
+        <p:nvPicPr>
+          <p:cNvPr id="6" name="圖片 5">
+            <a:extLst>
+              <a:ext uri="{FF2B5EF4-FFF2-40B4-BE49-F238E27FC236}">
+                <a16:creationId xmlns:a16="http://schemas.microsoft.com/office/drawing/2014/main" id="{92A6C649-DEDB-319C-F5C1-A78991DAE8A5}"/>
+              </a:ext>
+            </a:extLst>
+          </p:cNvPr>
+          <p:cNvPicPr>
+            <a:picLocks noChangeAspect="1"/>
+          </p:cNvPicPr>
+          <p:nvPr/>
+        </p:nvPicPr>
+        <p:blipFill>
+          <a:blip r:embed="rId2"/>
+          <a:stretch>
+            <a:fillRect/>
+          </a:stretch>
+        </p:blipFill>
+        <p:spPr>
+          <a:xfrm>
+            <a:off x="2493935" y="3922144"/>
+            <a:ext cx="7204131" cy="2708754"/>
+          </a:xfrm>
+          <a:prstGeom prst="rect">
+            <a:avLst/>
+          </a:prstGeom>
+          <a:ln>
+            <a:solidFill>
+              <a:schemeClr val="tx1"/>
+            </a:solidFill>
+          </a:ln>
+        </p:spPr>
+      </p:pic>
+    </p:spTree>
+    <p:extLst>
+      <p:ext uri="{BB962C8B-B14F-4D97-AF65-F5344CB8AC3E}">
+        <p14:creationId xmlns:p14="http://schemas.microsoft.com/office/powerpoint/2010/main" val="1374655008"/>
+      </p:ext>
+    </p:extLst>
+  </p:cSld>
+  <p:clrMapOvr>
+    <a:masterClrMapping/>
+  </p:clrMapOvr>
+</p:sld>
+</file>
+
+<file path=ppt/slides/slide12.xml><?xml version="1.0" encoding="utf-8"?>
+<p:sld xmlns:a="http://schemas.openxmlformats.org/drawingml/2006/main" xmlns:r="http://schemas.openxmlformats.org/officeDocument/2006/relationships" xmlns:p="http://schemas.openxmlformats.org/presentationml/2006/main">
+  <p:cSld>
+    <p:spTree>
+      <p:nvGrpSpPr>
+        <p:cNvPr id="1" name="">
+          <a:extLst>
+            <a:ext uri="{FF2B5EF4-FFF2-40B4-BE49-F238E27FC236}">
+              <a16:creationId xmlns:a16="http://schemas.microsoft.com/office/drawing/2014/main" id="{556BC052-1856-82F2-7DC9-29E841B9E586}"/>
+            </a:ext>
+          </a:extLst>
+        </p:cNvPr>
+        <p:cNvGrpSpPr/>
+        <p:nvPr/>
+      </p:nvGrpSpPr>
+      <p:grpSpPr>
+        <a:xfrm>
+          <a:off x="0" y="0"/>
+          <a:ext cx="0" cy="0"/>
+          <a:chOff x="0" y="0"/>
+          <a:chExt cx="0" cy="0"/>
+        </a:xfrm>
+      </p:grpSpPr>
+      <p:sp>
+        <p:nvSpPr>
+          <p:cNvPr id="2" name="標題 1">
+            <a:extLst>
+              <a:ext uri="{FF2B5EF4-FFF2-40B4-BE49-F238E27FC236}">
+                <a16:creationId xmlns:a16="http://schemas.microsoft.com/office/drawing/2014/main" id="{2451F8E2-3390-9D75-88BD-E30FFC4694B6}"/>
+              </a:ext>
+            </a:extLst>
+          </p:cNvPr>
+          <p:cNvSpPr>
+            <a:spLocks noGrp="1"/>
+          </p:cNvSpPr>
+          <p:nvPr>
+            <p:ph type="title"/>
+          </p:nvPr>
+        </p:nvSpPr>
+        <p:spPr/>
+        <p:txBody>
+          <a:bodyPr/>
+          <a:lstStyle/>
+          <a:p>
+            <a:r>
+              <a:rPr lang="en-US" altLang="zh-TW" dirty="0"/>
+              <a:t>AHB</a:t>
+            </a:r>
+            <a:r>
+              <a:rPr lang="zh-TW" altLang="en-US" dirty="0"/>
+              <a:t> </a:t>
+            </a:r>
+            <a:r>
+              <a:rPr lang="en-US" altLang="zh-TW" dirty="0"/>
+              <a:t>introduction (3/)</a:t>
+            </a:r>
+            <a:endParaRPr lang="zh-TW" altLang="en-US" dirty="0"/>
+          </a:p>
+        </p:txBody>
+      </p:sp>
+      <p:sp>
+        <p:nvSpPr>
+          <p:cNvPr id="3" name="內容版面配置區 2">
+            <a:extLst>
+              <a:ext uri="{FF2B5EF4-FFF2-40B4-BE49-F238E27FC236}">
+                <a16:creationId xmlns:a16="http://schemas.microsoft.com/office/drawing/2014/main" id="{6B30565B-F16E-61F8-AEC5-49411C48B6C5}"/>
+              </a:ext>
+            </a:extLst>
+          </p:cNvPr>
+          <p:cNvSpPr>
+            <a:spLocks noGrp="1"/>
+          </p:cNvSpPr>
+          <p:nvPr>
+            <p:ph idx="1"/>
+          </p:nvPr>
+        </p:nvSpPr>
+        <p:spPr/>
+        <p:txBody>
+          <a:bodyPr/>
+          <a:lstStyle/>
+          <a:p>
+            <a:pPr marL="514350" indent="-514350">
+              <a:buFont typeface="+mj-lt"/>
+              <a:buAutoNum type="arabicPeriod" startAt="2"/>
+            </a:pPr>
+            <a:r>
+              <a:rPr lang="en-US" altLang="zh-TW" dirty="0"/>
+              <a:t>AHB-Lite slave</a:t>
+            </a:r>
+          </a:p>
+          <a:p>
+            <a:pPr lvl="1"/>
+            <a:r>
+              <a:rPr lang="zh-TW" altLang="en-US" dirty="0"/>
+              <a:t>分成</a:t>
+            </a:r>
+            <a:endParaRPr lang="en-US" altLang="zh-TW" dirty="0"/>
+          </a:p>
+          <a:p>
+            <a:pPr marL="1371600" lvl="2" indent="-457200">
+              <a:buFont typeface="+mj-lt"/>
+              <a:buAutoNum type="arabicParenR"/>
+            </a:pPr>
+            <a:r>
+              <a:rPr lang="en-US" altLang="zh-TW" dirty="0"/>
+              <a:t>Global:</a:t>
+            </a:r>
+            <a:r>
+              <a:rPr lang="zh-TW" altLang="en-US" dirty="0"/>
+              <a:t> </a:t>
+            </a:r>
+            <a:r>
+              <a:rPr lang="en-US" altLang="zh-TW" dirty="0" err="1"/>
+              <a:t>clk</a:t>
+            </a:r>
+            <a:r>
+              <a:rPr lang="en-US" altLang="zh-TW" dirty="0"/>
+              <a:t> &amp; reset</a:t>
+            </a:r>
+          </a:p>
+          <a:p>
+            <a:pPr marL="1371600" lvl="2" indent="-457200">
+              <a:buFont typeface="+mj-lt"/>
+              <a:buAutoNum type="arabicParenR"/>
+            </a:pPr>
+            <a:r>
+              <a:rPr lang="en-US" altLang="zh-TW" dirty="0"/>
+              <a:t>Address phase: </a:t>
+            </a:r>
+            <a:r>
+              <a:rPr lang="zh-TW" altLang="en-US" dirty="0"/>
+              <a:t>由 </a:t>
+            </a:r>
+            <a:r>
+              <a:rPr lang="en-US" altLang="zh-TW" dirty="0"/>
+              <a:t>address &amp; control </a:t>
+            </a:r>
+            <a:r>
+              <a:rPr lang="zh-TW" altLang="en-US" dirty="0"/>
+              <a:t>組成</a:t>
+            </a:r>
+            <a:endParaRPr lang="en-US" altLang="zh-TW" dirty="0"/>
+          </a:p>
+          <a:p>
+            <a:pPr marL="1371600" lvl="2" indent="-457200">
+              <a:buFont typeface="+mj-lt"/>
+              <a:buAutoNum type="arabicParenR"/>
+            </a:pPr>
+            <a:r>
+              <a:rPr lang="en-US" altLang="zh-TW" dirty="0"/>
+              <a:t>Data phase:</a:t>
+            </a:r>
+            <a:r>
+              <a:rPr lang="zh-TW" altLang="en-US" dirty="0"/>
+              <a:t> 由</a:t>
+            </a:r>
+            <a:r>
+              <a:rPr lang="en-US" altLang="zh-TW" dirty="0"/>
+              <a:t> data &amp; transfer response </a:t>
+            </a:r>
+            <a:r>
+              <a:rPr lang="zh-TW" altLang="en-US" dirty="0"/>
+              <a:t>組成</a:t>
+            </a:r>
+            <a:endParaRPr lang="en-US" altLang="zh-TW" dirty="0"/>
+          </a:p>
+        </p:txBody>
+      </p:sp>
+      <p:pic>
+        <p:nvPicPr>
+          <p:cNvPr id="5" name="圖片 4">
+            <a:extLst>
+              <a:ext uri="{FF2B5EF4-FFF2-40B4-BE49-F238E27FC236}">
+                <a16:creationId xmlns:a16="http://schemas.microsoft.com/office/drawing/2014/main" id="{D7F31BA4-6560-B589-5823-22675BC9A446}"/>
+              </a:ext>
+            </a:extLst>
+          </p:cNvPr>
+          <p:cNvPicPr>
+            <a:picLocks noChangeAspect="1"/>
+          </p:cNvPicPr>
+          <p:nvPr/>
+        </p:nvPicPr>
+        <p:blipFill>
+          <a:blip r:embed="rId2"/>
+          <a:stretch>
+            <a:fillRect/>
+          </a:stretch>
+        </p:blipFill>
+        <p:spPr>
+          <a:xfrm>
+            <a:off x="3423326" y="3822497"/>
+            <a:ext cx="5345348" cy="2946424"/>
+          </a:xfrm>
+          <a:prstGeom prst="rect">
+            <a:avLst/>
+          </a:prstGeom>
+          <a:ln>
+            <a:solidFill>
+              <a:schemeClr val="tx1"/>
+            </a:solidFill>
+          </a:ln>
+        </p:spPr>
+      </p:pic>
+    </p:spTree>
+    <p:extLst>
+      <p:ext uri="{BB962C8B-B14F-4D97-AF65-F5344CB8AC3E}">
+        <p14:creationId xmlns:p14="http://schemas.microsoft.com/office/powerpoint/2010/main" val="35699136"/>
+      </p:ext>
+    </p:extLst>
+  </p:cSld>
+  <p:clrMapOvr>
+    <a:masterClrMapping/>
+  </p:clrMapOvr>
+</p:sld>
+</file>
+
+<file path=ppt/slides/slide13.xml><?xml version="1.0" encoding="utf-8"?>
+<p:sld xmlns:a="http://schemas.openxmlformats.org/drawingml/2006/main" xmlns:r="http://schemas.openxmlformats.org/officeDocument/2006/relationships" xmlns:p="http://schemas.openxmlformats.org/presentationml/2006/main">
+  <p:cSld>
+    <p:spTree>
+      <p:nvGrpSpPr>
+        <p:cNvPr id="1" name="">
+          <a:extLst>
+            <a:ext uri="{FF2B5EF4-FFF2-40B4-BE49-F238E27FC236}">
+              <a16:creationId xmlns:a16="http://schemas.microsoft.com/office/drawing/2014/main" id="{A893F6B2-95E6-66FE-1A1E-2454FCCE1C89}"/>
+            </a:ext>
+          </a:extLst>
+        </p:cNvPr>
+        <p:cNvGrpSpPr/>
+        <p:nvPr/>
+      </p:nvGrpSpPr>
+      <p:grpSpPr>
+        <a:xfrm>
+          <a:off x="0" y="0"/>
+          <a:ext cx="0" cy="0"/>
+          <a:chOff x="0" y="0"/>
+          <a:chExt cx="0" cy="0"/>
+        </a:xfrm>
+      </p:grpSpPr>
+      <p:sp>
+        <p:nvSpPr>
+          <p:cNvPr id="2" name="標題 1">
+            <a:extLst>
+              <a:ext uri="{FF2B5EF4-FFF2-40B4-BE49-F238E27FC236}">
+                <a16:creationId xmlns:a16="http://schemas.microsoft.com/office/drawing/2014/main" id="{C0E3A860-333C-4C39-5C94-063FE248AAC6}"/>
+              </a:ext>
+            </a:extLst>
+          </p:cNvPr>
+          <p:cNvSpPr>
+            <a:spLocks noGrp="1"/>
+          </p:cNvSpPr>
+          <p:nvPr>
+            <p:ph type="title"/>
+          </p:nvPr>
+        </p:nvSpPr>
+        <p:spPr/>
+        <p:txBody>
+          <a:bodyPr/>
+          <a:lstStyle/>
+          <a:p>
+            <a:r>
+              <a:rPr lang="en-US" altLang="zh-TW" dirty="0"/>
+              <a:t>AHB</a:t>
+            </a:r>
+            <a:r>
+              <a:rPr lang="zh-TW" altLang="en-US" dirty="0"/>
+              <a:t> </a:t>
+            </a:r>
+            <a:r>
+              <a:rPr lang="en-US" altLang="zh-TW" dirty="0"/>
+              <a:t>introduction (4/)</a:t>
+            </a:r>
+            <a:endParaRPr lang="zh-TW" altLang="en-US" dirty="0"/>
+          </a:p>
+        </p:txBody>
+      </p:sp>
+      <p:sp>
+        <p:nvSpPr>
+          <p:cNvPr id="3" name="內容版面配置區 2">
+            <a:extLst>
+              <a:ext uri="{FF2B5EF4-FFF2-40B4-BE49-F238E27FC236}">
+                <a16:creationId xmlns:a16="http://schemas.microsoft.com/office/drawing/2014/main" id="{969B53E3-F12E-1ED2-6F94-83C262E11832}"/>
+              </a:ext>
+            </a:extLst>
+          </p:cNvPr>
+          <p:cNvSpPr>
+            <a:spLocks noGrp="1"/>
+          </p:cNvSpPr>
+          <p:nvPr>
+            <p:ph idx="1"/>
+          </p:nvPr>
+        </p:nvSpPr>
+        <p:spPr/>
+        <p:txBody>
+          <a:bodyPr>
+            <a:normAutofit fontScale="92500" lnSpcReduction="10000"/>
+          </a:bodyPr>
+          <a:lstStyle/>
+          <a:p>
+            <a:pPr marL="514350" indent="-514350">
+              <a:buFont typeface="+mj-lt"/>
+              <a:buAutoNum type="arabicPeriod" startAt="3"/>
+            </a:pPr>
+            <a:r>
+              <a:rPr lang="en-US" altLang="zh-TW" dirty="0"/>
+              <a:t>Decoder</a:t>
+            </a:r>
+          </a:p>
+          <a:p>
+            <a:pPr lvl="1"/>
+            <a:r>
+              <a:rPr lang="zh-TW" altLang="en-US" dirty="0"/>
+              <a:t>將 </a:t>
+            </a:r>
+            <a:r>
+              <a:rPr lang="en-US" altLang="zh-TW" dirty="0"/>
+              <a:t>HADDR</a:t>
+            </a:r>
+            <a:r>
+              <a:rPr lang="zh-TW" altLang="en-US" dirty="0"/>
+              <a:t> 解碼，產生各 </a:t>
+            </a:r>
+            <a:r>
+              <a:rPr lang="en-US" altLang="zh-TW" dirty="0"/>
+              <a:t>slave </a:t>
+            </a:r>
+            <a:r>
+              <a:rPr lang="zh-TW" altLang="en-US" dirty="0"/>
+              <a:t>的 </a:t>
+            </a:r>
+            <a:r>
+              <a:rPr lang="en-US" altLang="zh-TW" dirty="0"/>
+              <a:t>HSEL </a:t>
+            </a:r>
+            <a:r>
+              <a:rPr lang="zh-TW" altLang="en-US" dirty="0"/>
+              <a:t>信號</a:t>
+            </a:r>
+            <a:endParaRPr lang="en-US" altLang="zh-TW" dirty="0"/>
+          </a:p>
+          <a:p>
+            <a:pPr lvl="1"/>
+            <a:endParaRPr lang="en-US" altLang="zh-TW" dirty="0"/>
+          </a:p>
+          <a:p>
+            <a:pPr marL="514350" indent="-514350">
+              <a:buFont typeface="+mj-lt"/>
+              <a:buAutoNum type="arabicPeriod" startAt="4"/>
+            </a:pPr>
+            <a:r>
+              <a:rPr lang="en-US" altLang="zh-TW" dirty="0"/>
+              <a:t>Multiplexor</a:t>
+            </a:r>
+            <a:r>
+              <a:rPr lang="zh-TW" altLang="en-US" dirty="0"/>
+              <a:t> </a:t>
+            </a:r>
+            <a:r>
+              <a:rPr lang="en-US" altLang="zh-TW" dirty="0"/>
+              <a:t>(MUX)</a:t>
+            </a:r>
+          </a:p>
+          <a:p>
+            <a:pPr marL="914400" lvl="1" indent="-457200">
+              <a:buFont typeface="+mj-lt"/>
+              <a:buAutoNum type="arabicParenR"/>
+            </a:pPr>
+            <a:r>
+              <a:rPr lang="zh-TW" altLang="en-US" dirty="0"/>
+              <a:t>單 </a:t>
+            </a:r>
+            <a:r>
+              <a:rPr lang="en-US" altLang="zh-TW" dirty="0"/>
+              <a:t>master </a:t>
+            </a:r>
+            <a:r>
+              <a:rPr lang="zh-TW" altLang="en-US" dirty="0"/>
+              <a:t>多 </a:t>
+            </a:r>
+            <a:r>
+              <a:rPr lang="en-US" altLang="zh-TW" dirty="0"/>
+              <a:t>slave</a:t>
+            </a:r>
+          </a:p>
+          <a:p>
+            <a:pPr lvl="2"/>
+            <a:r>
+              <a:rPr lang="en-US" altLang="zh-TW" dirty="0"/>
+              <a:t>MUX</a:t>
+            </a:r>
+            <a:r>
+              <a:rPr lang="zh-TW" altLang="en-US" dirty="0"/>
+              <a:t> 把各 </a:t>
+            </a:r>
+            <a:r>
+              <a:rPr lang="en-US" altLang="zh-TW" dirty="0"/>
+              <a:t>slave </a:t>
+            </a:r>
+            <a:r>
+              <a:rPr lang="zh-TW" altLang="en-US" dirty="0"/>
+              <a:t>的 </a:t>
+            </a:r>
+            <a:r>
+              <a:rPr lang="en-US" altLang="zh-TW" dirty="0"/>
+              <a:t>HRDATA, HRESP </a:t>
+            </a:r>
+            <a:r>
+              <a:rPr lang="zh-TW" altLang="en-US" dirty="0"/>
+              <a:t>選擇後輸出到 </a:t>
+            </a:r>
+            <a:r>
+              <a:rPr lang="en-US" altLang="zh-TW" dirty="0"/>
+              <a:t>master</a:t>
+            </a:r>
+          </a:p>
+          <a:p>
+            <a:pPr lvl="2"/>
+            <a:r>
+              <a:rPr lang="en-US" altLang="zh-TW" dirty="0"/>
+              <a:t>MUX</a:t>
+            </a:r>
+            <a:r>
+              <a:rPr lang="zh-TW" altLang="en-US" dirty="0"/>
+              <a:t> 把各 </a:t>
+            </a:r>
+            <a:r>
+              <a:rPr lang="en-US" altLang="zh-TW" dirty="0"/>
+              <a:t>slave </a:t>
+            </a:r>
+            <a:r>
+              <a:rPr lang="zh-TW" altLang="en-US" dirty="0"/>
+              <a:t>的 </a:t>
+            </a:r>
+            <a:r>
+              <a:rPr lang="en-US" altLang="zh-TW" dirty="0"/>
+              <a:t>HREADY_OUT</a:t>
+            </a:r>
+            <a:r>
+              <a:rPr lang="zh-TW" altLang="en-US" dirty="0"/>
+              <a:t> 選擇後輸出到 </a:t>
+            </a:r>
+            <a:r>
+              <a:rPr lang="en-US" altLang="zh-TW" dirty="0"/>
+              <a:t>master / slave</a:t>
+            </a:r>
+          </a:p>
+          <a:p>
+            <a:pPr marL="914400" lvl="1" indent="-457200">
+              <a:buFont typeface="+mj-lt"/>
+              <a:buAutoNum type="arabicParenR"/>
+            </a:pPr>
+            <a:r>
+              <a:rPr lang="zh-TW" altLang="en-US" dirty="0"/>
+              <a:t>多 </a:t>
+            </a:r>
+            <a:r>
+              <a:rPr lang="en-US" altLang="zh-TW" dirty="0"/>
+              <a:t>master </a:t>
+            </a:r>
+            <a:r>
+              <a:rPr lang="zh-TW" altLang="en-US" dirty="0"/>
+              <a:t>多 </a:t>
+            </a:r>
+            <a:r>
+              <a:rPr lang="en-US" altLang="zh-TW" dirty="0"/>
+              <a:t>slave</a:t>
+            </a:r>
+          </a:p>
+          <a:p>
+            <a:pPr marL="1371600" lvl="2" indent="-457200">
+              <a:buFont typeface="Wingdings" panose="05000000000000000000" pitchFamily="2" charset="2"/>
+              <a:buAutoNum type="circleNumWdWhitePlain"/>
+            </a:pPr>
+            <a:r>
+              <a:rPr lang="zh-TW" altLang="en-US" dirty="0"/>
+              <a:t>單層（</a:t>
+            </a:r>
+            <a:r>
+              <a:rPr lang="en-US" altLang="zh-TW" dirty="0"/>
+              <a:t>Single-Layer</a:t>
+            </a:r>
+            <a:r>
+              <a:rPr lang="zh-TW" altLang="en-US" dirty="0"/>
+              <a:t>，匯流排仲裁器 </a:t>
+            </a:r>
+            <a:r>
+              <a:rPr lang="en-US" altLang="zh-TW" dirty="0"/>
+              <a:t>bus arbiter</a:t>
+            </a:r>
+            <a:r>
+              <a:rPr lang="zh-TW" altLang="en-US" dirty="0"/>
+              <a:t>）</a:t>
+            </a:r>
+            <a:endParaRPr lang="en-US" altLang="zh-TW" dirty="0"/>
+          </a:p>
+          <a:p>
+            <a:pPr lvl="3"/>
+            <a:r>
+              <a:rPr lang="en-US" altLang="zh-TW" dirty="0"/>
+              <a:t>MUX</a:t>
+            </a:r>
+            <a:r>
+              <a:rPr lang="zh-TW" altLang="en-US" dirty="0"/>
+              <a:t> 將每個 </a:t>
+            </a:r>
+            <a:r>
+              <a:rPr lang="en-US" altLang="zh-TW" dirty="0"/>
+              <a:t>master </a:t>
+            </a:r>
+            <a:r>
+              <a:rPr lang="zh-TW" altLang="en-US" dirty="0"/>
+              <a:t>的 </a:t>
+            </a:r>
+            <a:r>
+              <a:rPr lang="en-US" altLang="zh-TW" dirty="0"/>
+              <a:t>address/control </a:t>
+            </a:r>
+            <a:r>
+              <a:rPr lang="zh-TW" altLang="en-US" dirty="0"/>
+              <a:t>訊號輸出到 </a:t>
+            </a:r>
+            <a:r>
+              <a:rPr lang="en-US" altLang="zh-TW" dirty="0"/>
+              <a:t>slave</a:t>
+            </a:r>
+          </a:p>
+          <a:p>
+            <a:pPr lvl="3"/>
+            <a:r>
+              <a:rPr lang="en-US" altLang="zh-TW" dirty="0"/>
+              <a:t>MUX</a:t>
+            </a:r>
+            <a:r>
+              <a:rPr lang="zh-TW" altLang="en-US" dirty="0"/>
+              <a:t> 將每個 </a:t>
+            </a:r>
+            <a:r>
+              <a:rPr lang="en-US" altLang="zh-TW" dirty="0"/>
+              <a:t>slave </a:t>
+            </a:r>
+            <a:r>
+              <a:rPr lang="zh-TW" altLang="en-US" dirty="0"/>
+              <a:t>的 </a:t>
+            </a:r>
+            <a:r>
+              <a:rPr lang="en-US" altLang="zh-TW" dirty="0" err="1"/>
+              <a:t>hrdata</a:t>
+            </a:r>
+            <a:r>
+              <a:rPr lang="zh-TW" altLang="en-US" dirty="0"/>
+              <a:t>、</a:t>
+            </a:r>
+            <a:r>
+              <a:rPr lang="en-US" altLang="zh-TW" dirty="0" err="1"/>
+              <a:t>hresp</a:t>
+            </a:r>
+            <a:r>
+              <a:rPr lang="en-US" altLang="zh-TW" dirty="0"/>
+              <a:t> </a:t>
+            </a:r>
+            <a:r>
+              <a:rPr lang="zh-TW" altLang="en-US" dirty="0"/>
+              <a:t>選擇後輸出到 </a:t>
+            </a:r>
+            <a:r>
+              <a:rPr lang="en-US" altLang="zh-TW" dirty="0"/>
+              <a:t>master</a:t>
+            </a:r>
+          </a:p>
+          <a:p>
+            <a:pPr lvl="3"/>
+            <a:r>
+              <a:rPr lang="en-US" altLang="zh-TW" dirty="0"/>
+              <a:t>MUX</a:t>
+            </a:r>
+            <a:r>
+              <a:rPr lang="zh-TW" altLang="en-US" dirty="0"/>
+              <a:t> 將每個 </a:t>
+            </a:r>
+            <a:r>
+              <a:rPr lang="en-US" altLang="zh-TW" dirty="0"/>
+              <a:t>slave </a:t>
+            </a:r>
+            <a:r>
+              <a:rPr lang="zh-TW" altLang="en-US" dirty="0"/>
+              <a:t>的 </a:t>
+            </a:r>
+            <a:r>
+              <a:rPr lang="en-US" altLang="zh-TW" dirty="0" err="1"/>
+              <a:t>hready_out</a:t>
+            </a:r>
+            <a:r>
+              <a:rPr lang="en-US" altLang="zh-TW" dirty="0"/>
+              <a:t> </a:t>
+            </a:r>
+            <a:r>
+              <a:rPr lang="zh-TW" altLang="en-US" dirty="0"/>
+              <a:t>選擇後輸出到 </a:t>
+            </a:r>
+            <a:r>
+              <a:rPr lang="en-US" altLang="zh-TW" dirty="0"/>
+              <a:t>master/slave</a:t>
+            </a:r>
+          </a:p>
+          <a:p>
+            <a:pPr marL="1371600" lvl="2" indent="-457200">
+              <a:buFont typeface="Wingdings" panose="05000000000000000000" pitchFamily="2" charset="2"/>
+              <a:buAutoNum type="circleNumWdWhitePlain"/>
+            </a:pPr>
+            <a:r>
+              <a:rPr lang="zh-TW" altLang="en-US" dirty="0"/>
+              <a:t>多層（</a:t>
+            </a:r>
+            <a:r>
+              <a:rPr lang="en-US" altLang="zh-TW" dirty="0"/>
+              <a:t>Multi-Layer</a:t>
+            </a:r>
+            <a:r>
+              <a:rPr lang="zh-TW" altLang="en-US" dirty="0"/>
+              <a:t>，匯流排矩陣 </a:t>
+            </a:r>
+            <a:r>
+              <a:rPr lang="en-US" altLang="zh-TW" dirty="0"/>
+              <a:t>bus matrix</a:t>
+            </a:r>
+            <a:r>
+              <a:rPr lang="zh-TW" altLang="en-US" dirty="0"/>
+              <a:t>）</a:t>
+            </a:r>
+            <a:endParaRPr lang="en-US" altLang="zh-TW" dirty="0"/>
+          </a:p>
+        </p:txBody>
+      </p:sp>
+    </p:spTree>
+    <p:extLst>
+      <p:ext uri="{BB962C8B-B14F-4D97-AF65-F5344CB8AC3E}">
+        <p14:creationId xmlns:p14="http://schemas.microsoft.com/office/powerpoint/2010/main" val="4219584344"/>
+      </p:ext>
+    </p:extLst>
+  </p:cSld>
+  <p:clrMapOvr>
+    <a:masterClrMapping/>
+  </p:clrMapOvr>
+</p:sld>
+</file>
+
+<file path=ppt/slides/slide14.xml><?xml version="1.0" encoding="utf-8"?>
+<p:sld xmlns:a="http://schemas.openxmlformats.org/drawingml/2006/main" xmlns:r="http://schemas.openxmlformats.org/officeDocument/2006/relationships" xmlns:p="http://schemas.openxmlformats.org/presentationml/2006/main">
+  <p:cSld>
+    <p:spTree>
+      <p:nvGrpSpPr>
+        <p:cNvPr id="1" name=""/>
+        <p:cNvGrpSpPr/>
+        <p:nvPr/>
+      </p:nvGrpSpPr>
+      <p:grpSpPr>
+        <a:xfrm>
+          <a:off x="0" y="0"/>
+          <a:ext cx="0" cy="0"/>
+          <a:chOff x="0" y="0"/>
+          <a:chExt cx="0" cy="0"/>
+        </a:xfrm>
+      </p:grpSpPr>
+      <p:sp>
+        <p:nvSpPr>
+          <p:cNvPr id="2" name="標題 1">
+            <a:extLst>
+              <a:ext uri="{FF2B5EF4-FFF2-40B4-BE49-F238E27FC236}">
+                <a16:creationId xmlns:a16="http://schemas.microsoft.com/office/drawing/2014/main" id="{1117985C-DA79-E940-5008-78B2D7652565}"/>
+              </a:ext>
+            </a:extLst>
+          </p:cNvPr>
+          <p:cNvSpPr>
+            <a:spLocks noGrp="1"/>
+          </p:cNvSpPr>
+          <p:nvPr>
+            <p:ph type="title"/>
+          </p:nvPr>
+        </p:nvSpPr>
+        <p:spPr/>
+        <p:txBody>
+          <a:bodyPr/>
+          <a:lstStyle/>
+          <a:p>
+            <a:r>
+              <a:rPr lang="en-US" altLang="zh-TW" dirty="0"/>
+              <a:t>AHB</a:t>
+            </a:r>
+            <a:r>
+              <a:rPr lang="zh-TW" altLang="en-US" dirty="0"/>
+              <a:t> </a:t>
+            </a:r>
+            <a:r>
+              <a:rPr lang="en-US" altLang="zh-TW" dirty="0"/>
+              <a:t>Signal Descriptions</a:t>
+            </a:r>
+            <a:r>
+              <a:rPr lang="zh-TW" altLang="en-US" dirty="0"/>
+              <a:t> </a:t>
+            </a:r>
+            <a:r>
+              <a:rPr lang="en-US" altLang="zh-TW" dirty="0"/>
+              <a:t>(1/)</a:t>
+            </a:r>
+            <a:endParaRPr lang="zh-TW" altLang="en-US" dirty="0"/>
+          </a:p>
+        </p:txBody>
+      </p:sp>
+      <p:sp>
+        <p:nvSpPr>
+          <p:cNvPr id="3" name="內容版面配置區 2">
+            <a:extLst>
+              <a:ext uri="{FF2B5EF4-FFF2-40B4-BE49-F238E27FC236}">
+                <a16:creationId xmlns:a16="http://schemas.microsoft.com/office/drawing/2014/main" id="{6C783E97-423C-491A-2452-80F641AC5928}"/>
+              </a:ext>
+            </a:extLst>
+          </p:cNvPr>
+          <p:cNvSpPr>
+            <a:spLocks noGrp="1"/>
+          </p:cNvSpPr>
+          <p:nvPr>
+            <p:ph idx="1"/>
+          </p:nvPr>
+        </p:nvSpPr>
+        <p:spPr/>
+        <p:txBody>
+          <a:bodyPr/>
+          <a:lstStyle/>
+          <a:p>
+            <a:pPr marL="514350" indent="-514350">
+              <a:buFont typeface="+mj-lt"/>
+              <a:buAutoNum type="arabicPeriod"/>
+            </a:pPr>
+            <a:r>
+              <a:rPr lang="en-US" altLang="zh-TW" dirty="0"/>
+              <a:t>Global signal</a:t>
+            </a:r>
+          </a:p>
+          <a:p>
+            <a:pPr marL="514350" indent="-514350">
+              <a:buFont typeface="+mj-lt"/>
+              <a:buAutoNum type="arabicPeriod"/>
+            </a:pPr>
+            <a:r>
+              <a:rPr lang="en-US" altLang="zh-TW" dirty="0"/>
+              <a:t>Master signal</a:t>
+            </a:r>
+          </a:p>
+          <a:p>
+            <a:pPr marL="514350" indent="-514350">
+              <a:buFont typeface="+mj-lt"/>
+              <a:buAutoNum type="arabicPeriod"/>
+            </a:pPr>
+            <a:r>
+              <a:rPr lang="en-US" altLang="zh-TW" dirty="0"/>
+              <a:t>Slave signal</a:t>
+            </a:r>
+          </a:p>
+          <a:p>
+            <a:pPr marL="514350" indent="-514350">
+              <a:buFont typeface="+mj-lt"/>
+              <a:buAutoNum type="arabicPeriod"/>
+            </a:pPr>
+            <a:r>
+              <a:rPr lang="en-US" altLang="zh-TW" dirty="0"/>
+              <a:t>Decoder signal</a:t>
+            </a:r>
+          </a:p>
+          <a:p>
+            <a:pPr marL="514350" indent="-514350">
+              <a:buFont typeface="+mj-lt"/>
+              <a:buAutoNum type="arabicPeriod"/>
+            </a:pPr>
+            <a:r>
+              <a:rPr lang="en-US" altLang="zh-TW" dirty="0"/>
+              <a:t>Multiplexor signal</a:t>
+            </a:r>
+          </a:p>
+        </p:txBody>
+      </p:sp>
+    </p:spTree>
+    <p:extLst>
+      <p:ext uri="{BB962C8B-B14F-4D97-AF65-F5344CB8AC3E}">
+        <p14:creationId xmlns:p14="http://schemas.microsoft.com/office/powerpoint/2010/main" val="1525437937"/>
       </p:ext>
     </p:extLst>
   </p:cSld>

</xml_diff>

<commit_message>
Modify: AMBA/AMBA_learning.pptx 1. Add chapter 2 AHB Signal Descriptions
</commit_message>
<xml_diff>
--- a/AMBA/AMBA_learning.pptx
+++ b/AMBA/AMBA_learning.pptx
@@ -19,6 +19,12 @@
     <p:sldId id="280" r:id="rId13"/>
     <p:sldId id="281" r:id="rId14"/>
     <p:sldId id="277" r:id="rId15"/>
+    <p:sldId id="282" r:id="rId16"/>
+    <p:sldId id="283" r:id="rId17"/>
+    <p:sldId id="284" r:id="rId18"/>
+    <p:sldId id="285" r:id="rId19"/>
+    <p:sldId id="286" r:id="rId20"/>
+    <p:sldId id="287" r:id="rId21"/>
   </p:sldIdLst>
   <p:sldSz cx="12192000" cy="6858000"/>
   <p:notesSz cx="6858000" cy="9144000"/>
@@ -272,7 +278,7 @@
           <a:p>
             <a:fld id="{277B1798-C61C-4271-ABD9-F0F48E058C48}" type="datetimeFigureOut">
               <a:rPr lang="zh-TW" altLang="en-US" smtClean="0"/>
-              <a:t>2025/7/6</a:t>
+              <a:t>2025/7/7</a:t>
             </a:fld>
             <a:endParaRPr lang="zh-TW" altLang="en-US"/>
           </a:p>
@@ -470,7 +476,7 @@
           <a:p>
             <a:fld id="{277B1798-C61C-4271-ABD9-F0F48E058C48}" type="datetimeFigureOut">
               <a:rPr lang="zh-TW" altLang="en-US" smtClean="0"/>
-              <a:t>2025/7/6</a:t>
+              <a:t>2025/7/7</a:t>
             </a:fld>
             <a:endParaRPr lang="zh-TW" altLang="en-US"/>
           </a:p>
@@ -678,7 +684,7 @@
           <a:p>
             <a:fld id="{277B1798-C61C-4271-ABD9-F0F48E058C48}" type="datetimeFigureOut">
               <a:rPr lang="zh-TW" altLang="en-US" smtClean="0"/>
-              <a:t>2025/7/6</a:t>
+              <a:t>2025/7/7</a:t>
             </a:fld>
             <a:endParaRPr lang="zh-TW" altLang="en-US"/>
           </a:p>
@@ -876,7 +882,7 @@
           <a:p>
             <a:fld id="{277B1798-C61C-4271-ABD9-F0F48E058C48}" type="datetimeFigureOut">
               <a:rPr lang="zh-TW" altLang="en-US" smtClean="0"/>
-              <a:t>2025/7/6</a:t>
+              <a:t>2025/7/7</a:t>
             </a:fld>
             <a:endParaRPr lang="zh-TW" altLang="en-US"/>
           </a:p>
@@ -1151,7 +1157,7 @@
           <a:p>
             <a:fld id="{277B1798-C61C-4271-ABD9-F0F48E058C48}" type="datetimeFigureOut">
               <a:rPr lang="zh-TW" altLang="en-US" smtClean="0"/>
-              <a:t>2025/7/6</a:t>
+              <a:t>2025/7/7</a:t>
             </a:fld>
             <a:endParaRPr lang="zh-TW" altLang="en-US"/>
           </a:p>
@@ -1416,7 +1422,7 @@
           <a:p>
             <a:fld id="{277B1798-C61C-4271-ABD9-F0F48E058C48}" type="datetimeFigureOut">
               <a:rPr lang="zh-TW" altLang="en-US" smtClean="0"/>
-              <a:t>2025/7/6</a:t>
+              <a:t>2025/7/7</a:t>
             </a:fld>
             <a:endParaRPr lang="zh-TW" altLang="en-US"/>
           </a:p>
@@ -1828,7 +1834,7 @@
           <a:p>
             <a:fld id="{277B1798-C61C-4271-ABD9-F0F48E058C48}" type="datetimeFigureOut">
               <a:rPr lang="zh-TW" altLang="en-US" smtClean="0"/>
-              <a:t>2025/7/6</a:t>
+              <a:t>2025/7/7</a:t>
             </a:fld>
             <a:endParaRPr lang="zh-TW" altLang="en-US"/>
           </a:p>
@@ -1969,7 +1975,7 @@
           <a:p>
             <a:fld id="{277B1798-C61C-4271-ABD9-F0F48E058C48}" type="datetimeFigureOut">
               <a:rPr lang="zh-TW" altLang="en-US" smtClean="0"/>
-              <a:t>2025/7/6</a:t>
+              <a:t>2025/7/7</a:t>
             </a:fld>
             <a:endParaRPr lang="zh-TW" altLang="en-US"/>
           </a:p>
@@ -2082,7 +2088,7 @@
           <a:p>
             <a:fld id="{277B1798-C61C-4271-ABD9-F0F48E058C48}" type="datetimeFigureOut">
               <a:rPr lang="zh-TW" altLang="en-US" smtClean="0"/>
-              <a:t>2025/7/6</a:t>
+              <a:t>2025/7/7</a:t>
             </a:fld>
             <a:endParaRPr lang="zh-TW" altLang="en-US"/>
           </a:p>
@@ -2393,7 +2399,7 @@
           <a:p>
             <a:fld id="{277B1798-C61C-4271-ABD9-F0F48E058C48}" type="datetimeFigureOut">
               <a:rPr lang="zh-TW" altLang="en-US" smtClean="0"/>
-              <a:t>2025/7/6</a:t>
+              <a:t>2025/7/7</a:t>
             </a:fld>
             <a:endParaRPr lang="zh-TW" altLang="en-US"/>
           </a:p>
@@ -2681,7 +2687,7 @@
           <a:p>
             <a:fld id="{277B1798-C61C-4271-ABD9-F0F48E058C48}" type="datetimeFigureOut">
               <a:rPr lang="zh-TW" altLang="en-US" smtClean="0"/>
-              <a:t>2025/7/6</a:t>
+              <a:t>2025/7/7</a:t>
             </a:fld>
             <a:endParaRPr lang="zh-TW" altLang="en-US"/>
           </a:p>
@@ -2922,7 +2928,7 @@
           <a:p>
             <a:fld id="{277B1798-C61C-4271-ABD9-F0F48E058C48}" type="datetimeFigureOut">
               <a:rPr lang="zh-TW" altLang="en-US" smtClean="0"/>
-              <a:t>2025/7/6</a:t>
+              <a:t>2025/7/7</a:t>
             </a:fld>
             <a:endParaRPr lang="zh-TW" altLang="en-US"/>
           </a:p>
@@ -3463,7 +3469,7 @@
             </a:r>
             <a:r>
               <a:rPr lang="en-US" altLang="zh-TW" dirty="0"/>
-              <a:t>introduction (1/)</a:t>
+              <a:t>introduction (1/4)</a:t>
             </a:r>
             <a:endParaRPr lang="zh-TW" altLang="en-US" dirty="0"/>
           </a:p>
@@ -3639,7 +3645,7 @@
             </a:r>
             <a:r>
               <a:rPr lang="en-US" altLang="zh-TW" dirty="0"/>
-              <a:t>introduction (2/)</a:t>
+              <a:t>introduction (2/4)</a:t>
             </a:r>
             <a:endParaRPr lang="zh-TW" altLang="en-US" dirty="0"/>
           </a:p>
@@ -3855,7 +3861,7 @@
             </a:r>
             <a:r>
               <a:rPr lang="en-US" altLang="zh-TW" dirty="0"/>
-              <a:t>introduction (3/)</a:t>
+              <a:t>introduction (3/4)</a:t>
             </a:r>
             <a:endParaRPr lang="zh-TW" altLang="en-US" dirty="0"/>
           </a:p>
@@ -4071,7 +4077,7 @@
             </a:r>
             <a:r>
               <a:rPr lang="en-US" altLang="zh-TW" dirty="0"/>
-              <a:t>introduction (4/)</a:t>
+              <a:t>introduction (4/4)</a:t>
             </a:r>
             <a:endParaRPr lang="zh-TW" altLang="en-US" dirty="0"/>
           </a:p>
@@ -4503,7 +4509,7 @@
             </a:r>
             <a:r>
               <a:rPr lang="en-US" altLang="zh-TW" dirty="0"/>
-              <a:t>(1/)</a:t>
+              <a:t>(1/7)</a:t>
             </a:r>
             <a:endParaRPr lang="zh-TW" altLang="en-US" dirty="0"/>
           </a:p>
@@ -4585,6 +4591,2412 @@
     <p:extLst>
       <p:ext uri="{BB962C8B-B14F-4D97-AF65-F5344CB8AC3E}">
         <p14:creationId xmlns:p14="http://schemas.microsoft.com/office/powerpoint/2010/main" val="1525437937"/>
+      </p:ext>
+    </p:extLst>
+  </p:cSld>
+  <p:clrMapOvr>
+    <a:masterClrMapping/>
+  </p:clrMapOvr>
+</p:sld>
+</file>
+
+<file path=ppt/slides/slide15.xml><?xml version="1.0" encoding="utf-8"?>
+<p:sld xmlns:a="http://schemas.openxmlformats.org/drawingml/2006/main" xmlns:r="http://schemas.openxmlformats.org/officeDocument/2006/relationships" xmlns:p="http://schemas.openxmlformats.org/presentationml/2006/main">
+  <p:cSld>
+    <p:spTree>
+      <p:nvGrpSpPr>
+        <p:cNvPr id="1" name="">
+          <a:extLst>
+            <a:ext uri="{FF2B5EF4-FFF2-40B4-BE49-F238E27FC236}">
+              <a16:creationId xmlns:a16="http://schemas.microsoft.com/office/drawing/2014/main" id="{5631E524-328E-44FA-2CA0-7A9ED3B11A33}"/>
+            </a:ext>
+          </a:extLst>
+        </p:cNvPr>
+        <p:cNvGrpSpPr/>
+        <p:nvPr/>
+      </p:nvGrpSpPr>
+      <p:grpSpPr>
+        <a:xfrm>
+          <a:off x="0" y="0"/>
+          <a:ext cx="0" cy="0"/>
+          <a:chOff x="0" y="0"/>
+          <a:chExt cx="0" cy="0"/>
+        </a:xfrm>
+      </p:grpSpPr>
+      <p:sp>
+        <p:nvSpPr>
+          <p:cNvPr id="2" name="標題 1">
+            <a:extLst>
+              <a:ext uri="{FF2B5EF4-FFF2-40B4-BE49-F238E27FC236}">
+                <a16:creationId xmlns:a16="http://schemas.microsoft.com/office/drawing/2014/main" id="{7A49AC3D-BBCF-F10B-E11B-3CEB8D88DBB9}"/>
+              </a:ext>
+            </a:extLst>
+          </p:cNvPr>
+          <p:cNvSpPr>
+            <a:spLocks noGrp="1"/>
+          </p:cNvSpPr>
+          <p:nvPr>
+            <p:ph type="title"/>
+          </p:nvPr>
+        </p:nvSpPr>
+        <p:spPr/>
+        <p:txBody>
+          <a:bodyPr/>
+          <a:lstStyle/>
+          <a:p>
+            <a:r>
+              <a:rPr lang="en-US" altLang="zh-TW" dirty="0"/>
+              <a:t>AHB</a:t>
+            </a:r>
+            <a:r>
+              <a:rPr lang="zh-TW" altLang="en-US" dirty="0"/>
+              <a:t> </a:t>
+            </a:r>
+            <a:r>
+              <a:rPr lang="en-US" altLang="zh-TW" dirty="0"/>
+              <a:t>Signal Descriptions</a:t>
+            </a:r>
+            <a:r>
+              <a:rPr lang="zh-TW" altLang="en-US" dirty="0"/>
+              <a:t> </a:t>
+            </a:r>
+            <a:r>
+              <a:rPr lang="en-US" altLang="zh-TW" dirty="0"/>
+              <a:t>(2/7)</a:t>
+            </a:r>
+            <a:endParaRPr lang="zh-TW" altLang="en-US" dirty="0"/>
+          </a:p>
+        </p:txBody>
+      </p:sp>
+      <p:sp>
+        <p:nvSpPr>
+          <p:cNvPr id="3" name="內容版面配置區 2">
+            <a:extLst>
+              <a:ext uri="{FF2B5EF4-FFF2-40B4-BE49-F238E27FC236}">
+                <a16:creationId xmlns:a16="http://schemas.microsoft.com/office/drawing/2014/main" id="{8C2330FE-A66B-186A-3E0C-1ED89B940B0B}"/>
+              </a:ext>
+            </a:extLst>
+          </p:cNvPr>
+          <p:cNvSpPr>
+            <a:spLocks noGrp="1"/>
+          </p:cNvSpPr>
+          <p:nvPr>
+            <p:ph idx="1"/>
+          </p:nvPr>
+        </p:nvSpPr>
+        <p:spPr/>
+        <p:txBody>
+          <a:bodyPr/>
+          <a:lstStyle/>
+          <a:p>
+            <a:pPr marL="514350" indent="-514350">
+              <a:buFont typeface="+mj-lt"/>
+              <a:buAutoNum type="arabicPeriod"/>
+            </a:pPr>
+            <a:r>
+              <a:rPr lang="en-US" altLang="zh-TW" dirty="0"/>
+              <a:t>Global signal</a:t>
+            </a:r>
+          </a:p>
+          <a:p>
+            <a:pPr marL="514350" indent="-514350">
+              <a:buFont typeface="+mj-lt"/>
+              <a:buAutoNum type="arabicPeriod"/>
+            </a:pPr>
+            <a:endParaRPr lang="en-US" altLang="zh-TW" dirty="0"/>
+          </a:p>
+        </p:txBody>
+      </p:sp>
+      <p:graphicFrame>
+        <p:nvGraphicFramePr>
+          <p:cNvPr id="4" name="表格 3">
+            <a:extLst>
+              <a:ext uri="{FF2B5EF4-FFF2-40B4-BE49-F238E27FC236}">
+                <a16:creationId xmlns:a16="http://schemas.microsoft.com/office/drawing/2014/main" id="{E35B63FA-CE53-5C80-8A35-1CA3F18889F6}"/>
+              </a:ext>
+            </a:extLst>
+          </p:cNvPr>
+          <p:cNvGraphicFramePr>
+            <a:graphicFrameLocks noGrp="1"/>
+          </p:cNvGraphicFramePr>
+          <p:nvPr>
+            <p:extLst>
+              <p:ext uri="{D42A27DB-BD31-4B8C-83A1-F6EECF244321}">
+                <p14:modId xmlns:p14="http://schemas.microsoft.com/office/powerpoint/2010/main" val="1990887668"/>
+              </p:ext>
+            </p:extLst>
+          </p:nvPr>
+        </p:nvGraphicFramePr>
+        <p:xfrm>
+          <a:off x="2032000" y="2451531"/>
+          <a:ext cx="8127999" cy="1112520"/>
+        </p:xfrm>
+        <a:graphic>
+          <a:graphicData uri="http://schemas.openxmlformats.org/drawingml/2006/table">
+            <a:tbl>
+              <a:tblPr firstRow="1" bandRow="1">
+                <a:tableStyleId>{5C22544A-7EE6-4342-B048-85BDC9FD1C3A}</a:tableStyleId>
+              </a:tblPr>
+              <a:tblGrid>
+                <a:gridCol w="2709333">
+                  <a:extLst>
+                    <a:ext uri="{9D8B030D-6E8A-4147-A177-3AD203B41FA5}">
+                      <a16:colId xmlns:a16="http://schemas.microsoft.com/office/drawing/2014/main" val="1485549075"/>
+                    </a:ext>
+                  </a:extLst>
+                </a:gridCol>
+                <a:gridCol w="2709333">
+                  <a:extLst>
+                    <a:ext uri="{9D8B030D-6E8A-4147-A177-3AD203B41FA5}">
+                      <a16:colId xmlns:a16="http://schemas.microsoft.com/office/drawing/2014/main" val="1812413034"/>
+                    </a:ext>
+                  </a:extLst>
+                </a:gridCol>
+                <a:gridCol w="2709333">
+                  <a:extLst>
+                    <a:ext uri="{9D8B030D-6E8A-4147-A177-3AD203B41FA5}">
+                      <a16:colId xmlns:a16="http://schemas.microsoft.com/office/drawing/2014/main" val="1577056355"/>
+                    </a:ext>
+                  </a:extLst>
+                </a:gridCol>
+              </a:tblGrid>
+              <a:tr h="370840">
+                <a:tc>
+                  <a:txBody>
+                    <a:bodyPr/>
+                    <a:lstStyle/>
+                    <a:p>
+                      <a:pPr algn="ctr"/>
+                      <a:r>
+                        <a:rPr lang="en-US" altLang="zh-TW" dirty="0"/>
+                        <a:t>Name</a:t>
+                      </a:r>
+                      <a:endParaRPr lang="zh-TW" altLang="en-US" dirty="0"/>
+                    </a:p>
+                  </a:txBody>
+                  <a:tcPr/>
+                </a:tc>
+                <a:tc>
+                  <a:txBody>
+                    <a:bodyPr/>
+                    <a:lstStyle/>
+                    <a:p>
+                      <a:pPr algn="ctr"/>
+                      <a:r>
+                        <a:rPr lang="en-US" altLang="zh-TW" dirty="0"/>
+                        <a:t>Source</a:t>
+                      </a:r>
+                      <a:endParaRPr lang="zh-TW" altLang="en-US" dirty="0"/>
+                    </a:p>
+                  </a:txBody>
+                  <a:tcPr/>
+                </a:tc>
+                <a:tc>
+                  <a:txBody>
+                    <a:bodyPr/>
+                    <a:lstStyle/>
+                    <a:p>
+                      <a:pPr algn="ctr"/>
+                      <a:r>
+                        <a:rPr lang="en-US" altLang="zh-TW" dirty="0"/>
+                        <a:t>Description</a:t>
+                      </a:r>
+                      <a:endParaRPr lang="zh-TW" altLang="en-US" dirty="0"/>
+                    </a:p>
+                  </a:txBody>
+                  <a:tcPr/>
+                </a:tc>
+                <a:extLst>
+                  <a:ext uri="{0D108BD9-81ED-4DB2-BD59-A6C34878D82A}">
+                    <a16:rowId xmlns:a16="http://schemas.microsoft.com/office/drawing/2014/main" val="607370041"/>
+                  </a:ext>
+                </a:extLst>
+              </a:tr>
+              <a:tr h="370840">
+                <a:tc>
+                  <a:txBody>
+                    <a:bodyPr/>
+                    <a:lstStyle/>
+                    <a:p>
+                      <a:pPr algn="ctr"/>
+                      <a:r>
+                        <a:rPr lang="en-US" altLang="zh-TW" dirty="0"/>
+                        <a:t>HCLK</a:t>
+                      </a:r>
+                      <a:endParaRPr lang="zh-TW" altLang="en-US" dirty="0"/>
+                    </a:p>
+                  </a:txBody>
+                  <a:tcPr/>
+                </a:tc>
+                <a:tc>
+                  <a:txBody>
+                    <a:bodyPr/>
+                    <a:lstStyle/>
+                    <a:p>
+                      <a:pPr algn="ctr"/>
+                      <a:r>
+                        <a:rPr lang="en-US" altLang="zh-TW" dirty="0"/>
+                        <a:t>Clock source</a:t>
+                      </a:r>
+                      <a:endParaRPr lang="zh-TW" altLang="en-US" dirty="0"/>
+                    </a:p>
+                  </a:txBody>
+                  <a:tcPr/>
+                </a:tc>
+                <a:tc>
+                  <a:txBody>
+                    <a:bodyPr/>
+                    <a:lstStyle/>
+                    <a:p>
+                      <a:pPr algn="ctr"/>
+                      <a:r>
+                        <a:rPr lang="zh-TW" altLang="en-US" dirty="0"/>
+                        <a:t>整個系統的 </a:t>
+                      </a:r>
+                      <a:r>
+                        <a:rPr lang="en-US" altLang="zh-TW" dirty="0"/>
+                        <a:t>Clock</a:t>
+                      </a:r>
+                      <a:endParaRPr lang="zh-TW" altLang="en-US" dirty="0"/>
+                    </a:p>
+                  </a:txBody>
+                  <a:tcPr/>
+                </a:tc>
+                <a:extLst>
+                  <a:ext uri="{0D108BD9-81ED-4DB2-BD59-A6C34878D82A}">
+                    <a16:rowId xmlns:a16="http://schemas.microsoft.com/office/drawing/2014/main" val="2888379893"/>
+                  </a:ext>
+                </a:extLst>
+              </a:tr>
+              <a:tr h="370840">
+                <a:tc>
+                  <a:txBody>
+                    <a:bodyPr/>
+                    <a:lstStyle/>
+                    <a:p>
+                      <a:pPr algn="ctr"/>
+                      <a:r>
+                        <a:rPr lang="en-US" altLang="zh-TW" dirty="0" err="1"/>
+                        <a:t>HRESETn</a:t>
+                      </a:r>
+                      <a:endParaRPr lang="zh-TW" altLang="en-US" dirty="0"/>
+                    </a:p>
+                  </a:txBody>
+                  <a:tcPr/>
+                </a:tc>
+                <a:tc>
+                  <a:txBody>
+                    <a:bodyPr/>
+                    <a:lstStyle/>
+                    <a:p>
+                      <a:pPr algn="ctr"/>
+                      <a:r>
+                        <a:rPr lang="en-US" altLang="zh-TW" dirty="0"/>
+                        <a:t>Reset controller</a:t>
+                      </a:r>
+                      <a:endParaRPr lang="zh-TW" altLang="en-US" dirty="0"/>
+                    </a:p>
+                  </a:txBody>
+                  <a:tcPr/>
+                </a:tc>
+                <a:tc>
+                  <a:txBody>
+                    <a:bodyPr/>
+                    <a:lstStyle/>
+                    <a:p>
+                      <a:pPr algn="ctr"/>
+                      <a:r>
+                        <a:rPr lang="zh-TW" altLang="en-US" dirty="0"/>
+                        <a:t>重置訊號 </a:t>
+                      </a:r>
+                    </a:p>
+                  </a:txBody>
+                  <a:tcPr/>
+                </a:tc>
+                <a:extLst>
+                  <a:ext uri="{0D108BD9-81ED-4DB2-BD59-A6C34878D82A}">
+                    <a16:rowId xmlns:a16="http://schemas.microsoft.com/office/drawing/2014/main" val="2736777749"/>
+                  </a:ext>
+                </a:extLst>
+              </a:tr>
+            </a:tbl>
+          </a:graphicData>
+        </a:graphic>
+      </p:graphicFrame>
+    </p:spTree>
+    <p:extLst>
+      <p:ext uri="{BB962C8B-B14F-4D97-AF65-F5344CB8AC3E}">
+        <p14:creationId xmlns:p14="http://schemas.microsoft.com/office/powerpoint/2010/main" val="216339879"/>
+      </p:ext>
+    </p:extLst>
+  </p:cSld>
+  <p:clrMapOvr>
+    <a:masterClrMapping/>
+  </p:clrMapOvr>
+</p:sld>
+</file>
+
+<file path=ppt/slides/slide16.xml><?xml version="1.0" encoding="utf-8"?>
+<p:sld xmlns:a="http://schemas.openxmlformats.org/drawingml/2006/main" xmlns:r="http://schemas.openxmlformats.org/officeDocument/2006/relationships" xmlns:p="http://schemas.openxmlformats.org/presentationml/2006/main">
+  <p:cSld>
+    <p:spTree>
+      <p:nvGrpSpPr>
+        <p:cNvPr id="1" name="">
+          <a:extLst>
+            <a:ext uri="{FF2B5EF4-FFF2-40B4-BE49-F238E27FC236}">
+              <a16:creationId xmlns:a16="http://schemas.microsoft.com/office/drawing/2014/main" id="{1BD958BF-88E4-BC1D-9917-F429C5BE7C3D}"/>
+            </a:ext>
+          </a:extLst>
+        </p:cNvPr>
+        <p:cNvGrpSpPr/>
+        <p:nvPr/>
+      </p:nvGrpSpPr>
+      <p:grpSpPr>
+        <a:xfrm>
+          <a:off x="0" y="0"/>
+          <a:ext cx="0" cy="0"/>
+          <a:chOff x="0" y="0"/>
+          <a:chExt cx="0" cy="0"/>
+        </a:xfrm>
+      </p:grpSpPr>
+      <p:sp>
+        <p:nvSpPr>
+          <p:cNvPr id="2" name="標題 1">
+            <a:extLst>
+              <a:ext uri="{FF2B5EF4-FFF2-40B4-BE49-F238E27FC236}">
+                <a16:creationId xmlns:a16="http://schemas.microsoft.com/office/drawing/2014/main" id="{A662673B-E23E-588D-197D-DBC60EA369F8}"/>
+              </a:ext>
+            </a:extLst>
+          </p:cNvPr>
+          <p:cNvSpPr>
+            <a:spLocks noGrp="1"/>
+          </p:cNvSpPr>
+          <p:nvPr>
+            <p:ph type="title"/>
+          </p:nvPr>
+        </p:nvSpPr>
+        <p:spPr/>
+        <p:txBody>
+          <a:bodyPr/>
+          <a:lstStyle/>
+          <a:p>
+            <a:r>
+              <a:rPr lang="en-US" altLang="zh-TW" dirty="0"/>
+              <a:t>AHB</a:t>
+            </a:r>
+            <a:r>
+              <a:rPr lang="zh-TW" altLang="en-US" dirty="0"/>
+              <a:t> </a:t>
+            </a:r>
+            <a:r>
+              <a:rPr lang="en-US" altLang="zh-TW" dirty="0"/>
+              <a:t>Signal Descriptions</a:t>
+            </a:r>
+            <a:r>
+              <a:rPr lang="zh-TW" altLang="en-US" dirty="0"/>
+              <a:t> </a:t>
+            </a:r>
+            <a:r>
+              <a:rPr lang="en-US" altLang="zh-TW" dirty="0"/>
+              <a:t>(3/7)</a:t>
+            </a:r>
+            <a:endParaRPr lang="zh-TW" altLang="en-US" dirty="0"/>
+          </a:p>
+        </p:txBody>
+      </p:sp>
+      <p:sp>
+        <p:nvSpPr>
+          <p:cNvPr id="3" name="內容版面配置區 2">
+            <a:extLst>
+              <a:ext uri="{FF2B5EF4-FFF2-40B4-BE49-F238E27FC236}">
+                <a16:creationId xmlns:a16="http://schemas.microsoft.com/office/drawing/2014/main" id="{2885B7C2-D0EB-668D-09C1-D1307D1FC960}"/>
+              </a:ext>
+            </a:extLst>
+          </p:cNvPr>
+          <p:cNvSpPr>
+            <a:spLocks noGrp="1"/>
+          </p:cNvSpPr>
+          <p:nvPr>
+            <p:ph idx="1"/>
+          </p:nvPr>
+        </p:nvSpPr>
+        <p:spPr/>
+        <p:txBody>
+          <a:bodyPr/>
+          <a:lstStyle/>
+          <a:p>
+            <a:pPr marL="514350" indent="-514350">
+              <a:buFont typeface="+mj-lt"/>
+              <a:buAutoNum type="arabicPeriod" startAt="2"/>
+            </a:pPr>
+            <a:r>
+              <a:rPr lang="en-US" altLang="zh-TW" dirty="0"/>
+              <a:t>Master signal</a:t>
+            </a:r>
+          </a:p>
+          <a:p>
+            <a:pPr marL="514350" indent="-514350">
+              <a:buFont typeface="+mj-lt"/>
+              <a:buAutoNum type="arabicPeriod" startAt="2"/>
+            </a:pPr>
+            <a:endParaRPr lang="en-US" altLang="zh-TW" dirty="0"/>
+          </a:p>
+        </p:txBody>
+      </p:sp>
+      <p:graphicFrame>
+        <p:nvGraphicFramePr>
+          <p:cNvPr id="4" name="表格 3">
+            <a:extLst>
+              <a:ext uri="{FF2B5EF4-FFF2-40B4-BE49-F238E27FC236}">
+                <a16:creationId xmlns:a16="http://schemas.microsoft.com/office/drawing/2014/main" id="{894FAE3A-7E4A-CCAC-C002-385667C06F1E}"/>
+              </a:ext>
+            </a:extLst>
+          </p:cNvPr>
+          <p:cNvGraphicFramePr>
+            <a:graphicFrameLocks noGrp="1"/>
+          </p:cNvGraphicFramePr>
+          <p:nvPr>
+            <p:extLst>
+              <p:ext uri="{D42A27DB-BD31-4B8C-83A1-F6EECF244321}">
+                <p14:modId xmlns:p14="http://schemas.microsoft.com/office/powerpoint/2010/main" val="441554126"/>
+              </p:ext>
+            </p:extLst>
+          </p:nvPr>
+        </p:nvGraphicFramePr>
+        <p:xfrm>
+          <a:off x="1075426" y="2463033"/>
+          <a:ext cx="10719759" cy="3860800"/>
+        </p:xfrm>
+        <a:graphic>
+          <a:graphicData uri="http://schemas.openxmlformats.org/drawingml/2006/table">
+            <a:tbl>
+              <a:tblPr firstRow="1" bandRow="1">
+                <a:tableStyleId>{5C22544A-7EE6-4342-B048-85BDC9FD1C3A}</a:tableStyleId>
+              </a:tblPr>
+              <a:tblGrid>
+                <a:gridCol w="2493034">
+                  <a:extLst>
+                    <a:ext uri="{9D8B030D-6E8A-4147-A177-3AD203B41FA5}">
+                      <a16:colId xmlns:a16="http://schemas.microsoft.com/office/drawing/2014/main" val="1485549075"/>
+                    </a:ext>
+                  </a:extLst>
+                </a:gridCol>
+                <a:gridCol w="2493034">
+                  <a:extLst>
+                    <a:ext uri="{9D8B030D-6E8A-4147-A177-3AD203B41FA5}">
+                      <a16:colId xmlns:a16="http://schemas.microsoft.com/office/drawing/2014/main" val="1812413034"/>
+                    </a:ext>
+                  </a:extLst>
+                </a:gridCol>
+                <a:gridCol w="5733691">
+                  <a:extLst>
+                    <a:ext uri="{9D8B030D-6E8A-4147-A177-3AD203B41FA5}">
+                      <a16:colId xmlns:a16="http://schemas.microsoft.com/office/drawing/2014/main" val="1577056355"/>
+                    </a:ext>
+                  </a:extLst>
+                </a:gridCol>
+              </a:tblGrid>
+              <a:tr h="370840">
+                <a:tc>
+                  <a:txBody>
+                    <a:bodyPr/>
+                    <a:lstStyle/>
+                    <a:p>
+                      <a:pPr algn="ctr"/>
+                      <a:r>
+                        <a:rPr lang="en-US" altLang="zh-TW" dirty="0"/>
+                        <a:t>Name</a:t>
+                      </a:r>
+                      <a:endParaRPr lang="zh-TW" altLang="en-US" dirty="0"/>
+                    </a:p>
+                  </a:txBody>
+                  <a:tcPr/>
+                </a:tc>
+                <a:tc>
+                  <a:txBody>
+                    <a:bodyPr/>
+                    <a:lstStyle/>
+                    <a:p>
+                      <a:pPr algn="ctr"/>
+                      <a:r>
+                        <a:rPr lang="en-US" altLang="zh-TW" dirty="0"/>
+                        <a:t>Destination</a:t>
+                      </a:r>
+                      <a:endParaRPr lang="zh-TW" altLang="en-US" dirty="0"/>
+                    </a:p>
+                  </a:txBody>
+                  <a:tcPr/>
+                </a:tc>
+                <a:tc>
+                  <a:txBody>
+                    <a:bodyPr/>
+                    <a:lstStyle/>
+                    <a:p>
+                      <a:pPr algn="ctr"/>
+                      <a:r>
+                        <a:rPr lang="en-US" altLang="zh-TW" dirty="0"/>
+                        <a:t>Description</a:t>
+                      </a:r>
+                      <a:endParaRPr lang="zh-TW" altLang="en-US" dirty="0"/>
+                    </a:p>
+                  </a:txBody>
+                  <a:tcPr/>
+                </a:tc>
+                <a:extLst>
+                  <a:ext uri="{0D108BD9-81ED-4DB2-BD59-A6C34878D82A}">
+                    <a16:rowId xmlns:a16="http://schemas.microsoft.com/office/drawing/2014/main" val="607370041"/>
+                  </a:ext>
+                </a:extLst>
+              </a:tr>
+              <a:tr h="370840">
+                <a:tc>
+                  <a:txBody>
+                    <a:bodyPr/>
+                    <a:lstStyle/>
+                    <a:p>
+                      <a:pPr algn="ctr"/>
+                      <a:r>
+                        <a:rPr lang="en-US" altLang="zh-TW" dirty="0"/>
+                        <a:t>HADDR[31:0]</a:t>
+                      </a:r>
+                      <a:endParaRPr lang="zh-TW" altLang="en-US" dirty="0"/>
+                    </a:p>
+                  </a:txBody>
+                  <a:tcPr/>
+                </a:tc>
+                <a:tc>
+                  <a:txBody>
+                    <a:bodyPr/>
+                    <a:lstStyle/>
+                    <a:p>
+                      <a:pPr algn="ctr"/>
+                      <a:r>
+                        <a:rPr lang="en-US" altLang="zh-TW" dirty="0"/>
+                        <a:t>Slave and decoder</a:t>
+                      </a:r>
+                      <a:endParaRPr lang="zh-TW" altLang="en-US" dirty="0"/>
+                    </a:p>
+                  </a:txBody>
+                  <a:tcPr/>
+                </a:tc>
+                <a:tc>
+                  <a:txBody>
+                    <a:bodyPr/>
+                    <a:lstStyle/>
+                    <a:p>
+                      <a:pPr algn="l"/>
+                      <a:r>
+                        <a:rPr lang="en-US" altLang="zh-TW" dirty="0"/>
+                        <a:t>32 bit </a:t>
+                      </a:r>
+                      <a:r>
+                        <a:rPr lang="zh-TW" altLang="en-US" dirty="0"/>
+                        <a:t>的 </a:t>
+                      </a:r>
+                      <a:r>
+                        <a:rPr lang="en-US" altLang="zh-TW" dirty="0"/>
+                        <a:t>system address bus</a:t>
+                      </a:r>
+                      <a:endParaRPr lang="zh-TW" altLang="en-US" dirty="0"/>
+                    </a:p>
+                  </a:txBody>
+                  <a:tcPr/>
+                </a:tc>
+                <a:extLst>
+                  <a:ext uri="{0D108BD9-81ED-4DB2-BD59-A6C34878D82A}">
+                    <a16:rowId xmlns:a16="http://schemas.microsoft.com/office/drawing/2014/main" val="2888379893"/>
+                  </a:ext>
+                </a:extLst>
+              </a:tr>
+              <a:tr h="370840">
+                <a:tc>
+                  <a:txBody>
+                    <a:bodyPr/>
+                    <a:lstStyle/>
+                    <a:p>
+                      <a:pPr algn="ctr"/>
+                      <a:r>
+                        <a:rPr lang="en-US" altLang="zh-TW" dirty="0"/>
+                        <a:t>HBURST[2:0]</a:t>
+                      </a:r>
+                      <a:endParaRPr lang="zh-TW" altLang="en-US" dirty="0"/>
+                    </a:p>
+                  </a:txBody>
+                  <a:tcPr/>
+                </a:tc>
+                <a:tc>
+                  <a:txBody>
+                    <a:bodyPr/>
+                    <a:lstStyle/>
+                    <a:p>
+                      <a:pPr algn="ctr"/>
+                      <a:r>
+                        <a:rPr lang="en-US" altLang="zh-TW" dirty="0"/>
+                        <a:t>Slave</a:t>
+                      </a:r>
+                      <a:endParaRPr lang="zh-TW" altLang="en-US" dirty="0"/>
+                    </a:p>
+                  </a:txBody>
+                  <a:tcPr/>
+                </a:tc>
+                <a:tc>
+                  <a:txBody>
+                    <a:bodyPr/>
+                    <a:lstStyle/>
+                    <a:p>
+                      <a:pPr algn="l"/>
+                      <a:r>
+                        <a:rPr lang="en-US" altLang="zh-TW" sz="1600" dirty="0"/>
+                        <a:t>burst type</a:t>
+                      </a:r>
+                      <a:r>
+                        <a:rPr lang="zh-TW" altLang="en-US" sz="1600" dirty="0"/>
+                        <a:t> 表示此次傳輸是單次傳輸還是屬於</a:t>
+                      </a:r>
+                      <a:r>
+                        <a:rPr lang="en-US" altLang="zh-TW" sz="1600" dirty="0"/>
+                        <a:t>burst</a:t>
+                      </a:r>
+                      <a:r>
+                        <a:rPr lang="zh-TW" altLang="en-US" sz="1600" dirty="0"/>
+                        <a:t>傳輸。</a:t>
+                      </a:r>
+                      <a:endParaRPr lang="en-US" altLang="zh-TW" sz="1600" dirty="0"/>
+                    </a:p>
+                    <a:p>
+                      <a:pPr algn="l"/>
+                      <a:r>
+                        <a:rPr lang="zh-TW" altLang="en-US" sz="1600" dirty="0"/>
+                        <a:t>系統支援固定長度的突發傳輸，包含 </a:t>
+                      </a:r>
+                      <a:r>
+                        <a:rPr lang="en-US" altLang="zh-TW" sz="1600" dirty="0"/>
+                        <a:t>4</a:t>
+                      </a:r>
+                      <a:r>
+                        <a:rPr lang="zh-TW" altLang="en-US" sz="1600" dirty="0"/>
+                        <a:t>、</a:t>
+                      </a:r>
+                      <a:r>
+                        <a:rPr lang="en-US" altLang="zh-TW" sz="1600" dirty="0"/>
+                        <a:t>8 </a:t>
+                      </a:r>
+                      <a:r>
+                        <a:rPr lang="zh-TW" altLang="en-US" sz="1600" dirty="0"/>
+                        <a:t>和 </a:t>
+                      </a:r>
+                      <a:r>
+                        <a:rPr lang="en-US" altLang="zh-TW" sz="1600" dirty="0"/>
+                        <a:t>16 </a:t>
+                      </a:r>
+                      <a:r>
+                        <a:rPr lang="zh-TW" altLang="en-US" sz="1600" dirty="0"/>
+                        <a:t>個 </a:t>
+                      </a:r>
+                      <a:r>
+                        <a:rPr lang="en-US" altLang="zh-TW" sz="1600" dirty="0"/>
+                        <a:t>beats</a:t>
+                      </a:r>
+                      <a:r>
+                        <a:rPr lang="zh-TW" altLang="en-US" sz="1600" dirty="0"/>
+                        <a:t>。</a:t>
+                      </a:r>
+                      <a:endParaRPr lang="en-US" altLang="zh-TW" sz="1600" dirty="0"/>
+                    </a:p>
+                    <a:p>
+                      <a:pPr algn="l"/>
+                      <a:r>
+                        <a:rPr lang="en-US" altLang="zh-TW" sz="1600" dirty="0"/>
+                        <a:t>burst</a:t>
+                      </a:r>
+                      <a:r>
+                        <a:rPr lang="zh-TW" altLang="en-US" sz="1600" dirty="0"/>
+                        <a:t>傳輸可以是遞增（</a:t>
+                      </a:r>
+                      <a:r>
+                        <a:rPr lang="en-US" altLang="zh-TW" sz="1600" dirty="0" err="1"/>
+                        <a:t>incr</a:t>
+                      </a:r>
+                      <a:r>
+                        <a:rPr lang="zh-TW" altLang="en-US" sz="1600" dirty="0"/>
+                        <a:t>）或循環（</a:t>
+                      </a:r>
+                      <a:r>
+                        <a:rPr lang="en-US" altLang="zh-TW" sz="1600" dirty="0"/>
+                        <a:t>wrap</a:t>
+                      </a:r>
+                      <a:r>
+                        <a:rPr lang="zh-TW" altLang="en-US" sz="1600" dirty="0"/>
+                        <a:t>）方式。</a:t>
+                      </a:r>
+                      <a:endParaRPr lang="en-US" altLang="zh-TW" sz="1600" dirty="0"/>
+                    </a:p>
+                    <a:p>
+                      <a:pPr algn="l"/>
+                      <a:r>
+                        <a:rPr lang="zh-TW" altLang="en-US" sz="1600" dirty="0"/>
+                        <a:t>也支援長度不定的遞增式</a:t>
+                      </a:r>
+                      <a:r>
+                        <a:rPr lang="en-US" altLang="zh-TW" sz="1600" dirty="0"/>
+                        <a:t>burst</a:t>
+                      </a:r>
+                      <a:r>
+                        <a:rPr lang="zh-TW" altLang="en-US" sz="1600" dirty="0"/>
+                        <a:t>傳輸。</a:t>
+                      </a:r>
+                    </a:p>
+                  </a:txBody>
+                  <a:tcPr/>
+                </a:tc>
+                <a:extLst>
+                  <a:ext uri="{0D108BD9-81ED-4DB2-BD59-A6C34878D82A}">
+                    <a16:rowId xmlns:a16="http://schemas.microsoft.com/office/drawing/2014/main" val="2736777749"/>
+                  </a:ext>
+                </a:extLst>
+              </a:tr>
+              <a:tr h="370840">
+                <a:tc>
+                  <a:txBody>
+                    <a:bodyPr/>
+                    <a:lstStyle/>
+                    <a:p>
+                      <a:pPr algn="ctr"/>
+                      <a:r>
+                        <a:rPr lang="en-US" altLang="zh-TW" dirty="0"/>
+                        <a:t>HMASTLOCK</a:t>
+                      </a:r>
+                      <a:endParaRPr lang="zh-TW" altLang="en-US" dirty="0"/>
+                    </a:p>
+                  </a:txBody>
+                  <a:tcPr/>
+                </a:tc>
+                <a:tc>
+                  <a:txBody>
+                    <a:bodyPr/>
+                    <a:lstStyle/>
+                    <a:p>
+                      <a:pPr algn="ctr"/>
+                      <a:r>
+                        <a:rPr lang="en-US" altLang="zh-TW" dirty="0"/>
+                        <a:t>Slave</a:t>
+                      </a:r>
+                      <a:endParaRPr lang="zh-TW" altLang="en-US" dirty="0"/>
+                    </a:p>
+                  </a:txBody>
+                  <a:tcPr/>
+                </a:tc>
+                <a:tc>
+                  <a:txBody>
+                    <a:bodyPr/>
+                    <a:lstStyle/>
+                    <a:p>
+                      <a:pPr algn="l"/>
+                      <a:r>
+                        <a:rPr lang="zh-TW" altLang="en-US" sz="1600" dirty="0"/>
+                        <a:t>當此訊號為高電位（</a:t>
+                      </a:r>
+                      <a:r>
+                        <a:rPr lang="en-US" altLang="zh-TW" sz="1600" dirty="0"/>
+                        <a:t>HIGH</a:t>
+                      </a:r>
+                      <a:r>
+                        <a:rPr lang="zh-TW" altLang="en-US" sz="1600" dirty="0"/>
+                        <a:t>）時，</a:t>
+                      </a:r>
+                      <a:endParaRPr lang="en-US" altLang="zh-TW" sz="1600" dirty="0"/>
+                    </a:p>
+                    <a:p>
+                      <a:pPr algn="l"/>
+                      <a:r>
+                        <a:rPr lang="zh-TW" altLang="en-US" sz="1600" dirty="0"/>
+                        <a:t>表示目前的傳輸是屬於一個 </a:t>
+                      </a:r>
+                      <a:r>
+                        <a:rPr lang="en-US" altLang="zh-TW" sz="1600" dirty="0"/>
+                        <a:t>locked sequence</a:t>
+                      </a:r>
+                      <a:r>
+                        <a:rPr lang="zh-TW" altLang="en-US" sz="1600" dirty="0"/>
+                        <a:t> 的一部分。</a:t>
+                      </a:r>
+                      <a:endParaRPr lang="en-US" altLang="zh-TW" sz="1600" dirty="0"/>
+                    </a:p>
+                    <a:p>
+                      <a:pPr algn="l"/>
+                      <a:r>
+                        <a:rPr lang="zh-TW" altLang="en-US" sz="1600" dirty="0"/>
+                        <a:t>不能讓其他</a:t>
+                      </a:r>
+                      <a:r>
+                        <a:rPr lang="en-US" altLang="zh-TW" sz="1600" dirty="0"/>
+                        <a:t>master</a:t>
+                      </a:r>
+                      <a:r>
+                        <a:rPr lang="zh-TW" altLang="en-US" sz="1600" dirty="0"/>
+                        <a:t>來存取此</a:t>
+                      </a:r>
+                      <a:r>
+                        <a:rPr lang="en-US" altLang="zh-TW" sz="1600" dirty="0"/>
+                        <a:t>slave</a:t>
+                      </a:r>
+                      <a:r>
+                        <a:rPr lang="zh-TW" altLang="en-US" sz="1600" dirty="0"/>
+                        <a:t>。</a:t>
+                      </a:r>
+                      <a:endParaRPr lang="en-US" altLang="zh-TW" sz="1600" dirty="0"/>
+                    </a:p>
+                    <a:p>
+                      <a:pPr algn="l"/>
+                      <a:r>
+                        <a:rPr lang="zh-TW" altLang="en-US" sz="1600" dirty="0">
+                          <a:solidFill>
+                            <a:srgbClr val="FF0000"/>
+                          </a:solidFill>
+                        </a:rPr>
+                        <a:t>表示目前的傳輸序列是不可分割的，</a:t>
+                      </a:r>
+                      <a:endParaRPr lang="en-US" altLang="zh-TW" sz="1600" dirty="0">
+                        <a:solidFill>
+                          <a:srgbClr val="FF0000"/>
+                        </a:solidFill>
+                      </a:endParaRPr>
+                    </a:p>
+                    <a:p>
+                      <a:pPr algn="l"/>
+                      <a:r>
+                        <a:rPr lang="zh-TW" altLang="en-US" sz="1600" dirty="0">
+                          <a:solidFill>
+                            <a:srgbClr val="FF0000"/>
+                          </a:solidFill>
+                        </a:rPr>
+                        <a:t>因此必須在處理其他傳輸之前優先完成。</a:t>
+                      </a:r>
+                      <a:endParaRPr lang="en-US" altLang="zh-TW" sz="1600" dirty="0">
+                        <a:solidFill>
+                          <a:srgbClr val="FF0000"/>
+                        </a:solidFill>
+                      </a:endParaRPr>
+                    </a:p>
+                  </a:txBody>
+                  <a:tcPr/>
+                </a:tc>
+                <a:extLst>
+                  <a:ext uri="{0D108BD9-81ED-4DB2-BD59-A6C34878D82A}">
+                    <a16:rowId xmlns:a16="http://schemas.microsoft.com/office/drawing/2014/main" val="3110160557"/>
+                  </a:ext>
+                </a:extLst>
+              </a:tr>
+              <a:tr h="370840">
+                <a:tc>
+                  <a:txBody>
+                    <a:bodyPr/>
+                    <a:lstStyle/>
+                    <a:p>
+                      <a:pPr algn="ctr"/>
+                      <a:r>
+                        <a:rPr lang="en-US" altLang="zh-TW" dirty="0"/>
+                        <a:t>HPROT[3:0]</a:t>
+                      </a:r>
+                      <a:endParaRPr lang="zh-TW" altLang="en-US" dirty="0"/>
+                    </a:p>
+                  </a:txBody>
+                  <a:tcPr/>
+                </a:tc>
+                <a:tc>
+                  <a:txBody>
+                    <a:bodyPr/>
+                    <a:lstStyle/>
+                    <a:p>
+                      <a:pPr algn="ctr"/>
+                      <a:r>
+                        <a:rPr lang="en-US" altLang="zh-TW" dirty="0"/>
+                        <a:t>Slave</a:t>
+                      </a:r>
+                      <a:endParaRPr lang="zh-TW" altLang="en-US" dirty="0"/>
+                    </a:p>
+                  </a:txBody>
+                  <a:tcPr/>
+                </a:tc>
+                <a:tc>
+                  <a:txBody>
+                    <a:bodyPr/>
+                    <a:lstStyle/>
+                    <a:p>
+                      <a:pPr algn="l"/>
+                      <a:endParaRPr lang="zh-TW" altLang="en-US" dirty="0"/>
+                    </a:p>
+                  </a:txBody>
+                  <a:tcPr/>
+                </a:tc>
+                <a:extLst>
+                  <a:ext uri="{0D108BD9-81ED-4DB2-BD59-A6C34878D82A}">
+                    <a16:rowId xmlns:a16="http://schemas.microsoft.com/office/drawing/2014/main" val="2164535834"/>
+                  </a:ext>
+                </a:extLst>
+              </a:tr>
+              <a:tr h="370840">
+                <a:tc>
+                  <a:txBody>
+                    <a:bodyPr/>
+                    <a:lstStyle/>
+                    <a:p>
+                      <a:pPr algn="ctr"/>
+                      <a:r>
+                        <a:rPr lang="en-US" altLang="zh-TW" dirty="0"/>
+                        <a:t>HSIZE[2:0]</a:t>
+                      </a:r>
+                      <a:endParaRPr lang="zh-TW" altLang="en-US" dirty="0"/>
+                    </a:p>
+                  </a:txBody>
+                  <a:tcPr/>
+                </a:tc>
+                <a:tc>
+                  <a:txBody>
+                    <a:bodyPr/>
+                    <a:lstStyle/>
+                    <a:p>
+                      <a:pPr algn="ctr"/>
+                      <a:r>
+                        <a:rPr lang="en-US" altLang="zh-TW" dirty="0"/>
+                        <a:t>Slave</a:t>
+                      </a:r>
+                      <a:endParaRPr lang="zh-TW" altLang="en-US" dirty="0"/>
+                    </a:p>
+                  </a:txBody>
+                  <a:tcPr/>
+                </a:tc>
+                <a:tc>
+                  <a:txBody>
+                    <a:bodyPr/>
+                    <a:lstStyle/>
+                    <a:p>
+                      <a:pPr algn="l"/>
+                      <a:endParaRPr lang="zh-TW" altLang="en-US" dirty="0"/>
+                    </a:p>
+                  </a:txBody>
+                  <a:tcPr/>
+                </a:tc>
+                <a:extLst>
+                  <a:ext uri="{0D108BD9-81ED-4DB2-BD59-A6C34878D82A}">
+                    <a16:rowId xmlns:a16="http://schemas.microsoft.com/office/drawing/2014/main" val="3468224830"/>
+                  </a:ext>
+                </a:extLst>
+              </a:tr>
+            </a:tbl>
+          </a:graphicData>
+        </a:graphic>
+      </p:graphicFrame>
+    </p:spTree>
+    <p:extLst>
+      <p:ext uri="{BB962C8B-B14F-4D97-AF65-F5344CB8AC3E}">
+        <p14:creationId xmlns:p14="http://schemas.microsoft.com/office/powerpoint/2010/main" val="2745765604"/>
+      </p:ext>
+    </p:extLst>
+  </p:cSld>
+  <p:clrMapOvr>
+    <a:masterClrMapping/>
+  </p:clrMapOvr>
+</p:sld>
+</file>
+
+<file path=ppt/slides/slide17.xml><?xml version="1.0" encoding="utf-8"?>
+<p:sld xmlns:a="http://schemas.openxmlformats.org/drawingml/2006/main" xmlns:r="http://schemas.openxmlformats.org/officeDocument/2006/relationships" xmlns:p="http://schemas.openxmlformats.org/presentationml/2006/main">
+  <p:cSld>
+    <p:spTree>
+      <p:nvGrpSpPr>
+        <p:cNvPr id="1" name="">
+          <a:extLst>
+            <a:ext uri="{FF2B5EF4-FFF2-40B4-BE49-F238E27FC236}">
+              <a16:creationId xmlns:a16="http://schemas.microsoft.com/office/drawing/2014/main" id="{41A0758E-5F02-5D95-C681-664341A18905}"/>
+            </a:ext>
+          </a:extLst>
+        </p:cNvPr>
+        <p:cNvGrpSpPr/>
+        <p:nvPr/>
+      </p:nvGrpSpPr>
+      <p:grpSpPr>
+        <a:xfrm>
+          <a:off x="0" y="0"/>
+          <a:ext cx="0" cy="0"/>
+          <a:chOff x="0" y="0"/>
+          <a:chExt cx="0" cy="0"/>
+        </a:xfrm>
+      </p:grpSpPr>
+      <p:sp>
+        <p:nvSpPr>
+          <p:cNvPr id="2" name="標題 1">
+            <a:extLst>
+              <a:ext uri="{FF2B5EF4-FFF2-40B4-BE49-F238E27FC236}">
+                <a16:creationId xmlns:a16="http://schemas.microsoft.com/office/drawing/2014/main" id="{EE34C91B-6255-DBCD-9FCA-B941280BD14C}"/>
+              </a:ext>
+            </a:extLst>
+          </p:cNvPr>
+          <p:cNvSpPr>
+            <a:spLocks noGrp="1"/>
+          </p:cNvSpPr>
+          <p:nvPr>
+            <p:ph type="title"/>
+          </p:nvPr>
+        </p:nvSpPr>
+        <p:spPr/>
+        <p:txBody>
+          <a:bodyPr/>
+          <a:lstStyle/>
+          <a:p>
+            <a:r>
+              <a:rPr lang="en-US" altLang="zh-TW" dirty="0"/>
+              <a:t>AHB</a:t>
+            </a:r>
+            <a:r>
+              <a:rPr lang="zh-TW" altLang="en-US" dirty="0"/>
+              <a:t> </a:t>
+            </a:r>
+            <a:r>
+              <a:rPr lang="en-US" altLang="zh-TW" dirty="0"/>
+              <a:t>Signal Descriptions</a:t>
+            </a:r>
+            <a:r>
+              <a:rPr lang="zh-TW" altLang="en-US" dirty="0"/>
+              <a:t> </a:t>
+            </a:r>
+            <a:r>
+              <a:rPr lang="en-US" altLang="zh-TW" dirty="0"/>
+              <a:t>(4/7)</a:t>
+            </a:r>
+            <a:endParaRPr lang="zh-TW" altLang="en-US" dirty="0"/>
+          </a:p>
+        </p:txBody>
+      </p:sp>
+      <p:sp>
+        <p:nvSpPr>
+          <p:cNvPr id="3" name="內容版面配置區 2">
+            <a:extLst>
+              <a:ext uri="{FF2B5EF4-FFF2-40B4-BE49-F238E27FC236}">
+                <a16:creationId xmlns:a16="http://schemas.microsoft.com/office/drawing/2014/main" id="{8A7DE5C1-FD0E-251E-5344-E6E246EA5CC8}"/>
+              </a:ext>
+            </a:extLst>
+          </p:cNvPr>
+          <p:cNvSpPr>
+            <a:spLocks noGrp="1"/>
+          </p:cNvSpPr>
+          <p:nvPr>
+            <p:ph idx="1"/>
+          </p:nvPr>
+        </p:nvSpPr>
+        <p:spPr/>
+        <p:txBody>
+          <a:bodyPr/>
+          <a:lstStyle/>
+          <a:p>
+            <a:pPr marL="514350" indent="-514350">
+              <a:buFont typeface="+mj-lt"/>
+              <a:buAutoNum type="arabicPeriod" startAt="2"/>
+            </a:pPr>
+            <a:r>
+              <a:rPr lang="en-US" altLang="zh-TW" dirty="0"/>
+              <a:t>Master signal</a:t>
+            </a:r>
+          </a:p>
+          <a:p>
+            <a:pPr marL="514350" indent="-514350">
+              <a:buFont typeface="+mj-lt"/>
+              <a:buAutoNum type="arabicPeriod" startAt="2"/>
+            </a:pPr>
+            <a:endParaRPr lang="en-US" altLang="zh-TW" dirty="0"/>
+          </a:p>
+        </p:txBody>
+      </p:sp>
+      <p:graphicFrame>
+        <p:nvGraphicFramePr>
+          <p:cNvPr id="4" name="表格 3">
+            <a:extLst>
+              <a:ext uri="{FF2B5EF4-FFF2-40B4-BE49-F238E27FC236}">
+                <a16:creationId xmlns:a16="http://schemas.microsoft.com/office/drawing/2014/main" id="{4F42F0C4-B3FB-FE46-4009-E076DF016FF9}"/>
+              </a:ext>
+            </a:extLst>
+          </p:cNvPr>
+          <p:cNvGraphicFramePr>
+            <a:graphicFrameLocks noGrp="1"/>
+          </p:cNvGraphicFramePr>
+          <p:nvPr>
+            <p:extLst>
+              <p:ext uri="{D42A27DB-BD31-4B8C-83A1-F6EECF244321}">
+                <p14:modId xmlns:p14="http://schemas.microsoft.com/office/powerpoint/2010/main" val="1225588855"/>
+              </p:ext>
+            </p:extLst>
+          </p:nvPr>
+        </p:nvGraphicFramePr>
+        <p:xfrm>
+          <a:off x="1075426" y="2463033"/>
+          <a:ext cx="10719759" cy="2966720"/>
+        </p:xfrm>
+        <a:graphic>
+          <a:graphicData uri="http://schemas.openxmlformats.org/drawingml/2006/table">
+            <a:tbl>
+              <a:tblPr firstRow="1" bandRow="1">
+                <a:tableStyleId>{5C22544A-7EE6-4342-B048-85BDC9FD1C3A}</a:tableStyleId>
+              </a:tblPr>
+              <a:tblGrid>
+                <a:gridCol w="2493034">
+                  <a:extLst>
+                    <a:ext uri="{9D8B030D-6E8A-4147-A177-3AD203B41FA5}">
+                      <a16:colId xmlns:a16="http://schemas.microsoft.com/office/drawing/2014/main" val="1485549075"/>
+                    </a:ext>
+                  </a:extLst>
+                </a:gridCol>
+                <a:gridCol w="2493034">
+                  <a:extLst>
+                    <a:ext uri="{9D8B030D-6E8A-4147-A177-3AD203B41FA5}">
+                      <a16:colId xmlns:a16="http://schemas.microsoft.com/office/drawing/2014/main" val="1812413034"/>
+                    </a:ext>
+                  </a:extLst>
+                </a:gridCol>
+                <a:gridCol w="5733691">
+                  <a:extLst>
+                    <a:ext uri="{9D8B030D-6E8A-4147-A177-3AD203B41FA5}">
+                      <a16:colId xmlns:a16="http://schemas.microsoft.com/office/drawing/2014/main" val="1577056355"/>
+                    </a:ext>
+                  </a:extLst>
+                </a:gridCol>
+              </a:tblGrid>
+              <a:tr h="370840">
+                <a:tc>
+                  <a:txBody>
+                    <a:bodyPr/>
+                    <a:lstStyle/>
+                    <a:p>
+                      <a:pPr algn="ctr"/>
+                      <a:r>
+                        <a:rPr lang="en-US" altLang="zh-TW" dirty="0"/>
+                        <a:t>Name</a:t>
+                      </a:r>
+                      <a:endParaRPr lang="zh-TW" altLang="en-US" dirty="0"/>
+                    </a:p>
+                  </a:txBody>
+                  <a:tcPr/>
+                </a:tc>
+                <a:tc>
+                  <a:txBody>
+                    <a:bodyPr/>
+                    <a:lstStyle/>
+                    <a:p>
+                      <a:pPr algn="ctr"/>
+                      <a:r>
+                        <a:rPr lang="en-US" altLang="zh-TW" dirty="0"/>
+                        <a:t>Destination</a:t>
+                      </a:r>
+                      <a:endParaRPr lang="zh-TW" altLang="en-US" dirty="0"/>
+                    </a:p>
+                  </a:txBody>
+                  <a:tcPr/>
+                </a:tc>
+                <a:tc>
+                  <a:txBody>
+                    <a:bodyPr/>
+                    <a:lstStyle/>
+                    <a:p>
+                      <a:pPr algn="ctr"/>
+                      <a:r>
+                        <a:rPr lang="en-US" altLang="zh-TW" dirty="0"/>
+                        <a:t>Description</a:t>
+                      </a:r>
+                      <a:endParaRPr lang="zh-TW" altLang="en-US" dirty="0"/>
+                    </a:p>
+                  </a:txBody>
+                  <a:tcPr/>
+                </a:tc>
+                <a:extLst>
+                  <a:ext uri="{0D108BD9-81ED-4DB2-BD59-A6C34878D82A}">
+                    <a16:rowId xmlns:a16="http://schemas.microsoft.com/office/drawing/2014/main" val="607370041"/>
+                  </a:ext>
+                </a:extLst>
+              </a:tr>
+              <a:tr h="370840">
+                <a:tc>
+                  <a:txBody>
+                    <a:bodyPr/>
+                    <a:lstStyle/>
+                    <a:p>
+                      <a:pPr algn="ctr"/>
+                      <a:r>
+                        <a:rPr lang="en-US" altLang="zh-TW" dirty="0"/>
+                        <a:t>HTRANS[1:0]</a:t>
+                      </a:r>
+                      <a:endParaRPr lang="zh-TW" altLang="en-US" dirty="0"/>
+                    </a:p>
+                  </a:txBody>
+                  <a:tcPr/>
+                </a:tc>
+                <a:tc>
+                  <a:txBody>
+                    <a:bodyPr/>
+                    <a:lstStyle/>
+                    <a:p>
+                      <a:pPr algn="ctr"/>
+                      <a:r>
+                        <a:rPr lang="en-US" altLang="zh-TW" dirty="0"/>
+                        <a:t>Slave</a:t>
+                      </a:r>
+                      <a:endParaRPr lang="zh-TW" altLang="en-US" dirty="0"/>
+                    </a:p>
+                  </a:txBody>
+                  <a:tcPr/>
+                </a:tc>
+                <a:tc>
+                  <a:txBody>
+                    <a:bodyPr/>
+                    <a:lstStyle/>
+                    <a:p>
+                      <a:pPr algn="l"/>
+                      <a:r>
+                        <a:rPr lang="zh-TW" altLang="en-US" sz="1600" dirty="0"/>
+                        <a:t>表示目前傳輸的類型（</a:t>
+                      </a:r>
+                      <a:r>
+                        <a:rPr lang="en-US" altLang="zh-TW" sz="1600" dirty="0"/>
+                        <a:t>transfer type</a:t>
+                      </a:r>
+                      <a:r>
+                        <a:rPr lang="zh-TW" altLang="en-US" sz="1600" dirty="0"/>
+                        <a:t>），可能的類型包括：</a:t>
+                      </a:r>
+                      <a:endParaRPr lang="en-US" altLang="zh-TW" sz="1600" dirty="0"/>
+                    </a:p>
+                    <a:p>
+                      <a:pPr algn="l"/>
+                      <a:r>
+                        <a:rPr lang="en-US" altLang="zh-TW" sz="1600" dirty="0"/>
+                        <a:t>• IDLE</a:t>
+                      </a:r>
+                      <a:r>
+                        <a:rPr lang="zh-TW" altLang="en-US" sz="1600" dirty="0"/>
+                        <a:t>（閒置）</a:t>
+                      </a:r>
+                      <a:endParaRPr lang="en-US" altLang="zh-TW" sz="1600" dirty="0"/>
+                    </a:p>
+                    <a:p>
+                      <a:pPr algn="l"/>
+                      <a:r>
+                        <a:rPr lang="en-US" altLang="zh-TW" sz="1600" dirty="0"/>
+                        <a:t>• BUSY</a:t>
+                      </a:r>
+                      <a:r>
+                        <a:rPr lang="zh-TW" altLang="en-US" sz="1600" dirty="0"/>
+                        <a:t>（忙碌）</a:t>
+                      </a:r>
+                      <a:endParaRPr lang="en-US" altLang="zh-TW" sz="1600" dirty="0"/>
+                    </a:p>
+                    <a:p>
+                      <a:pPr algn="l"/>
+                      <a:r>
+                        <a:rPr lang="en-US" altLang="zh-TW" sz="1600" dirty="0"/>
+                        <a:t>• NONSEQUENTIAL</a:t>
+                      </a:r>
+                      <a:r>
+                        <a:rPr lang="zh-TW" altLang="en-US" sz="1600" dirty="0"/>
+                        <a:t>（非連續傳輸）</a:t>
+                      </a:r>
+                      <a:endParaRPr lang="en-US" altLang="zh-TW" sz="1600" dirty="0"/>
+                    </a:p>
+                    <a:p>
+                      <a:pPr algn="l"/>
+                      <a:r>
+                        <a:rPr lang="en-US" altLang="zh-TW" sz="1600" dirty="0"/>
+                        <a:t>• SEQUENTIAL</a:t>
+                      </a:r>
+                      <a:r>
+                        <a:rPr lang="zh-TW" altLang="en-US" sz="1600" dirty="0"/>
+                        <a:t>（連續傳輸）</a:t>
+                      </a:r>
+                    </a:p>
+                  </a:txBody>
+                  <a:tcPr/>
+                </a:tc>
+                <a:extLst>
+                  <a:ext uri="{0D108BD9-81ED-4DB2-BD59-A6C34878D82A}">
+                    <a16:rowId xmlns:a16="http://schemas.microsoft.com/office/drawing/2014/main" val="416700849"/>
+                  </a:ext>
+                </a:extLst>
+              </a:tr>
+              <a:tr h="370840">
+                <a:tc>
+                  <a:txBody>
+                    <a:bodyPr/>
+                    <a:lstStyle/>
+                    <a:p>
+                      <a:pPr algn="ctr"/>
+                      <a:r>
+                        <a:rPr lang="en-US" altLang="zh-TW" dirty="0"/>
+                        <a:t>HWDATA[31:0]</a:t>
+                      </a:r>
+                      <a:endParaRPr lang="zh-TW" altLang="en-US" dirty="0"/>
+                    </a:p>
+                  </a:txBody>
+                  <a:tcPr/>
+                </a:tc>
+                <a:tc>
+                  <a:txBody>
+                    <a:bodyPr/>
+                    <a:lstStyle/>
+                    <a:p>
+                      <a:pPr algn="ctr"/>
+                      <a:r>
+                        <a:rPr lang="en-US" altLang="zh-TW" dirty="0"/>
+                        <a:t>Slave</a:t>
+                      </a:r>
+                      <a:endParaRPr lang="zh-TW" altLang="en-US" dirty="0"/>
+                    </a:p>
+                  </a:txBody>
+                  <a:tcPr/>
+                </a:tc>
+                <a:tc>
+                  <a:txBody>
+                    <a:bodyPr/>
+                    <a:lstStyle/>
+                    <a:p>
+                      <a:pPr algn="l"/>
+                      <a:r>
+                        <a:rPr lang="zh-TW" altLang="en-US" dirty="0"/>
+                        <a:t>寫入的</a:t>
+                      </a:r>
+                      <a:r>
+                        <a:rPr lang="en-US" altLang="zh-TW" dirty="0"/>
+                        <a:t>data</a:t>
+                      </a:r>
+                      <a:endParaRPr lang="zh-TW" altLang="en-US" dirty="0"/>
+                    </a:p>
+                  </a:txBody>
+                  <a:tcPr/>
+                </a:tc>
+                <a:extLst>
+                  <a:ext uri="{0D108BD9-81ED-4DB2-BD59-A6C34878D82A}">
+                    <a16:rowId xmlns:a16="http://schemas.microsoft.com/office/drawing/2014/main" val="3909532716"/>
+                  </a:ext>
+                </a:extLst>
+              </a:tr>
+              <a:tr h="370840">
+                <a:tc>
+                  <a:txBody>
+                    <a:bodyPr/>
+                    <a:lstStyle/>
+                    <a:p>
+                      <a:pPr algn="ctr"/>
+                      <a:r>
+                        <a:rPr lang="en-US" altLang="zh-TW" dirty="0"/>
+                        <a:t>HWRITE</a:t>
+                      </a:r>
+                      <a:endParaRPr lang="zh-TW" altLang="en-US" dirty="0"/>
+                    </a:p>
+                  </a:txBody>
+                  <a:tcPr/>
+                </a:tc>
+                <a:tc>
+                  <a:txBody>
+                    <a:bodyPr/>
+                    <a:lstStyle/>
+                    <a:p>
+                      <a:pPr algn="ctr"/>
+                      <a:r>
+                        <a:rPr lang="en-US" altLang="zh-TW" dirty="0"/>
+                        <a:t>Slave</a:t>
+                      </a:r>
+                      <a:endParaRPr lang="zh-TW" altLang="en-US" dirty="0"/>
+                    </a:p>
+                  </a:txBody>
+                  <a:tcPr/>
+                </a:tc>
+                <a:tc>
+                  <a:txBody>
+                    <a:bodyPr/>
+                    <a:lstStyle/>
+                    <a:p>
+                      <a:pPr algn="l"/>
+                      <a:r>
+                        <a:rPr lang="zh-TW" altLang="en-US" dirty="0"/>
+                        <a:t>此訊號表示傳輸的類別。</a:t>
+                      </a:r>
+                      <a:endParaRPr lang="en-US" altLang="zh-TW" dirty="0"/>
+                    </a:p>
+                    <a:p>
+                      <a:pPr algn="l"/>
+                      <a:r>
+                        <a:rPr lang="zh-TW" altLang="en-US" dirty="0"/>
+                        <a:t>當為高電位（</a:t>
+                      </a:r>
+                      <a:r>
+                        <a:rPr lang="en-US" altLang="zh-TW" dirty="0"/>
+                        <a:t>HIGH</a:t>
+                      </a:r>
+                      <a:r>
+                        <a:rPr lang="zh-TW" altLang="en-US" dirty="0"/>
+                        <a:t>）時，表示為寫入傳輸</a:t>
+                      </a:r>
+                      <a:endParaRPr lang="en-US" altLang="zh-TW" dirty="0"/>
+                    </a:p>
+                    <a:p>
+                      <a:pPr algn="l"/>
+                      <a:r>
+                        <a:rPr lang="zh-TW" altLang="en-US" dirty="0"/>
+                        <a:t>當為低電位（</a:t>
+                      </a:r>
+                      <a:r>
+                        <a:rPr lang="en-US" altLang="zh-TW" dirty="0"/>
+                        <a:t>LOW</a:t>
+                      </a:r>
+                      <a:r>
+                        <a:rPr lang="zh-TW" altLang="en-US" dirty="0"/>
+                        <a:t>）時，則表示為讀取傳輸</a:t>
+                      </a:r>
+                    </a:p>
+                  </a:txBody>
+                  <a:tcPr/>
+                </a:tc>
+                <a:extLst>
+                  <a:ext uri="{0D108BD9-81ED-4DB2-BD59-A6C34878D82A}">
+                    <a16:rowId xmlns:a16="http://schemas.microsoft.com/office/drawing/2014/main" val="2650518415"/>
+                  </a:ext>
+                </a:extLst>
+              </a:tr>
+            </a:tbl>
+          </a:graphicData>
+        </a:graphic>
+      </p:graphicFrame>
+    </p:spTree>
+    <p:extLst>
+      <p:ext uri="{BB962C8B-B14F-4D97-AF65-F5344CB8AC3E}">
+        <p14:creationId xmlns:p14="http://schemas.microsoft.com/office/powerpoint/2010/main" val="2153992855"/>
+      </p:ext>
+    </p:extLst>
+  </p:cSld>
+  <p:clrMapOvr>
+    <a:masterClrMapping/>
+  </p:clrMapOvr>
+</p:sld>
+</file>
+
+<file path=ppt/slides/slide18.xml><?xml version="1.0" encoding="utf-8"?>
+<p:sld xmlns:a="http://schemas.openxmlformats.org/drawingml/2006/main" xmlns:r="http://schemas.openxmlformats.org/officeDocument/2006/relationships" xmlns:p="http://schemas.openxmlformats.org/presentationml/2006/main">
+  <p:cSld>
+    <p:spTree>
+      <p:nvGrpSpPr>
+        <p:cNvPr id="1" name="">
+          <a:extLst>
+            <a:ext uri="{FF2B5EF4-FFF2-40B4-BE49-F238E27FC236}">
+              <a16:creationId xmlns:a16="http://schemas.microsoft.com/office/drawing/2014/main" id="{108BDAAF-FA86-9DB1-1EFB-6005F8F72ACF}"/>
+            </a:ext>
+          </a:extLst>
+        </p:cNvPr>
+        <p:cNvGrpSpPr/>
+        <p:nvPr/>
+      </p:nvGrpSpPr>
+      <p:grpSpPr>
+        <a:xfrm>
+          <a:off x="0" y="0"/>
+          <a:ext cx="0" cy="0"/>
+          <a:chOff x="0" y="0"/>
+          <a:chExt cx="0" cy="0"/>
+        </a:xfrm>
+      </p:grpSpPr>
+      <p:sp>
+        <p:nvSpPr>
+          <p:cNvPr id="2" name="標題 1">
+            <a:extLst>
+              <a:ext uri="{FF2B5EF4-FFF2-40B4-BE49-F238E27FC236}">
+                <a16:creationId xmlns:a16="http://schemas.microsoft.com/office/drawing/2014/main" id="{FEB79C30-C911-9702-EA45-2C3D4071B2B6}"/>
+              </a:ext>
+            </a:extLst>
+          </p:cNvPr>
+          <p:cNvSpPr>
+            <a:spLocks noGrp="1"/>
+          </p:cNvSpPr>
+          <p:nvPr>
+            <p:ph type="title"/>
+          </p:nvPr>
+        </p:nvSpPr>
+        <p:spPr/>
+        <p:txBody>
+          <a:bodyPr/>
+          <a:lstStyle/>
+          <a:p>
+            <a:r>
+              <a:rPr lang="en-US" altLang="zh-TW" dirty="0"/>
+              <a:t>AHB</a:t>
+            </a:r>
+            <a:r>
+              <a:rPr lang="zh-TW" altLang="en-US" dirty="0"/>
+              <a:t> </a:t>
+            </a:r>
+            <a:r>
+              <a:rPr lang="en-US" altLang="zh-TW" dirty="0"/>
+              <a:t>Signal Descriptions</a:t>
+            </a:r>
+            <a:r>
+              <a:rPr lang="zh-TW" altLang="en-US" dirty="0"/>
+              <a:t> </a:t>
+            </a:r>
+            <a:r>
+              <a:rPr lang="en-US" altLang="zh-TW" dirty="0"/>
+              <a:t>(5/7)</a:t>
+            </a:r>
+            <a:endParaRPr lang="zh-TW" altLang="en-US" dirty="0"/>
+          </a:p>
+        </p:txBody>
+      </p:sp>
+      <p:sp>
+        <p:nvSpPr>
+          <p:cNvPr id="3" name="內容版面配置區 2">
+            <a:extLst>
+              <a:ext uri="{FF2B5EF4-FFF2-40B4-BE49-F238E27FC236}">
+                <a16:creationId xmlns:a16="http://schemas.microsoft.com/office/drawing/2014/main" id="{ABE5D1DF-E6BD-13EB-69AD-BAC956D26F48}"/>
+              </a:ext>
+            </a:extLst>
+          </p:cNvPr>
+          <p:cNvSpPr>
+            <a:spLocks noGrp="1"/>
+          </p:cNvSpPr>
+          <p:nvPr>
+            <p:ph idx="1"/>
+          </p:nvPr>
+        </p:nvSpPr>
+        <p:spPr/>
+        <p:txBody>
+          <a:bodyPr/>
+          <a:lstStyle/>
+          <a:p>
+            <a:pPr marL="514350" indent="-514350">
+              <a:buFont typeface="+mj-lt"/>
+              <a:buAutoNum type="arabicPeriod" startAt="3"/>
+            </a:pPr>
+            <a:r>
+              <a:rPr lang="en-US" altLang="zh-TW" dirty="0"/>
+              <a:t>Slave signal</a:t>
+            </a:r>
+          </a:p>
+          <a:p>
+            <a:pPr marL="514350" indent="-514350">
+              <a:buFont typeface="+mj-lt"/>
+              <a:buAutoNum type="arabicPeriod" startAt="3"/>
+            </a:pPr>
+            <a:endParaRPr lang="en-US" altLang="zh-TW" dirty="0"/>
+          </a:p>
+        </p:txBody>
+      </p:sp>
+      <p:graphicFrame>
+        <p:nvGraphicFramePr>
+          <p:cNvPr id="4" name="表格 3">
+            <a:extLst>
+              <a:ext uri="{FF2B5EF4-FFF2-40B4-BE49-F238E27FC236}">
+                <a16:creationId xmlns:a16="http://schemas.microsoft.com/office/drawing/2014/main" id="{FFB36274-97EF-6CBA-089F-D0242627BF77}"/>
+              </a:ext>
+            </a:extLst>
+          </p:cNvPr>
+          <p:cNvGraphicFramePr>
+            <a:graphicFrameLocks noGrp="1"/>
+          </p:cNvGraphicFramePr>
+          <p:nvPr>
+            <p:extLst>
+              <p:ext uri="{D42A27DB-BD31-4B8C-83A1-F6EECF244321}">
+                <p14:modId xmlns:p14="http://schemas.microsoft.com/office/powerpoint/2010/main" val="2460974167"/>
+              </p:ext>
+            </p:extLst>
+          </p:nvPr>
+        </p:nvGraphicFramePr>
+        <p:xfrm>
+          <a:off x="1075426" y="2463033"/>
+          <a:ext cx="10719759" cy="3571240"/>
+        </p:xfrm>
+        <a:graphic>
+          <a:graphicData uri="http://schemas.openxmlformats.org/drawingml/2006/table">
+            <a:tbl>
+              <a:tblPr firstRow="1" bandRow="1">
+                <a:tableStyleId>{5C22544A-7EE6-4342-B048-85BDC9FD1C3A}</a:tableStyleId>
+              </a:tblPr>
+              <a:tblGrid>
+                <a:gridCol w="2493034">
+                  <a:extLst>
+                    <a:ext uri="{9D8B030D-6E8A-4147-A177-3AD203B41FA5}">
+                      <a16:colId xmlns:a16="http://schemas.microsoft.com/office/drawing/2014/main" val="1485549075"/>
+                    </a:ext>
+                  </a:extLst>
+                </a:gridCol>
+                <a:gridCol w="2493034">
+                  <a:extLst>
+                    <a:ext uri="{9D8B030D-6E8A-4147-A177-3AD203B41FA5}">
+                      <a16:colId xmlns:a16="http://schemas.microsoft.com/office/drawing/2014/main" val="1812413034"/>
+                    </a:ext>
+                  </a:extLst>
+                </a:gridCol>
+                <a:gridCol w="5733691">
+                  <a:extLst>
+                    <a:ext uri="{9D8B030D-6E8A-4147-A177-3AD203B41FA5}">
+                      <a16:colId xmlns:a16="http://schemas.microsoft.com/office/drawing/2014/main" val="1577056355"/>
+                    </a:ext>
+                  </a:extLst>
+                </a:gridCol>
+              </a:tblGrid>
+              <a:tr h="370840">
+                <a:tc>
+                  <a:txBody>
+                    <a:bodyPr/>
+                    <a:lstStyle/>
+                    <a:p>
+                      <a:pPr algn="ctr"/>
+                      <a:r>
+                        <a:rPr lang="en-US" altLang="zh-TW" dirty="0"/>
+                        <a:t>Name</a:t>
+                      </a:r>
+                      <a:endParaRPr lang="zh-TW" altLang="en-US" dirty="0"/>
+                    </a:p>
+                  </a:txBody>
+                  <a:tcPr/>
+                </a:tc>
+                <a:tc>
+                  <a:txBody>
+                    <a:bodyPr/>
+                    <a:lstStyle/>
+                    <a:p>
+                      <a:pPr algn="ctr"/>
+                      <a:r>
+                        <a:rPr lang="en-US" altLang="zh-TW" dirty="0"/>
+                        <a:t>Destination</a:t>
+                      </a:r>
+                      <a:endParaRPr lang="zh-TW" altLang="en-US" dirty="0"/>
+                    </a:p>
+                  </a:txBody>
+                  <a:tcPr/>
+                </a:tc>
+                <a:tc>
+                  <a:txBody>
+                    <a:bodyPr/>
+                    <a:lstStyle/>
+                    <a:p>
+                      <a:pPr algn="ctr"/>
+                      <a:r>
+                        <a:rPr lang="en-US" altLang="zh-TW" dirty="0"/>
+                        <a:t>Description</a:t>
+                      </a:r>
+                      <a:endParaRPr lang="zh-TW" altLang="en-US" dirty="0"/>
+                    </a:p>
+                  </a:txBody>
+                  <a:tcPr/>
+                </a:tc>
+                <a:extLst>
+                  <a:ext uri="{0D108BD9-81ED-4DB2-BD59-A6C34878D82A}">
+                    <a16:rowId xmlns:a16="http://schemas.microsoft.com/office/drawing/2014/main" val="607370041"/>
+                  </a:ext>
+                </a:extLst>
+              </a:tr>
+              <a:tr h="370840">
+                <a:tc>
+                  <a:txBody>
+                    <a:bodyPr/>
+                    <a:lstStyle/>
+                    <a:p>
+                      <a:pPr algn="ctr"/>
+                      <a:r>
+                        <a:rPr lang="en-US" altLang="zh-TW" dirty="0"/>
+                        <a:t>HRDATA[31:0]</a:t>
+                      </a:r>
+                      <a:endParaRPr lang="zh-TW" altLang="en-US" dirty="0"/>
+                    </a:p>
+                  </a:txBody>
+                  <a:tcPr/>
+                </a:tc>
+                <a:tc>
+                  <a:txBody>
+                    <a:bodyPr/>
+                    <a:lstStyle/>
+                    <a:p>
+                      <a:pPr algn="ctr"/>
+                      <a:r>
+                        <a:rPr lang="en-US" altLang="zh-TW" dirty="0"/>
+                        <a:t>Multiplexor</a:t>
+                      </a:r>
+                      <a:endParaRPr lang="zh-TW" altLang="en-US" dirty="0"/>
+                    </a:p>
+                  </a:txBody>
+                  <a:tcPr/>
+                </a:tc>
+                <a:tc>
+                  <a:txBody>
+                    <a:bodyPr/>
+                    <a:lstStyle/>
+                    <a:p>
+                      <a:pPr algn="l"/>
+                      <a:r>
+                        <a:rPr lang="zh-TW" altLang="en-US" sz="1600" dirty="0"/>
+                        <a:t>在讀取操作期間，讀取資料匯流排（</a:t>
+                      </a:r>
+                      <a:r>
+                        <a:rPr lang="en-US" altLang="zh-TW" sz="1600" dirty="0"/>
+                        <a:t>read data bus</a:t>
+                      </a:r>
+                      <a:r>
+                        <a:rPr lang="zh-TW" altLang="en-US" sz="1600" dirty="0"/>
+                        <a:t>）將資料從選定的</a:t>
+                      </a:r>
+                      <a:r>
+                        <a:rPr lang="en-US" altLang="zh-TW" sz="1600" dirty="0"/>
+                        <a:t>slave</a:t>
+                      </a:r>
+                      <a:r>
+                        <a:rPr lang="zh-TW" altLang="en-US" sz="1600" dirty="0"/>
+                        <a:t>傳送到多工器（</a:t>
+                      </a:r>
+                      <a:r>
+                        <a:rPr lang="en-US" altLang="zh-TW" sz="1600" dirty="0"/>
+                        <a:t>multiplexor</a:t>
+                      </a:r>
+                      <a:r>
+                        <a:rPr lang="zh-TW" altLang="en-US" sz="1600" dirty="0"/>
+                        <a:t>）。</a:t>
+                      </a:r>
+                      <a:endParaRPr lang="en-US" altLang="zh-TW" sz="1600" dirty="0"/>
+                    </a:p>
+                    <a:p>
+                      <a:pPr algn="l"/>
+                      <a:r>
+                        <a:rPr lang="zh-TW" altLang="en-US" sz="1600" dirty="0"/>
+                        <a:t>多工器接著再將該資料傳送給</a:t>
+                      </a:r>
+                      <a:r>
+                        <a:rPr lang="en-US" altLang="zh-TW" sz="1600" dirty="0"/>
+                        <a:t>master</a:t>
+                      </a:r>
+                      <a:endParaRPr lang="zh-TW" altLang="en-US" sz="1600" dirty="0"/>
+                    </a:p>
+                  </a:txBody>
+                  <a:tcPr/>
+                </a:tc>
+                <a:extLst>
+                  <a:ext uri="{0D108BD9-81ED-4DB2-BD59-A6C34878D82A}">
+                    <a16:rowId xmlns:a16="http://schemas.microsoft.com/office/drawing/2014/main" val="416700849"/>
+                  </a:ext>
+                </a:extLst>
+              </a:tr>
+              <a:tr h="370840">
+                <a:tc>
+                  <a:txBody>
+                    <a:bodyPr/>
+                    <a:lstStyle/>
+                    <a:p>
+                      <a:pPr algn="ctr"/>
+                      <a:r>
+                        <a:rPr lang="en-US" altLang="zh-TW" dirty="0"/>
+                        <a:t>HREADYOUT</a:t>
+                      </a:r>
+                      <a:endParaRPr lang="zh-TW" altLang="en-US" dirty="0"/>
+                    </a:p>
+                  </a:txBody>
+                  <a:tcPr/>
+                </a:tc>
+                <a:tc>
+                  <a:txBody>
+                    <a:bodyPr/>
+                    <a:lstStyle/>
+                    <a:p>
+                      <a:pPr algn="ctr"/>
+                      <a:r>
+                        <a:rPr lang="en-US" altLang="zh-TW" dirty="0"/>
+                        <a:t>Multiplexor</a:t>
+                      </a:r>
+                      <a:endParaRPr lang="zh-TW" altLang="en-US" dirty="0"/>
+                    </a:p>
+                  </a:txBody>
+                  <a:tcPr/>
+                </a:tc>
+                <a:tc>
+                  <a:txBody>
+                    <a:bodyPr/>
+                    <a:lstStyle/>
+                    <a:p>
+                      <a:pPr algn="l"/>
+                      <a:r>
+                        <a:rPr lang="zh-TW" altLang="en-US" sz="1600" dirty="0"/>
+                        <a:t>當 </a:t>
+                      </a:r>
+                      <a:r>
+                        <a:rPr lang="en-US" altLang="zh-TW" sz="1600" dirty="0"/>
+                        <a:t>HREADYOUT </a:t>
+                      </a:r>
+                      <a:r>
+                        <a:rPr lang="zh-TW" altLang="en-US" sz="1600" dirty="0"/>
+                        <a:t>訊號為高電位（</a:t>
+                      </a:r>
+                      <a:r>
+                        <a:rPr lang="en-US" altLang="zh-TW" sz="1600" dirty="0"/>
+                        <a:t>HIGH</a:t>
+                      </a:r>
+                      <a:r>
+                        <a:rPr lang="zh-TW" altLang="en-US" sz="1600" dirty="0"/>
+                        <a:t>）時，表示匯流排上的一筆傳輸已經完成。</a:t>
+                      </a:r>
+                      <a:endParaRPr lang="en-US" altLang="zh-TW" sz="1600" dirty="0"/>
+                    </a:p>
+                    <a:p>
+                      <a:pPr algn="l"/>
+                      <a:r>
+                        <a:rPr lang="zh-TW" altLang="en-US" sz="1600" dirty="0"/>
+                        <a:t>此訊號也可以被拉低（</a:t>
+                      </a:r>
+                      <a:r>
+                        <a:rPr lang="en-US" altLang="zh-TW" sz="1600" dirty="0"/>
+                        <a:t>LOW</a:t>
+                      </a:r>
+                      <a:r>
+                        <a:rPr lang="zh-TW" altLang="en-US" sz="1600" dirty="0"/>
+                        <a:t>）以延長傳輸的時間。</a:t>
+                      </a:r>
+                    </a:p>
+                  </a:txBody>
+                  <a:tcPr/>
+                </a:tc>
+                <a:extLst>
+                  <a:ext uri="{0D108BD9-81ED-4DB2-BD59-A6C34878D82A}">
+                    <a16:rowId xmlns:a16="http://schemas.microsoft.com/office/drawing/2014/main" val="3909532716"/>
+                  </a:ext>
+                </a:extLst>
+              </a:tr>
+              <a:tr h="370840">
+                <a:tc>
+                  <a:txBody>
+                    <a:bodyPr/>
+                    <a:lstStyle/>
+                    <a:p>
+                      <a:pPr algn="ctr"/>
+                      <a:r>
+                        <a:rPr lang="en-US" altLang="zh-TW" dirty="0"/>
+                        <a:t>HRESP</a:t>
+                      </a:r>
+                      <a:endParaRPr lang="zh-TW" altLang="en-US" dirty="0"/>
+                    </a:p>
+                  </a:txBody>
+                  <a:tcPr/>
+                </a:tc>
+                <a:tc>
+                  <a:txBody>
+                    <a:bodyPr/>
+                    <a:lstStyle/>
+                    <a:p>
+                      <a:pPr algn="ctr"/>
+                      <a:r>
+                        <a:rPr lang="en-US" altLang="zh-TW" dirty="0"/>
+                        <a:t>Multiplexor</a:t>
+                      </a:r>
+                      <a:endParaRPr lang="zh-TW" altLang="en-US" dirty="0"/>
+                    </a:p>
+                  </a:txBody>
+                  <a:tcPr/>
+                </a:tc>
+                <a:tc>
+                  <a:txBody>
+                    <a:bodyPr/>
+                    <a:lstStyle/>
+                    <a:p>
+                      <a:pPr algn="l"/>
+                      <a:r>
+                        <a:rPr lang="zh-TW" altLang="en-US" sz="1600" dirty="0"/>
+                        <a:t>傳輸回應訊號（</a:t>
+                      </a:r>
+                      <a:r>
+                        <a:rPr lang="en-US" altLang="zh-TW" sz="1600" dirty="0"/>
+                        <a:t>transfer response</a:t>
+                      </a:r>
+                      <a:r>
+                        <a:rPr lang="zh-TW" altLang="en-US" sz="1600" dirty="0"/>
+                        <a:t>）在經過多工器後，</a:t>
+                      </a:r>
+                      <a:endParaRPr lang="en-US" altLang="zh-TW" sz="1600" dirty="0"/>
+                    </a:p>
+                    <a:p>
+                      <a:pPr algn="l"/>
+                      <a:r>
+                        <a:rPr lang="zh-TW" altLang="en-US" sz="1600" dirty="0"/>
+                        <a:t>會提供</a:t>
+                      </a:r>
+                      <a:r>
+                        <a:rPr lang="en-US" altLang="zh-TW" sz="1600" dirty="0"/>
+                        <a:t>master</a:t>
+                      </a:r>
+                      <a:r>
+                        <a:rPr lang="zh-TW" altLang="en-US" sz="1600" dirty="0"/>
+                        <a:t>關於傳輸狀態的額外資訊。</a:t>
+                      </a:r>
+                      <a:endParaRPr lang="en-US" altLang="zh-TW" sz="1600" dirty="0"/>
+                    </a:p>
+                    <a:p>
+                      <a:pPr algn="l"/>
+                      <a:r>
+                        <a:rPr lang="zh-TW" altLang="en-US" sz="1600" dirty="0"/>
+                        <a:t>當 </a:t>
+                      </a:r>
+                      <a:r>
+                        <a:rPr lang="en-US" altLang="zh-TW" sz="1600" dirty="0"/>
+                        <a:t>HRESP </a:t>
+                      </a:r>
+                      <a:r>
+                        <a:rPr lang="zh-TW" altLang="en-US" sz="1600" dirty="0"/>
+                        <a:t>訊號為低電位（</a:t>
+                      </a:r>
+                      <a:r>
+                        <a:rPr lang="en-US" altLang="zh-TW" sz="1600" dirty="0"/>
+                        <a:t>LOW</a:t>
+                      </a:r>
+                      <a:r>
+                        <a:rPr lang="zh-TW" altLang="en-US" sz="1600" dirty="0"/>
+                        <a:t>）時，表示傳輸狀態為 </a:t>
+                      </a:r>
+                      <a:r>
+                        <a:rPr lang="en-US" altLang="zh-TW" sz="1600" dirty="0"/>
+                        <a:t>OKAY</a:t>
+                      </a:r>
+                      <a:r>
+                        <a:rPr lang="zh-TW" altLang="en-US" sz="1600" dirty="0"/>
+                        <a:t>（正常）。</a:t>
+                      </a:r>
+                      <a:endParaRPr lang="en-US" altLang="zh-TW" sz="1600" dirty="0"/>
+                    </a:p>
+                    <a:p>
+                      <a:pPr algn="l"/>
+                      <a:r>
+                        <a:rPr lang="zh-TW" altLang="en-US" sz="1600" dirty="0"/>
+                        <a:t>當 </a:t>
+                      </a:r>
+                      <a:r>
+                        <a:rPr lang="en-US" altLang="zh-TW" sz="1600" dirty="0"/>
+                        <a:t>HRESP </a:t>
+                      </a:r>
+                      <a:r>
+                        <a:rPr lang="zh-TW" altLang="en-US" sz="1600" dirty="0"/>
+                        <a:t>訊號為高電位（</a:t>
+                      </a:r>
+                      <a:r>
+                        <a:rPr lang="en-US" altLang="zh-TW" sz="1600" dirty="0"/>
+                        <a:t>HIGH</a:t>
+                      </a:r>
+                      <a:r>
+                        <a:rPr lang="zh-TW" altLang="en-US" sz="1600" dirty="0"/>
+                        <a:t>）時，表示傳輸狀態為 </a:t>
+                      </a:r>
+                      <a:r>
+                        <a:rPr lang="en-US" altLang="zh-TW" sz="1600" dirty="0"/>
+                        <a:t>ERROR</a:t>
+                      </a:r>
+                      <a:r>
+                        <a:rPr lang="zh-TW" altLang="en-US" sz="1600" dirty="0"/>
+                        <a:t>（錯誤）。</a:t>
+                      </a:r>
+                    </a:p>
+                  </a:txBody>
+                  <a:tcPr/>
+                </a:tc>
+                <a:extLst>
+                  <a:ext uri="{0D108BD9-81ED-4DB2-BD59-A6C34878D82A}">
+                    <a16:rowId xmlns:a16="http://schemas.microsoft.com/office/drawing/2014/main" val="2650518415"/>
+                  </a:ext>
+                </a:extLst>
+              </a:tr>
+            </a:tbl>
+          </a:graphicData>
+        </a:graphic>
+      </p:graphicFrame>
+    </p:spTree>
+    <p:extLst>
+      <p:ext uri="{BB962C8B-B14F-4D97-AF65-F5344CB8AC3E}">
+        <p14:creationId xmlns:p14="http://schemas.microsoft.com/office/powerpoint/2010/main" val="2230979185"/>
+      </p:ext>
+    </p:extLst>
+  </p:cSld>
+  <p:clrMapOvr>
+    <a:masterClrMapping/>
+  </p:clrMapOvr>
+</p:sld>
+</file>
+
+<file path=ppt/slides/slide19.xml><?xml version="1.0" encoding="utf-8"?>
+<p:sld xmlns:a="http://schemas.openxmlformats.org/drawingml/2006/main" xmlns:r="http://schemas.openxmlformats.org/officeDocument/2006/relationships" xmlns:p="http://schemas.openxmlformats.org/presentationml/2006/main">
+  <p:cSld>
+    <p:spTree>
+      <p:nvGrpSpPr>
+        <p:cNvPr id="1" name="">
+          <a:extLst>
+            <a:ext uri="{FF2B5EF4-FFF2-40B4-BE49-F238E27FC236}">
+              <a16:creationId xmlns:a16="http://schemas.microsoft.com/office/drawing/2014/main" id="{8F7BA0F4-33B9-3515-8B81-E652D0B81736}"/>
+            </a:ext>
+          </a:extLst>
+        </p:cNvPr>
+        <p:cNvGrpSpPr/>
+        <p:nvPr/>
+      </p:nvGrpSpPr>
+      <p:grpSpPr>
+        <a:xfrm>
+          <a:off x="0" y="0"/>
+          <a:ext cx="0" cy="0"/>
+          <a:chOff x="0" y="0"/>
+          <a:chExt cx="0" cy="0"/>
+        </a:xfrm>
+      </p:grpSpPr>
+      <p:sp>
+        <p:nvSpPr>
+          <p:cNvPr id="2" name="標題 1">
+            <a:extLst>
+              <a:ext uri="{FF2B5EF4-FFF2-40B4-BE49-F238E27FC236}">
+                <a16:creationId xmlns:a16="http://schemas.microsoft.com/office/drawing/2014/main" id="{B3C93F53-2DD6-6627-CD60-C89E6B6FF8B0}"/>
+              </a:ext>
+            </a:extLst>
+          </p:cNvPr>
+          <p:cNvSpPr>
+            <a:spLocks noGrp="1"/>
+          </p:cNvSpPr>
+          <p:nvPr>
+            <p:ph type="title"/>
+          </p:nvPr>
+        </p:nvSpPr>
+        <p:spPr/>
+        <p:txBody>
+          <a:bodyPr/>
+          <a:lstStyle/>
+          <a:p>
+            <a:r>
+              <a:rPr lang="en-US" altLang="zh-TW" dirty="0"/>
+              <a:t>AHB</a:t>
+            </a:r>
+            <a:r>
+              <a:rPr lang="zh-TW" altLang="en-US" dirty="0"/>
+              <a:t> </a:t>
+            </a:r>
+            <a:r>
+              <a:rPr lang="en-US" altLang="zh-TW" dirty="0"/>
+              <a:t>Signal Descriptions</a:t>
+            </a:r>
+            <a:r>
+              <a:rPr lang="zh-TW" altLang="en-US" dirty="0"/>
+              <a:t> </a:t>
+            </a:r>
+            <a:r>
+              <a:rPr lang="en-US" altLang="zh-TW" dirty="0"/>
+              <a:t>(6/7)</a:t>
+            </a:r>
+            <a:endParaRPr lang="zh-TW" altLang="en-US" dirty="0"/>
+          </a:p>
+        </p:txBody>
+      </p:sp>
+      <p:sp>
+        <p:nvSpPr>
+          <p:cNvPr id="3" name="內容版面配置區 2">
+            <a:extLst>
+              <a:ext uri="{FF2B5EF4-FFF2-40B4-BE49-F238E27FC236}">
+                <a16:creationId xmlns:a16="http://schemas.microsoft.com/office/drawing/2014/main" id="{67318484-8CA6-C760-2555-22C6B4B971E6}"/>
+              </a:ext>
+            </a:extLst>
+          </p:cNvPr>
+          <p:cNvSpPr>
+            <a:spLocks noGrp="1"/>
+          </p:cNvSpPr>
+          <p:nvPr>
+            <p:ph idx="1"/>
+          </p:nvPr>
+        </p:nvSpPr>
+        <p:spPr/>
+        <p:txBody>
+          <a:bodyPr/>
+          <a:lstStyle/>
+          <a:p>
+            <a:pPr marL="514350" indent="-514350">
+              <a:buFont typeface="+mj-lt"/>
+              <a:buAutoNum type="arabicPeriod" startAt="4"/>
+            </a:pPr>
+            <a:r>
+              <a:rPr lang="en-US" altLang="zh-TW" dirty="0"/>
+              <a:t>Decoder signal</a:t>
+            </a:r>
+          </a:p>
+          <a:p>
+            <a:pPr marL="514350" indent="-514350">
+              <a:buFont typeface="+mj-lt"/>
+              <a:buAutoNum type="arabicPeriod" startAt="4"/>
+            </a:pPr>
+            <a:endParaRPr lang="en-US" altLang="zh-TW" dirty="0"/>
+          </a:p>
+        </p:txBody>
+      </p:sp>
+      <p:graphicFrame>
+        <p:nvGraphicFramePr>
+          <p:cNvPr id="4" name="表格 3">
+            <a:extLst>
+              <a:ext uri="{FF2B5EF4-FFF2-40B4-BE49-F238E27FC236}">
+                <a16:creationId xmlns:a16="http://schemas.microsoft.com/office/drawing/2014/main" id="{ED13B79A-4B76-9B89-A9E7-5B2A3D5A4624}"/>
+              </a:ext>
+            </a:extLst>
+          </p:cNvPr>
+          <p:cNvGraphicFramePr>
+            <a:graphicFrameLocks noGrp="1"/>
+          </p:cNvGraphicFramePr>
+          <p:nvPr>
+            <p:extLst>
+              <p:ext uri="{D42A27DB-BD31-4B8C-83A1-F6EECF244321}">
+                <p14:modId xmlns:p14="http://schemas.microsoft.com/office/powerpoint/2010/main" val="107870261"/>
+              </p:ext>
+            </p:extLst>
+          </p:nvPr>
+        </p:nvGraphicFramePr>
+        <p:xfrm>
+          <a:off x="1075426" y="2463033"/>
+          <a:ext cx="10719759" cy="1925320"/>
+        </p:xfrm>
+        <a:graphic>
+          <a:graphicData uri="http://schemas.openxmlformats.org/drawingml/2006/table">
+            <a:tbl>
+              <a:tblPr firstRow="1" bandRow="1">
+                <a:tableStyleId>{5C22544A-7EE6-4342-B048-85BDC9FD1C3A}</a:tableStyleId>
+              </a:tblPr>
+              <a:tblGrid>
+                <a:gridCol w="2493034">
+                  <a:extLst>
+                    <a:ext uri="{9D8B030D-6E8A-4147-A177-3AD203B41FA5}">
+                      <a16:colId xmlns:a16="http://schemas.microsoft.com/office/drawing/2014/main" val="1485549075"/>
+                    </a:ext>
+                  </a:extLst>
+                </a:gridCol>
+                <a:gridCol w="2493034">
+                  <a:extLst>
+                    <a:ext uri="{9D8B030D-6E8A-4147-A177-3AD203B41FA5}">
+                      <a16:colId xmlns:a16="http://schemas.microsoft.com/office/drawing/2014/main" val="1812413034"/>
+                    </a:ext>
+                  </a:extLst>
+                </a:gridCol>
+                <a:gridCol w="5733691">
+                  <a:extLst>
+                    <a:ext uri="{9D8B030D-6E8A-4147-A177-3AD203B41FA5}">
+                      <a16:colId xmlns:a16="http://schemas.microsoft.com/office/drawing/2014/main" val="1577056355"/>
+                    </a:ext>
+                  </a:extLst>
+                </a:gridCol>
+              </a:tblGrid>
+              <a:tr h="370840">
+                <a:tc>
+                  <a:txBody>
+                    <a:bodyPr/>
+                    <a:lstStyle/>
+                    <a:p>
+                      <a:pPr algn="ctr"/>
+                      <a:r>
+                        <a:rPr lang="en-US" altLang="zh-TW" dirty="0"/>
+                        <a:t>Name</a:t>
+                      </a:r>
+                      <a:endParaRPr lang="zh-TW" altLang="en-US" dirty="0"/>
+                    </a:p>
+                  </a:txBody>
+                  <a:tcPr/>
+                </a:tc>
+                <a:tc>
+                  <a:txBody>
+                    <a:bodyPr/>
+                    <a:lstStyle/>
+                    <a:p>
+                      <a:pPr algn="ctr"/>
+                      <a:r>
+                        <a:rPr lang="en-US" altLang="zh-TW" dirty="0"/>
+                        <a:t>Destination</a:t>
+                      </a:r>
+                      <a:endParaRPr lang="zh-TW" altLang="en-US" dirty="0"/>
+                    </a:p>
+                  </a:txBody>
+                  <a:tcPr/>
+                </a:tc>
+                <a:tc>
+                  <a:txBody>
+                    <a:bodyPr/>
+                    <a:lstStyle/>
+                    <a:p>
+                      <a:pPr algn="ctr"/>
+                      <a:r>
+                        <a:rPr lang="en-US" altLang="zh-TW" dirty="0"/>
+                        <a:t>Description</a:t>
+                      </a:r>
+                      <a:endParaRPr lang="zh-TW" altLang="en-US" dirty="0"/>
+                    </a:p>
+                  </a:txBody>
+                  <a:tcPr/>
+                </a:tc>
+                <a:extLst>
+                  <a:ext uri="{0D108BD9-81ED-4DB2-BD59-A6C34878D82A}">
+                    <a16:rowId xmlns:a16="http://schemas.microsoft.com/office/drawing/2014/main" val="607370041"/>
+                  </a:ext>
+                </a:extLst>
+              </a:tr>
+              <a:tr h="370840">
+                <a:tc>
+                  <a:txBody>
+                    <a:bodyPr/>
+                    <a:lstStyle/>
+                    <a:p>
+                      <a:pPr algn="ctr"/>
+                      <a:r>
+                        <a:rPr lang="en-US" altLang="zh-TW" dirty="0" err="1"/>
+                        <a:t>HSELx</a:t>
+                      </a:r>
+                      <a:endParaRPr lang="zh-TW" altLang="en-US" dirty="0"/>
+                    </a:p>
+                  </a:txBody>
+                  <a:tcPr/>
+                </a:tc>
+                <a:tc>
+                  <a:txBody>
+                    <a:bodyPr/>
+                    <a:lstStyle/>
+                    <a:p>
+                      <a:pPr algn="ctr"/>
+                      <a:r>
+                        <a:rPr lang="en-US" altLang="zh-TW" dirty="0"/>
+                        <a:t>Slave</a:t>
+                      </a:r>
+                      <a:endParaRPr lang="zh-TW" altLang="en-US" dirty="0"/>
+                    </a:p>
+                  </a:txBody>
+                  <a:tcPr/>
+                </a:tc>
+                <a:tc>
+                  <a:txBody>
+                    <a:bodyPr/>
+                    <a:lstStyle/>
+                    <a:p>
+                      <a:pPr algn="l"/>
+                      <a:r>
+                        <a:rPr lang="zh-TW" altLang="en-US" sz="1600" dirty="0"/>
+                        <a:t>每個 </a:t>
+                      </a:r>
+                      <a:r>
+                        <a:rPr lang="en-US" altLang="zh-TW" sz="1600" dirty="0"/>
+                        <a:t>AHB-Lite  slave</a:t>
+                      </a:r>
+                      <a:r>
+                        <a:rPr lang="zh-TW" altLang="en-US" sz="1600" dirty="0"/>
+                        <a:t> 都有自己的</a:t>
+                      </a:r>
+                      <a:r>
+                        <a:rPr lang="en-US" altLang="zh-TW" sz="1600" dirty="0"/>
+                        <a:t>slave</a:t>
+                      </a:r>
+                      <a:r>
+                        <a:rPr lang="zh-TW" altLang="en-US" sz="1600" dirty="0"/>
+                        <a:t>選擇訊號 </a:t>
+                      </a:r>
+                      <a:r>
+                        <a:rPr lang="en-US" altLang="zh-TW" sz="1600" dirty="0" err="1"/>
+                        <a:t>HSELx</a:t>
+                      </a:r>
+                      <a:r>
+                        <a:rPr lang="zh-TW" altLang="en-US" sz="1600" dirty="0"/>
+                        <a:t>，</a:t>
+                      </a:r>
+                      <a:endParaRPr lang="en-US" altLang="zh-TW" sz="1600" dirty="0"/>
+                    </a:p>
+                    <a:p>
+                      <a:pPr algn="l"/>
+                      <a:r>
+                        <a:rPr lang="zh-TW" altLang="en-US" sz="1600" dirty="0"/>
+                        <a:t>此訊號用來表示當前的傳輸是針對該被選取的</a:t>
+                      </a:r>
+                      <a:r>
+                        <a:rPr lang="en-US" altLang="zh-TW" sz="1600" dirty="0"/>
+                        <a:t>slave</a:t>
+                      </a:r>
+                      <a:r>
+                        <a:rPr lang="zh-TW" altLang="en-US" sz="1600" dirty="0"/>
+                        <a:t>。</a:t>
+                      </a:r>
+                      <a:endParaRPr lang="en-US" altLang="zh-TW" sz="1600" dirty="0"/>
+                    </a:p>
+                    <a:p>
+                      <a:pPr algn="l"/>
+                      <a:r>
+                        <a:rPr lang="zh-TW" altLang="en-US" sz="1600" dirty="0">
+                          <a:solidFill>
+                            <a:srgbClr val="FF0000"/>
+                          </a:solidFill>
+                        </a:rPr>
+                        <a:t>當</a:t>
+                      </a:r>
+                      <a:r>
+                        <a:rPr lang="en-US" altLang="zh-TW" sz="1600" dirty="0">
+                          <a:solidFill>
+                            <a:srgbClr val="FF0000"/>
+                          </a:solidFill>
+                        </a:rPr>
+                        <a:t>slave</a:t>
+                      </a:r>
+                      <a:r>
+                        <a:rPr lang="zh-TW" altLang="en-US" sz="1600" dirty="0">
+                          <a:solidFill>
+                            <a:srgbClr val="FF0000"/>
+                          </a:solidFill>
+                        </a:rPr>
+                        <a:t>初次被選中時，它也必須監控 </a:t>
+                      </a:r>
+                      <a:r>
+                        <a:rPr lang="en-US" altLang="zh-TW" sz="1600" dirty="0">
+                          <a:solidFill>
+                            <a:srgbClr val="FF0000"/>
+                          </a:solidFill>
+                        </a:rPr>
+                        <a:t>HREADY </a:t>
+                      </a:r>
+                      <a:r>
+                        <a:rPr lang="zh-TW" altLang="en-US" sz="1600" dirty="0">
+                          <a:solidFill>
+                            <a:srgbClr val="FF0000"/>
+                          </a:solidFill>
+                        </a:rPr>
+                        <a:t>的狀態，以確保前一筆匯流排傳輸已經完成，才能對當前傳輸作出回應。</a:t>
+                      </a:r>
+                      <a:endParaRPr lang="en-US" altLang="zh-TW" sz="1600" dirty="0">
+                        <a:solidFill>
+                          <a:srgbClr val="FF0000"/>
+                        </a:solidFill>
+                      </a:endParaRPr>
+                    </a:p>
+                    <a:p>
+                      <a:pPr algn="l"/>
+                      <a:r>
+                        <a:rPr lang="en-US" altLang="zh-TW" sz="1600" dirty="0" err="1"/>
+                        <a:t>HSELx</a:t>
+                      </a:r>
+                      <a:r>
+                        <a:rPr lang="en-US" altLang="zh-TW" sz="1600" dirty="0"/>
+                        <a:t> </a:t>
+                      </a:r>
+                      <a:r>
+                        <a:rPr lang="zh-TW" altLang="en-US" sz="1600" dirty="0"/>
+                        <a:t>訊號是由位址匯流排進行組合邏輯解碼（</a:t>
+                      </a:r>
+                      <a:r>
+                        <a:rPr lang="en-US" altLang="zh-TW" sz="1600" dirty="0"/>
+                        <a:t>combinatorial decode</a:t>
+                      </a:r>
+                      <a:r>
+                        <a:rPr lang="zh-TW" altLang="en-US" sz="1600" dirty="0"/>
+                        <a:t>）後產生的。</a:t>
+                      </a:r>
+                    </a:p>
+                  </a:txBody>
+                  <a:tcPr/>
+                </a:tc>
+                <a:extLst>
+                  <a:ext uri="{0D108BD9-81ED-4DB2-BD59-A6C34878D82A}">
+                    <a16:rowId xmlns:a16="http://schemas.microsoft.com/office/drawing/2014/main" val="416700849"/>
+                  </a:ext>
+                </a:extLst>
+              </a:tr>
+            </a:tbl>
+          </a:graphicData>
+        </a:graphic>
+      </p:graphicFrame>
+    </p:spTree>
+    <p:extLst>
+      <p:ext uri="{BB962C8B-B14F-4D97-AF65-F5344CB8AC3E}">
+        <p14:creationId xmlns:p14="http://schemas.microsoft.com/office/powerpoint/2010/main" val="986177490"/>
       </p:ext>
     </p:extLst>
   </p:cSld>
@@ -4695,6 +7107,422 @@
     <p:extLst>
       <p:ext uri="{BB962C8B-B14F-4D97-AF65-F5344CB8AC3E}">
         <p14:creationId xmlns:p14="http://schemas.microsoft.com/office/powerpoint/2010/main" val="438809779"/>
+      </p:ext>
+    </p:extLst>
+  </p:cSld>
+  <p:clrMapOvr>
+    <a:masterClrMapping/>
+  </p:clrMapOvr>
+</p:sld>
+</file>
+
+<file path=ppt/slides/slide20.xml><?xml version="1.0" encoding="utf-8"?>
+<p:sld xmlns:a="http://schemas.openxmlformats.org/drawingml/2006/main" xmlns:r="http://schemas.openxmlformats.org/officeDocument/2006/relationships" xmlns:p="http://schemas.openxmlformats.org/presentationml/2006/main">
+  <p:cSld>
+    <p:spTree>
+      <p:nvGrpSpPr>
+        <p:cNvPr id="1" name="">
+          <a:extLst>
+            <a:ext uri="{FF2B5EF4-FFF2-40B4-BE49-F238E27FC236}">
+              <a16:creationId xmlns:a16="http://schemas.microsoft.com/office/drawing/2014/main" id="{BE1C63A8-DC53-3EB6-CC7E-8D510D5BE135}"/>
+            </a:ext>
+          </a:extLst>
+        </p:cNvPr>
+        <p:cNvGrpSpPr/>
+        <p:nvPr/>
+      </p:nvGrpSpPr>
+      <p:grpSpPr>
+        <a:xfrm>
+          <a:off x="0" y="0"/>
+          <a:ext cx="0" cy="0"/>
+          <a:chOff x="0" y="0"/>
+          <a:chExt cx="0" cy="0"/>
+        </a:xfrm>
+      </p:grpSpPr>
+      <p:sp>
+        <p:nvSpPr>
+          <p:cNvPr id="2" name="標題 1">
+            <a:extLst>
+              <a:ext uri="{FF2B5EF4-FFF2-40B4-BE49-F238E27FC236}">
+                <a16:creationId xmlns:a16="http://schemas.microsoft.com/office/drawing/2014/main" id="{6ED2C29A-C82B-F5BC-4CDC-3563ABE8F5A0}"/>
+              </a:ext>
+            </a:extLst>
+          </p:cNvPr>
+          <p:cNvSpPr>
+            <a:spLocks noGrp="1"/>
+          </p:cNvSpPr>
+          <p:nvPr>
+            <p:ph type="title"/>
+          </p:nvPr>
+        </p:nvSpPr>
+        <p:spPr/>
+        <p:txBody>
+          <a:bodyPr/>
+          <a:lstStyle/>
+          <a:p>
+            <a:r>
+              <a:rPr lang="en-US" altLang="zh-TW" dirty="0"/>
+              <a:t>AHB</a:t>
+            </a:r>
+            <a:r>
+              <a:rPr lang="zh-TW" altLang="en-US" dirty="0"/>
+              <a:t> </a:t>
+            </a:r>
+            <a:r>
+              <a:rPr lang="en-US" altLang="zh-TW" dirty="0"/>
+              <a:t>Signal Descriptions</a:t>
+            </a:r>
+            <a:r>
+              <a:rPr lang="zh-TW" altLang="en-US" dirty="0"/>
+              <a:t> </a:t>
+            </a:r>
+            <a:r>
+              <a:rPr lang="en-US" altLang="zh-TW" dirty="0"/>
+              <a:t>(7/7)</a:t>
+            </a:r>
+            <a:endParaRPr lang="zh-TW" altLang="en-US" dirty="0"/>
+          </a:p>
+        </p:txBody>
+      </p:sp>
+      <p:sp>
+        <p:nvSpPr>
+          <p:cNvPr id="3" name="內容版面配置區 2">
+            <a:extLst>
+              <a:ext uri="{FF2B5EF4-FFF2-40B4-BE49-F238E27FC236}">
+                <a16:creationId xmlns:a16="http://schemas.microsoft.com/office/drawing/2014/main" id="{0FC2AD29-7E3F-338E-480D-3B12B049FFE5}"/>
+              </a:ext>
+            </a:extLst>
+          </p:cNvPr>
+          <p:cNvSpPr>
+            <a:spLocks noGrp="1"/>
+          </p:cNvSpPr>
+          <p:nvPr>
+            <p:ph idx="1"/>
+          </p:nvPr>
+        </p:nvSpPr>
+        <p:spPr/>
+        <p:txBody>
+          <a:bodyPr/>
+          <a:lstStyle/>
+          <a:p>
+            <a:pPr marL="514350" indent="-514350">
+              <a:buFont typeface="+mj-lt"/>
+              <a:buAutoNum type="arabicPeriod" startAt="5"/>
+            </a:pPr>
+            <a:r>
+              <a:rPr lang="en-US" altLang="zh-TW" dirty="0"/>
+              <a:t>Multiplexor signal</a:t>
+            </a:r>
+          </a:p>
+          <a:p>
+            <a:pPr marL="514350" indent="-514350">
+              <a:buFont typeface="+mj-lt"/>
+              <a:buAutoNum type="arabicPeriod" startAt="5"/>
+            </a:pPr>
+            <a:endParaRPr lang="en-US" altLang="zh-TW" dirty="0"/>
+          </a:p>
+        </p:txBody>
+      </p:sp>
+      <p:graphicFrame>
+        <p:nvGraphicFramePr>
+          <p:cNvPr id="4" name="表格 3">
+            <a:extLst>
+              <a:ext uri="{FF2B5EF4-FFF2-40B4-BE49-F238E27FC236}">
+                <a16:creationId xmlns:a16="http://schemas.microsoft.com/office/drawing/2014/main" id="{20BA3FB4-4D57-4B74-DD0B-D1473C5F744D}"/>
+              </a:ext>
+            </a:extLst>
+          </p:cNvPr>
+          <p:cNvGraphicFramePr>
+            <a:graphicFrameLocks noGrp="1"/>
+          </p:cNvGraphicFramePr>
+          <p:nvPr>
+            <p:extLst>
+              <p:ext uri="{D42A27DB-BD31-4B8C-83A1-F6EECF244321}">
+                <p14:modId xmlns:p14="http://schemas.microsoft.com/office/powerpoint/2010/main" val="3312266747"/>
+              </p:ext>
+            </p:extLst>
+          </p:nvPr>
+        </p:nvGraphicFramePr>
+        <p:xfrm>
+          <a:off x="1075426" y="2463033"/>
+          <a:ext cx="10719759" cy="1691640"/>
+        </p:xfrm>
+        <a:graphic>
+          <a:graphicData uri="http://schemas.openxmlformats.org/drawingml/2006/table">
+            <a:tbl>
+              <a:tblPr firstRow="1" bandRow="1">
+                <a:tableStyleId>{5C22544A-7EE6-4342-B048-85BDC9FD1C3A}</a:tableStyleId>
+              </a:tblPr>
+              <a:tblGrid>
+                <a:gridCol w="2493034">
+                  <a:extLst>
+                    <a:ext uri="{9D8B030D-6E8A-4147-A177-3AD203B41FA5}">
+                      <a16:colId xmlns:a16="http://schemas.microsoft.com/office/drawing/2014/main" val="1485549075"/>
+                    </a:ext>
+                  </a:extLst>
+                </a:gridCol>
+                <a:gridCol w="2493034">
+                  <a:extLst>
+                    <a:ext uri="{9D8B030D-6E8A-4147-A177-3AD203B41FA5}">
+                      <a16:colId xmlns:a16="http://schemas.microsoft.com/office/drawing/2014/main" val="1812413034"/>
+                    </a:ext>
+                  </a:extLst>
+                </a:gridCol>
+                <a:gridCol w="5733691">
+                  <a:extLst>
+                    <a:ext uri="{9D8B030D-6E8A-4147-A177-3AD203B41FA5}">
+                      <a16:colId xmlns:a16="http://schemas.microsoft.com/office/drawing/2014/main" val="1577056355"/>
+                    </a:ext>
+                  </a:extLst>
+                </a:gridCol>
+              </a:tblGrid>
+              <a:tr h="370840">
+                <a:tc>
+                  <a:txBody>
+                    <a:bodyPr/>
+                    <a:lstStyle/>
+                    <a:p>
+                      <a:pPr algn="ctr"/>
+                      <a:r>
+                        <a:rPr lang="en-US" altLang="zh-TW" dirty="0"/>
+                        <a:t>Name</a:t>
+                      </a:r>
+                      <a:endParaRPr lang="zh-TW" altLang="en-US" dirty="0"/>
+                    </a:p>
+                  </a:txBody>
+                  <a:tcPr/>
+                </a:tc>
+                <a:tc>
+                  <a:txBody>
+                    <a:bodyPr/>
+                    <a:lstStyle/>
+                    <a:p>
+                      <a:pPr algn="ctr"/>
+                      <a:r>
+                        <a:rPr lang="en-US" altLang="zh-TW" dirty="0"/>
+                        <a:t>Destination</a:t>
+                      </a:r>
+                      <a:endParaRPr lang="zh-TW" altLang="en-US" dirty="0"/>
+                    </a:p>
+                  </a:txBody>
+                  <a:tcPr/>
+                </a:tc>
+                <a:tc>
+                  <a:txBody>
+                    <a:bodyPr/>
+                    <a:lstStyle/>
+                    <a:p>
+                      <a:pPr algn="ctr"/>
+                      <a:r>
+                        <a:rPr lang="en-US" altLang="zh-TW" dirty="0"/>
+                        <a:t>Description</a:t>
+                      </a:r>
+                      <a:endParaRPr lang="zh-TW" altLang="en-US" dirty="0"/>
+                    </a:p>
+                  </a:txBody>
+                  <a:tcPr/>
+                </a:tc>
+                <a:extLst>
+                  <a:ext uri="{0D108BD9-81ED-4DB2-BD59-A6C34878D82A}">
+                    <a16:rowId xmlns:a16="http://schemas.microsoft.com/office/drawing/2014/main" val="607370041"/>
+                  </a:ext>
+                </a:extLst>
+              </a:tr>
+              <a:tr h="370840">
+                <a:tc>
+                  <a:txBody>
+                    <a:bodyPr/>
+                    <a:lstStyle/>
+                    <a:p>
+                      <a:pPr algn="ctr"/>
+                      <a:r>
+                        <a:rPr lang="en-US" altLang="zh-TW" dirty="0"/>
+                        <a:t>HRDATA[31:0]</a:t>
+                      </a:r>
+                      <a:endParaRPr lang="zh-TW" altLang="en-US" dirty="0"/>
+                    </a:p>
+                  </a:txBody>
+                  <a:tcPr/>
+                </a:tc>
+                <a:tc>
+                  <a:txBody>
+                    <a:bodyPr/>
+                    <a:lstStyle/>
+                    <a:p>
+                      <a:pPr algn="ctr"/>
+                      <a:r>
+                        <a:rPr lang="en-US" altLang="zh-TW" dirty="0"/>
+                        <a:t>Master</a:t>
+                      </a:r>
+                      <a:endParaRPr lang="zh-TW" altLang="en-US" dirty="0"/>
+                    </a:p>
+                  </a:txBody>
+                  <a:tcPr/>
+                </a:tc>
+                <a:tc>
+                  <a:txBody>
+                    <a:bodyPr/>
+                    <a:lstStyle/>
+                    <a:p>
+                      <a:pPr algn="l"/>
+                      <a:r>
+                        <a:rPr lang="en-US" altLang="zh-TW" sz="1600" dirty="0"/>
+                        <a:t>Read data bus, selected by the decoder.</a:t>
+                      </a:r>
+                      <a:endParaRPr lang="zh-TW" altLang="en-US" sz="1600" dirty="0"/>
+                    </a:p>
+                  </a:txBody>
+                  <a:tcPr/>
+                </a:tc>
+                <a:extLst>
+                  <a:ext uri="{0D108BD9-81ED-4DB2-BD59-A6C34878D82A}">
+                    <a16:rowId xmlns:a16="http://schemas.microsoft.com/office/drawing/2014/main" val="416700849"/>
+                  </a:ext>
+                </a:extLst>
+              </a:tr>
+              <a:tr h="370840">
+                <a:tc>
+                  <a:txBody>
+                    <a:bodyPr/>
+                    <a:lstStyle/>
+                    <a:p>
+                      <a:pPr algn="ctr"/>
+                      <a:r>
+                        <a:rPr lang="en-US" altLang="zh-TW" dirty="0"/>
+                        <a:t>HREADY</a:t>
+                      </a:r>
+                      <a:endParaRPr lang="zh-TW" altLang="en-US" dirty="0"/>
+                    </a:p>
+                  </a:txBody>
+                  <a:tcPr/>
+                </a:tc>
+                <a:tc>
+                  <a:txBody>
+                    <a:bodyPr/>
+                    <a:lstStyle/>
+                    <a:p>
+                      <a:pPr algn="ctr"/>
+                      <a:r>
+                        <a:rPr lang="en-US" altLang="zh-TW" dirty="0"/>
+                        <a:t>Master and slave</a:t>
+                      </a:r>
+                      <a:endParaRPr lang="zh-TW" altLang="en-US" dirty="0"/>
+                    </a:p>
+                  </a:txBody>
+                  <a:tcPr/>
+                </a:tc>
+                <a:tc>
+                  <a:txBody>
+                    <a:bodyPr/>
+                    <a:lstStyle/>
+                    <a:p>
+                      <a:pPr algn="l"/>
+                      <a:r>
+                        <a:rPr lang="zh-TW" altLang="en-US" sz="1600" dirty="0"/>
+                        <a:t>當 </a:t>
+                      </a:r>
+                      <a:r>
+                        <a:rPr lang="en-US" altLang="zh-TW" sz="1600" dirty="0"/>
+                        <a:t>HREADY </a:t>
+                      </a:r>
+                      <a:r>
+                        <a:rPr lang="zh-TW" altLang="en-US" sz="1600" dirty="0"/>
+                        <a:t>訊號為高電位時，表示先前的傳輸已完成</a:t>
+                      </a:r>
+                      <a:endParaRPr lang="en-US" altLang="zh-TW" sz="1600" dirty="0"/>
+                    </a:p>
+                    <a:p>
+                      <a:pPr algn="l"/>
+                      <a:r>
+                        <a:rPr lang="zh-TW" altLang="en-US" sz="1600" dirty="0"/>
+                        <a:t>這個訊號會通知</a:t>
+                      </a:r>
+                      <a:r>
+                        <a:rPr lang="en-US" altLang="zh-TW" sz="1600" dirty="0"/>
+                        <a:t>master</a:t>
+                      </a:r>
+                      <a:r>
+                        <a:rPr lang="zh-TW" altLang="en-US" sz="1600" dirty="0"/>
+                        <a:t>和所有</a:t>
+                      </a:r>
+                      <a:r>
+                        <a:rPr lang="en-US" altLang="zh-TW" sz="1600" dirty="0"/>
+                        <a:t>slave</a:t>
+                      </a:r>
+                      <a:r>
+                        <a:rPr lang="zh-TW" altLang="en-US" sz="1600" dirty="0"/>
+                        <a:t>。</a:t>
+                      </a:r>
+                    </a:p>
+                  </a:txBody>
+                  <a:tcPr/>
+                </a:tc>
+                <a:extLst>
+                  <a:ext uri="{0D108BD9-81ED-4DB2-BD59-A6C34878D82A}">
+                    <a16:rowId xmlns:a16="http://schemas.microsoft.com/office/drawing/2014/main" val="3909532716"/>
+                  </a:ext>
+                </a:extLst>
+              </a:tr>
+              <a:tr h="370840">
+                <a:tc>
+                  <a:txBody>
+                    <a:bodyPr/>
+                    <a:lstStyle/>
+                    <a:p>
+                      <a:pPr algn="ctr"/>
+                      <a:r>
+                        <a:rPr lang="en-US" altLang="zh-TW" dirty="0"/>
+                        <a:t>HRESP</a:t>
+                      </a:r>
+                      <a:endParaRPr lang="zh-TW" altLang="en-US" dirty="0"/>
+                    </a:p>
+                  </a:txBody>
+                  <a:tcPr/>
+                </a:tc>
+                <a:tc>
+                  <a:txBody>
+                    <a:bodyPr/>
+                    <a:lstStyle/>
+                    <a:p>
+                      <a:pPr algn="ctr"/>
+                      <a:r>
+                        <a:rPr lang="en-US" altLang="zh-TW" dirty="0"/>
+                        <a:t>Master</a:t>
+                      </a:r>
+                      <a:endParaRPr lang="zh-TW" altLang="en-US" dirty="0"/>
+                    </a:p>
+                  </a:txBody>
+                  <a:tcPr/>
+                </a:tc>
+                <a:tc>
+                  <a:txBody>
+                    <a:bodyPr/>
+                    <a:lstStyle/>
+                    <a:p>
+                      <a:pPr algn="l"/>
+                      <a:r>
+                        <a:rPr lang="en-US" altLang="zh-TW" sz="1600" dirty="0"/>
+                        <a:t>Transfer response, selected by the decoder.</a:t>
+                      </a:r>
+                      <a:endParaRPr lang="zh-TW" altLang="en-US" sz="1600" dirty="0"/>
+                    </a:p>
+                  </a:txBody>
+                  <a:tcPr/>
+                </a:tc>
+                <a:extLst>
+                  <a:ext uri="{0D108BD9-81ED-4DB2-BD59-A6C34878D82A}">
+                    <a16:rowId xmlns:a16="http://schemas.microsoft.com/office/drawing/2014/main" val="2650518415"/>
+                  </a:ext>
+                </a:extLst>
+              </a:tr>
+            </a:tbl>
+          </a:graphicData>
+        </a:graphic>
+      </p:graphicFrame>
+    </p:spTree>
+    <p:extLst>
+      <p:ext uri="{BB962C8B-B14F-4D97-AF65-F5344CB8AC3E}">
+        <p14:creationId xmlns:p14="http://schemas.microsoft.com/office/powerpoint/2010/main" val="412343188"/>
       </p:ext>
     </p:extLst>
   </p:cSld>

</xml_diff>

<commit_message>
Modify: AMBA/AMBA_learning.pptx 1. Add chapter 2 AHB Transfers Basic transfers 2. Add chapter 2 AHB Transfers Transfer types
</commit_message>
<xml_diff>
--- a/AMBA/AMBA_learning.pptx
+++ b/AMBA/AMBA_learning.pptx
@@ -25,6 +25,15 @@
     <p:sldId id="285" r:id="rId19"/>
     <p:sldId id="286" r:id="rId20"/>
     <p:sldId id="287" r:id="rId21"/>
+    <p:sldId id="288" r:id="rId22"/>
+    <p:sldId id="289" r:id="rId23"/>
+    <p:sldId id="290" r:id="rId24"/>
+    <p:sldId id="293" r:id="rId25"/>
+    <p:sldId id="291" r:id="rId26"/>
+    <p:sldId id="292" r:id="rId27"/>
+    <p:sldId id="294" r:id="rId28"/>
+    <p:sldId id="296" r:id="rId29"/>
+    <p:sldId id="295" r:id="rId30"/>
   </p:sldIdLst>
   <p:sldSz cx="12192000" cy="6858000"/>
   <p:notesSz cx="6858000" cy="9144000"/>
@@ -7523,6 +7532,2704 @@
     <p:extLst>
       <p:ext uri="{BB962C8B-B14F-4D97-AF65-F5344CB8AC3E}">
         <p14:creationId xmlns:p14="http://schemas.microsoft.com/office/powerpoint/2010/main" val="412343188"/>
+      </p:ext>
+    </p:extLst>
+  </p:cSld>
+  <p:clrMapOvr>
+    <a:masterClrMapping/>
+  </p:clrMapOvr>
+</p:sld>
+</file>
+
+<file path=ppt/slides/slide21.xml><?xml version="1.0" encoding="utf-8"?>
+<p:sld xmlns:a="http://schemas.openxmlformats.org/drawingml/2006/main" xmlns:r="http://schemas.openxmlformats.org/officeDocument/2006/relationships" xmlns:p="http://schemas.openxmlformats.org/presentationml/2006/main">
+  <p:cSld>
+    <p:spTree>
+      <p:nvGrpSpPr>
+        <p:cNvPr id="1" name="">
+          <a:extLst>
+            <a:ext uri="{FF2B5EF4-FFF2-40B4-BE49-F238E27FC236}">
+              <a16:creationId xmlns:a16="http://schemas.microsoft.com/office/drawing/2014/main" id="{FFF53E35-F374-242C-B3D3-92F387C12378}"/>
+            </a:ext>
+          </a:extLst>
+        </p:cNvPr>
+        <p:cNvGrpSpPr/>
+        <p:nvPr/>
+      </p:nvGrpSpPr>
+      <p:grpSpPr>
+        <a:xfrm>
+          <a:off x="0" y="0"/>
+          <a:ext cx="0" cy="0"/>
+          <a:chOff x="0" y="0"/>
+          <a:chExt cx="0" cy="0"/>
+        </a:xfrm>
+      </p:grpSpPr>
+      <p:sp>
+        <p:nvSpPr>
+          <p:cNvPr id="2" name="標題 1">
+            <a:extLst>
+              <a:ext uri="{FF2B5EF4-FFF2-40B4-BE49-F238E27FC236}">
+                <a16:creationId xmlns:a16="http://schemas.microsoft.com/office/drawing/2014/main" id="{6DB15306-7F5A-2CB9-5ED2-3F7B0D8E6EBF}"/>
+              </a:ext>
+            </a:extLst>
+          </p:cNvPr>
+          <p:cNvSpPr>
+            <a:spLocks noGrp="1"/>
+          </p:cNvSpPr>
+          <p:nvPr>
+            <p:ph type="title"/>
+          </p:nvPr>
+        </p:nvSpPr>
+        <p:spPr/>
+        <p:txBody>
+          <a:bodyPr/>
+          <a:lstStyle/>
+          <a:p>
+            <a:r>
+              <a:rPr lang="en-US" altLang="zh-TW" dirty="0"/>
+              <a:t>AHB</a:t>
+            </a:r>
+            <a:r>
+              <a:rPr lang="zh-TW" altLang="en-US" dirty="0"/>
+              <a:t> </a:t>
+            </a:r>
+            <a:r>
+              <a:rPr lang="en-US" altLang="zh-TW" dirty="0"/>
+              <a:t>Transfers (1/)</a:t>
+            </a:r>
+            <a:endParaRPr lang="zh-TW" altLang="en-US" dirty="0"/>
+          </a:p>
+        </p:txBody>
+      </p:sp>
+      <p:sp>
+        <p:nvSpPr>
+          <p:cNvPr id="3" name="內容版面配置區 2">
+            <a:extLst>
+              <a:ext uri="{FF2B5EF4-FFF2-40B4-BE49-F238E27FC236}">
+                <a16:creationId xmlns:a16="http://schemas.microsoft.com/office/drawing/2014/main" id="{2EA31934-FFD2-87DF-36E6-CB9F9807A3D3}"/>
+              </a:ext>
+            </a:extLst>
+          </p:cNvPr>
+          <p:cNvSpPr>
+            <a:spLocks noGrp="1"/>
+          </p:cNvSpPr>
+          <p:nvPr>
+            <p:ph idx="1"/>
+          </p:nvPr>
+        </p:nvSpPr>
+        <p:spPr/>
+        <p:txBody>
+          <a:bodyPr/>
+          <a:lstStyle/>
+          <a:p>
+            <a:pPr marL="514350" indent="-514350">
+              <a:buFont typeface="+mj-lt"/>
+              <a:buAutoNum type="arabicPeriod"/>
+            </a:pPr>
+            <a:r>
+              <a:rPr lang="en-US" altLang="zh-TW" dirty="0"/>
+              <a:t>Basic transfers</a:t>
+            </a:r>
+          </a:p>
+          <a:p>
+            <a:pPr marL="514350" indent="-514350">
+              <a:buFont typeface="+mj-lt"/>
+              <a:buAutoNum type="arabicPeriod"/>
+            </a:pPr>
+            <a:r>
+              <a:rPr lang="en-US" altLang="zh-TW" dirty="0"/>
+              <a:t>Transfer types</a:t>
+            </a:r>
+          </a:p>
+          <a:p>
+            <a:pPr marL="514350" indent="-514350">
+              <a:buFont typeface="+mj-lt"/>
+              <a:buAutoNum type="arabicPeriod"/>
+            </a:pPr>
+            <a:r>
+              <a:rPr lang="en-US" altLang="zh-TW" dirty="0"/>
+              <a:t>Locked transfers</a:t>
+            </a:r>
+          </a:p>
+          <a:p>
+            <a:pPr marL="514350" indent="-514350">
+              <a:buFont typeface="+mj-lt"/>
+              <a:buAutoNum type="arabicPeriod"/>
+            </a:pPr>
+            <a:r>
+              <a:rPr lang="en-US" altLang="zh-TW" dirty="0"/>
+              <a:t>Transfer size</a:t>
+            </a:r>
+          </a:p>
+          <a:p>
+            <a:pPr marL="514350" indent="-514350">
+              <a:buFont typeface="+mj-lt"/>
+              <a:buAutoNum type="arabicPeriod"/>
+            </a:pPr>
+            <a:r>
+              <a:rPr lang="en-US" altLang="zh-TW" dirty="0"/>
+              <a:t>Burst operation</a:t>
+            </a:r>
+          </a:p>
+          <a:p>
+            <a:pPr marL="514350" indent="-514350">
+              <a:buFont typeface="+mj-lt"/>
+              <a:buAutoNum type="arabicPeriod"/>
+            </a:pPr>
+            <a:r>
+              <a:rPr lang="en-US" altLang="zh-TW" dirty="0"/>
+              <a:t>Waited transfers</a:t>
+            </a:r>
+          </a:p>
+          <a:p>
+            <a:pPr marL="514350" indent="-514350">
+              <a:buFont typeface="+mj-lt"/>
+              <a:buAutoNum type="arabicPeriod"/>
+            </a:pPr>
+            <a:r>
+              <a:rPr lang="en-US" altLang="zh-TW" dirty="0"/>
+              <a:t>Protection control</a:t>
+            </a:r>
+          </a:p>
+        </p:txBody>
+      </p:sp>
+    </p:spTree>
+    <p:extLst>
+      <p:ext uri="{BB962C8B-B14F-4D97-AF65-F5344CB8AC3E}">
+        <p14:creationId xmlns:p14="http://schemas.microsoft.com/office/powerpoint/2010/main" val="2474521859"/>
+      </p:ext>
+    </p:extLst>
+  </p:cSld>
+  <p:clrMapOvr>
+    <a:masterClrMapping/>
+  </p:clrMapOvr>
+</p:sld>
+</file>
+
+<file path=ppt/slides/slide22.xml><?xml version="1.0" encoding="utf-8"?>
+<p:sld xmlns:a="http://schemas.openxmlformats.org/drawingml/2006/main" xmlns:r="http://schemas.openxmlformats.org/officeDocument/2006/relationships" xmlns:p="http://schemas.openxmlformats.org/presentationml/2006/main">
+  <p:cSld>
+    <p:spTree>
+      <p:nvGrpSpPr>
+        <p:cNvPr id="1" name="">
+          <a:extLst>
+            <a:ext uri="{FF2B5EF4-FFF2-40B4-BE49-F238E27FC236}">
+              <a16:creationId xmlns:a16="http://schemas.microsoft.com/office/drawing/2014/main" id="{043140AF-6A8B-1CE5-BAF7-AA66D2D888F6}"/>
+            </a:ext>
+          </a:extLst>
+        </p:cNvPr>
+        <p:cNvGrpSpPr/>
+        <p:nvPr/>
+      </p:nvGrpSpPr>
+      <p:grpSpPr>
+        <a:xfrm>
+          <a:off x="0" y="0"/>
+          <a:ext cx="0" cy="0"/>
+          <a:chOff x="0" y="0"/>
+          <a:chExt cx="0" cy="0"/>
+        </a:xfrm>
+      </p:grpSpPr>
+      <p:sp>
+        <p:nvSpPr>
+          <p:cNvPr id="2" name="標題 1">
+            <a:extLst>
+              <a:ext uri="{FF2B5EF4-FFF2-40B4-BE49-F238E27FC236}">
+                <a16:creationId xmlns:a16="http://schemas.microsoft.com/office/drawing/2014/main" id="{33155F78-7DBB-3CF2-C594-A4F37491EAA3}"/>
+              </a:ext>
+            </a:extLst>
+          </p:cNvPr>
+          <p:cNvSpPr>
+            <a:spLocks noGrp="1"/>
+          </p:cNvSpPr>
+          <p:nvPr>
+            <p:ph type="title"/>
+          </p:nvPr>
+        </p:nvSpPr>
+        <p:spPr/>
+        <p:txBody>
+          <a:bodyPr/>
+          <a:lstStyle/>
+          <a:p>
+            <a:r>
+              <a:rPr lang="en-US" altLang="zh-TW" dirty="0"/>
+              <a:t>AHB</a:t>
+            </a:r>
+            <a:r>
+              <a:rPr lang="zh-TW" altLang="en-US" dirty="0"/>
+              <a:t> </a:t>
+            </a:r>
+            <a:r>
+              <a:rPr lang="en-US" altLang="zh-TW" dirty="0"/>
+              <a:t>Transfers (2/)</a:t>
+            </a:r>
+            <a:endParaRPr lang="zh-TW" altLang="en-US" dirty="0"/>
+          </a:p>
+        </p:txBody>
+      </p:sp>
+      <p:sp>
+        <p:nvSpPr>
+          <p:cNvPr id="3" name="內容版面配置區 2">
+            <a:extLst>
+              <a:ext uri="{FF2B5EF4-FFF2-40B4-BE49-F238E27FC236}">
+                <a16:creationId xmlns:a16="http://schemas.microsoft.com/office/drawing/2014/main" id="{EBFACEAB-21F8-3623-57F2-71802F1D91AE}"/>
+              </a:ext>
+            </a:extLst>
+          </p:cNvPr>
+          <p:cNvSpPr>
+            <a:spLocks noGrp="1"/>
+          </p:cNvSpPr>
+          <p:nvPr>
+            <p:ph idx="1"/>
+          </p:nvPr>
+        </p:nvSpPr>
+        <p:spPr/>
+        <p:txBody>
+          <a:bodyPr/>
+          <a:lstStyle/>
+          <a:p>
+            <a:pPr marL="514350" indent="-514350">
+              <a:buFont typeface="+mj-lt"/>
+              <a:buAutoNum type="arabicPeriod"/>
+            </a:pPr>
+            <a:r>
+              <a:rPr lang="en-US" altLang="zh-TW" dirty="0"/>
+              <a:t>Basic transfers</a:t>
+            </a:r>
+            <a:r>
+              <a:rPr lang="zh-TW" altLang="en-US" dirty="0"/>
+              <a:t> </a:t>
+            </a:r>
+            <a:r>
+              <a:rPr lang="en-US" altLang="zh-TW" dirty="0"/>
+              <a:t>– Read </a:t>
+            </a:r>
+          </a:p>
+          <a:p>
+            <a:pPr lvl="1"/>
+            <a:r>
+              <a:rPr lang="en-US" altLang="zh-TW" dirty="0"/>
+              <a:t>Master </a:t>
+            </a:r>
+            <a:r>
+              <a:rPr lang="zh-TW" altLang="en-US" dirty="0"/>
+              <a:t>發 </a:t>
+            </a:r>
+            <a:r>
+              <a:rPr lang="en-US" altLang="zh-TW" dirty="0"/>
+              <a:t>Read CMD </a:t>
+            </a:r>
+            <a:r>
+              <a:rPr lang="zh-TW" altLang="en-US" dirty="0"/>
+              <a:t>給 </a:t>
+            </a:r>
+            <a:r>
+              <a:rPr lang="en-US" altLang="zh-TW" dirty="0"/>
+              <a:t>slave</a:t>
+            </a:r>
+            <a:br>
+              <a:rPr lang="en-US" altLang="zh-TW" dirty="0"/>
+            </a:br>
+            <a:r>
+              <a:rPr lang="en-US" altLang="zh-TW" dirty="0"/>
+              <a:t>(Master </a:t>
+            </a:r>
+            <a:r>
+              <a:rPr lang="zh-TW" altLang="en-US" dirty="0"/>
+              <a:t>對 </a:t>
+            </a:r>
+            <a:r>
+              <a:rPr lang="en-US" altLang="zh-TW" dirty="0"/>
+              <a:t>Slave</a:t>
+            </a:r>
+            <a:r>
+              <a:rPr lang="zh-TW" altLang="en-US" dirty="0"/>
+              <a:t> 做讀取</a:t>
+            </a:r>
+            <a:r>
+              <a:rPr lang="en-US" altLang="zh-TW" dirty="0"/>
+              <a:t>)</a:t>
+            </a:r>
+          </a:p>
+          <a:p>
+            <a:pPr lvl="1"/>
+            <a:r>
+              <a:rPr lang="en-US" altLang="zh-TW" dirty="0"/>
+              <a:t>HWRITE</a:t>
+            </a:r>
+            <a:r>
+              <a:rPr lang="zh-TW" altLang="en-US" dirty="0"/>
+              <a:t> </a:t>
+            </a:r>
+            <a:r>
+              <a:rPr lang="en-US" altLang="zh-TW" dirty="0"/>
+              <a:t>=</a:t>
+            </a:r>
+            <a:r>
+              <a:rPr lang="zh-TW" altLang="en-US" dirty="0"/>
+              <a:t> </a:t>
+            </a:r>
+            <a:r>
+              <a:rPr lang="en-US" altLang="zh-TW" dirty="0"/>
+              <a:t>LOW</a:t>
+            </a:r>
+          </a:p>
+          <a:p>
+            <a:pPr lvl="1"/>
+            <a:r>
+              <a:rPr lang="en-US" altLang="zh-TW" dirty="0"/>
+              <a:t>Address Phase</a:t>
+            </a:r>
+          </a:p>
+          <a:p>
+            <a:pPr lvl="2"/>
+            <a:r>
+              <a:rPr lang="zh-TW" altLang="en-US" dirty="0"/>
+              <a:t>當 </a:t>
+            </a:r>
+            <a:r>
+              <a:rPr lang="en-US" altLang="zh-TW" dirty="0"/>
+              <a:t>HREADY</a:t>
+            </a:r>
+            <a:r>
+              <a:rPr lang="zh-TW" altLang="en-US" dirty="0"/>
+              <a:t> </a:t>
+            </a:r>
+            <a:r>
+              <a:rPr lang="en-US" altLang="zh-TW" dirty="0"/>
+              <a:t>=</a:t>
+            </a:r>
+            <a:r>
+              <a:rPr lang="zh-TW" altLang="en-US" dirty="0"/>
+              <a:t> </a:t>
+            </a:r>
+            <a:r>
+              <a:rPr lang="en-US" altLang="zh-TW" dirty="0"/>
+              <a:t>1 </a:t>
+            </a:r>
+            <a:r>
+              <a:rPr lang="zh-TW" altLang="en-US" dirty="0"/>
+              <a:t>時， </a:t>
+            </a:r>
+            <a:r>
+              <a:rPr lang="en-US" altLang="zh-TW" dirty="0"/>
+              <a:t>HADDR  (A)</a:t>
+            </a:r>
+            <a:r>
+              <a:rPr lang="zh-TW" altLang="en-US" dirty="0"/>
+              <a:t> 被接收</a:t>
+            </a:r>
+            <a:endParaRPr lang="en-US" altLang="zh-TW" dirty="0"/>
+          </a:p>
+          <a:p>
+            <a:pPr lvl="1"/>
+            <a:r>
+              <a:rPr lang="en-US" altLang="zh-TW" dirty="0"/>
+              <a:t>Data Phase</a:t>
+            </a:r>
+          </a:p>
+          <a:p>
+            <a:pPr lvl="2"/>
+            <a:r>
+              <a:rPr lang="zh-TW" altLang="en-US" dirty="0"/>
+              <a:t>當下一個週期 </a:t>
+            </a:r>
+            <a:r>
+              <a:rPr lang="en-US" altLang="zh-TW" dirty="0"/>
+              <a:t>HREADY</a:t>
+            </a:r>
+            <a:r>
+              <a:rPr lang="zh-TW" altLang="en-US" dirty="0"/>
+              <a:t> </a:t>
+            </a:r>
+            <a:r>
+              <a:rPr lang="en-US" altLang="zh-TW" dirty="0"/>
+              <a:t>=</a:t>
+            </a:r>
+            <a:r>
+              <a:rPr lang="zh-TW" altLang="en-US" dirty="0"/>
+              <a:t> </a:t>
+            </a:r>
+            <a:r>
+              <a:rPr lang="en-US" altLang="zh-TW" dirty="0"/>
+              <a:t>1</a:t>
+            </a:r>
+            <a:r>
+              <a:rPr lang="zh-TW" altLang="en-US" dirty="0"/>
+              <a:t> 時，</a:t>
+            </a:r>
+            <a:endParaRPr lang="en-US" altLang="zh-TW" dirty="0"/>
+          </a:p>
+          <a:p>
+            <a:pPr lvl="2"/>
+            <a:r>
+              <a:rPr lang="en-US" altLang="zh-TW" dirty="0"/>
+              <a:t>A </a:t>
+            </a:r>
+            <a:r>
+              <a:rPr lang="zh-TW" altLang="en-US" dirty="0"/>
+              <a:t>的 </a:t>
+            </a:r>
+            <a:r>
+              <a:rPr lang="en-US" altLang="zh-TW" dirty="0"/>
+              <a:t>Data</a:t>
+            </a:r>
+            <a:r>
+              <a:rPr lang="zh-TW" altLang="en-US" dirty="0"/>
+              <a:t> 放上 </a:t>
+            </a:r>
+            <a:r>
+              <a:rPr lang="en-US" altLang="zh-TW" dirty="0"/>
+              <a:t>HRDATA</a:t>
+            </a:r>
+            <a:r>
+              <a:rPr lang="zh-TW" altLang="en-US" dirty="0"/>
+              <a:t> 回傳給 </a:t>
+            </a:r>
+            <a:r>
+              <a:rPr lang="en-US" altLang="zh-TW" dirty="0"/>
+              <a:t>master</a:t>
+            </a:r>
+          </a:p>
+        </p:txBody>
+      </p:sp>
+      <p:pic>
+        <p:nvPicPr>
+          <p:cNvPr id="5" name="圖片 4">
+            <a:extLst>
+              <a:ext uri="{FF2B5EF4-FFF2-40B4-BE49-F238E27FC236}">
+                <a16:creationId xmlns:a16="http://schemas.microsoft.com/office/drawing/2014/main" id="{90CA3D32-6C3A-FB2C-45F2-3562F4BC38D3}"/>
+              </a:ext>
+            </a:extLst>
+          </p:cNvPr>
+          <p:cNvPicPr>
+            <a:picLocks noChangeAspect="1"/>
+          </p:cNvPicPr>
+          <p:nvPr/>
+        </p:nvPicPr>
+        <p:blipFill>
+          <a:blip r:embed="rId2"/>
+          <a:stretch>
+            <a:fillRect/>
+          </a:stretch>
+        </p:blipFill>
+        <p:spPr>
+          <a:xfrm>
+            <a:off x="6824197" y="1825625"/>
+            <a:ext cx="5143615" cy="2045756"/>
+          </a:xfrm>
+          <a:prstGeom prst="rect">
+            <a:avLst/>
+          </a:prstGeom>
+          <a:ln>
+            <a:solidFill>
+              <a:schemeClr val="tx1"/>
+            </a:solidFill>
+          </a:ln>
+        </p:spPr>
+      </p:pic>
+    </p:spTree>
+    <p:extLst>
+      <p:ext uri="{BB962C8B-B14F-4D97-AF65-F5344CB8AC3E}">
+        <p14:creationId xmlns:p14="http://schemas.microsoft.com/office/powerpoint/2010/main" val="3050888124"/>
+      </p:ext>
+    </p:extLst>
+  </p:cSld>
+  <p:clrMapOvr>
+    <a:masterClrMapping/>
+  </p:clrMapOvr>
+</p:sld>
+</file>
+
+<file path=ppt/slides/slide23.xml><?xml version="1.0" encoding="utf-8"?>
+<p:sld xmlns:a="http://schemas.openxmlformats.org/drawingml/2006/main" xmlns:r="http://schemas.openxmlformats.org/officeDocument/2006/relationships" xmlns:p="http://schemas.openxmlformats.org/presentationml/2006/main">
+  <p:cSld>
+    <p:spTree>
+      <p:nvGrpSpPr>
+        <p:cNvPr id="1" name="">
+          <a:extLst>
+            <a:ext uri="{FF2B5EF4-FFF2-40B4-BE49-F238E27FC236}">
+              <a16:creationId xmlns:a16="http://schemas.microsoft.com/office/drawing/2014/main" id="{8337068D-3F02-DB6F-2ED2-CD910182C4AF}"/>
+            </a:ext>
+          </a:extLst>
+        </p:cNvPr>
+        <p:cNvGrpSpPr/>
+        <p:nvPr/>
+      </p:nvGrpSpPr>
+      <p:grpSpPr>
+        <a:xfrm>
+          <a:off x="0" y="0"/>
+          <a:ext cx="0" cy="0"/>
+          <a:chOff x="0" y="0"/>
+          <a:chExt cx="0" cy="0"/>
+        </a:xfrm>
+      </p:grpSpPr>
+      <p:sp>
+        <p:nvSpPr>
+          <p:cNvPr id="2" name="標題 1">
+            <a:extLst>
+              <a:ext uri="{FF2B5EF4-FFF2-40B4-BE49-F238E27FC236}">
+                <a16:creationId xmlns:a16="http://schemas.microsoft.com/office/drawing/2014/main" id="{A00B00ED-8B16-A6B4-70FD-044A93F81F0A}"/>
+              </a:ext>
+            </a:extLst>
+          </p:cNvPr>
+          <p:cNvSpPr>
+            <a:spLocks noGrp="1"/>
+          </p:cNvSpPr>
+          <p:nvPr>
+            <p:ph type="title"/>
+          </p:nvPr>
+        </p:nvSpPr>
+        <p:spPr/>
+        <p:txBody>
+          <a:bodyPr/>
+          <a:lstStyle/>
+          <a:p>
+            <a:r>
+              <a:rPr lang="en-US" altLang="zh-TW" dirty="0"/>
+              <a:t>AHB</a:t>
+            </a:r>
+            <a:r>
+              <a:rPr lang="zh-TW" altLang="en-US" dirty="0"/>
+              <a:t> </a:t>
+            </a:r>
+            <a:r>
+              <a:rPr lang="en-US" altLang="zh-TW" dirty="0"/>
+              <a:t>Transfers (3/)</a:t>
+            </a:r>
+            <a:endParaRPr lang="zh-TW" altLang="en-US" dirty="0"/>
+          </a:p>
+        </p:txBody>
+      </p:sp>
+      <p:sp>
+        <p:nvSpPr>
+          <p:cNvPr id="3" name="內容版面配置區 2">
+            <a:extLst>
+              <a:ext uri="{FF2B5EF4-FFF2-40B4-BE49-F238E27FC236}">
+                <a16:creationId xmlns:a16="http://schemas.microsoft.com/office/drawing/2014/main" id="{25D28B8E-7F5A-28F7-A2A3-A39CF585DB98}"/>
+              </a:ext>
+            </a:extLst>
+          </p:cNvPr>
+          <p:cNvSpPr>
+            <a:spLocks noGrp="1"/>
+          </p:cNvSpPr>
+          <p:nvPr>
+            <p:ph idx="1"/>
+          </p:nvPr>
+        </p:nvSpPr>
+        <p:spPr/>
+        <p:txBody>
+          <a:bodyPr/>
+          <a:lstStyle/>
+          <a:p>
+            <a:pPr marL="514350" indent="-514350">
+              <a:buFont typeface="+mj-lt"/>
+              <a:buAutoNum type="arabicPeriod"/>
+            </a:pPr>
+            <a:r>
+              <a:rPr lang="en-US" altLang="zh-TW" dirty="0"/>
+              <a:t>Basic transfers</a:t>
+            </a:r>
+            <a:r>
+              <a:rPr lang="zh-TW" altLang="en-US" dirty="0"/>
+              <a:t> </a:t>
+            </a:r>
+            <a:r>
+              <a:rPr lang="en-US" altLang="zh-TW" dirty="0"/>
+              <a:t>– Write </a:t>
+            </a:r>
+          </a:p>
+          <a:p>
+            <a:pPr lvl="1"/>
+            <a:r>
+              <a:rPr lang="en-US" altLang="zh-TW" dirty="0"/>
+              <a:t>Master </a:t>
+            </a:r>
+            <a:r>
+              <a:rPr lang="zh-TW" altLang="en-US" dirty="0"/>
+              <a:t>發 </a:t>
+            </a:r>
+            <a:r>
+              <a:rPr lang="en-US" altLang="zh-TW" dirty="0"/>
+              <a:t>Write CMD </a:t>
+            </a:r>
+            <a:r>
+              <a:rPr lang="zh-TW" altLang="en-US" dirty="0"/>
+              <a:t>給 </a:t>
+            </a:r>
+            <a:r>
+              <a:rPr lang="en-US" altLang="zh-TW" dirty="0"/>
+              <a:t>slave</a:t>
+            </a:r>
+            <a:br>
+              <a:rPr lang="en-US" altLang="zh-TW" dirty="0"/>
+            </a:br>
+            <a:r>
+              <a:rPr lang="en-US" altLang="zh-TW" dirty="0"/>
+              <a:t>(Master </a:t>
+            </a:r>
+            <a:r>
+              <a:rPr lang="zh-TW" altLang="en-US" dirty="0"/>
+              <a:t>對 </a:t>
+            </a:r>
+            <a:r>
+              <a:rPr lang="en-US" altLang="zh-TW" dirty="0"/>
+              <a:t>slave </a:t>
+            </a:r>
+            <a:r>
+              <a:rPr lang="zh-TW" altLang="en-US" dirty="0"/>
+              <a:t>做寫入</a:t>
+            </a:r>
+            <a:r>
+              <a:rPr lang="en-US" altLang="zh-TW" dirty="0"/>
+              <a:t>)</a:t>
+            </a:r>
+          </a:p>
+          <a:p>
+            <a:pPr lvl="1"/>
+            <a:r>
+              <a:rPr lang="en-US" altLang="zh-TW" dirty="0"/>
+              <a:t>HWRITE</a:t>
+            </a:r>
+            <a:r>
+              <a:rPr lang="zh-TW" altLang="en-US" dirty="0"/>
+              <a:t> </a:t>
+            </a:r>
+            <a:r>
+              <a:rPr lang="en-US" altLang="zh-TW" dirty="0"/>
+              <a:t>=</a:t>
+            </a:r>
+            <a:r>
+              <a:rPr lang="zh-TW" altLang="en-US" dirty="0"/>
+              <a:t> </a:t>
+            </a:r>
+            <a:r>
+              <a:rPr lang="en-US" altLang="zh-TW" dirty="0"/>
+              <a:t>HIGH</a:t>
+            </a:r>
+          </a:p>
+          <a:p>
+            <a:pPr lvl="1"/>
+            <a:r>
+              <a:rPr lang="en-US" altLang="zh-TW" dirty="0"/>
+              <a:t>Address Phase</a:t>
+            </a:r>
+          </a:p>
+          <a:p>
+            <a:pPr lvl="2"/>
+            <a:r>
+              <a:rPr lang="zh-TW" altLang="en-US" dirty="0"/>
+              <a:t>當 </a:t>
+            </a:r>
+            <a:r>
+              <a:rPr lang="en-US" altLang="zh-TW" dirty="0"/>
+              <a:t>HREADY</a:t>
+            </a:r>
+            <a:r>
+              <a:rPr lang="zh-TW" altLang="en-US" dirty="0"/>
+              <a:t> </a:t>
+            </a:r>
+            <a:r>
+              <a:rPr lang="en-US" altLang="zh-TW" dirty="0"/>
+              <a:t>=</a:t>
+            </a:r>
+            <a:r>
+              <a:rPr lang="zh-TW" altLang="en-US" dirty="0"/>
+              <a:t> </a:t>
+            </a:r>
+            <a:r>
+              <a:rPr lang="en-US" altLang="zh-TW" dirty="0"/>
+              <a:t>1 </a:t>
+            </a:r>
+            <a:r>
+              <a:rPr lang="zh-TW" altLang="en-US" dirty="0"/>
+              <a:t>時， </a:t>
+            </a:r>
+            <a:r>
+              <a:rPr lang="en-US" altLang="zh-TW" dirty="0"/>
+              <a:t>HADDR  (A)</a:t>
+            </a:r>
+            <a:r>
+              <a:rPr lang="zh-TW" altLang="en-US" dirty="0"/>
+              <a:t> 被接收</a:t>
+            </a:r>
+            <a:endParaRPr lang="en-US" altLang="zh-TW" dirty="0"/>
+          </a:p>
+          <a:p>
+            <a:pPr lvl="1"/>
+            <a:r>
+              <a:rPr lang="en-US" altLang="zh-TW" dirty="0"/>
+              <a:t>Data Phase</a:t>
+            </a:r>
+          </a:p>
+          <a:p>
+            <a:pPr lvl="2"/>
+            <a:r>
+              <a:rPr lang="zh-TW" altLang="en-US" dirty="0"/>
+              <a:t>當下一個週期 </a:t>
+            </a:r>
+            <a:r>
+              <a:rPr lang="en-US" altLang="zh-TW" dirty="0"/>
+              <a:t>HREADY</a:t>
+            </a:r>
+            <a:r>
+              <a:rPr lang="zh-TW" altLang="en-US" dirty="0"/>
+              <a:t> </a:t>
+            </a:r>
+            <a:r>
+              <a:rPr lang="en-US" altLang="zh-TW" dirty="0"/>
+              <a:t>=</a:t>
+            </a:r>
+            <a:r>
+              <a:rPr lang="zh-TW" altLang="en-US" dirty="0"/>
+              <a:t> </a:t>
+            </a:r>
+            <a:r>
+              <a:rPr lang="en-US" altLang="zh-TW" dirty="0"/>
+              <a:t>1</a:t>
+            </a:r>
+            <a:r>
+              <a:rPr lang="zh-TW" altLang="en-US" dirty="0"/>
+              <a:t> 時，</a:t>
+            </a:r>
+            <a:endParaRPr lang="en-US" altLang="zh-TW" dirty="0"/>
+          </a:p>
+          <a:p>
+            <a:pPr lvl="2"/>
+            <a:r>
+              <a:rPr lang="en-US" altLang="zh-TW" dirty="0"/>
+              <a:t>A </a:t>
+            </a:r>
+            <a:r>
+              <a:rPr lang="zh-TW" altLang="en-US" dirty="0"/>
+              <a:t>的 </a:t>
+            </a:r>
+            <a:r>
+              <a:rPr lang="en-US" altLang="zh-TW" dirty="0"/>
+              <a:t>Data</a:t>
+            </a:r>
+            <a:r>
+              <a:rPr lang="zh-TW" altLang="en-US" dirty="0"/>
+              <a:t> 放上 </a:t>
+            </a:r>
+            <a:r>
+              <a:rPr lang="en-US" altLang="zh-TW" dirty="0"/>
+              <a:t>HWDATA</a:t>
+            </a:r>
+            <a:r>
+              <a:rPr lang="zh-TW" altLang="en-US" dirty="0"/>
+              <a:t> 傳給 </a:t>
+            </a:r>
+            <a:r>
+              <a:rPr lang="en-US" altLang="zh-TW" dirty="0"/>
+              <a:t>slave</a:t>
+            </a:r>
+          </a:p>
+        </p:txBody>
+      </p:sp>
+      <p:pic>
+        <p:nvPicPr>
+          <p:cNvPr id="6" name="圖片 5">
+            <a:extLst>
+              <a:ext uri="{FF2B5EF4-FFF2-40B4-BE49-F238E27FC236}">
+                <a16:creationId xmlns:a16="http://schemas.microsoft.com/office/drawing/2014/main" id="{79517395-B02D-7430-CEB0-EEFAEEC6FF5D}"/>
+              </a:ext>
+            </a:extLst>
+          </p:cNvPr>
+          <p:cNvPicPr>
+            <a:picLocks noChangeAspect="1"/>
+          </p:cNvPicPr>
+          <p:nvPr/>
+        </p:nvPicPr>
+        <p:blipFill>
+          <a:blip r:embed="rId2"/>
+          <a:stretch>
+            <a:fillRect/>
+          </a:stretch>
+        </p:blipFill>
+        <p:spPr>
+          <a:xfrm>
+            <a:off x="6634596" y="1825625"/>
+            <a:ext cx="5310113" cy="2059752"/>
+          </a:xfrm>
+          <a:prstGeom prst="rect">
+            <a:avLst/>
+          </a:prstGeom>
+          <a:ln>
+            <a:solidFill>
+              <a:schemeClr val="tx1"/>
+            </a:solidFill>
+          </a:ln>
+        </p:spPr>
+      </p:pic>
+    </p:spTree>
+    <p:extLst>
+      <p:ext uri="{BB962C8B-B14F-4D97-AF65-F5344CB8AC3E}">
+        <p14:creationId xmlns:p14="http://schemas.microsoft.com/office/powerpoint/2010/main" val="2038535457"/>
+      </p:ext>
+    </p:extLst>
+  </p:cSld>
+  <p:clrMapOvr>
+    <a:masterClrMapping/>
+  </p:clrMapOvr>
+</p:sld>
+</file>
+
+<file path=ppt/slides/slide24.xml><?xml version="1.0" encoding="utf-8"?>
+<p:sld xmlns:a="http://schemas.openxmlformats.org/drawingml/2006/main" xmlns:r="http://schemas.openxmlformats.org/officeDocument/2006/relationships" xmlns:p="http://schemas.openxmlformats.org/presentationml/2006/main">
+  <p:cSld>
+    <p:spTree>
+      <p:nvGrpSpPr>
+        <p:cNvPr id="1" name="">
+          <a:extLst>
+            <a:ext uri="{FF2B5EF4-FFF2-40B4-BE49-F238E27FC236}">
+              <a16:creationId xmlns:a16="http://schemas.microsoft.com/office/drawing/2014/main" id="{44DF5342-6ABE-B536-AFFF-C7B824E79375}"/>
+            </a:ext>
+          </a:extLst>
+        </p:cNvPr>
+        <p:cNvGrpSpPr/>
+        <p:nvPr/>
+      </p:nvGrpSpPr>
+      <p:grpSpPr>
+        <a:xfrm>
+          <a:off x="0" y="0"/>
+          <a:ext cx="0" cy="0"/>
+          <a:chOff x="0" y="0"/>
+          <a:chExt cx="0" cy="0"/>
+        </a:xfrm>
+      </p:grpSpPr>
+      <p:sp>
+        <p:nvSpPr>
+          <p:cNvPr id="2" name="標題 1">
+            <a:extLst>
+              <a:ext uri="{FF2B5EF4-FFF2-40B4-BE49-F238E27FC236}">
+                <a16:creationId xmlns:a16="http://schemas.microsoft.com/office/drawing/2014/main" id="{D6E70699-ACF5-74D4-3B40-A9C317372AD8}"/>
+              </a:ext>
+            </a:extLst>
+          </p:cNvPr>
+          <p:cNvSpPr>
+            <a:spLocks noGrp="1"/>
+          </p:cNvSpPr>
+          <p:nvPr>
+            <p:ph type="title"/>
+          </p:nvPr>
+        </p:nvSpPr>
+        <p:spPr/>
+        <p:txBody>
+          <a:bodyPr/>
+          <a:lstStyle/>
+          <a:p>
+            <a:r>
+              <a:rPr lang="en-US" altLang="zh-TW" dirty="0"/>
+              <a:t>AHB</a:t>
+            </a:r>
+            <a:r>
+              <a:rPr lang="zh-TW" altLang="en-US" dirty="0"/>
+              <a:t> </a:t>
+            </a:r>
+            <a:r>
+              <a:rPr lang="en-US" altLang="zh-TW" dirty="0"/>
+              <a:t>Transfers (4/)</a:t>
+            </a:r>
+            <a:endParaRPr lang="zh-TW" altLang="en-US" dirty="0"/>
+          </a:p>
+        </p:txBody>
+      </p:sp>
+      <p:sp>
+        <p:nvSpPr>
+          <p:cNvPr id="3" name="內容版面配置區 2">
+            <a:extLst>
+              <a:ext uri="{FF2B5EF4-FFF2-40B4-BE49-F238E27FC236}">
+                <a16:creationId xmlns:a16="http://schemas.microsoft.com/office/drawing/2014/main" id="{2F8B50CA-CD04-3EC4-755A-76ECDB216ED2}"/>
+              </a:ext>
+            </a:extLst>
+          </p:cNvPr>
+          <p:cNvSpPr>
+            <a:spLocks noGrp="1"/>
+          </p:cNvSpPr>
+          <p:nvPr>
+            <p:ph idx="1"/>
+          </p:nvPr>
+        </p:nvSpPr>
+        <p:spPr/>
+        <p:txBody>
+          <a:bodyPr/>
+          <a:lstStyle/>
+          <a:p>
+            <a:pPr marL="514350" indent="-514350">
+              <a:buFont typeface="+mj-lt"/>
+              <a:buAutoNum type="arabicPeriod"/>
+            </a:pPr>
+            <a:r>
+              <a:rPr lang="en-US" altLang="zh-TW" dirty="0"/>
+              <a:t>Basic transfers</a:t>
+            </a:r>
+            <a:r>
+              <a:rPr lang="zh-TW" altLang="en-US" dirty="0"/>
+              <a:t> </a:t>
+            </a:r>
+            <a:r>
+              <a:rPr lang="en-US" altLang="zh-TW" dirty="0"/>
+              <a:t>– wait state </a:t>
+            </a:r>
+          </a:p>
+          <a:p>
+            <a:pPr lvl="1"/>
+            <a:r>
+              <a:rPr lang="en-US" altLang="zh-TW" dirty="0"/>
+              <a:t>Slave </a:t>
+            </a:r>
+            <a:r>
+              <a:rPr lang="zh-TW" altLang="en-US" dirty="0"/>
+              <a:t>如果還沒準備好</a:t>
+            </a:r>
+            <a:br>
+              <a:rPr lang="en-US" altLang="zh-TW" dirty="0"/>
+            </a:br>
+            <a:r>
+              <a:rPr lang="zh-TW" altLang="en-US" dirty="0"/>
+              <a:t>可以使用 </a:t>
+            </a:r>
+            <a:r>
+              <a:rPr lang="en-US" altLang="zh-TW" dirty="0">
+                <a:solidFill>
+                  <a:srgbClr val="FF0000"/>
+                </a:solidFill>
+              </a:rPr>
+              <a:t>HREADY_OUT </a:t>
+            </a:r>
+            <a:r>
+              <a:rPr lang="zh-TW" altLang="en-US" dirty="0">
+                <a:solidFill>
+                  <a:srgbClr val="FF0000"/>
+                </a:solidFill>
+              </a:rPr>
+              <a:t>拉 </a:t>
+            </a:r>
+            <a:r>
+              <a:rPr lang="en-US" altLang="zh-TW" dirty="0">
+                <a:solidFill>
+                  <a:srgbClr val="FF0000"/>
+                </a:solidFill>
+              </a:rPr>
+              <a:t>LOW</a:t>
+            </a:r>
+            <a:r>
+              <a:rPr lang="zh-TW" altLang="en-US" dirty="0"/>
+              <a:t>，來達成 </a:t>
+            </a:r>
+            <a:r>
+              <a:rPr lang="en-US" altLang="zh-TW" dirty="0"/>
+              <a:t>wait </a:t>
+            </a:r>
+            <a:r>
+              <a:rPr lang="zh-TW" altLang="en-US" dirty="0"/>
+              <a:t>效果</a:t>
+            </a:r>
+            <a:endParaRPr lang="en-US" altLang="zh-TW" dirty="0"/>
+          </a:p>
+          <a:p>
+            <a:pPr lvl="1"/>
+            <a:endParaRPr lang="en-US" altLang="zh-TW" dirty="0"/>
+          </a:p>
+        </p:txBody>
+      </p:sp>
+      <p:grpSp>
+        <p:nvGrpSpPr>
+          <p:cNvPr id="9" name="群組 8">
+            <a:extLst>
+              <a:ext uri="{FF2B5EF4-FFF2-40B4-BE49-F238E27FC236}">
+                <a16:creationId xmlns:a16="http://schemas.microsoft.com/office/drawing/2014/main" id="{0011D045-E9BB-6742-9B06-D7F2199DA72B}"/>
+              </a:ext>
+            </a:extLst>
+          </p:cNvPr>
+          <p:cNvGrpSpPr/>
+          <p:nvPr/>
+        </p:nvGrpSpPr>
+        <p:grpSpPr>
+          <a:xfrm>
+            <a:off x="518995" y="3588242"/>
+            <a:ext cx="11154009" cy="2088000"/>
+            <a:chOff x="579354" y="4404875"/>
+            <a:chExt cx="11154009" cy="2088000"/>
+          </a:xfrm>
+        </p:grpSpPr>
+        <p:pic>
+          <p:nvPicPr>
+            <p:cNvPr id="5" name="圖片 4">
+              <a:extLst>
+                <a:ext uri="{FF2B5EF4-FFF2-40B4-BE49-F238E27FC236}">
+                  <a16:creationId xmlns:a16="http://schemas.microsoft.com/office/drawing/2014/main" id="{2B97765A-712C-3B89-895A-CA6D887DA8D3}"/>
+                </a:ext>
+              </a:extLst>
+            </p:cNvPr>
+            <p:cNvPicPr>
+              <a:picLocks noChangeAspect="1"/>
+            </p:cNvPicPr>
+            <p:nvPr/>
+          </p:nvPicPr>
+          <p:blipFill>
+            <a:blip r:embed="rId2"/>
+            <a:stretch>
+              <a:fillRect/>
+            </a:stretch>
+          </p:blipFill>
+          <p:spPr>
+            <a:xfrm>
+              <a:off x="579354" y="4404875"/>
+              <a:ext cx="6073097" cy="2088000"/>
+            </a:xfrm>
+            <a:prstGeom prst="rect">
+              <a:avLst/>
+            </a:prstGeom>
+            <a:ln>
+              <a:solidFill>
+                <a:schemeClr val="tx1"/>
+              </a:solidFill>
+            </a:ln>
+          </p:spPr>
+        </p:pic>
+        <p:pic>
+          <p:nvPicPr>
+            <p:cNvPr id="8" name="圖片 7">
+              <a:extLst>
+                <a:ext uri="{FF2B5EF4-FFF2-40B4-BE49-F238E27FC236}">
+                  <a16:creationId xmlns:a16="http://schemas.microsoft.com/office/drawing/2014/main" id="{8334B437-51DE-F0B7-496D-74301EFB93B8}"/>
+                </a:ext>
+              </a:extLst>
+            </p:cNvPr>
+            <p:cNvPicPr>
+              <a:picLocks noChangeAspect="1"/>
+            </p:cNvPicPr>
+            <p:nvPr/>
+          </p:nvPicPr>
+          <p:blipFill>
+            <a:blip r:embed="rId3"/>
+            <a:stretch>
+              <a:fillRect/>
+            </a:stretch>
+          </p:blipFill>
+          <p:spPr>
+            <a:xfrm>
+              <a:off x="6884563" y="4404875"/>
+              <a:ext cx="4848800" cy="2088000"/>
+            </a:xfrm>
+            <a:prstGeom prst="rect">
+              <a:avLst/>
+            </a:prstGeom>
+            <a:ln>
+              <a:solidFill>
+                <a:schemeClr val="tx1"/>
+              </a:solidFill>
+            </a:ln>
+          </p:spPr>
+        </p:pic>
+      </p:grpSp>
+    </p:spTree>
+    <p:extLst>
+      <p:ext uri="{BB962C8B-B14F-4D97-AF65-F5344CB8AC3E}">
+        <p14:creationId xmlns:p14="http://schemas.microsoft.com/office/powerpoint/2010/main" val="2226587764"/>
+      </p:ext>
+    </p:extLst>
+  </p:cSld>
+  <p:clrMapOvr>
+    <a:masterClrMapping/>
+  </p:clrMapOvr>
+</p:sld>
+</file>
+
+<file path=ppt/slides/slide25.xml><?xml version="1.0" encoding="utf-8"?>
+<p:sld xmlns:a="http://schemas.openxmlformats.org/drawingml/2006/main" xmlns:r="http://schemas.openxmlformats.org/officeDocument/2006/relationships" xmlns:p="http://schemas.openxmlformats.org/presentationml/2006/main">
+  <p:cSld>
+    <p:spTree>
+      <p:nvGrpSpPr>
+        <p:cNvPr id="1" name="">
+          <a:extLst>
+            <a:ext uri="{FF2B5EF4-FFF2-40B4-BE49-F238E27FC236}">
+              <a16:creationId xmlns:a16="http://schemas.microsoft.com/office/drawing/2014/main" id="{56A7E46C-0EF9-C760-A2C8-E016E28695CB}"/>
+            </a:ext>
+          </a:extLst>
+        </p:cNvPr>
+        <p:cNvGrpSpPr/>
+        <p:nvPr/>
+      </p:nvGrpSpPr>
+      <p:grpSpPr>
+        <a:xfrm>
+          <a:off x="0" y="0"/>
+          <a:ext cx="0" cy="0"/>
+          <a:chOff x="0" y="0"/>
+          <a:chExt cx="0" cy="0"/>
+        </a:xfrm>
+      </p:grpSpPr>
+      <p:sp>
+        <p:nvSpPr>
+          <p:cNvPr id="2" name="標題 1">
+            <a:extLst>
+              <a:ext uri="{FF2B5EF4-FFF2-40B4-BE49-F238E27FC236}">
+                <a16:creationId xmlns:a16="http://schemas.microsoft.com/office/drawing/2014/main" id="{27356F36-C480-E542-5CDF-E92FEE5C1548}"/>
+              </a:ext>
+            </a:extLst>
+          </p:cNvPr>
+          <p:cNvSpPr>
+            <a:spLocks noGrp="1"/>
+          </p:cNvSpPr>
+          <p:nvPr>
+            <p:ph type="title"/>
+          </p:nvPr>
+        </p:nvSpPr>
+        <p:spPr/>
+        <p:txBody>
+          <a:bodyPr/>
+          <a:lstStyle/>
+          <a:p>
+            <a:r>
+              <a:rPr lang="en-US" altLang="zh-TW" dirty="0"/>
+              <a:t>AHB</a:t>
+            </a:r>
+            <a:r>
+              <a:rPr lang="zh-TW" altLang="en-US" dirty="0"/>
+              <a:t> </a:t>
+            </a:r>
+            <a:r>
+              <a:rPr lang="en-US" altLang="zh-TW" dirty="0"/>
+              <a:t>Transfers (5/)</a:t>
+            </a:r>
+            <a:endParaRPr lang="zh-TW" altLang="en-US" dirty="0"/>
+          </a:p>
+        </p:txBody>
+      </p:sp>
+      <p:sp>
+        <p:nvSpPr>
+          <p:cNvPr id="3" name="內容版面配置區 2">
+            <a:extLst>
+              <a:ext uri="{FF2B5EF4-FFF2-40B4-BE49-F238E27FC236}">
+                <a16:creationId xmlns:a16="http://schemas.microsoft.com/office/drawing/2014/main" id="{61727A96-46E9-F62C-225E-B24F483022A2}"/>
+              </a:ext>
+            </a:extLst>
+          </p:cNvPr>
+          <p:cNvSpPr>
+            <a:spLocks noGrp="1"/>
+          </p:cNvSpPr>
+          <p:nvPr>
+            <p:ph idx="1"/>
+          </p:nvPr>
+        </p:nvSpPr>
+        <p:spPr/>
+        <p:txBody>
+          <a:bodyPr/>
+          <a:lstStyle/>
+          <a:p>
+            <a:pPr marL="514350" indent="-514350">
+              <a:buFont typeface="+mj-lt"/>
+              <a:buAutoNum type="arabicPeriod"/>
+            </a:pPr>
+            <a:r>
+              <a:rPr lang="en-US" altLang="zh-TW" dirty="0"/>
+              <a:t>Basic transfers – seq transfer</a:t>
+            </a:r>
+          </a:p>
+          <a:p>
+            <a:pPr marL="0" indent="0">
+              <a:buNone/>
+            </a:pPr>
+            <a:r>
+              <a:rPr lang="zh-TW" altLang="en-US" dirty="0"/>
+              <a:t> </a:t>
+            </a:r>
+            <a:endParaRPr lang="en-US" altLang="zh-TW" dirty="0"/>
+          </a:p>
+          <a:p>
+            <a:pPr lvl="1"/>
+            <a:endParaRPr lang="en-US" altLang="zh-TW" dirty="0"/>
+          </a:p>
+        </p:txBody>
+      </p:sp>
+      <p:pic>
+        <p:nvPicPr>
+          <p:cNvPr id="5" name="圖片 4">
+            <a:extLst>
+              <a:ext uri="{FF2B5EF4-FFF2-40B4-BE49-F238E27FC236}">
+                <a16:creationId xmlns:a16="http://schemas.microsoft.com/office/drawing/2014/main" id="{33C5192E-2341-D97D-E0B2-0BBA5D347E56}"/>
+              </a:ext>
+            </a:extLst>
+          </p:cNvPr>
+          <p:cNvPicPr>
+            <a:picLocks noChangeAspect="1"/>
+          </p:cNvPicPr>
+          <p:nvPr/>
+        </p:nvPicPr>
+        <p:blipFill>
+          <a:blip r:embed="rId2"/>
+          <a:stretch>
+            <a:fillRect/>
+          </a:stretch>
+        </p:blipFill>
+        <p:spPr>
+          <a:xfrm>
+            <a:off x="2360113" y="2946798"/>
+            <a:ext cx="7471774" cy="2561996"/>
+          </a:xfrm>
+          <a:prstGeom prst="rect">
+            <a:avLst/>
+          </a:prstGeom>
+          <a:ln>
+            <a:solidFill>
+              <a:schemeClr val="tx1"/>
+            </a:solidFill>
+          </a:ln>
+        </p:spPr>
+      </p:pic>
+      <p:sp>
+        <p:nvSpPr>
+          <p:cNvPr id="7" name="文字方塊 6">
+            <a:extLst>
+              <a:ext uri="{FF2B5EF4-FFF2-40B4-BE49-F238E27FC236}">
+                <a16:creationId xmlns:a16="http://schemas.microsoft.com/office/drawing/2014/main" id="{813A211F-3536-C5F6-818C-BCF53A314FAD}"/>
+              </a:ext>
+            </a:extLst>
+          </p:cNvPr>
+          <p:cNvSpPr txBox="1"/>
+          <p:nvPr/>
+        </p:nvSpPr>
+        <p:spPr>
+          <a:xfrm>
+            <a:off x="1374477" y="4227796"/>
+            <a:ext cx="891396" cy="369332"/>
+          </a:xfrm>
+          <a:prstGeom prst="rect">
+            <a:avLst/>
+          </a:prstGeom>
+          <a:noFill/>
+        </p:spPr>
+        <p:txBody>
+          <a:bodyPr wrap="square" rtlCol="0">
+            <a:spAutoFit/>
+          </a:bodyPr>
+          <a:lstStyle/>
+          <a:p>
+            <a:pPr algn="ctr"/>
+            <a:r>
+              <a:rPr lang="en-US" altLang="zh-TW" dirty="0"/>
+              <a:t>ADDR</a:t>
+            </a:r>
+            <a:endParaRPr lang="zh-TW" altLang="en-US" dirty="0"/>
+          </a:p>
+        </p:txBody>
+      </p:sp>
+      <p:sp>
+        <p:nvSpPr>
+          <p:cNvPr id="8" name="文字方塊 7">
+            <a:extLst>
+              <a:ext uri="{FF2B5EF4-FFF2-40B4-BE49-F238E27FC236}">
+                <a16:creationId xmlns:a16="http://schemas.microsoft.com/office/drawing/2014/main" id="{99246372-6965-B141-1BBC-67698CD4E8DE}"/>
+              </a:ext>
+            </a:extLst>
+          </p:cNvPr>
+          <p:cNvSpPr txBox="1"/>
+          <p:nvPr/>
+        </p:nvSpPr>
+        <p:spPr>
+          <a:xfrm>
+            <a:off x="1374477" y="5017713"/>
+            <a:ext cx="891396" cy="369332"/>
+          </a:xfrm>
+          <a:prstGeom prst="rect">
+            <a:avLst/>
+          </a:prstGeom>
+          <a:noFill/>
+        </p:spPr>
+        <p:txBody>
+          <a:bodyPr wrap="square" rtlCol="0">
+            <a:spAutoFit/>
+          </a:bodyPr>
+          <a:lstStyle/>
+          <a:p>
+            <a:pPr algn="ctr"/>
+            <a:r>
+              <a:rPr lang="en-US" altLang="zh-TW" dirty="0"/>
+              <a:t>DATA</a:t>
+            </a:r>
+            <a:endParaRPr lang="zh-TW" altLang="en-US" dirty="0"/>
+          </a:p>
+        </p:txBody>
+      </p:sp>
+    </p:spTree>
+    <p:extLst>
+      <p:ext uri="{BB962C8B-B14F-4D97-AF65-F5344CB8AC3E}">
+        <p14:creationId xmlns:p14="http://schemas.microsoft.com/office/powerpoint/2010/main" val="4082315593"/>
+      </p:ext>
+    </p:extLst>
+  </p:cSld>
+  <p:clrMapOvr>
+    <a:masterClrMapping/>
+  </p:clrMapOvr>
+</p:sld>
+</file>
+
+<file path=ppt/slides/slide26.xml><?xml version="1.0" encoding="utf-8"?>
+<p:sld xmlns:a="http://schemas.openxmlformats.org/drawingml/2006/main" xmlns:r="http://schemas.openxmlformats.org/officeDocument/2006/relationships" xmlns:p="http://schemas.openxmlformats.org/presentationml/2006/main">
+  <p:cSld>
+    <p:spTree>
+      <p:nvGrpSpPr>
+        <p:cNvPr id="1" name="">
+          <a:extLst>
+            <a:ext uri="{FF2B5EF4-FFF2-40B4-BE49-F238E27FC236}">
+              <a16:creationId xmlns:a16="http://schemas.microsoft.com/office/drawing/2014/main" id="{E5D6F6F2-510F-EA3A-F003-85DE64ED624D}"/>
+            </a:ext>
+          </a:extLst>
+        </p:cNvPr>
+        <p:cNvGrpSpPr/>
+        <p:nvPr/>
+      </p:nvGrpSpPr>
+      <p:grpSpPr>
+        <a:xfrm>
+          <a:off x="0" y="0"/>
+          <a:ext cx="0" cy="0"/>
+          <a:chOff x="0" y="0"/>
+          <a:chExt cx="0" cy="0"/>
+        </a:xfrm>
+      </p:grpSpPr>
+      <p:sp>
+        <p:nvSpPr>
+          <p:cNvPr id="2" name="標題 1">
+            <a:extLst>
+              <a:ext uri="{FF2B5EF4-FFF2-40B4-BE49-F238E27FC236}">
+                <a16:creationId xmlns:a16="http://schemas.microsoft.com/office/drawing/2014/main" id="{99F91C3B-D841-35F0-0306-272E5929F656}"/>
+              </a:ext>
+            </a:extLst>
+          </p:cNvPr>
+          <p:cNvSpPr>
+            <a:spLocks noGrp="1"/>
+          </p:cNvSpPr>
+          <p:nvPr>
+            <p:ph type="title"/>
+          </p:nvPr>
+        </p:nvSpPr>
+        <p:spPr/>
+        <p:txBody>
+          <a:bodyPr/>
+          <a:lstStyle/>
+          <a:p>
+            <a:r>
+              <a:rPr lang="en-US" altLang="zh-TW" dirty="0"/>
+              <a:t>AHB</a:t>
+            </a:r>
+            <a:r>
+              <a:rPr lang="zh-TW" altLang="en-US" dirty="0"/>
+              <a:t> </a:t>
+            </a:r>
+            <a:r>
+              <a:rPr lang="en-US" altLang="zh-TW" dirty="0"/>
+              <a:t>Transfers (6/)</a:t>
+            </a:r>
+            <a:endParaRPr lang="zh-TW" altLang="en-US" dirty="0"/>
+          </a:p>
+        </p:txBody>
+      </p:sp>
+      <p:sp>
+        <p:nvSpPr>
+          <p:cNvPr id="3" name="內容版面配置區 2">
+            <a:extLst>
+              <a:ext uri="{FF2B5EF4-FFF2-40B4-BE49-F238E27FC236}">
+                <a16:creationId xmlns:a16="http://schemas.microsoft.com/office/drawing/2014/main" id="{6BAA4971-ACEE-6D14-CC5C-6906AB627BBC}"/>
+              </a:ext>
+            </a:extLst>
+          </p:cNvPr>
+          <p:cNvSpPr>
+            <a:spLocks noGrp="1"/>
+          </p:cNvSpPr>
+          <p:nvPr>
+            <p:ph idx="1"/>
+          </p:nvPr>
+        </p:nvSpPr>
+        <p:spPr/>
+        <p:txBody>
+          <a:bodyPr/>
+          <a:lstStyle/>
+          <a:p>
+            <a:pPr marL="514350" indent="-514350">
+              <a:buFont typeface="+mj-lt"/>
+              <a:buAutoNum type="arabicPeriod" startAt="2"/>
+            </a:pPr>
+            <a:r>
+              <a:rPr lang="en-US" altLang="zh-TW" dirty="0"/>
+              <a:t>Transfer types</a:t>
+            </a:r>
+          </a:p>
+          <a:p>
+            <a:pPr lvl="1"/>
+            <a:r>
+              <a:rPr lang="zh-TW" altLang="en-US" dirty="0"/>
+              <a:t>傳輸類型可根據 </a:t>
+            </a:r>
+            <a:r>
+              <a:rPr lang="en-US" altLang="zh-TW" dirty="0"/>
+              <a:t>HTRANS </a:t>
+            </a:r>
+            <a:r>
+              <a:rPr lang="zh-TW" altLang="en-US" dirty="0"/>
+              <a:t>訊號的控制，分為四種類型</a:t>
+            </a:r>
+            <a:endParaRPr lang="en-US" altLang="zh-TW" dirty="0"/>
+          </a:p>
+          <a:p>
+            <a:pPr lvl="1"/>
+            <a:endParaRPr lang="en-US" altLang="zh-TW" dirty="0"/>
+          </a:p>
+        </p:txBody>
+      </p:sp>
+      <p:graphicFrame>
+        <p:nvGraphicFramePr>
+          <p:cNvPr id="6" name="表格 5">
+            <a:extLst>
+              <a:ext uri="{FF2B5EF4-FFF2-40B4-BE49-F238E27FC236}">
+                <a16:creationId xmlns:a16="http://schemas.microsoft.com/office/drawing/2014/main" id="{260D4AF7-2F6C-493A-7DB2-F4EEB749D704}"/>
+              </a:ext>
+            </a:extLst>
+          </p:cNvPr>
+          <p:cNvGraphicFramePr>
+            <a:graphicFrameLocks noGrp="1"/>
+          </p:cNvGraphicFramePr>
+          <p:nvPr>
+            <p:extLst>
+              <p:ext uri="{D42A27DB-BD31-4B8C-83A1-F6EECF244321}">
+                <p14:modId xmlns:p14="http://schemas.microsoft.com/office/powerpoint/2010/main" val="3115151113"/>
+              </p:ext>
+            </p:extLst>
+          </p:nvPr>
+        </p:nvGraphicFramePr>
+        <p:xfrm>
+          <a:off x="736120" y="2818118"/>
+          <a:ext cx="10719759" cy="3759200"/>
+        </p:xfrm>
+        <a:graphic>
+          <a:graphicData uri="http://schemas.openxmlformats.org/drawingml/2006/table">
+            <a:tbl>
+              <a:tblPr firstRow="1" bandRow="1">
+                <a:tableStyleId>{5C22544A-7EE6-4342-B048-85BDC9FD1C3A}</a:tableStyleId>
+              </a:tblPr>
+              <a:tblGrid>
+                <a:gridCol w="2493034">
+                  <a:extLst>
+                    <a:ext uri="{9D8B030D-6E8A-4147-A177-3AD203B41FA5}">
+                      <a16:colId xmlns:a16="http://schemas.microsoft.com/office/drawing/2014/main" val="1485549075"/>
+                    </a:ext>
+                  </a:extLst>
+                </a:gridCol>
+                <a:gridCol w="2493034">
+                  <a:extLst>
+                    <a:ext uri="{9D8B030D-6E8A-4147-A177-3AD203B41FA5}">
+                      <a16:colId xmlns:a16="http://schemas.microsoft.com/office/drawing/2014/main" val="1812413034"/>
+                    </a:ext>
+                  </a:extLst>
+                </a:gridCol>
+                <a:gridCol w="5733691">
+                  <a:extLst>
+                    <a:ext uri="{9D8B030D-6E8A-4147-A177-3AD203B41FA5}">
+                      <a16:colId xmlns:a16="http://schemas.microsoft.com/office/drawing/2014/main" val="1577056355"/>
+                    </a:ext>
+                  </a:extLst>
+                </a:gridCol>
+              </a:tblGrid>
+              <a:tr h="370840">
+                <a:tc>
+                  <a:txBody>
+                    <a:bodyPr/>
+                    <a:lstStyle/>
+                    <a:p>
+                      <a:pPr algn="ctr"/>
+                      <a:r>
+                        <a:rPr lang="en-US" altLang="zh-TW" dirty="0"/>
+                        <a:t>HTRANS[1:0]</a:t>
+                      </a:r>
+                      <a:endParaRPr lang="zh-TW" altLang="en-US" dirty="0"/>
+                    </a:p>
+                  </a:txBody>
+                  <a:tcPr/>
+                </a:tc>
+                <a:tc>
+                  <a:txBody>
+                    <a:bodyPr/>
+                    <a:lstStyle/>
+                    <a:p>
+                      <a:pPr algn="ctr"/>
+                      <a:r>
+                        <a:rPr lang="en-US" altLang="zh-TW" dirty="0"/>
+                        <a:t>Type</a:t>
+                      </a:r>
+                      <a:endParaRPr lang="zh-TW" altLang="en-US" dirty="0"/>
+                    </a:p>
+                  </a:txBody>
+                  <a:tcPr/>
+                </a:tc>
+                <a:tc>
+                  <a:txBody>
+                    <a:bodyPr/>
+                    <a:lstStyle/>
+                    <a:p>
+                      <a:pPr algn="ctr"/>
+                      <a:r>
+                        <a:rPr lang="en-US" altLang="zh-TW" dirty="0"/>
+                        <a:t>Description</a:t>
+                      </a:r>
+                      <a:endParaRPr lang="zh-TW" altLang="en-US" dirty="0"/>
+                    </a:p>
+                  </a:txBody>
+                  <a:tcPr/>
+                </a:tc>
+                <a:extLst>
+                  <a:ext uri="{0D108BD9-81ED-4DB2-BD59-A6C34878D82A}">
+                    <a16:rowId xmlns:a16="http://schemas.microsoft.com/office/drawing/2014/main" val="607370041"/>
+                  </a:ext>
+                </a:extLst>
+              </a:tr>
+              <a:tr h="370840">
+                <a:tc>
+                  <a:txBody>
+                    <a:bodyPr/>
+                    <a:lstStyle/>
+                    <a:p>
+                      <a:pPr algn="ctr"/>
+                      <a:r>
+                        <a:rPr lang="en-US" altLang="zh-TW" dirty="0"/>
+                        <a:t>b00</a:t>
+                      </a:r>
+                      <a:endParaRPr lang="zh-TW" altLang="en-US" dirty="0"/>
+                    </a:p>
+                  </a:txBody>
+                  <a:tcPr/>
+                </a:tc>
+                <a:tc>
+                  <a:txBody>
+                    <a:bodyPr/>
+                    <a:lstStyle/>
+                    <a:p>
+                      <a:pPr algn="ctr"/>
+                      <a:r>
+                        <a:rPr lang="en-US" altLang="zh-TW" dirty="0"/>
+                        <a:t>IDLE</a:t>
+                      </a:r>
+                      <a:endParaRPr lang="zh-TW" altLang="en-US" dirty="0"/>
+                    </a:p>
+                  </a:txBody>
+                  <a:tcPr/>
+                </a:tc>
+                <a:tc>
+                  <a:txBody>
+                    <a:bodyPr/>
+                    <a:lstStyle/>
+                    <a:p>
+                      <a:pPr algn="l"/>
+                      <a:r>
+                        <a:rPr lang="zh-TW" altLang="en-US" sz="1200" dirty="0"/>
+                        <a:t>表示不需要進行資料傳輸。</a:t>
+                      </a:r>
+                      <a:endParaRPr lang="en-US" altLang="zh-TW" sz="1200" dirty="0"/>
+                    </a:p>
+                    <a:p>
+                      <a:pPr algn="l"/>
+                      <a:r>
+                        <a:rPr lang="zh-TW" altLang="en-US" sz="1200" dirty="0"/>
+                        <a:t>當</a:t>
+                      </a:r>
+                      <a:r>
+                        <a:rPr lang="en-US" altLang="zh-TW" sz="1200" dirty="0"/>
+                        <a:t>master</a:t>
+                      </a:r>
+                      <a:r>
+                        <a:rPr lang="zh-TW" altLang="en-US" sz="1200" dirty="0"/>
+                        <a:t>不想執行資料傳輸時，會使用 </a:t>
+                      </a:r>
+                      <a:r>
+                        <a:rPr lang="en-US" altLang="zh-TW" sz="1200" dirty="0"/>
+                        <a:t>IDLE </a:t>
+                      </a:r>
+                      <a:r>
+                        <a:rPr lang="zh-TW" altLang="en-US" sz="1200" dirty="0"/>
+                        <a:t>傳輸。</a:t>
+                      </a:r>
+                      <a:endParaRPr lang="en-US" altLang="zh-TW" sz="1200" dirty="0"/>
+                    </a:p>
+                    <a:p>
+                      <a:pPr algn="l"/>
+                      <a:r>
+                        <a:rPr lang="zh-TW" altLang="en-US" sz="1200" dirty="0"/>
+                        <a:t>建議主裝置在結束一個 </a:t>
+                      </a:r>
+                      <a:r>
+                        <a:rPr lang="en-US" altLang="zh-TW" sz="1200" dirty="0"/>
+                        <a:t>locked </a:t>
+                      </a:r>
+                      <a:r>
+                        <a:rPr lang="zh-TW" altLang="en-US" sz="1200" dirty="0"/>
+                        <a:t>傳輸時，以 </a:t>
+                      </a:r>
+                      <a:r>
+                        <a:rPr lang="en-US" altLang="zh-TW" sz="1200" dirty="0"/>
+                        <a:t>IDLE </a:t>
+                      </a:r>
+                      <a:r>
+                        <a:rPr lang="zh-TW" altLang="en-US" sz="1200" dirty="0"/>
+                        <a:t>傳輸作為終止。</a:t>
+                      </a:r>
+                      <a:r>
+                        <a:rPr lang="en-US" altLang="zh-TW" sz="1200" dirty="0"/>
+                        <a:t>slave</a:t>
+                      </a:r>
+                      <a:r>
+                        <a:rPr lang="zh-TW" altLang="en-US" sz="1200" dirty="0"/>
+                        <a:t>在接收到 </a:t>
+                      </a:r>
+                      <a:r>
+                        <a:rPr lang="en-US" altLang="zh-TW" sz="1200" dirty="0"/>
+                        <a:t>IDLE </a:t>
+                      </a:r>
+                      <a:r>
+                        <a:rPr lang="zh-TW" altLang="en-US" sz="1200" dirty="0"/>
+                        <a:t>傳輸時，必須提供 </a:t>
+                      </a:r>
+                      <a:r>
+                        <a:rPr lang="en-US" altLang="zh-TW" sz="1200" dirty="0"/>
+                        <a:t>0 wait state </a:t>
+                      </a:r>
+                      <a:r>
+                        <a:rPr lang="zh-TW" altLang="en-US" sz="1200" dirty="0"/>
+                        <a:t>的 </a:t>
+                      </a:r>
+                      <a:r>
+                        <a:rPr lang="en-US" altLang="zh-TW" sz="1200" dirty="0"/>
+                        <a:t>OKAY </a:t>
+                      </a:r>
+                      <a:r>
+                        <a:rPr lang="zh-TW" altLang="en-US" sz="1200" dirty="0"/>
+                        <a:t>回應，並且忽略該次傳輸。</a:t>
+                      </a:r>
+                    </a:p>
+                  </a:txBody>
+                  <a:tcPr/>
+                </a:tc>
+                <a:extLst>
+                  <a:ext uri="{0D108BD9-81ED-4DB2-BD59-A6C34878D82A}">
+                    <a16:rowId xmlns:a16="http://schemas.microsoft.com/office/drawing/2014/main" val="416700849"/>
+                  </a:ext>
+                </a:extLst>
+              </a:tr>
+              <a:tr h="370840">
+                <a:tc>
+                  <a:txBody>
+                    <a:bodyPr/>
+                    <a:lstStyle/>
+                    <a:p>
+                      <a:pPr algn="ctr"/>
+                      <a:r>
+                        <a:rPr lang="en-US" altLang="zh-TW" dirty="0"/>
+                        <a:t>b01</a:t>
+                      </a:r>
+                      <a:endParaRPr lang="zh-TW" altLang="en-US" dirty="0"/>
+                    </a:p>
+                  </a:txBody>
+                  <a:tcPr/>
+                </a:tc>
+                <a:tc>
+                  <a:txBody>
+                    <a:bodyPr/>
+                    <a:lstStyle/>
+                    <a:p>
+                      <a:pPr algn="ctr"/>
+                      <a:r>
+                        <a:rPr lang="en-US" altLang="zh-TW" dirty="0"/>
+                        <a:t>BUSY</a:t>
+                      </a:r>
+                      <a:endParaRPr lang="zh-TW" altLang="en-US" dirty="0"/>
+                    </a:p>
+                  </a:txBody>
+                  <a:tcPr/>
+                </a:tc>
+                <a:tc>
+                  <a:txBody>
+                    <a:bodyPr/>
+                    <a:lstStyle/>
+                    <a:p>
+                      <a:pPr algn="l"/>
+                      <a:r>
+                        <a:rPr lang="en-US" altLang="zh-TW" sz="1200" dirty="0"/>
+                        <a:t>BUSY </a:t>
+                      </a:r>
+                      <a:r>
+                        <a:rPr lang="zh-TW" altLang="en-US" sz="1200" dirty="0"/>
+                        <a:t>傳輸類型允許</a:t>
+                      </a:r>
+                      <a:r>
+                        <a:rPr lang="en-US" altLang="zh-TW" sz="1200" dirty="0"/>
+                        <a:t>master</a:t>
+                      </a:r>
+                      <a:r>
+                        <a:rPr lang="zh-TW" altLang="en-US" sz="1200" dirty="0"/>
+                        <a:t>在</a:t>
+                      </a:r>
+                      <a:r>
+                        <a:rPr lang="en-US" altLang="zh-TW" sz="1200" dirty="0"/>
+                        <a:t>burst</a:t>
+                      </a:r>
+                      <a:r>
+                        <a:rPr lang="zh-TW" altLang="en-US" sz="1200" dirty="0"/>
+                        <a:t>過程中插入</a:t>
+                      </a:r>
+                      <a:r>
+                        <a:rPr lang="en-US" altLang="zh-TW" sz="1200" dirty="0"/>
+                        <a:t>idle cycles</a:t>
+                      </a:r>
+                      <a:r>
+                        <a:rPr lang="zh-TW" altLang="en-US" sz="1200" dirty="0"/>
+                        <a:t>。</a:t>
+                      </a:r>
+                      <a:endParaRPr lang="en-US" altLang="zh-TW" sz="1200" dirty="0"/>
+                    </a:p>
+                    <a:p>
+                      <a:pPr algn="l"/>
+                      <a:r>
+                        <a:rPr lang="zh-TW" altLang="en-US" sz="1200" dirty="0"/>
+                        <a:t>這種傳輸表示</a:t>
+                      </a:r>
+                      <a:r>
+                        <a:rPr lang="en-US" altLang="zh-TW" sz="1200" dirty="0"/>
+                        <a:t>master</a:t>
+                      </a:r>
+                      <a:r>
+                        <a:rPr lang="zh-TW" altLang="en-US" sz="1200" dirty="0"/>
+                        <a:t>將繼續進行突發傳輸，但下一次的傳輸無法立即開始。</a:t>
+                      </a:r>
+                      <a:endParaRPr lang="en-US" altLang="zh-TW" sz="1200" dirty="0"/>
+                    </a:p>
+                    <a:p>
+                      <a:pPr algn="l"/>
+                      <a:r>
+                        <a:rPr lang="zh-TW" altLang="en-US" sz="1200" dirty="0"/>
+                        <a:t>當主裝置使用 </a:t>
+                      </a:r>
+                      <a:r>
+                        <a:rPr lang="en-US" altLang="zh-TW" sz="1200" dirty="0"/>
+                        <a:t>BUSY </a:t>
+                      </a:r>
+                      <a:r>
+                        <a:rPr lang="zh-TW" altLang="en-US" sz="1200" dirty="0"/>
+                        <a:t>傳輸類型時，位址和控制訊號必須反映突發中下一筆傳輸的內容。</a:t>
+                      </a:r>
+                      <a:endParaRPr lang="en-US" altLang="zh-TW" sz="1200" dirty="0"/>
+                    </a:p>
+                    <a:p>
+                      <a:pPr algn="l"/>
+                      <a:r>
+                        <a:rPr lang="zh-TW" altLang="en-US" sz="1200" dirty="0">
+                          <a:solidFill>
+                            <a:srgbClr val="FF0000"/>
+                          </a:solidFill>
+                        </a:rPr>
+                        <a:t>只有長度未定義（</a:t>
+                      </a:r>
+                      <a:r>
+                        <a:rPr lang="en-US" altLang="zh-TW" sz="1200" dirty="0">
+                          <a:solidFill>
+                            <a:srgbClr val="FF0000"/>
+                          </a:solidFill>
+                        </a:rPr>
+                        <a:t>ex: INCR</a:t>
+                      </a:r>
+                      <a:r>
+                        <a:rPr lang="zh-TW" altLang="en-US" sz="1200" dirty="0">
+                          <a:solidFill>
+                            <a:srgbClr val="FF0000"/>
+                          </a:solidFill>
+                        </a:rPr>
+                        <a:t>）的</a:t>
+                      </a:r>
+                      <a:r>
+                        <a:rPr lang="en-US" altLang="zh-TW" sz="1200" dirty="0">
+                          <a:solidFill>
+                            <a:srgbClr val="FF0000"/>
+                          </a:solidFill>
+                        </a:rPr>
+                        <a:t>burst</a:t>
+                      </a:r>
+                      <a:r>
+                        <a:rPr lang="zh-TW" altLang="en-US" sz="1200" dirty="0">
+                          <a:solidFill>
+                            <a:srgbClr val="FF0000"/>
+                          </a:solidFill>
+                        </a:rPr>
+                        <a:t>才允許以 </a:t>
+                      </a:r>
+                      <a:r>
+                        <a:rPr lang="en-US" altLang="zh-TW" sz="1200" dirty="0">
+                          <a:solidFill>
+                            <a:srgbClr val="FF0000"/>
+                          </a:solidFill>
+                        </a:rPr>
+                        <a:t>BUSY </a:t>
+                      </a:r>
+                      <a:r>
+                        <a:rPr lang="zh-TW" altLang="en-US" sz="1200" dirty="0">
+                          <a:solidFill>
+                            <a:srgbClr val="FF0000"/>
+                          </a:solidFill>
+                        </a:rPr>
+                        <a:t>傳輸作為突發的最後一個週期。</a:t>
+                      </a:r>
+                      <a:endParaRPr lang="en-US" altLang="zh-TW" sz="1200" dirty="0">
+                        <a:solidFill>
+                          <a:srgbClr val="FF0000"/>
+                        </a:solidFill>
+                      </a:endParaRPr>
+                    </a:p>
+                    <a:p>
+                      <a:pPr algn="l"/>
+                      <a:r>
+                        <a:rPr lang="en-US" altLang="zh-TW" sz="1200" dirty="0"/>
+                        <a:t>slave</a:t>
+                      </a:r>
+                      <a:r>
+                        <a:rPr lang="zh-TW" altLang="en-US" sz="1200" dirty="0"/>
+                        <a:t>在接收到 </a:t>
+                      </a:r>
+                      <a:r>
+                        <a:rPr lang="en-US" altLang="zh-TW" sz="1200" dirty="0"/>
+                        <a:t>BUSY </a:t>
+                      </a:r>
+                      <a:r>
+                        <a:rPr lang="zh-TW" altLang="en-US" sz="1200" dirty="0"/>
+                        <a:t>傳輸時，必須始終提供 </a:t>
+                      </a:r>
+                      <a:r>
+                        <a:rPr lang="en-US" altLang="zh-TW" sz="1200" dirty="0"/>
+                        <a:t>0 wait state </a:t>
+                      </a:r>
+                      <a:r>
+                        <a:rPr lang="zh-TW" altLang="en-US" sz="1200" dirty="0"/>
+                        <a:t>的 </a:t>
+                      </a:r>
+                      <a:r>
+                        <a:rPr lang="en-US" altLang="zh-TW" sz="1200" dirty="0"/>
+                        <a:t>OKAY </a:t>
+                      </a:r>
+                      <a:r>
+                        <a:rPr lang="zh-TW" altLang="en-US" sz="1200" dirty="0"/>
+                        <a:t>回應，並且忽略該次傳輸。</a:t>
+                      </a:r>
+                    </a:p>
+                  </a:txBody>
+                  <a:tcPr/>
+                </a:tc>
+                <a:extLst>
+                  <a:ext uri="{0D108BD9-81ED-4DB2-BD59-A6C34878D82A}">
+                    <a16:rowId xmlns:a16="http://schemas.microsoft.com/office/drawing/2014/main" val="3909532716"/>
+                  </a:ext>
+                </a:extLst>
+              </a:tr>
+              <a:tr h="370840">
+                <a:tc>
+                  <a:txBody>
+                    <a:bodyPr/>
+                    <a:lstStyle/>
+                    <a:p>
+                      <a:pPr algn="ctr"/>
+                      <a:r>
+                        <a:rPr lang="en-US" altLang="zh-TW" dirty="0"/>
+                        <a:t>B10</a:t>
+                      </a:r>
+                      <a:endParaRPr lang="zh-TW" altLang="en-US" dirty="0"/>
+                    </a:p>
+                  </a:txBody>
+                  <a:tcPr/>
+                </a:tc>
+                <a:tc>
+                  <a:txBody>
+                    <a:bodyPr/>
+                    <a:lstStyle/>
+                    <a:p>
+                      <a:pPr algn="ctr"/>
+                      <a:r>
+                        <a:rPr lang="en-US" altLang="zh-TW" dirty="0"/>
+                        <a:t>NONSEQ</a:t>
+                      </a:r>
+                      <a:endParaRPr lang="zh-TW" altLang="en-US" dirty="0"/>
+                    </a:p>
+                  </a:txBody>
+                  <a:tcPr/>
+                </a:tc>
+                <a:tc>
+                  <a:txBody>
+                    <a:bodyPr/>
+                    <a:lstStyle/>
+                    <a:p>
+                      <a:pPr algn="l"/>
+                      <a:r>
+                        <a:rPr lang="zh-TW" altLang="en-US" sz="1200" dirty="0"/>
+                        <a:t>表示單筆傳輸或是</a:t>
+                      </a:r>
+                      <a:r>
+                        <a:rPr lang="en-US" altLang="zh-TW" sz="1200" dirty="0">
+                          <a:solidFill>
+                            <a:srgbClr val="FF0000"/>
+                          </a:solidFill>
+                        </a:rPr>
+                        <a:t>burst</a:t>
+                      </a:r>
+                      <a:r>
+                        <a:rPr lang="zh-TW" altLang="en-US" sz="1200" dirty="0">
+                          <a:solidFill>
+                            <a:srgbClr val="FF0000"/>
+                          </a:solidFill>
+                        </a:rPr>
+                        <a:t>的第一筆資料傳輸</a:t>
+                      </a:r>
+                      <a:r>
+                        <a:rPr lang="zh-TW" altLang="en-US" sz="1200" dirty="0"/>
+                        <a:t>。</a:t>
+                      </a:r>
+                      <a:endParaRPr lang="en-US" altLang="zh-TW" sz="1200" dirty="0"/>
+                    </a:p>
+                    <a:p>
+                      <a:pPr algn="l"/>
+                      <a:r>
+                        <a:rPr lang="zh-TW" altLang="en-US" sz="1200" dirty="0"/>
+                        <a:t>此時的位址與控制訊號與前一次傳輸無關。</a:t>
+                      </a:r>
+                      <a:endParaRPr lang="en-US" altLang="zh-TW" sz="1200" dirty="0"/>
+                    </a:p>
+                    <a:p>
+                      <a:pPr algn="l"/>
+                      <a:r>
+                        <a:rPr lang="zh-TW" altLang="en-US" sz="1200" dirty="0"/>
+                        <a:t>在匯流排（</a:t>
+                      </a:r>
+                      <a:r>
+                        <a:rPr lang="en-US" altLang="zh-TW" sz="1200" dirty="0"/>
+                        <a:t>bus</a:t>
+                      </a:r>
+                      <a:r>
+                        <a:rPr lang="zh-TW" altLang="en-US" sz="1200" dirty="0"/>
+                        <a:t>）上的單筆傳輸會被視為長度為 </a:t>
+                      </a:r>
+                      <a:r>
+                        <a:rPr lang="en-US" altLang="zh-TW" sz="1200" dirty="0"/>
+                        <a:t>1 </a:t>
+                      </a:r>
+                      <a:r>
+                        <a:rPr lang="zh-TW" altLang="en-US" sz="1200" dirty="0"/>
+                        <a:t>的</a:t>
+                      </a:r>
+                      <a:r>
+                        <a:rPr lang="en-US" altLang="zh-TW" sz="1200" dirty="0"/>
+                        <a:t>burst</a:t>
+                      </a:r>
+                      <a:r>
+                        <a:rPr lang="zh-TW" altLang="en-US" sz="1200" dirty="0"/>
+                        <a:t>，因此其傳輸類型為 </a:t>
+                      </a:r>
+                      <a:r>
+                        <a:rPr lang="en-US" altLang="zh-TW" sz="1200" dirty="0"/>
+                        <a:t>NONSEQUENTIAL</a:t>
+                      </a:r>
+                      <a:r>
+                        <a:rPr lang="zh-TW" altLang="en-US" sz="1200" dirty="0"/>
+                        <a:t>。</a:t>
+                      </a:r>
+                    </a:p>
+                  </a:txBody>
+                  <a:tcPr/>
+                </a:tc>
+                <a:extLst>
+                  <a:ext uri="{0D108BD9-81ED-4DB2-BD59-A6C34878D82A}">
+                    <a16:rowId xmlns:a16="http://schemas.microsoft.com/office/drawing/2014/main" val="2650518415"/>
+                  </a:ext>
+                </a:extLst>
+              </a:tr>
+              <a:tr h="370840">
+                <a:tc>
+                  <a:txBody>
+                    <a:bodyPr/>
+                    <a:lstStyle/>
+                    <a:p>
+                      <a:pPr algn="ctr"/>
+                      <a:r>
+                        <a:rPr lang="en-US" altLang="zh-TW" dirty="0"/>
+                        <a:t>b11</a:t>
+                      </a:r>
+                      <a:endParaRPr lang="zh-TW" altLang="en-US" dirty="0"/>
+                    </a:p>
+                  </a:txBody>
+                  <a:tcPr/>
+                </a:tc>
+                <a:tc>
+                  <a:txBody>
+                    <a:bodyPr/>
+                    <a:lstStyle/>
+                    <a:p>
+                      <a:pPr algn="ctr"/>
+                      <a:r>
+                        <a:rPr lang="en-US" altLang="zh-TW" dirty="0"/>
+                        <a:t>SEQ</a:t>
+                      </a:r>
+                      <a:endParaRPr lang="zh-TW" altLang="en-US" dirty="0"/>
+                    </a:p>
+                  </a:txBody>
+                  <a:tcPr/>
+                </a:tc>
+                <a:tc>
+                  <a:txBody>
+                    <a:bodyPr/>
+                    <a:lstStyle/>
+                    <a:p>
+                      <a:pPr algn="l"/>
+                      <a:r>
+                        <a:rPr lang="en-US" altLang="zh-TW" sz="1200" dirty="0"/>
+                        <a:t>burst</a:t>
+                      </a:r>
+                      <a:r>
+                        <a:rPr lang="zh-TW" altLang="en-US" sz="1200" dirty="0"/>
+                        <a:t>中其餘的傳輸為 </a:t>
+                      </a:r>
+                      <a:r>
+                        <a:rPr lang="en-US" altLang="zh-TW" sz="1200" dirty="0"/>
+                        <a:t>SEQUENTIAL </a:t>
+                      </a:r>
+                      <a:r>
+                        <a:rPr lang="zh-TW" altLang="en-US" sz="1200" dirty="0"/>
+                        <a:t>類型，這些傳輸的位址與前一次傳輸有關聯。</a:t>
+                      </a:r>
+                    </a:p>
+                  </a:txBody>
+                  <a:tcPr/>
+                </a:tc>
+                <a:extLst>
+                  <a:ext uri="{0D108BD9-81ED-4DB2-BD59-A6C34878D82A}">
+                    <a16:rowId xmlns:a16="http://schemas.microsoft.com/office/drawing/2014/main" val="1862151468"/>
+                  </a:ext>
+                </a:extLst>
+              </a:tr>
+            </a:tbl>
+          </a:graphicData>
+        </a:graphic>
+      </p:graphicFrame>
+    </p:spTree>
+    <p:extLst>
+      <p:ext uri="{BB962C8B-B14F-4D97-AF65-F5344CB8AC3E}">
+        <p14:creationId xmlns:p14="http://schemas.microsoft.com/office/powerpoint/2010/main" val="1436490053"/>
+      </p:ext>
+    </p:extLst>
+  </p:cSld>
+  <p:clrMapOvr>
+    <a:masterClrMapping/>
+  </p:clrMapOvr>
+</p:sld>
+</file>
+
+<file path=ppt/slides/slide27.xml><?xml version="1.0" encoding="utf-8"?>
+<p:sld xmlns:a="http://schemas.openxmlformats.org/drawingml/2006/main" xmlns:r="http://schemas.openxmlformats.org/officeDocument/2006/relationships" xmlns:p="http://schemas.openxmlformats.org/presentationml/2006/main">
+  <p:cSld>
+    <p:spTree>
+      <p:nvGrpSpPr>
+        <p:cNvPr id="1" name="">
+          <a:extLst>
+            <a:ext uri="{FF2B5EF4-FFF2-40B4-BE49-F238E27FC236}">
+              <a16:creationId xmlns:a16="http://schemas.microsoft.com/office/drawing/2014/main" id="{D5E1FAD5-BBEE-F019-3965-49604AE8A683}"/>
+            </a:ext>
+          </a:extLst>
+        </p:cNvPr>
+        <p:cNvGrpSpPr/>
+        <p:nvPr/>
+      </p:nvGrpSpPr>
+      <p:grpSpPr>
+        <a:xfrm>
+          <a:off x="0" y="0"/>
+          <a:ext cx="0" cy="0"/>
+          <a:chOff x="0" y="0"/>
+          <a:chExt cx="0" cy="0"/>
+        </a:xfrm>
+      </p:grpSpPr>
+      <p:sp>
+        <p:nvSpPr>
+          <p:cNvPr id="2" name="標題 1">
+            <a:extLst>
+              <a:ext uri="{FF2B5EF4-FFF2-40B4-BE49-F238E27FC236}">
+                <a16:creationId xmlns:a16="http://schemas.microsoft.com/office/drawing/2014/main" id="{F11C4C81-449D-A0AE-ECC1-EA20958B3CAC}"/>
+              </a:ext>
+            </a:extLst>
+          </p:cNvPr>
+          <p:cNvSpPr>
+            <a:spLocks noGrp="1"/>
+          </p:cNvSpPr>
+          <p:nvPr>
+            <p:ph type="title"/>
+          </p:nvPr>
+        </p:nvSpPr>
+        <p:spPr/>
+        <p:txBody>
+          <a:bodyPr/>
+          <a:lstStyle/>
+          <a:p>
+            <a:r>
+              <a:rPr lang="en-US" altLang="zh-TW" dirty="0"/>
+              <a:t>AHB</a:t>
+            </a:r>
+            <a:r>
+              <a:rPr lang="zh-TW" altLang="en-US" dirty="0"/>
+              <a:t> </a:t>
+            </a:r>
+            <a:r>
+              <a:rPr lang="en-US" altLang="zh-TW" dirty="0"/>
+              <a:t>Transfers (7/)</a:t>
+            </a:r>
+            <a:endParaRPr lang="zh-TW" altLang="en-US" dirty="0"/>
+          </a:p>
+        </p:txBody>
+      </p:sp>
+      <p:sp>
+        <p:nvSpPr>
+          <p:cNvPr id="3" name="內容版面配置區 2">
+            <a:extLst>
+              <a:ext uri="{FF2B5EF4-FFF2-40B4-BE49-F238E27FC236}">
+                <a16:creationId xmlns:a16="http://schemas.microsoft.com/office/drawing/2014/main" id="{3E3D0E87-EF30-9755-69E1-FF4EDC6F8751}"/>
+              </a:ext>
+            </a:extLst>
+          </p:cNvPr>
+          <p:cNvSpPr>
+            <a:spLocks noGrp="1"/>
+          </p:cNvSpPr>
+          <p:nvPr>
+            <p:ph idx="1"/>
+          </p:nvPr>
+        </p:nvSpPr>
+        <p:spPr/>
+        <p:txBody>
+          <a:bodyPr/>
+          <a:lstStyle/>
+          <a:p>
+            <a:pPr marL="514350" indent="-514350">
+              <a:buFont typeface="+mj-lt"/>
+              <a:buAutoNum type="arabicPeriod" startAt="2"/>
+            </a:pPr>
+            <a:r>
+              <a:rPr lang="en-US" altLang="zh-TW" dirty="0"/>
+              <a:t>Transfer types</a:t>
+            </a:r>
+            <a:r>
+              <a:rPr lang="zh-TW" altLang="en-US" dirty="0"/>
+              <a:t> </a:t>
+            </a:r>
+            <a:r>
+              <a:rPr lang="en-US" altLang="zh-TW" dirty="0"/>
+              <a:t>– example waveform</a:t>
+            </a:r>
+          </a:p>
+          <a:p>
+            <a:pPr lvl="1"/>
+            <a:r>
+              <a:rPr lang="en-US" altLang="zh-TW" dirty="0"/>
+              <a:t>T0 – T1:</a:t>
+            </a:r>
+            <a:r>
+              <a:rPr lang="zh-TW" altLang="en-US" dirty="0"/>
+              <a:t> 一個 </a:t>
+            </a:r>
+            <a:r>
+              <a:rPr lang="en-US" altLang="zh-TW" dirty="0"/>
+              <a:t>burst </a:t>
+            </a:r>
+            <a:r>
+              <a:rPr lang="zh-TW" altLang="en-US" dirty="0"/>
+              <a:t>的第一個 </a:t>
+            </a:r>
+            <a:r>
+              <a:rPr lang="en-US" altLang="zh-TW" dirty="0"/>
+              <a:t>CMD </a:t>
+            </a:r>
+            <a:r>
+              <a:rPr lang="zh-TW" altLang="en-US" dirty="0"/>
+              <a:t>的 </a:t>
+            </a:r>
+            <a:r>
+              <a:rPr lang="en-US" altLang="zh-TW" dirty="0"/>
+              <a:t>HTRANS</a:t>
+            </a:r>
+            <a:r>
+              <a:rPr lang="zh-TW" altLang="en-US" dirty="0"/>
+              <a:t> 一定是 </a:t>
+            </a:r>
+            <a:r>
+              <a:rPr lang="en-US" altLang="zh-TW" dirty="0"/>
+              <a:t>NONSEQ</a:t>
+            </a:r>
+          </a:p>
+          <a:p>
+            <a:pPr lvl="1"/>
+            <a:r>
+              <a:rPr lang="en-US" altLang="zh-TW" dirty="0"/>
+              <a:t>T4 – T5: </a:t>
+            </a:r>
+            <a:r>
+              <a:rPr lang="zh-TW" altLang="en-US" dirty="0"/>
+              <a:t>由於 </a:t>
+            </a:r>
+            <a:r>
+              <a:rPr lang="en-US" altLang="zh-TW" dirty="0"/>
+              <a:t>slave </a:t>
+            </a:r>
+            <a:r>
+              <a:rPr lang="zh-TW" altLang="en-US" dirty="0"/>
+              <a:t>還沒準備好，所以</a:t>
+            </a:r>
+            <a:r>
+              <a:rPr lang="en-US" altLang="zh-TW" dirty="0"/>
+              <a:t>HREADY</a:t>
+            </a:r>
+            <a:r>
+              <a:rPr lang="zh-TW" altLang="en-US" dirty="0"/>
+              <a:t> 拉 </a:t>
+            </a:r>
+            <a:r>
+              <a:rPr lang="en-US" altLang="zh-TW" dirty="0"/>
+              <a:t>LOW</a:t>
+            </a:r>
+            <a:r>
+              <a:rPr lang="zh-TW" altLang="en-US" dirty="0"/>
+              <a:t>，來做 </a:t>
+            </a:r>
+            <a:r>
+              <a:rPr lang="en-US" altLang="zh-TW" dirty="0"/>
+              <a:t>wait state</a:t>
+            </a:r>
+          </a:p>
+          <a:p>
+            <a:pPr lvl="1"/>
+            <a:endParaRPr lang="en-US" altLang="zh-TW" dirty="0"/>
+          </a:p>
+          <a:p>
+            <a:pPr lvl="1"/>
+            <a:r>
+              <a:rPr lang="zh-TW" altLang="en-US" dirty="0"/>
+              <a:t>如果 </a:t>
+            </a:r>
+            <a:r>
+              <a:rPr lang="en-US" altLang="zh-TW" dirty="0"/>
+              <a:t>master </a:t>
+            </a:r>
+            <a:r>
+              <a:rPr lang="zh-TW" altLang="en-US" dirty="0"/>
+              <a:t>還沒準備好的話，</a:t>
+            </a:r>
+            <a:br>
+              <a:rPr lang="en-US" altLang="zh-TW" dirty="0"/>
+            </a:br>
+            <a:r>
+              <a:rPr lang="zh-TW" altLang="en-US" dirty="0"/>
+              <a:t>在 </a:t>
+            </a:r>
+            <a:r>
+              <a:rPr lang="en-US" altLang="zh-TW" dirty="0"/>
+              <a:t>NONSEQ</a:t>
+            </a:r>
+            <a:r>
+              <a:rPr lang="zh-TW" altLang="en-US" dirty="0"/>
+              <a:t> </a:t>
+            </a:r>
+            <a:r>
+              <a:rPr lang="en-US" altLang="zh-TW" dirty="0"/>
+              <a:t>– SEQ </a:t>
+            </a:r>
+            <a:r>
+              <a:rPr lang="zh-TW" altLang="en-US" dirty="0"/>
+              <a:t>與 </a:t>
+            </a:r>
+            <a:r>
+              <a:rPr lang="en-US" altLang="zh-TW" dirty="0"/>
+              <a:t>SEQ</a:t>
+            </a:r>
+            <a:r>
+              <a:rPr lang="zh-TW" altLang="en-US" dirty="0"/>
+              <a:t> </a:t>
+            </a:r>
+            <a:r>
+              <a:rPr lang="en-US" altLang="zh-TW" dirty="0"/>
+              <a:t>– SEQ </a:t>
+            </a:r>
+            <a:r>
+              <a:rPr lang="zh-TW" altLang="en-US" dirty="0"/>
+              <a:t>之間可以加入任意個 </a:t>
+            </a:r>
+            <a:r>
+              <a:rPr lang="en-US" altLang="zh-TW" dirty="0"/>
+              <a:t>BUSY</a:t>
+            </a:r>
+          </a:p>
+          <a:p>
+            <a:pPr lvl="1"/>
+            <a:endParaRPr lang="en-US" altLang="zh-TW" dirty="0"/>
+          </a:p>
+        </p:txBody>
+      </p:sp>
+      <p:pic>
+        <p:nvPicPr>
+          <p:cNvPr id="5" name="圖片 4">
+            <a:extLst>
+              <a:ext uri="{FF2B5EF4-FFF2-40B4-BE49-F238E27FC236}">
+                <a16:creationId xmlns:a16="http://schemas.microsoft.com/office/drawing/2014/main" id="{2EEFCACE-5C00-11F3-A1A4-207E5F624C79}"/>
+              </a:ext>
+            </a:extLst>
+          </p:cNvPr>
+          <p:cNvPicPr>
+            <a:picLocks noChangeAspect="1"/>
+          </p:cNvPicPr>
+          <p:nvPr/>
+        </p:nvPicPr>
+        <p:blipFill>
+          <a:blip r:embed="rId2"/>
+          <a:stretch>
+            <a:fillRect/>
+          </a:stretch>
+        </p:blipFill>
+        <p:spPr>
+          <a:xfrm>
+            <a:off x="3148856" y="4297506"/>
+            <a:ext cx="5894289" cy="2439724"/>
+          </a:xfrm>
+          <a:prstGeom prst="rect">
+            <a:avLst/>
+          </a:prstGeom>
+          <a:ln>
+            <a:solidFill>
+              <a:schemeClr val="tx1"/>
+            </a:solidFill>
+          </a:ln>
+        </p:spPr>
+      </p:pic>
+    </p:spTree>
+    <p:extLst>
+      <p:ext uri="{BB962C8B-B14F-4D97-AF65-F5344CB8AC3E}">
+        <p14:creationId xmlns:p14="http://schemas.microsoft.com/office/powerpoint/2010/main" val="4105425835"/>
+      </p:ext>
+    </p:extLst>
+  </p:cSld>
+  <p:clrMapOvr>
+    <a:masterClrMapping/>
+  </p:clrMapOvr>
+</p:sld>
+</file>
+
+<file path=ppt/slides/slide28.xml><?xml version="1.0" encoding="utf-8"?>
+<p:sld xmlns:a="http://schemas.openxmlformats.org/drawingml/2006/main" xmlns:r="http://schemas.openxmlformats.org/officeDocument/2006/relationships" xmlns:p="http://schemas.openxmlformats.org/presentationml/2006/main">
+  <p:cSld>
+    <p:spTree>
+      <p:nvGrpSpPr>
+        <p:cNvPr id="1" name="">
+          <a:extLst>
+            <a:ext uri="{FF2B5EF4-FFF2-40B4-BE49-F238E27FC236}">
+              <a16:creationId xmlns:a16="http://schemas.microsoft.com/office/drawing/2014/main" id="{F5284631-126C-5D31-DA08-89CFFD7C593E}"/>
+            </a:ext>
+          </a:extLst>
+        </p:cNvPr>
+        <p:cNvGrpSpPr/>
+        <p:nvPr/>
+      </p:nvGrpSpPr>
+      <p:grpSpPr>
+        <a:xfrm>
+          <a:off x="0" y="0"/>
+          <a:ext cx="0" cy="0"/>
+          <a:chOff x="0" y="0"/>
+          <a:chExt cx="0" cy="0"/>
+        </a:xfrm>
+      </p:grpSpPr>
+      <p:sp>
+        <p:nvSpPr>
+          <p:cNvPr id="2" name="標題 1">
+            <a:extLst>
+              <a:ext uri="{FF2B5EF4-FFF2-40B4-BE49-F238E27FC236}">
+                <a16:creationId xmlns:a16="http://schemas.microsoft.com/office/drawing/2014/main" id="{7F7BFC9F-8F60-F2B7-A5D1-5048C70214FD}"/>
+              </a:ext>
+            </a:extLst>
+          </p:cNvPr>
+          <p:cNvSpPr>
+            <a:spLocks noGrp="1"/>
+          </p:cNvSpPr>
+          <p:nvPr>
+            <p:ph type="title"/>
+          </p:nvPr>
+        </p:nvSpPr>
+        <p:spPr/>
+        <p:txBody>
+          <a:bodyPr/>
+          <a:lstStyle/>
+          <a:p>
+            <a:r>
+              <a:rPr lang="en-US" altLang="zh-TW" dirty="0"/>
+              <a:t>AHB</a:t>
+            </a:r>
+            <a:r>
+              <a:rPr lang="zh-TW" altLang="en-US" dirty="0"/>
+              <a:t> </a:t>
+            </a:r>
+            <a:r>
+              <a:rPr lang="en-US" altLang="zh-TW" dirty="0"/>
+              <a:t>Transfers (8/)</a:t>
+            </a:r>
+            <a:endParaRPr lang="zh-TW" altLang="en-US" dirty="0"/>
+          </a:p>
+        </p:txBody>
+      </p:sp>
+      <p:sp>
+        <p:nvSpPr>
+          <p:cNvPr id="3" name="內容版面配置區 2">
+            <a:extLst>
+              <a:ext uri="{FF2B5EF4-FFF2-40B4-BE49-F238E27FC236}">
+                <a16:creationId xmlns:a16="http://schemas.microsoft.com/office/drawing/2014/main" id="{080622A8-E7ED-5CD9-D225-429B2682F001}"/>
+              </a:ext>
+            </a:extLst>
+          </p:cNvPr>
+          <p:cNvSpPr>
+            <a:spLocks noGrp="1"/>
+          </p:cNvSpPr>
+          <p:nvPr>
+            <p:ph idx="1"/>
+          </p:nvPr>
+        </p:nvSpPr>
+        <p:spPr/>
+        <p:txBody>
+          <a:bodyPr/>
+          <a:lstStyle/>
+          <a:p>
+            <a:pPr marL="514350" indent="-514350">
+              <a:buFont typeface="+mj-lt"/>
+              <a:buAutoNum type="arabicPeriod" startAt="2"/>
+            </a:pPr>
+            <a:r>
+              <a:rPr lang="en-US" altLang="zh-TW" dirty="0"/>
+              <a:t>Transfer types - </a:t>
+            </a:r>
+            <a:r>
+              <a:rPr lang="zh-TW" altLang="en-US" dirty="0"/>
+              <a:t>整理</a:t>
+            </a:r>
+            <a:endParaRPr lang="en-US" altLang="zh-TW" dirty="0"/>
+          </a:p>
+          <a:p>
+            <a:pPr lvl="1"/>
+            <a:r>
+              <a:rPr lang="zh-TW" altLang="en-US" dirty="0"/>
+              <a:t>一個 </a:t>
+            </a:r>
+            <a:r>
+              <a:rPr lang="en-US" altLang="zh-TW" dirty="0"/>
+              <a:t>beat RW </a:t>
+            </a:r>
+            <a:r>
+              <a:rPr lang="zh-TW" altLang="en-US" dirty="0"/>
+              <a:t>操作，分為 </a:t>
+            </a:r>
+            <a:r>
+              <a:rPr lang="en-US" altLang="zh-TW" dirty="0"/>
+              <a:t>address phase &amp; data phase</a:t>
+            </a:r>
+          </a:p>
+          <a:p>
+            <a:pPr lvl="1"/>
+            <a:r>
+              <a:rPr lang="en-US" altLang="zh-TW" dirty="0"/>
+              <a:t>HREADY </a:t>
+            </a:r>
+            <a:r>
+              <a:rPr lang="zh-TW" altLang="en-US" dirty="0"/>
+              <a:t>驅動總線週期推進</a:t>
+            </a:r>
+            <a:endParaRPr lang="en-US" altLang="zh-TW" dirty="0"/>
+          </a:p>
+          <a:p>
+            <a:pPr lvl="1"/>
+            <a:r>
+              <a:rPr lang="en-US" altLang="zh-TW" dirty="0"/>
+              <a:t>Slave </a:t>
+            </a:r>
+            <a:r>
+              <a:rPr lang="zh-TW" altLang="en-US" dirty="0"/>
+              <a:t>靠拉低 </a:t>
+            </a:r>
+            <a:r>
+              <a:rPr lang="en-US" altLang="zh-TW" dirty="0"/>
+              <a:t>HREADY_OUT</a:t>
+            </a:r>
+            <a:r>
+              <a:rPr lang="zh-TW" altLang="en-US" dirty="0"/>
+              <a:t> 在 </a:t>
+            </a:r>
+            <a:r>
+              <a:rPr lang="en-US" altLang="zh-TW" dirty="0"/>
+              <a:t>data phase </a:t>
+            </a:r>
+            <a:r>
+              <a:rPr lang="zh-TW" altLang="en-US" dirty="0"/>
+              <a:t>插入 </a:t>
+            </a:r>
+            <a:r>
+              <a:rPr lang="en-US" altLang="zh-TW" dirty="0"/>
+              <a:t>wait state</a:t>
+            </a:r>
+          </a:p>
+          <a:p>
+            <a:pPr lvl="1"/>
+            <a:r>
+              <a:rPr lang="en-US" altLang="zh-TW" dirty="0"/>
+              <a:t>Master </a:t>
+            </a:r>
+            <a:r>
+              <a:rPr lang="zh-TW" altLang="en-US" dirty="0"/>
+              <a:t>靠 </a:t>
+            </a:r>
+            <a:r>
+              <a:rPr lang="en-US" altLang="zh-TW" dirty="0"/>
+              <a:t>HTRANS</a:t>
+            </a:r>
+            <a:r>
+              <a:rPr lang="zh-TW" altLang="en-US" dirty="0"/>
+              <a:t> </a:t>
+            </a:r>
+            <a:r>
+              <a:rPr lang="en-US" altLang="zh-TW" dirty="0"/>
+              <a:t>=</a:t>
+            </a:r>
+            <a:r>
+              <a:rPr lang="zh-TW" altLang="en-US" dirty="0"/>
+              <a:t> </a:t>
+            </a:r>
+            <a:r>
+              <a:rPr lang="en-US" altLang="zh-TW" dirty="0"/>
+              <a:t>BUSY</a:t>
+            </a:r>
+            <a:r>
+              <a:rPr lang="zh-TW" altLang="en-US" dirty="0"/>
+              <a:t> 來插入 </a:t>
+            </a:r>
+            <a:r>
+              <a:rPr lang="en-US" altLang="zh-TW" dirty="0"/>
+              <a:t>wait cycle</a:t>
+            </a:r>
+          </a:p>
+          <a:p>
+            <a:pPr lvl="1"/>
+            <a:endParaRPr lang="en-US" altLang="zh-TW" dirty="0"/>
+          </a:p>
+        </p:txBody>
+      </p:sp>
+    </p:spTree>
+    <p:extLst>
+      <p:ext uri="{BB962C8B-B14F-4D97-AF65-F5344CB8AC3E}">
+        <p14:creationId xmlns:p14="http://schemas.microsoft.com/office/powerpoint/2010/main" val="3773555455"/>
+      </p:ext>
+    </p:extLst>
+  </p:cSld>
+  <p:clrMapOvr>
+    <a:masterClrMapping/>
+  </p:clrMapOvr>
+</p:sld>
+</file>
+
+<file path=ppt/slides/slide29.xml><?xml version="1.0" encoding="utf-8"?>
+<p:sld xmlns:a="http://schemas.openxmlformats.org/drawingml/2006/main" xmlns:r="http://schemas.openxmlformats.org/officeDocument/2006/relationships" xmlns:p="http://schemas.openxmlformats.org/presentationml/2006/main">
+  <p:cSld>
+    <p:spTree>
+      <p:nvGrpSpPr>
+        <p:cNvPr id="1" name="">
+          <a:extLst>
+            <a:ext uri="{FF2B5EF4-FFF2-40B4-BE49-F238E27FC236}">
+              <a16:creationId xmlns:a16="http://schemas.microsoft.com/office/drawing/2014/main" id="{296CDB30-EE07-55B3-202F-9BE7993B50CC}"/>
+            </a:ext>
+          </a:extLst>
+        </p:cNvPr>
+        <p:cNvGrpSpPr/>
+        <p:nvPr/>
+      </p:nvGrpSpPr>
+      <p:grpSpPr>
+        <a:xfrm>
+          <a:off x="0" y="0"/>
+          <a:ext cx="0" cy="0"/>
+          <a:chOff x="0" y="0"/>
+          <a:chExt cx="0" cy="0"/>
+        </a:xfrm>
+      </p:grpSpPr>
+      <p:sp>
+        <p:nvSpPr>
+          <p:cNvPr id="2" name="標題 1">
+            <a:extLst>
+              <a:ext uri="{FF2B5EF4-FFF2-40B4-BE49-F238E27FC236}">
+                <a16:creationId xmlns:a16="http://schemas.microsoft.com/office/drawing/2014/main" id="{F223B1D7-C0B1-1B76-FADE-9066CC5CCCCE}"/>
+              </a:ext>
+            </a:extLst>
+          </p:cNvPr>
+          <p:cNvSpPr>
+            <a:spLocks noGrp="1"/>
+          </p:cNvSpPr>
+          <p:nvPr>
+            <p:ph type="title"/>
+          </p:nvPr>
+        </p:nvSpPr>
+        <p:spPr/>
+        <p:txBody>
+          <a:bodyPr/>
+          <a:lstStyle/>
+          <a:p>
+            <a:r>
+              <a:rPr lang="en-US" altLang="zh-TW" dirty="0"/>
+              <a:t>AHB</a:t>
+            </a:r>
+            <a:r>
+              <a:rPr lang="zh-TW" altLang="en-US" dirty="0"/>
+              <a:t> </a:t>
+            </a:r>
+            <a:r>
+              <a:rPr lang="en-US" altLang="zh-TW" dirty="0"/>
+              <a:t>Transfers (9/)</a:t>
+            </a:r>
+            <a:endParaRPr lang="zh-TW" altLang="en-US" dirty="0"/>
+          </a:p>
+        </p:txBody>
+      </p:sp>
+      <p:sp>
+        <p:nvSpPr>
+          <p:cNvPr id="3" name="內容版面配置區 2">
+            <a:extLst>
+              <a:ext uri="{FF2B5EF4-FFF2-40B4-BE49-F238E27FC236}">
+                <a16:creationId xmlns:a16="http://schemas.microsoft.com/office/drawing/2014/main" id="{9FE08B1C-069F-9ECE-B848-A4E5B6C59AC5}"/>
+              </a:ext>
+            </a:extLst>
+          </p:cNvPr>
+          <p:cNvSpPr>
+            <a:spLocks noGrp="1"/>
+          </p:cNvSpPr>
+          <p:nvPr>
+            <p:ph idx="1"/>
+          </p:nvPr>
+        </p:nvSpPr>
+        <p:spPr/>
+        <p:txBody>
+          <a:bodyPr/>
+          <a:lstStyle/>
+          <a:p>
+            <a:pPr marL="514350" indent="-514350">
+              <a:buFont typeface="+mj-lt"/>
+              <a:buAutoNum type="arabicPeriod" startAt="3"/>
+            </a:pPr>
+            <a:r>
+              <a:rPr lang="en-US" altLang="zh-TW" dirty="0"/>
+              <a:t>Locked transfers</a:t>
+            </a:r>
+          </a:p>
+          <a:p>
+            <a:pPr lvl="1"/>
+            <a:endParaRPr lang="en-US" altLang="zh-TW" dirty="0"/>
+          </a:p>
+        </p:txBody>
+      </p:sp>
+    </p:spTree>
+    <p:extLst>
+      <p:ext uri="{BB962C8B-B14F-4D97-AF65-F5344CB8AC3E}">
+        <p14:creationId xmlns:p14="http://schemas.microsoft.com/office/powerpoint/2010/main" val="3513029630"/>
       </p:ext>
     </p:extLst>
   </p:cSld>

</xml_diff>

<commit_message>
Modify: AMBA/AMBA_learning.pptx 1. Add chapter2 Locked transfers 2. Add chapter2 Transfer size 3. Add chapter2 Burst operation
</commit_message>
<xml_diff>
--- a/AMBA/AMBA_learning.pptx
+++ b/AMBA/AMBA_learning.pptx
@@ -34,6 +34,13 @@
     <p:sldId id="294" r:id="rId28"/>
     <p:sldId id="296" r:id="rId29"/>
     <p:sldId id="295" r:id="rId30"/>
+    <p:sldId id="297" r:id="rId31"/>
+    <p:sldId id="298" r:id="rId32"/>
+    <p:sldId id="299" r:id="rId33"/>
+    <p:sldId id="300" r:id="rId34"/>
+    <p:sldId id="301" r:id="rId35"/>
+    <p:sldId id="302" r:id="rId36"/>
+    <p:sldId id="303" r:id="rId37"/>
   </p:sldIdLst>
   <p:sldSz cx="12192000" cy="6858000"/>
   <p:notesSz cx="6858000" cy="9144000"/>
@@ -287,7 +294,7 @@
           <a:p>
             <a:fld id="{277B1798-C61C-4271-ABD9-F0F48E058C48}" type="datetimeFigureOut">
               <a:rPr lang="zh-TW" altLang="en-US" smtClean="0"/>
-              <a:t>2025/7/7</a:t>
+              <a:t>2025/7/8</a:t>
             </a:fld>
             <a:endParaRPr lang="zh-TW" altLang="en-US"/>
           </a:p>
@@ -485,7 +492,7 @@
           <a:p>
             <a:fld id="{277B1798-C61C-4271-ABD9-F0F48E058C48}" type="datetimeFigureOut">
               <a:rPr lang="zh-TW" altLang="en-US" smtClean="0"/>
-              <a:t>2025/7/7</a:t>
+              <a:t>2025/7/8</a:t>
             </a:fld>
             <a:endParaRPr lang="zh-TW" altLang="en-US"/>
           </a:p>
@@ -693,7 +700,7 @@
           <a:p>
             <a:fld id="{277B1798-C61C-4271-ABD9-F0F48E058C48}" type="datetimeFigureOut">
               <a:rPr lang="zh-TW" altLang="en-US" smtClean="0"/>
-              <a:t>2025/7/7</a:t>
+              <a:t>2025/7/8</a:t>
             </a:fld>
             <a:endParaRPr lang="zh-TW" altLang="en-US"/>
           </a:p>
@@ -891,7 +898,7 @@
           <a:p>
             <a:fld id="{277B1798-C61C-4271-ABD9-F0F48E058C48}" type="datetimeFigureOut">
               <a:rPr lang="zh-TW" altLang="en-US" smtClean="0"/>
-              <a:t>2025/7/7</a:t>
+              <a:t>2025/7/8</a:t>
             </a:fld>
             <a:endParaRPr lang="zh-TW" altLang="en-US"/>
           </a:p>
@@ -1166,7 +1173,7 @@
           <a:p>
             <a:fld id="{277B1798-C61C-4271-ABD9-F0F48E058C48}" type="datetimeFigureOut">
               <a:rPr lang="zh-TW" altLang="en-US" smtClean="0"/>
-              <a:t>2025/7/7</a:t>
+              <a:t>2025/7/8</a:t>
             </a:fld>
             <a:endParaRPr lang="zh-TW" altLang="en-US"/>
           </a:p>
@@ -1431,7 +1438,7 @@
           <a:p>
             <a:fld id="{277B1798-C61C-4271-ABD9-F0F48E058C48}" type="datetimeFigureOut">
               <a:rPr lang="zh-TW" altLang="en-US" smtClean="0"/>
-              <a:t>2025/7/7</a:t>
+              <a:t>2025/7/8</a:t>
             </a:fld>
             <a:endParaRPr lang="zh-TW" altLang="en-US"/>
           </a:p>
@@ -1843,7 +1850,7 @@
           <a:p>
             <a:fld id="{277B1798-C61C-4271-ABD9-F0F48E058C48}" type="datetimeFigureOut">
               <a:rPr lang="zh-TW" altLang="en-US" smtClean="0"/>
-              <a:t>2025/7/7</a:t>
+              <a:t>2025/7/8</a:t>
             </a:fld>
             <a:endParaRPr lang="zh-TW" altLang="en-US"/>
           </a:p>
@@ -1984,7 +1991,7 @@
           <a:p>
             <a:fld id="{277B1798-C61C-4271-ABD9-F0F48E058C48}" type="datetimeFigureOut">
               <a:rPr lang="zh-TW" altLang="en-US" smtClean="0"/>
-              <a:t>2025/7/7</a:t>
+              <a:t>2025/7/8</a:t>
             </a:fld>
             <a:endParaRPr lang="zh-TW" altLang="en-US"/>
           </a:p>
@@ -2097,7 +2104,7 @@
           <a:p>
             <a:fld id="{277B1798-C61C-4271-ABD9-F0F48E058C48}" type="datetimeFigureOut">
               <a:rPr lang="zh-TW" altLang="en-US" smtClean="0"/>
-              <a:t>2025/7/7</a:t>
+              <a:t>2025/7/8</a:t>
             </a:fld>
             <a:endParaRPr lang="zh-TW" altLang="en-US"/>
           </a:p>
@@ -2408,7 +2415,7 @@
           <a:p>
             <a:fld id="{277B1798-C61C-4271-ABD9-F0F48E058C48}" type="datetimeFigureOut">
               <a:rPr lang="zh-TW" altLang="en-US" smtClean="0"/>
-              <a:t>2025/7/7</a:t>
+              <a:t>2025/7/8</a:t>
             </a:fld>
             <a:endParaRPr lang="zh-TW" altLang="en-US"/>
           </a:p>
@@ -2696,7 +2703,7 @@
           <a:p>
             <a:fld id="{277B1798-C61C-4271-ABD9-F0F48E058C48}" type="datetimeFigureOut">
               <a:rPr lang="zh-TW" altLang="en-US" smtClean="0"/>
-              <a:t>2025/7/7</a:t>
+              <a:t>2025/7/8</a:t>
             </a:fld>
             <a:endParaRPr lang="zh-TW" altLang="en-US"/>
           </a:p>
@@ -2937,7 +2944,7 @@
           <a:p>
             <a:fld id="{277B1798-C61C-4271-ABD9-F0F48E058C48}" type="datetimeFigureOut">
               <a:rPr lang="zh-TW" altLang="en-US" smtClean="0"/>
-              <a:t>2025/7/7</a:t>
+              <a:t>2025/7/8</a:t>
             </a:fld>
             <a:endParaRPr lang="zh-TW" altLang="en-US"/>
           </a:p>
@@ -10222,10 +10229,233 @@
           </a:p>
           <a:p>
             <a:pPr lvl="1"/>
+            <a:r>
+              <a:rPr lang="zh-TW" altLang="en-US" sz="2000" dirty="0"/>
+              <a:t>如果</a:t>
+            </a:r>
+            <a:r>
+              <a:rPr lang="en-US" altLang="zh-TW" sz="2000" dirty="0"/>
+              <a:t>master </a:t>
+            </a:r>
+            <a:r>
+              <a:rPr lang="zh-TW" altLang="en-US" sz="2000" dirty="0"/>
+              <a:t>需要進行 </a:t>
+            </a:r>
+            <a:r>
+              <a:rPr lang="en-US" altLang="zh-TW" sz="2000" dirty="0"/>
+              <a:t>locked</a:t>
+            </a:r>
+            <a:r>
+              <a:rPr lang="zh-TW" altLang="en-US" sz="2000" dirty="0"/>
+              <a:t> 存取，則必須同時</a:t>
+            </a:r>
+            <a:r>
+              <a:rPr lang="zh-TW" altLang="en-US" sz="2000" dirty="0">
+                <a:solidFill>
+                  <a:srgbClr val="FF0000"/>
+                </a:solidFill>
+              </a:rPr>
+              <a:t>拉高 </a:t>
+            </a:r>
+            <a:r>
+              <a:rPr lang="en-US" altLang="zh-TW" sz="2000" dirty="0">
+                <a:solidFill>
+                  <a:srgbClr val="FF0000"/>
+                </a:solidFill>
+              </a:rPr>
+              <a:t>HMASTLOCK </a:t>
+            </a:r>
+            <a:r>
+              <a:rPr lang="zh-TW" altLang="en-US" sz="2000" dirty="0">
+                <a:solidFill>
+                  <a:srgbClr val="FF0000"/>
+                </a:solidFill>
+              </a:rPr>
+              <a:t>訊號</a:t>
+            </a:r>
+            <a:r>
+              <a:rPr lang="zh-TW" altLang="en-US" sz="2000" dirty="0"/>
+              <a:t>。</a:t>
+            </a:r>
+            <a:br>
+              <a:rPr lang="en-US" altLang="zh-TW" sz="2000" dirty="0"/>
+            </a:br>
+            <a:r>
+              <a:rPr lang="zh-TW" altLang="en-US" sz="2000" dirty="0"/>
+              <a:t>此訊號告知所有</a:t>
+            </a:r>
+            <a:r>
+              <a:rPr lang="en-US" altLang="zh-TW" sz="2000" dirty="0"/>
+              <a:t>slave</a:t>
+            </a:r>
+            <a:r>
+              <a:rPr lang="zh-TW" altLang="en-US" sz="2000" dirty="0"/>
+              <a:t>，目前的</a:t>
+            </a:r>
+            <a:r>
+              <a:rPr lang="zh-TW" altLang="en-US" sz="2000" dirty="0">
+                <a:solidFill>
+                  <a:srgbClr val="FF0000"/>
+                </a:solidFill>
+              </a:rPr>
+              <a:t>傳輸序列是不可分割</a:t>
+            </a:r>
+            <a:r>
+              <a:rPr lang="zh-TW" altLang="en-US" sz="2000" dirty="0"/>
+              <a:t>的，因此必須在處理任何指令之前優先完成。</a:t>
+            </a:r>
+            <a:endParaRPr lang="en-US" altLang="zh-TW" sz="2000" dirty="0"/>
+          </a:p>
+          <a:p>
+            <a:pPr lvl="1"/>
+            <a:endParaRPr lang="en-US" altLang="zh-TW" sz="2000" dirty="0"/>
+          </a:p>
+          <a:p>
+            <a:pPr lvl="1"/>
+            <a:r>
+              <a:rPr lang="en-US" altLang="zh-TW" sz="2000" dirty="0"/>
+              <a:t>Lock </a:t>
+            </a:r>
+            <a:r>
+              <a:rPr lang="zh-TW" altLang="en-US" sz="2000" dirty="0"/>
+              <a:t>開始</a:t>
+            </a:r>
+            <a:r>
+              <a:rPr lang="en-US" altLang="zh-TW" sz="2000" dirty="0"/>
+              <a:t>:</a:t>
+            </a:r>
+          </a:p>
+          <a:p>
+            <a:pPr marL="1257300" lvl="2" indent="-342900">
+              <a:buFont typeface="+mj-lt"/>
+              <a:buAutoNum type="arabicPeriod"/>
+            </a:pPr>
+            <a:r>
+              <a:rPr lang="zh-TW" altLang="en-US" sz="1600" dirty="0"/>
+              <a:t> </a:t>
+            </a:r>
+            <a:r>
+              <a:rPr lang="en-US" altLang="zh-TW" sz="1600" dirty="0"/>
+              <a:t>master: HMASTERLOCK = 1 &amp;&amp; HREADY = 1</a:t>
+            </a:r>
+          </a:p>
+          <a:p>
+            <a:pPr marL="1257300" lvl="2" indent="-342900">
+              <a:buFont typeface="+mj-lt"/>
+              <a:buAutoNum type="arabicPeriod"/>
+            </a:pPr>
+            <a:r>
+              <a:rPr lang="en-US" altLang="zh-TW" sz="1600" dirty="0"/>
+              <a:t>Slave: HMASTERLOCK = 0 &amp;&amp; HSEL = 1 &amp;&amp; HREADY = 1</a:t>
+            </a:r>
+          </a:p>
+          <a:p>
+            <a:pPr lvl="1"/>
+            <a:r>
+              <a:rPr lang="en-US" altLang="zh-TW" sz="2000" dirty="0"/>
+              <a:t>Lock </a:t>
+            </a:r>
+            <a:r>
+              <a:rPr lang="zh-TW" altLang="en-US" sz="2000" dirty="0"/>
+              <a:t>結束</a:t>
+            </a:r>
+            <a:r>
+              <a:rPr lang="en-US" altLang="zh-TW" sz="2000" dirty="0"/>
+              <a:t>:</a:t>
+            </a:r>
+          </a:p>
+          <a:p>
+            <a:pPr marL="1257300" lvl="2" indent="-342900">
+              <a:buFont typeface="+mj-lt"/>
+              <a:buAutoNum type="arabicPeriod"/>
+            </a:pPr>
+            <a:r>
+              <a:rPr lang="en-US" altLang="zh-TW" sz="1600" dirty="0"/>
+              <a:t>HMASTERLOCK</a:t>
+            </a:r>
+            <a:r>
+              <a:rPr lang="zh-TW" altLang="en-US" sz="1600" dirty="0"/>
+              <a:t> </a:t>
+            </a:r>
+            <a:r>
+              <a:rPr lang="en-US" altLang="zh-TW" sz="1600" dirty="0"/>
+              <a:t>=</a:t>
+            </a:r>
+            <a:r>
+              <a:rPr lang="zh-TW" altLang="en-US" sz="1600" dirty="0"/>
+              <a:t> </a:t>
+            </a:r>
+            <a:r>
+              <a:rPr lang="en-US" altLang="zh-TW" sz="1600" dirty="0"/>
+              <a:t>0 &amp;&amp; HREADY = 1</a:t>
+            </a:r>
+          </a:p>
+          <a:p>
+            <a:pPr marL="1257300" lvl="2" indent="-342900">
+              <a:buFont typeface="+mj-lt"/>
+              <a:buAutoNum type="arabicPeriod"/>
+            </a:pPr>
+            <a:r>
+              <a:rPr lang="en-US" altLang="zh-TW" sz="1600" dirty="0"/>
+              <a:t>locked transfer</a:t>
+            </a:r>
+            <a:r>
+              <a:rPr lang="zh-TW" altLang="en-US" sz="1600" dirty="0"/>
+              <a:t> 結束時，建議在最後插入一個 </a:t>
+            </a:r>
+            <a:r>
+              <a:rPr lang="en-US" altLang="zh-TW" sz="1600" dirty="0"/>
+              <a:t>IDLE</a:t>
+            </a:r>
+          </a:p>
+          <a:p>
+            <a:pPr marL="1257300" lvl="2" indent="-342900">
+              <a:buFont typeface="+mj-lt"/>
+              <a:buAutoNum type="arabicPeriod"/>
+            </a:pPr>
+            <a:endParaRPr lang="en-US" altLang="zh-TW" sz="1600" dirty="0"/>
+          </a:p>
+          <a:p>
+            <a:pPr lvl="1"/>
             <a:endParaRPr lang="en-US" altLang="zh-TW" dirty="0"/>
           </a:p>
         </p:txBody>
       </p:sp>
+      <p:pic>
+        <p:nvPicPr>
+          <p:cNvPr id="5" name="圖片 4">
+            <a:extLst>
+              <a:ext uri="{FF2B5EF4-FFF2-40B4-BE49-F238E27FC236}">
+                <a16:creationId xmlns:a16="http://schemas.microsoft.com/office/drawing/2014/main" id="{0CCC7D87-2E5A-C70E-2129-177A234D899C}"/>
+              </a:ext>
+            </a:extLst>
+          </p:cNvPr>
+          <p:cNvPicPr>
+            <a:picLocks noChangeAspect="1"/>
+          </p:cNvPicPr>
+          <p:nvPr/>
+        </p:nvPicPr>
+        <p:blipFill>
+          <a:blip r:embed="rId2"/>
+          <a:stretch>
+            <a:fillRect/>
+          </a:stretch>
+        </p:blipFill>
+        <p:spPr>
+          <a:xfrm>
+            <a:off x="7254489" y="4219180"/>
+            <a:ext cx="4733925" cy="2390775"/>
+          </a:xfrm>
+          <a:prstGeom prst="rect">
+            <a:avLst/>
+          </a:prstGeom>
+          <a:ln>
+            <a:solidFill>
+              <a:schemeClr val="tx1"/>
+            </a:solidFill>
+          </a:ln>
+        </p:spPr>
+      </p:pic>
     </p:spTree>
     <p:extLst>
       <p:ext uri="{BB962C8B-B14F-4D97-AF65-F5344CB8AC3E}">
@@ -10319,6 +10549,1725 @@
     <p:extLst>
       <p:ext uri="{BB962C8B-B14F-4D97-AF65-F5344CB8AC3E}">
         <p14:creationId xmlns:p14="http://schemas.microsoft.com/office/powerpoint/2010/main" val="3558549456"/>
+      </p:ext>
+    </p:extLst>
+  </p:cSld>
+  <p:clrMapOvr>
+    <a:masterClrMapping/>
+  </p:clrMapOvr>
+</p:sld>
+</file>
+
+<file path=ppt/slides/slide30.xml><?xml version="1.0" encoding="utf-8"?>
+<p:sld xmlns:a="http://schemas.openxmlformats.org/drawingml/2006/main" xmlns:r="http://schemas.openxmlformats.org/officeDocument/2006/relationships" xmlns:p="http://schemas.openxmlformats.org/presentationml/2006/main">
+  <p:cSld>
+    <p:spTree>
+      <p:nvGrpSpPr>
+        <p:cNvPr id="1" name="">
+          <a:extLst>
+            <a:ext uri="{FF2B5EF4-FFF2-40B4-BE49-F238E27FC236}">
+              <a16:creationId xmlns:a16="http://schemas.microsoft.com/office/drawing/2014/main" id="{68040582-CD45-E8A5-8267-9B6B54FADE19}"/>
+            </a:ext>
+          </a:extLst>
+        </p:cNvPr>
+        <p:cNvGrpSpPr/>
+        <p:nvPr/>
+      </p:nvGrpSpPr>
+      <p:grpSpPr>
+        <a:xfrm>
+          <a:off x="0" y="0"/>
+          <a:ext cx="0" cy="0"/>
+          <a:chOff x="0" y="0"/>
+          <a:chExt cx="0" cy="0"/>
+        </a:xfrm>
+      </p:grpSpPr>
+      <p:sp>
+        <p:nvSpPr>
+          <p:cNvPr id="2" name="標題 1">
+            <a:extLst>
+              <a:ext uri="{FF2B5EF4-FFF2-40B4-BE49-F238E27FC236}">
+                <a16:creationId xmlns:a16="http://schemas.microsoft.com/office/drawing/2014/main" id="{EB57DFCE-7807-6FEC-5E1E-2C119C2B1B5F}"/>
+              </a:ext>
+            </a:extLst>
+          </p:cNvPr>
+          <p:cNvSpPr>
+            <a:spLocks noGrp="1"/>
+          </p:cNvSpPr>
+          <p:nvPr>
+            <p:ph type="title"/>
+          </p:nvPr>
+        </p:nvSpPr>
+        <p:spPr/>
+        <p:txBody>
+          <a:bodyPr/>
+          <a:lstStyle/>
+          <a:p>
+            <a:r>
+              <a:rPr lang="en-US" altLang="zh-TW" dirty="0"/>
+              <a:t>AHB</a:t>
+            </a:r>
+            <a:r>
+              <a:rPr lang="zh-TW" altLang="en-US" dirty="0"/>
+              <a:t> </a:t>
+            </a:r>
+            <a:r>
+              <a:rPr lang="en-US" altLang="zh-TW" dirty="0"/>
+              <a:t>Transfers (10/)</a:t>
+            </a:r>
+            <a:endParaRPr lang="zh-TW" altLang="en-US" dirty="0"/>
+          </a:p>
+        </p:txBody>
+      </p:sp>
+      <p:sp>
+        <p:nvSpPr>
+          <p:cNvPr id="3" name="內容版面配置區 2">
+            <a:extLst>
+              <a:ext uri="{FF2B5EF4-FFF2-40B4-BE49-F238E27FC236}">
+                <a16:creationId xmlns:a16="http://schemas.microsoft.com/office/drawing/2014/main" id="{4F35DC7E-2890-4409-F2AA-84A2F8FDDDC8}"/>
+              </a:ext>
+            </a:extLst>
+          </p:cNvPr>
+          <p:cNvSpPr>
+            <a:spLocks noGrp="1"/>
+          </p:cNvSpPr>
+          <p:nvPr>
+            <p:ph idx="1"/>
+          </p:nvPr>
+        </p:nvSpPr>
+        <p:spPr/>
+        <p:txBody>
+          <a:bodyPr/>
+          <a:lstStyle/>
+          <a:p>
+            <a:pPr marL="514350" indent="-514350">
+              <a:buFont typeface="+mj-lt"/>
+              <a:buAutoNum type="arabicPeriod" startAt="4"/>
+            </a:pPr>
+            <a:r>
+              <a:rPr lang="en-US" altLang="zh-TW" dirty="0"/>
+              <a:t>Transfer size</a:t>
+            </a:r>
+          </a:p>
+          <a:p>
+            <a:pPr lvl="1"/>
+            <a:r>
+              <a:rPr lang="en-US" altLang="zh-TW" sz="2000" dirty="0"/>
+              <a:t>HSIZE[2:0] </a:t>
+            </a:r>
+            <a:r>
+              <a:rPr lang="zh-TW" altLang="en-US" sz="2000" dirty="0"/>
+              <a:t>表示資料傳輸的大小</a:t>
+            </a:r>
+            <a:endParaRPr lang="en-US" altLang="zh-TW" sz="2000" dirty="0"/>
+          </a:p>
+          <a:p>
+            <a:pPr lvl="1"/>
+            <a:r>
+              <a:rPr lang="zh-TW" altLang="en-US" sz="2000" dirty="0">
+                <a:solidFill>
+                  <a:srgbClr val="FF0000"/>
+                </a:solidFill>
+              </a:rPr>
+              <a:t>代表每一 </a:t>
+            </a:r>
+            <a:r>
+              <a:rPr lang="en-US" altLang="zh-TW" sz="2000" dirty="0">
+                <a:solidFill>
+                  <a:srgbClr val="FF0000"/>
+                </a:solidFill>
+              </a:rPr>
+              <a:t>beat </a:t>
+            </a:r>
+            <a:r>
+              <a:rPr lang="zh-TW" altLang="en-US" sz="2000" dirty="0">
+                <a:solidFill>
+                  <a:srgbClr val="FF0000"/>
+                </a:solidFill>
+              </a:rPr>
+              <a:t>傳輸的數據量為多少 </a:t>
+            </a:r>
+            <a:r>
+              <a:rPr lang="en-US" altLang="zh-TW" sz="2000" dirty="0">
+                <a:solidFill>
+                  <a:srgbClr val="FF0000"/>
+                </a:solidFill>
+              </a:rPr>
+              <a:t>bit</a:t>
+            </a:r>
+            <a:br>
+              <a:rPr lang="en-US" altLang="zh-TW" sz="2000" dirty="0"/>
+            </a:br>
+            <a:r>
+              <a:rPr lang="en-US" altLang="zh-TW" sz="2000" dirty="0"/>
+              <a:t>(ex: </a:t>
+            </a:r>
+            <a:r>
+              <a:rPr lang="zh-TW" altLang="en-US" sz="2000" dirty="0"/>
+              <a:t>當 </a:t>
+            </a:r>
+            <a:r>
+              <a:rPr lang="en-US" altLang="zh-TW" sz="2000" dirty="0"/>
+              <a:t>HSIZE[2:0] </a:t>
+            </a:r>
+            <a:r>
+              <a:rPr lang="zh-TW" altLang="en-US" sz="2000" dirty="0"/>
+              <a:t> </a:t>
+            </a:r>
+            <a:r>
+              <a:rPr lang="en-US" altLang="zh-TW" sz="2000" dirty="0"/>
+              <a:t>=</a:t>
+            </a:r>
+            <a:r>
+              <a:rPr lang="zh-TW" altLang="en-US" sz="2000" dirty="0"/>
+              <a:t> </a:t>
+            </a:r>
+            <a:r>
+              <a:rPr lang="en-US" altLang="zh-TW" sz="2000" dirty="0"/>
+              <a:t>1</a:t>
+            </a:r>
+            <a:r>
+              <a:rPr lang="zh-TW" altLang="en-US" sz="2000" dirty="0"/>
+              <a:t>，代表此次傳輸，一次傳 </a:t>
+            </a:r>
+            <a:r>
+              <a:rPr lang="en-US" altLang="zh-TW" sz="2000" dirty="0"/>
+              <a:t>16</a:t>
+            </a:r>
+            <a:r>
+              <a:rPr lang="zh-TW" altLang="en-US" sz="2000" dirty="0"/>
+              <a:t> </a:t>
+            </a:r>
+            <a:r>
+              <a:rPr lang="en-US" altLang="zh-TW" sz="2000" dirty="0"/>
+              <a:t>bits</a:t>
+            </a:r>
+            <a:br>
+              <a:rPr lang="en-US" altLang="zh-TW" sz="2000" dirty="0"/>
+            </a:br>
+            <a:r>
+              <a:rPr lang="zh-TW" altLang="en-US" sz="2000" dirty="0"/>
+              <a:t>換句話說 </a:t>
+            </a:r>
+            <a:r>
+              <a:rPr lang="en-US" altLang="zh-TW" sz="2000" dirty="0"/>
+              <a:t>DATA</a:t>
+            </a:r>
+            <a:r>
+              <a:rPr lang="zh-TW" altLang="en-US" sz="2000" dirty="0"/>
+              <a:t> </a:t>
+            </a:r>
+            <a:r>
+              <a:rPr lang="en-US" altLang="zh-TW" sz="2000" dirty="0"/>
+              <a:t>bus</a:t>
+            </a:r>
+            <a:r>
+              <a:rPr lang="zh-TW" altLang="en-US" sz="2000" dirty="0"/>
+              <a:t> </a:t>
+            </a:r>
+            <a:r>
+              <a:rPr lang="en-US" altLang="zh-TW" sz="2000" dirty="0"/>
+              <a:t>(32bits) </a:t>
+            </a:r>
+            <a:r>
+              <a:rPr lang="zh-TW" altLang="en-US" sz="2000" dirty="0"/>
+              <a:t>上的資料有 </a:t>
+            </a:r>
+            <a:r>
+              <a:rPr lang="en-US" altLang="zh-TW" sz="2000" dirty="0"/>
+              <a:t>16 bits </a:t>
+            </a:r>
+            <a:r>
+              <a:rPr lang="zh-TW" altLang="en-US" sz="2000" dirty="0"/>
+              <a:t>是有效的</a:t>
+            </a:r>
+            <a:r>
+              <a:rPr lang="en-US" altLang="zh-TW" sz="2000" dirty="0"/>
+              <a:t>)</a:t>
+            </a:r>
+          </a:p>
+          <a:p>
+            <a:pPr lvl="1"/>
+            <a:endParaRPr lang="en-US" altLang="zh-TW" dirty="0"/>
+          </a:p>
+        </p:txBody>
+      </p:sp>
+      <p:pic>
+        <p:nvPicPr>
+          <p:cNvPr id="6" name="圖片 5">
+            <a:extLst>
+              <a:ext uri="{FF2B5EF4-FFF2-40B4-BE49-F238E27FC236}">
+                <a16:creationId xmlns:a16="http://schemas.microsoft.com/office/drawing/2014/main" id="{C9CDB701-3EC7-C200-C1E7-38C36E22EA17}"/>
+              </a:ext>
+            </a:extLst>
+          </p:cNvPr>
+          <p:cNvPicPr>
+            <a:picLocks noChangeAspect="1"/>
+          </p:cNvPicPr>
+          <p:nvPr/>
+        </p:nvPicPr>
+        <p:blipFill>
+          <a:blip r:embed="rId2"/>
+          <a:stretch>
+            <a:fillRect/>
+          </a:stretch>
+        </p:blipFill>
+        <p:spPr>
+          <a:xfrm>
+            <a:off x="7983505" y="3322623"/>
+            <a:ext cx="4019358" cy="3335212"/>
+          </a:xfrm>
+          <a:prstGeom prst="rect">
+            <a:avLst/>
+          </a:prstGeom>
+          <a:ln>
+            <a:solidFill>
+              <a:schemeClr val="tx1"/>
+            </a:solidFill>
+          </a:ln>
+        </p:spPr>
+      </p:pic>
+    </p:spTree>
+    <p:extLst>
+      <p:ext uri="{BB962C8B-B14F-4D97-AF65-F5344CB8AC3E}">
+        <p14:creationId xmlns:p14="http://schemas.microsoft.com/office/powerpoint/2010/main" val="233842531"/>
+      </p:ext>
+    </p:extLst>
+  </p:cSld>
+  <p:clrMapOvr>
+    <a:masterClrMapping/>
+  </p:clrMapOvr>
+</p:sld>
+</file>
+
+<file path=ppt/slides/slide31.xml><?xml version="1.0" encoding="utf-8"?>
+<p:sld xmlns:a="http://schemas.openxmlformats.org/drawingml/2006/main" xmlns:r="http://schemas.openxmlformats.org/officeDocument/2006/relationships" xmlns:p="http://schemas.openxmlformats.org/presentationml/2006/main">
+  <p:cSld>
+    <p:spTree>
+      <p:nvGrpSpPr>
+        <p:cNvPr id="1" name="">
+          <a:extLst>
+            <a:ext uri="{FF2B5EF4-FFF2-40B4-BE49-F238E27FC236}">
+              <a16:creationId xmlns:a16="http://schemas.microsoft.com/office/drawing/2014/main" id="{DDFBF3DD-958D-DCAF-5ED7-CF24026325FE}"/>
+            </a:ext>
+          </a:extLst>
+        </p:cNvPr>
+        <p:cNvGrpSpPr/>
+        <p:nvPr/>
+      </p:nvGrpSpPr>
+      <p:grpSpPr>
+        <a:xfrm>
+          <a:off x="0" y="0"/>
+          <a:ext cx="0" cy="0"/>
+          <a:chOff x="0" y="0"/>
+          <a:chExt cx="0" cy="0"/>
+        </a:xfrm>
+      </p:grpSpPr>
+      <p:sp>
+        <p:nvSpPr>
+          <p:cNvPr id="2" name="標題 1">
+            <a:extLst>
+              <a:ext uri="{FF2B5EF4-FFF2-40B4-BE49-F238E27FC236}">
+                <a16:creationId xmlns:a16="http://schemas.microsoft.com/office/drawing/2014/main" id="{1069DB3D-9EA3-FF0A-1683-2CAA1B257192}"/>
+              </a:ext>
+            </a:extLst>
+          </p:cNvPr>
+          <p:cNvSpPr>
+            <a:spLocks noGrp="1"/>
+          </p:cNvSpPr>
+          <p:nvPr>
+            <p:ph type="title"/>
+          </p:nvPr>
+        </p:nvSpPr>
+        <p:spPr/>
+        <p:txBody>
+          <a:bodyPr/>
+          <a:lstStyle/>
+          <a:p>
+            <a:r>
+              <a:rPr lang="en-US" altLang="zh-TW" dirty="0"/>
+              <a:t>AHB</a:t>
+            </a:r>
+            <a:r>
+              <a:rPr lang="zh-TW" altLang="en-US" dirty="0"/>
+              <a:t> </a:t>
+            </a:r>
+            <a:r>
+              <a:rPr lang="en-US" altLang="zh-TW" dirty="0"/>
+              <a:t>Transfers (11/)</a:t>
+            </a:r>
+            <a:endParaRPr lang="zh-TW" altLang="en-US" dirty="0"/>
+          </a:p>
+        </p:txBody>
+      </p:sp>
+      <p:sp>
+        <p:nvSpPr>
+          <p:cNvPr id="3" name="內容版面配置區 2">
+            <a:extLst>
+              <a:ext uri="{FF2B5EF4-FFF2-40B4-BE49-F238E27FC236}">
+                <a16:creationId xmlns:a16="http://schemas.microsoft.com/office/drawing/2014/main" id="{A34C7EE2-EF08-B4A1-116E-E8D94DA28F69}"/>
+              </a:ext>
+            </a:extLst>
+          </p:cNvPr>
+          <p:cNvSpPr>
+            <a:spLocks noGrp="1"/>
+          </p:cNvSpPr>
+          <p:nvPr>
+            <p:ph idx="1"/>
+          </p:nvPr>
+        </p:nvSpPr>
+        <p:spPr/>
+        <p:txBody>
+          <a:bodyPr>
+            <a:normAutofit lnSpcReduction="10000"/>
+          </a:bodyPr>
+          <a:lstStyle/>
+          <a:p>
+            <a:pPr marL="514350" indent="-514350">
+              <a:buFont typeface="+mj-lt"/>
+              <a:buAutoNum type="arabicPeriod" startAt="5"/>
+            </a:pPr>
+            <a:r>
+              <a:rPr lang="en-US" altLang="zh-TW" dirty="0"/>
+              <a:t>Burst operation</a:t>
+            </a:r>
+          </a:p>
+          <a:p>
+            <a:pPr lvl="1"/>
+            <a:r>
+              <a:rPr lang="en-US" altLang="zh-TW" dirty="0"/>
+              <a:t>Burst </a:t>
+            </a:r>
+            <a:r>
+              <a:rPr lang="zh-TW" altLang="en-US" dirty="0"/>
+              <a:t>筆數由 </a:t>
+            </a:r>
+            <a:r>
+              <a:rPr lang="en-US" altLang="zh-TW" dirty="0"/>
+              <a:t>HBURST </a:t>
+            </a:r>
+            <a:r>
+              <a:rPr lang="zh-TW" altLang="en-US" dirty="0"/>
+              <a:t>控制，傳輸大小由 </a:t>
+            </a:r>
+            <a:r>
+              <a:rPr lang="en-US" altLang="zh-TW" dirty="0"/>
+              <a:t>HSIZE </a:t>
+            </a:r>
+            <a:r>
+              <a:rPr lang="zh-TW" altLang="en-US" dirty="0"/>
+              <a:t>控制</a:t>
+            </a:r>
+            <a:endParaRPr lang="en-US" altLang="zh-TW" dirty="0"/>
+          </a:p>
+          <a:p>
+            <a:pPr lvl="1"/>
+            <a:r>
+              <a:rPr lang="zh-TW" altLang="en-US" dirty="0"/>
+              <a:t>支援以下</a:t>
+            </a:r>
+            <a:r>
+              <a:rPr lang="en-US" altLang="zh-TW" dirty="0"/>
+              <a:t>Burst</a:t>
+            </a:r>
+            <a:r>
+              <a:rPr lang="zh-TW" altLang="en-US" dirty="0"/>
+              <a:t>類型</a:t>
+            </a:r>
+            <a:endParaRPr lang="en-US" altLang="zh-TW" dirty="0"/>
+          </a:p>
+          <a:p>
+            <a:pPr marL="1371600" lvl="2" indent="-457200">
+              <a:buFont typeface="+mj-lt"/>
+              <a:buAutoNum type="arabicParenR"/>
+            </a:pPr>
+            <a:r>
+              <a:rPr lang="zh-TW" altLang="en-US" dirty="0"/>
+              <a:t>單筆 </a:t>
+            </a:r>
+            <a:r>
+              <a:rPr lang="en-US" altLang="zh-TW" dirty="0"/>
+              <a:t>(SINGLE)</a:t>
+            </a:r>
+          </a:p>
+          <a:p>
+            <a:pPr marL="1371600" lvl="2" indent="-457200">
+              <a:buFont typeface="+mj-lt"/>
+              <a:buAutoNum type="arabicParenR"/>
+            </a:pPr>
+            <a:endParaRPr lang="en-US" altLang="zh-TW" dirty="0"/>
+          </a:p>
+          <a:p>
+            <a:pPr marL="1371600" lvl="2" indent="-457200">
+              <a:buFont typeface="+mj-lt"/>
+              <a:buAutoNum type="arabicParenR"/>
+            </a:pPr>
+            <a:r>
+              <a:rPr lang="zh-TW" altLang="en-US" dirty="0"/>
+              <a:t>遞增不定長</a:t>
+            </a:r>
+            <a:r>
+              <a:rPr lang="en-US" altLang="zh-TW" dirty="0"/>
+              <a:t>Burst</a:t>
+            </a:r>
+            <a:r>
+              <a:rPr lang="zh-TW" altLang="en-US" dirty="0"/>
+              <a:t> </a:t>
+            </a:r>
+            <a:r>
+              <a:rPr lang="en-US" altLang="zh-TW" dirty="0"/>
+              <a:t>(INCR):</a:t>
+            </a:r>
+          </a:p>
+          <a:p>
+            <a:pPr marL="1714500" lvl="3" indent="-342900">
+              <a:buFont typeface="+mj-lt"/>
+              <a:buAutoNum type="arabicPeriod"/>
+            </a:pPr>
+            <a:r>
+              <a:rPr lang="zh-TW" altLang="en-US" dirty="0"/>
+              <a:t>存取的是連續的位址位置，突發中每次傳輸的位址會比前一次遞增。</a:t>
+            </a:r>
+            <a:endParaRPr lang="en-US" altLang="zh-TW" dirty="0"/>
+          </a:p>
+          <a:p>
+            <a:pPr marL="1714500" lvl="3" indent="-342900">
+              <a:buFont typeface="+mj-lt"/>
+              <a:buAutoNum type="arabicPeriod"/>
+            </a:pPr>
+            <a:endParaRPr lang="en-US" altLang="zh-TW" dirty="0"/>
+          </a:p>
+          <a:p>
+            <a:pPr marL="1371600" lvl="2" indent="-457200">
+              <a:buFont typeface="+mj-lt"/>
+              <a:buAutoNum type="arabicParenR"/>
+            </a:pPr>
+            <a:r>
+              <a:rPr lang="zh-TW" altLang="en-US" dirty="0"/>
+              <a:t>遞增定長 </a:t>
+            </a:r>
+            <a:r>
+              <a:rPr lang="en-US" altLang="zh-TW" dirty="0"/>
+              <a:t>Burst</a:t>
+            </a:r>
+            <a:r>
+              <a:rPr lang="zh-TW" altLang="en-US" dirty="0"/>
+              <a:t> </a:t>
+            </a:r>
+            <a:r>
+              <a:rPr lang="en-US" altLang="zh-TW" dirty="0"/>
+              <a:t>(INCR</a:t>
+            </a:r>
+            <a:r>
+              <a:rPr lang="zh-TW" altLang="en-US" dirty="0"/>
+              <a:t> </a:t>
+            </a:r>
+            <a:r>
+              <a:rPr lang="en-US" altLang="zh-TW" dirty="0"/>
+              <a:t>4, 8, 16)</a:t>
+            </a:r>
+          </a:p>
+          <a:p>
+            <a:pPr marL="1371600" lvl="2" indent="-457200">
+              <a:buFont typeface="+mj-lt"/>
+              <a:buAutoNum type="arabicParenR"/>
+            </a:pPr>
+            <a:endParaRPr lang="en-US" altLang="zh-TW" dirty="0"/>
+          </a:p>
+          <a:p>
+            <a:pPr marL="1371600" lvl="2" indent="-457200">
+              <a:buFont typeface="+mj-lt"/>
+              <a:buAutoNum type="arabicParenR"/>
+            </a:pPr>
+            <a:r>
+              <a:rPr lang="zh-TW" altLang="en-US" dirty="0"/>
+              <a:t>包裝式</a:t>
+            </a:r>
+            <a:r>
+              <a:rPr lang="en-US" altLang="zh-TW" dirty="0"/>
+              <a:t>Burst</a:t>
+            </a:r>
+            <a:r>
+              <a:rPr lang="zh-TW" altLang="en-US" dirty="0"/>
+              <a:t> </a:t>
+            </a:r>
+            <a:r>
+              <a:rPr lang="en-US" altLang="zh-TW" dirty="0"/>
+              <a:t>(WRAP 4, 8, 16):</a:t>
+            </a:r>
+          </a:p>
+          <a:p>
+            <a:pPr marL="1714500" lvl="3" indent="-342900">
+              <a:buFont typeface="+mj-lt"/>
+              <a:buAutoNum type="arabicPeriod"/>
+            </a:pPr>
+            <a:r>
+              <a:rPr lang="zh-TW" altLang="en-US" dirty="0"/>
+              <a:t>當跨越某個位址邊界時，位址會自動回繞（</a:t>
+            </a:r>
+            <a:r>
+              <a:rPr lang="en-US" altLang="zh-TW" dirty="0"/>
+              <a:t>wrap around</a:t>
+            </a:r>
+            <a:r>
+              <a:rPr lang="zh-TW" altLang="en-US" dirty="0"/>
+              <a:t>）。</a:t>
+            </a:r>
+            <a:endParaRPr lang="en-US" altLang="zh-TW" dirty="0"/>
+          </a:p>
+          <a:p>
+            <a:pPr marL="1714500" lvl="3" indent="-342900">
+              <a:buFont typeface="+mj-lt"/>
+              <a:buAutoNum type="arabicPeriod"/>
+            </a:pPr>
+            <a:r>
+              <a:rPr lang="zh-TW" altLang="en-US" dirty="0"/>
+              <a:t>位址邊界的計算方式為：</a:t>
+            </a:r>
+            <a:r>
+              <a:rPr lang="en-US" altLang="zh-TW" dirty="0"/>
+              <a:t>beats</a:t>
+            </a:r>
+            <a:r>
+              <a:rPr lang="zh-TW" altLang="en-US" dirty="0"/>
+              <a:t> * </a:t>
+            </a:r>
+            <a:r>
+              <a:rPr lang="en-US" altLang="zh-TW" dirty="0"/>
+              <a:t>HSIZE </a:t>
+            </a:r>
+          </a:p>
+          <a:p>
+            <a:pPr lvl="1"/>
+            <a:endParaRPr lang="en-US" altLang="zh-TW" dirty="0"/>
+          </a:p>
+        </p:txBody>
+      </p:sp>
+    </p:spTree>
+    <p:extLst>
+      <p:ext uri="{BB962C8B-B14F-4D97-AF65-F5344CB8AC3E}">
+        <p14:creationId xmlns:p14="http://schemas.microsoft.com/office/powerpoint/2010/main" val="2719222659"/>
+      </p:ext>
+    </p:extLst>
+  </p:cSld>
+  <p:clrMapOvr>
+    <a:masterClrMapping/>
+  </p:clrMapOvr>
+</p:sld>
+</file>
+
+<file path=ppt/slides/slide32.xml><?xml version="1.0" encoding="utf-8"?>
+<p:sld xmlns:a="http://schemas.openxmlformats.org/drawingml/2006/main" xmlns:r="http://schemas.openxmlformats.org/officeDocument/2006/relationships" xmlns:p="http://schemas.openxmlformats.org/presentationml/2006/main">
+  <p:cSld>
+    <p:spTree>
+      <p:nvGrpSpPr>
+        <p:cNvPr id="1" name="">
+          <a:extLst>
+            <a:ext uri="{FF2B5EF4-FFF2-40B4-BE49-F238E27FC236}">
+              <a16:creationId xmlns:a16="http://schemas.microsoft.com/office/drawing/2014/main" id="{10F798A4-0A43-444E-E62F-BB2F575901E7}"/>
+            </a:ext>
+          </a:extLst>
+        </p:cNvPr>
+        <p:cNvGrpSpPr/>
+        <p:nvPr/>
+      </p:nvGrpSpPr>
+      <p:grpSpPr>
+        <a:xfrm>
+          <a:off x="0" y="0"/>
+          <a:ext cx="0" cy="0"/>
+          <a:chOff x="0" y="0"/>
+          <a:chExt cx="0" cy="0"/>
+        </a:xfrm>
+      </p:grpSpPr>
+      <p:sp>
+        <p:nvSpPr>
+          <p:cNvPr id="2" name="標題 1">
+            <a:extLst>
+              <a:ext uri="{FF2B5EF4-FFF2-40B4-BE49-F238E27FC236}">
+                <a16:creationId xmlns:a16="http://schemas.microsoft.com/office/drawing/2014/main" id="{B465D7B7-6EBD-CB40-0B3C-0A4C0B302993}"/>
+              </a:ext>
+            </a:extLst>
+          </p:cNvPr>
+          <p:cNvSpPr>
+            <a:spLocks noGrp="1"/>
+          </p:cNvSpPr>
+          <p:nvPr>
+            <p:ph type="title"/>
+          </p:nvPr>
+        </p:nvSpPr>
+        <p:spPr/>
+        <p:txBody>
+          <a:bodyPr/>
+          <a:lstStyle/>
+          <a:p>
+            <a:r>
+              <a:rPr lang="en-US" altLang="zh-TW" dirty="0"/>
+              <a:t>AHB</a:t>
+            </a:r>
+            <a:r>
+              <a:rPr lang="zh-TW" altLang="en-US" dirty="0"/>
+              <a:t> </a:t>
+            </a:r>
+            <a:r>
+              <a:rPr lang="en-US" altLang="zh-TW" dirty="0"/>
+              <a:t>Transfers (12/)</a:t>
+            </a:r>
+            <a:endParaRPr lang="zh-TW" altLang="en-US" dirty="0"/>
+          </a:p>
+        </p:txBody>
+      </p:sp>
+      <p:sp>
+        <p:nvSpPr>
+          <p:cNvPr id="3" name="內容版面配置區 2">
+            <a:extLst>
+              <a:ext uri="{FF2B5EF4-FFF2-40B4-BE49-F238E27FC236}">
+                <a16:creationId xmlns:a16="http://schemas.microsoft.com/office/drawing/2014/main" id="{90F64075-EF66-9E6F-BD50-338017C8E239}"/>
+              </a:ext>
+            </a:extLst>
+          </p:cNvPr>
+          <p:cNvSpPr>
+            <a:spLocks noGrp="1"/>
+          </p:cNvSpPr>
+          <p:nvPr>
+            <p:ph idx="1"/>
+          </p:nvPr>
+        </p:nvSpPr>
+        <p:spPr/>
+        <p:txBody>
+          <a:bodyPr>
+            <a:normAutofit/>
+          </a:bodyPr>
+          <a:lstStyle/>
+          <a:p>
+            <a:pPr marL="514350" indent="-514350">
+              <a:buFont typeface="+mj-lt"/>
+              <a:buAutoNum type="arabicPeriod" startAt="5"/>
+            </a:pPr>
+            <a:r>
+              <a:rPr lang="en-US" altLang="zh-TW" dirty="0"/>
+              <a:t>Burst operation – example</a:t>
+            </a:r>
+          </a:p>
+          <a:p>
+            <a:pPr marL="914400" lvl="1" indent="-457200">
+              <a:buFont typeface="+mj-lt"/>
+              <a:buAutoNum type="arabicParenR"/>
+            </a:pPr>
+            <a:r>
+              <a:rPr lang="en-US" altLang="zh-TW" sz="2000" dirty="0"/>
+              <a:t>WRAP4</a:t>
+            </a:r>
+          </a:p>
+          <a:p>
+            <a:pPr lvl="2"/>
+            <a:r>
+              <a:rPr lang="zh-TW" altLang="en-US" sz="1600" dirty="0"/>
+              <a:t>因為是 </a:t>
+            </a:r>
+            <a:r>
+              <a:rPr lang="en-US" altLang="zh-TW" sz="1600" dirty="0"/>
+              <a:t>HBURST</a:t>
+            </a:r>
+            <a:r>
+              <a:rPr lang="zh-TW" altLang="en-US" sz="1600" dirty="0"/>
+              <a:t> </a:t>
+            </a:r>
+            <a:r>
+              <a:rPr lang="en-US" altLang="zh-TW" sz="1600" dirty="0"/>
+              <a:t>=</a:t>
+            </a:r>
+            <a:r>
+              <a:rPr lang="zh-TW" altLang="en-US" sz="1600" dirty="0"/>
+              <a:t> </a:t>
+            </a:r>
+            <a:r>
+              <a:rPr lang="en-US" altLang="zh-TW" sz="1600" dirty="0"/>
+              <a:t>4</a:t>
+            </a:r>
+            <a:r>
+              <a:rPr lang="zh-TW" altLang="en-US" sz="1600" dirty="0"/>
+              <a:t> </a:t>
+            </a:r>
+            <a:r>
+              <a:rPr lang="en-US" altLang="zh-TW" sz="1600" dirty="0"/>
+              <a:t>beat</a:t>
+            </a:r>
+            <a:r>
+              <a:rPr lang="zh-TW" altLang="en-US" sz="1600" dirty="0"/>
+              <a:t> 且 </a:t>
+            </a:r>
+            <a:r>
+              <a:rPr lang="en-US" altLang="zh-TW" sz="1600" dirty="0"/>
+              <a:t>HSIZE</a:t>
+            </a:r>
+            <a:r>
+              <a:rPr lang="zh-TW" altLang="en-US" sz="1600" dirty="0"/>
+              <a:t> </a:t>
+            </a:r>
+            <a:r>
+              <a:rPr lang="en-US" altLang="zh-TW" sz="1600" dirty="0"/>
+              <a:t>=</a:t>
+            </a:r>
+            <a:r>
+              <a:rPr lang="zh-TW" altLang="en-US" sz="1600" dirty="0"/>
+              <a:t> </a:t>
+            </a:r>
+            <a:r>
+              <a:rPr lang="en-US" altLang="zh-TW" sz="1600" dirty="0"/>
+              <a:t>4</a:t>
+            </a:r>
+            <a:r>
+              <a:rPr lang="zh-TW" altLang="en-US" sz="1600" dirty="0"/>
+              <a:t> </a:t>
+            </a:r>
+            <a:r>
+              <a:rPr lang="en-US" altLang="zh-TW" sz="1600" dirty="0"/>
+              <a:t>bytes (WORD)</a:t>
+            </a:r>
+            <a:r>
+              <a:rPr lang="zh-TW" altLang="en-US" sz="1600" dirty="0"/>
+              <a:t>，</a:t>
+            </a:r>
+            <a:br>
+              <a:rPr lang="en-US" altLang="zh-TW" sz="1600" dirty="0"/>
+            </a:br>
+            <a:r>
+              <a:rPr lang="zh-TW" altLang="en-US" sz="1600" dirty="0"/>
+              <a:t>位址邊界為 </a:t>
+            </a:r>
+            <a:r>
+              <a:rPr lang="en-US" altLang="zh-TW" sz="1600" dirty="0"/>
+              <a:t>4</a:t>
+            </a:r>
+            <a:r>
+              <a:rPr lang="zh-TW" altLang="en-US" sz="1600" dirty="0"/>
+              <a:t> *</a:t>
+            </a:r>
+            <a:r>
+              <a:rPr lang="en-US" altLang="zh-TW" sz="1600" dirty="0"/>
+              <a:t>4</a:t>
+            </a:r>
+            <a:r>
+              <a:rPr lang="zh-TW" altLang="en-US" sz="1600" dirty="0"/>
+              <a:t> </a:t>
+            </a:r>
+            <a:r>
+              <a:rPr lang="en-US" altLang="zh-TW" sz="1600" dirty="0"/>
+              <a:t>=</a:t>
+            </a:r>
+            <a:r>
+              <a:rPr lang="zh-TW" altLang="en-US" sz="1600" dirty="0"/>
+              <a:t> </a:t>
+            </a:r>
+            <a:r>
+              <a:rPr lang="en-US" altLang="zh-TW" sz="1600" dirty="0"/>
+              <a:t>16</a:t>
+            </a:r>
+            <a:r>
+              <a:rPr lang="zh-TW" altLang="en-US" sz="1600" dirty="0"/>
+              <a:t> </a:t>
+            </a:r>
+            <a:r>
+              <a:rPr lang="en-US" altLang="zh-TW" sz="1600" dirty="0"/>
+              <a:t>bytes</a:t>
+            </a:r>
+            <a:r>
+              <a:rPr lang="zh-TW" altLang="en-US" sz="1600" dirty="0"/>
+              <a:t>，所以 </a:t>
+            </a:r>
+            <a:r>
+              <a:rPr lang="en-US" altLang="zh-TW" sz="1600" dirty="0"/>
+              <a:t>HADDR</a:t>
+            </a:r>
+            <a:r>
+              <a:rPr lang="zh-TW" altLang="en-US" sz="1600" dirty="0"/>
+              <a:t> 在 </a:t>
+            </a:r>
+            <a:r>
+              <a:rPr lang="en-US" altLang="zh-TW" sz="1600" dirty="0"/>
+              <a:t>0x3C </a:t>
+            </a:r>
+            <a:r>
+              <a:rPr lang="zh-TW" altLang="en-US" sz="1600" dirty="0"/>
+              <a:t>之後會繞回 </a:t>
+            </a:r>
+            <a:r>
+              <a:rPr lang="en-US" altLang="zh-TW" sz="1600" dirty="0"/>
+              <a:t>0x30 </a:t>
+            </a:r>
+          </a:p>
+        </p:txBody>
+      </p:sp>
+      <p:pic>
+        <p:nvPicPr>
+          <p:cNvPr id="7" name="圖片 6">
+            <a:extLst>
+              <a:ext uri="{FF2B5EF4-FFF2-40B4-BE49-F238E27FC236}">
+                <a16:creationId xmlns:a16="http://schemas.microsoft.com/office/drawing/2014/main" id="{9997D5A1-9645-009D-2529-5DCB42C3DBF0}"/>
+              </a:ext>
+            </a:extLst>
+          </p:cNvPr>
+          <p:cNvPicPr>
+            <a:picLocks noChangeAspect="1"/>
+          </p:cNvPicPr>
+          <p:nvPr/>
+        </p:nvPicPr>
+        <p:blipFill>
+          <a:blip r:embed="rId2"/>
+          <a:stretch>
+            <a:fillRect/>
+          </a:stretch>
+        </p:blipFill>
+        <p:spPr>
+          <a:xfrm>
+            <a:off x="3391999" y="3366099"/>
+            <a:ext cx="5408002" cy="3126776"/>
+          </a:xfrm>
+          <a:prstGeom prst="rect">
+            <a:avLst/>
+          </a:prstGeom>
+          <a:ln>
+            <a:solidFill>
+              <a:schemeClr val="tx1"/>
+            </a:solidFill>
+          </a:ln>
+        </p:spPr>
+      </p:pic>
+    </p:spTree>
+    <p:extLst>
+      <p:ext uri="{BB962C8B-B14F-4D97-AF65-F5344CB8AC3E}">
+        <p14:creationId xmlns:p14="http://schemas.microsoft.com/office/powerpoint/2010/main" val="2164607401"/>
+      </p:ext>
+    </p:extLst>
+  </p:cSld>
+  <p:clrMapOvr>
+    <a:masterClrMapping/>
+  </p:clrMapOvr>
+</p:sld>
+</file>
+
+<file path=ppt/slides/slide33.xml><?xml version="1.0" encoding="utf-8"?>
+<p:sld xmlns:a="http://schemas.openxmlformats.org/drawingml/2006/main" xmlns:r="http://schemas.openxmlformats.org/officeDocument/2006/relationships" xmlns:p="http://schemas.openxmlformats.org/presentationml/2006/main">
+  <p:cSld>
+    <p:spTree>
+      <p:nvGrpSpPr>
+        <p:cNvPr id="1" name="">
+          <a:extLst>
+            <a:ext uri="{FF2B5EF4-FFF2-40B4-BE49-F238E27FC236}">
+              <a16:creationId xmlns:a16="http://schemas.microsoft.com/office/drawing/2014/main" id="{D221BCCD-8BDF-D548-3E25-1BD85D3DC560}"/>
+            </a:ext>
+          </a:extLst>
+        </p:cNvPr>
+        <p:cNvGrpSpPr/>
+        <p:nvPr/>
+      </p:nvGrpSpPr>
+      <p:grpSpPr>
+        <a:xfrm>
+          <a:off x="0" y="0"/>
+          <a:ext cx="0" cy="0"/>
+          <a:chOff x="0" y="0"/>
+          <a:chExt cx="0" cy="0"/>
+        </a:xfrm>
+      </p:grpSpPr>
+      <p:sp>
+        <p:nvSpPr>
+          <p:cNvPr id="2" name="標題 1">
+            <a:extLst>
+              <a:ext uri="{FF2B5EF4-FFF2-40B4-BE49-F238E27FC236}">
+                <a16:creationId xmlns:a16="http://schemas.microsoft.com/office/drawing/2014/main" id="{D779DDEB-80AC-AA34-8102-7AEE61435D59}"/>
+              </a:ext>
+            </a:extLst>
+          </p:cNvPr>
+          <p:cNvSpPr>
+            <a:spLocks noGrp="1"/>
+          </p:cNvSpPr>
+          <p:nvPr>
+            <p:ph type="title"/>
+          </p:nvPr>
+        </p:nvSpPr>
+        <p:spPr/>
+        <p:txBody>
+          <a:bodyPr/>
+          <a:lstStyle/>
+          <a:p>
+            <a:r>
+              <a:rPr lang="en-US" altLang="zh-TW" dirty="0"/>
+              <a:t>AHB</a:t>
+            </a:r>
+            <a:r>
+              <a:rPr lang="zh-TW" altLang="en-US" dirty="0"/>
+              <a:t> </a:t>
+            </a:r>
+            <a:r>
+              <a:rPr lang="en-US" altLang="zh-TW" dirty="0"/>
+              <a:t>Transfers (13/)</a:t>
+            </a:r>
+            <a:endParaRPr lang="zh-TW" altLang="en-US" dirty="0"/>
+          </a:p>
+        </p:txBody>
+      </p:sp>
+      <p:sp>
+        <p:nvSpPr>
+          <p:cNvPr id="3" name="內容版面配置區 2">
+            <a:extLst>
+              <a:ext uri="{FF2B5EF4-FFF2-40B4-BE49-F238E27FC236}">
+                <a16:creationId xmlns:a16="http://schemas.microsoft.com/office/drawing/2014/main" id="{B27EE1AA-FF24-63D5-7AC1-D56E10BE0D0D}"/>
+              </a:ext>
+            </a:extLst>
+          </p:cNvPr>
+          <p:cNvSpPr>
+            <a:spLocks noGrp="1"/>
+          </p:cNvSpPr>
+          <p:nvPr>
+            <p:ph idx="1"/>
+          </p:nvPr>
+        </p:nvSpPr>
+        <p:spPr/>
+        <p:txBody>
+          <a:bodyPr>
+            <a:normAutofit/>
+          </a:bodyPr>
+          <a:lstStyle/>
+          <a:p>
+            <a:pPr marL="514350" indent="-514350">
+              <a:buFont typeface="+mj-lt"/>
+              <a:buAutoNum type="arabicPeriod" startAt="5"/>
+            </a:pPr>
+            <a:r>
+              <a:rPr lang="en-US" altLang="zh-TW" dirty="0"/>
+              <a:t>Burst operation – example</a:t>
+            </a:r>
+          </a:p>
+          <a:p>
+            <a:pPr marL="914400" lvl="1" indent="-457200">
+              <a:buFont typeface="+mj-lt"/>
+              <a:buAutoNum type="arabicParenR"/>
+            </a:pPr>
+            <a:r>
+              <a:rPr lang="en-US" altLang="zh-TW" sz="2000" dirty="0"/>
+              <a:t>INCR4</a:t>
+            </a:r>
+          </a:p>
+        </p:txBody>
+      </p:sp>
+      <p:pic>
+        <p:nvPicPr>
+          <p:cNvPr id="5" name="圖片 4">
+            <a:extLst>
+              <a:ext uri="{FF2B5EF4-FFF2-40B4-BE49-F238E27FC236}">
+                <a16:creationId xmlns:a16="http://schemas.microsoft.com/office/drawing/2014/main" id="{DEDB9C8A-96A9-7327-86CF-ED177F3CA370}"/>
+              </a:ext>
+            </a:extLst>
+          </p:cNvPr>
+          <p:cNvPicPr>
+            <a:picLocks noChangeAspect="1"/>
+          </p:cNvPicPr>
+          <p:nvPr/>
+        </p:nvPicPr>
+        <p:blipFill>
+          <a:blip r:embed="rId2"/>
+          <a:stretch>
+            <a:fillRect/>
+          </a:stretch>
+        </p:blipFill>
+        <p:spPr>
+          <a:xfrm>
+            <a:off x="2990060" y="2877005"/>
+            <a:ext cx="6211880" cy="3615870"/>
+          </a:xfrm>
+          <a:prstGeom prst="rect">
+            <a:avLst/>
+          </a:prstGeom>
+          <a:ln>
+            <a:solidFill>
+              <a:schemeClr val="tx1"/>
+            </a:solidFill>
+          </a:ln>
+        </p:spPr>
+      </p:pic>
+    </p:spTree>
+    <p:extLst>
+      <p:ext uri="{BB962C8B-B14F-4D97-AF65-F5344CB8AC3E}">
+        <p14:creationId xmlns:p14="http://schemas.microsoft.com/office/powerpoint/2010/main" val="3091374333"/>
+      </p:ext>
+    </p:extLst>
+  </p:cSld>
+  <p:clrMapOvr>
+    <a:masterClrMapping/>
+  </p:clrMapOvr>
+</p:sld>
+</file>
+
+<file path=ppt/slides/slide34.xml><?xml version="1.0" encoding="utf-8"?>
+<p:sld xmlns:a="http://schemas.openxmlformats.org/drawingml/2006/main" xmlns:r="http://schemas.openxmlformats.org/officeDocument/2006/relationships" xmlns:p="http://schemas.openxmlformats.org/presentationml/2006/main">
+  <p:cSld>
+    <p:spTree>
+      <p:nvGrpSpPr>
+        <p:cNvPr id="1" name="">
+          <a:extLst>
+            <a:ext uri="{FF2B5EF4-FFF2-40B4-BE49-F238E27FC236}">
+              <a16:creationId xmlns:a16="http://schemas.microsoft.com/office/drawing/2014/main" id="{84C2417D-7F9B-F404-7A9B-FE3786D14B23}"/>
+            </a:ext>
+          </a:extLst>
+        </p:cNvPr>
+        <p:cNvGrpSpPr/>
+        <p:nvPr/>
+      </p:nvGrpSpPr>
+      <p:grpSpPr>
+        <a:xfrm>
+          <a:off x="0" y="0"/>
+          <a:ext cx="0" cy="0"/>
+          <a:chOff x="0" y="0"/>
+          <a:chExt cx="0" cy="0"/>
+        </a:xfrm>
+      </p:grpSpPr>
+      <p:sp>
+        <p:nvSpPr>
+          <p:cNvPr id="2" name="標題 1">
+            <a:extLst>
+              <a:ext uri="{FF2B5EF4-FFF2-40B4-BE49-F238E27FC236}">
+                <a16:creationId xmlns:a16="http://schemas.microsoft.com/office/drawing/2014/main" id="{5D9DF358-BDC9-E23E-B39B-76AE4A1BB081}"/>
+              </a:ext>
+            </a:extLst>
+          </p:cNvPr>
+          <p:cNvSpPr>
+            <a:spLocks noGrp="1"/>
+          </p:cNvSpPr>
+          <p:nvPr>
+            <p:ph type="title"/>
+          </p:nvPr>
+        </p:nvSpPr>
+        <p:spPr/>
+        <p:txBody>
+          <a:bodyPr/>
+          <a:lstStyle/>
+          <a:p>
+            <a:r>
+              <a:rPr lang="en-US" altLang="zh-TW" dirty="0"/>
+              <a:t>AHB</a:t>
+            </a:r>
+            <a:r>
+              <a:rPr lang="zh-TW" altLang="en-US" dirty="0"/>
+              <a:t> </a:t>
+            </a:r>
+            <a:r>
+              <a:rPr lang="en-US" altLang="zh-TW" dirty="0"/>
+              <a:t>Transfers (14/)</a:t>
+            </a:r>
+            <a:endParaRPr lang="zh-TW" altLang="en-US" dirty="0"/>
+          </a:p>
+        </p:txBody>
+      </p:sp>
+      <p:sp>
+        <p:nvSpPr>
+          <p:cNvPr id="3" name="內容版面配置區 2">
+            <a:extLst>
+              <a:ext uri="{FF2B5EF4-FFF2-40B4-BE49-F238E27FC236}">
+                <a16:creationId xmlns:a16="http://schemas.microsoft.com/office/drawing/2014/main" id="{5C38D1F7-2E53-F0CD-28BF-A4A4BFAF9ACF}"/>
+              </a:ext>
+            </a:extLst>
+          </p:cNvPr>
+          <p:cNvSpPr>
+            <a:spLocks noGrp="1"/>
+          </p:cNvSpPr>
+          <p:nvPr>
+            <p:ph idx="1"/>
+          </p:nvPr>
+        </p:nvSpPr>
+        <p:spPr/>
+        <p:txBody>
+          <a:bodyPr>
+            <a:normAutofit/>
+          </a:bodyPr>
+          <a:lstStyle/>
+          <a:p>
+            <a:pPr marL="514350" indent="-514350">
+              <a:buFont typeface="+mj-lt"/>
+              <a:buAutoNum type="arabicPeriod" startAt="5"/>
+            </a:pPr>
+            <a:r>
+              <a:rPr lang="en-US" altLang="zh-TW" dirty="0"/>
+              <a:t>Burst operation – example</a:t>
+            </a:r>
+          </a:p>
+          <a:p>
+            <a:pPr marL="914400" lvl="1" indent="-457200">
+              <a:buFont typeface="+mj-lt"/>
+              <a:buAutoNum type="arabicParenR"/>
+            </a:pPr>
+            <a:r>
+              <a:rPr lang="en-US" altLang="zh-TW" sz="2000" dirty="0"/>
+              <a:t>WRAP8</a:t>
+            </a:r>
+          </a:p>
+          <a:p>
+            <a:pPr lvl="2"/>
+            <a:r>
+              <a:rPr lang="zh-TW" altLang="en-US" sz="1600" dirty="0"/>
+              <a:t>因為是 </a:t>
+            </a:r>
+            <a:r>
+              <a:rPr lang="en-US" altLang="zh-TW" sz="1600" dirty="0"/>
+              <a:t>HBURST</a:t>
+            </a:r>
+            <a:r>
+              <a:rPr lang="zh-TW" altLang="en-US" sz="1600" dirty="0"/>
+              <a:t> </a:t>
+            </a:r>
+            <a:r>
+              <a:rPr lang="en-US" altLang="zh-TW" sz="1600" dirty="0"/>
+              <a:t>=</a:t>
+            </a:r>
+            <a:r>
+              <a:rPr lang="zh-TW" altLang="en-US" sz="1600" dirty="0"/>
+              <a:t> </a:t>
+            </a:r>
+            <a:r>
+              <a:rPr lang="en-US" altLang="zh-TW" sz="1600" dirty="0"/>
+              <a:t>8</a:t>
+            </a:r>
+            <a:r>
+              <a:rPr lang="zh-TW" altLang="en-US" sz="1600" dirty="0"/>
+              <a:t> </a:t>
+            </a:r>
+            <a:r>
+              <a:rPr lang="en-US" altLang="zh-TW" sz="1600" dirty="0"/>
+              <a:t>beat</a:t>
+            </a:r>
+            <a:r>
+              <a:rPr lang="zh-TW" altLang="en-US" sz="1600" dirty="0"/>
+              <a:t> 且 </a:t>
+            </a:r>
+            <a:r>
+              <a:rPr lang="en-US" altLang="zh-TW" sz="1600" dirty="0"/>
+              <a:t>HSIZE</a:t>
+            </a:r>
+            <a:r>
+              <a:rPr lang="zh-TW" altLang="en-US" sz="1600" dirty="0"/>
+              <a:t> </a:t>
+            </a:r>
+            <a:r>
+              <a:rPr lang="en-US" altLang="zh-TW" sz="1600" dirty="0"/>
+              <a:t>=</a:t>
+            </a:r>
+            <a:r>
+              <a:rPr lang="zh-TW" altLang="en-US" sz="1600" dirty="0"/>
+              <a:t> </a:t>
+            </a:r>
+            <a:r>
+              <a:rPr lang="en-US" altLang="zh-TW" sz="1600" dirty="0"/>
+              <a:t>4</a:t>
+            </a:r>
+            <a:r>
+              <a:rPr lang="zh-TW" altLang="en-US" sz="1600" dirty="0"/>
+              <a:t> </a:t>
+            </a:r>
+            <a:r>
+              <a:rPr lang="en-US" altLang="zh-TW" sz="1600" dirty="0"/>
+              <a:t>bytes (WORD)</a:t>
+            </a:r>
+            <a:r>
+              <a:rPr lang="zh-TW" altLang="en-US" sz="1600" dirty="0"/>
+              <a:t>，</a:t>
+            </a:r>
+            <a:br>
+              <a:rPr lang="en-US" altLang="zh-TW" sz="1600" dirty="0"/>
+            </a:br>
+            <a:r>
+              <a:rPr lang="zh-TW" altLang="en-US" sz="1600" dirty="0"/>
+              <a:t>位址邊界為 </a:t>
+            </a:r>
+            <a:r>
+              <a:rPr lang="en-US" altLang="zh-TW" sz="1600" dirty="0"/>
+              <a:t>8</a:t>
+            </a:r>
+            <a:r>
+              <a:rPr lang="zh-TW" altLang="en-US" sz="1600" dirty="0"/>
+              <a:t> *</a:t>
+            </a:r>
+            <a:r>
+              <a:rPr lang="en-US" altLang="zh-TW" sz="1600" dirty="0"/>
+              <a:t>4</a:t>
+            </a:r>
+            <a:r>
+              <a:rPr lang="zh-TW" altLang="en-US" sz="1600" dirty="0"/>
+              <a:t> </a:t>
+            </a:r>
+            <a:r>
+              <a:rPr lang="en-US" altLang="zh-TW" sz="1600" dirty="0"/>
+              <a:t>=</a:t>
+            </a:r>
+            <a:r>
+              <a:rPr lang="zh-TW" altLang="en-US" sz="1600" dirty="0"/>
+              <a:t> </a:t>
+            </a:r>
+            <a:r>
+              <a:rPr lang="en-US" altLang="zh-TW" sz="1600" dirty="0"/>
+              <a:t>32</a:t>
+            </a:r>
+            <a:r>
+              <a:rPr lang="zh-TW" altLang="en-US" sz="1600" dirty="0"/>
+              <a:t> </a:t>
+            </a:r>
+            <a:r>
+              <a:rPr lang="en-US" altLang="zh-TW" sz="1600" dirty="0"/>
+              <a:t>bytes</a:t>
+            </a:r>
+            <a:r>
+              <a:rPr lang="zh-TW" altLang="en-US" sz="1600" dirty="0"/>
+              <a:t>，所以 </a:t>
+            </a:r>
+            <a:r>
+              <a:rPr lang="en-US" altLang="zh-TW" sz="1600" dirty="0"/>
+              <a:t>HADDR</a:t>
+            </a:r>
+            <a:r>
+              <a:rPr lang="zh-TW" altLang="en-US" sz="1600" dirty="0"/>
+              <a:t> 在 </a:t>
+            </a:r>
+            <a:r>
+              <a:rPr lang="en-US" altLang="zh-TW" sz="1600" dirty="0"/>
+              <a:t>0x3C </a:t>
+            </a:r>
+            <a:r>
+              <a:rPr lang="zh-TW" altLang="en-US" sz="1600" dirty="0"/>
+              <a:t>之後會繞回 </a:t>
+            </a:r>
+            <a:r>
+              <a:rPr lang="en-US" altLang="zh-TW" sz="1600" dirty="0"/>
+              <a:t>0x20 </a:t>
+            </a:r>
+          </a:p>
+        </p:txBody>
+      </p:sp>
+      <p:pic>
+        <p:nvPicPr>
+          <p:cNvPr id="5" name="圖片 4">
+            <a:extLst>
+              <a:ext uri="{FF2B5EF4-FFF2-40B4-BE49-F238E27FC236}">
+                <a16:creationId xmlns:a16="http://schemas.microsoft.com/office/drawing/2014/main" id="{E82B6FC6-491D-8956-4D33-50B76867BA82}"/>
+              </a:ext>
+            </a:extLst>
+          </p:cNvPr>
+          <p:cNvPicPr>
+            <a:picLocks noChangeAspect="1"/>
+          </p:cNvPicPr>
+          <p:nvPr/>
+        </p:nvPicPr>
+        <p:blipFill>
+          <a:blip r:embed="rId2"/>
+          <a:stretch>
+            <a:fillRect/>
+          </a:stretch>
+        </p:blipFill>
+        <p:spPr>
+          <a:xfrm>
+            <a:off x="3094965" y="3429000"/>
+            <a:ext cx="6002070" cy="3217977"/>
+          </a:xfrm>
+          <a:prstGeom prst="rect">
+            <a:avLst/>
+          </a:prstGeom>
+          <a:ln>
+            <a:solidFill>
+              <a:schemeClr val="tx1"/>
+            </a:solidFill>
+          </a:ln>
+        </p:spPr>
+      </p:pic>
+    </p:spTree>
+    <p:extLst>
+      <p:ext uri="{BB962C8B-B14F-4D97-AF65-F5344CB8AC3E}">
+        <p14:creationId xmlns:p14="http://schemas.microsoft.com/office/powerpoint/2010/main" val="1022575528"/>
+      </p:ext>
+    </p:extLst>
+  </p:cSld>
+  <p:clrMapOvr>
+    <a:masterClrMapping/>
+  </p:clrMapOvr>
+</p:sld>
+</file>
+
+<file path=ppt/slides/slide35.xml><?xml version="1.0" encoding="utf-8"?>
+<p:sld xmlns:a="http://schemas.openxmlformats.org/drawingml/2006/main" xmlns:r="http://schemas.openxmlformats.org/officeDocument/2006/relationships" xmlns:p="http://schemas.openxmlformats.org/presentationml/2006/main">
+  <p:cSld>
+    <p:spTree>
+      <p:nvGrpSpPr>
+        <p:cNvPr id="1" name="">
+          <a:extLst>
+            <a:ext uri="{FF2B5EF4-FFF2-40B4-BE49-F238E27FC236}">
+              <a16:creationId xmlns:a16="http://schemas.microsoft.com/office/drawing/2014/main" id="{A1EA260A-6535-294D-67C7-2BECA638DA5B}"/>
+            </a:ext>
+          </a:extLst>
+        </p:cNvPr>
+        <p:cNvGrpSpPr/>
+        <p:nvPr/>
+      </p:nvGrpSpPr>
+      <p:grpSpPr>
+        <a:xfrm>
+          <a:off x="0" y="0"/>
+          <a:ext cx="0" cy="0"/>
+          <a:chOff x="0" y="0"/>
+          <a:chExt cx="0" cy="0"/>
+        </a:xfrm>
+      </p:grpSpPr>
+      <p:sp>
+        <p:nvSpPr>
+          <p:cNvPr id="2" name="標題 1">
+            <a:extLst>
+              <a:ext uri="{FF2B5EF4-FFF2-40B4-BE49-F238E27FC236}">
+                <a16:creationId xmlns:a16="http://schemas.microsoft.com/office/drawing/2014/main" id="{F36206D5-4F49-DE41-C334-CB2C22F41699}"/>
+              </a:ext>
+            </a:extLst>
+          </p:cNvPr>
+          <p:cNvSpPr>
+            <a:spLocks noGrp="1"/>
+          </p:cNvSpPr>
+          <p:nvPr>
+            <p:ph type="title"/>
+          </p:nvPr>
+        </p:nvSpPr>
+        <p:spPr/>
+        <p:txBody>
+          <a:bodyPr/>
+          <a:lstStyle/>
+          <a:p>
+            <a:r>
+              <a:rPr lang="en-US" altLang="zh-TW" dirty="0"/>
+              <a:t>AHB</a:t>
+            </a:r>
+            <a:r>
+              <a:rPr lang="zh-TW" altLang="en-US" dirty="0"/>
+              <a:t> </a:t>
+            </a:r>
+            <a:r>
+              <a:rPr lang="en-US" altLang="zh-TW" dirty="0"/>
+              <a:t>Transfers (15/)</a:t>
+            </a:r>
+            <a:endParaRPr lang="zh-TW" altLang="en-US" dirty="0"/>
+          </a:p>
+        </p:txBody>
+      </p:sp>
+      <p:sp>
+        <p:nvSpPr>
+          <p:cNvPr id="3" name="內容版面配置區 2">
+            <a:extLst>
+              <a:ext uri="{FF2B5EF4-FFF2-40B4-BE49-F238E27FC236}">
+                <a16:creationId xmlns:a16="http://schemas.microsoft.com/office/drawing/2014/main" id="{41591CA5-3C77-9F67-3341-8F37165711E3}"/>
+              </a:ext>
+            </a:extLst>
+          </p:cNvPr>
+          <p:cNvSpPr>
+            <a:spLocks noGrp="1"/>
+          </p:cNvSpPr>
+          <p:nvPr>
+            <p:ph idx="1"/>
+          </p:nvPr>
+        </p:nvSpPr>
+        <p:spPr/>
+        <p:txBody>
+          <a:bodyPr>
+            <a:normAutofit/>
+          </a:bodyPr>
+          <a:lstStyle/>
+          <a:p>
+            <a:pPr marL="514350" indent="-514350">
+              <a:buFont typeface="+mj-lt"/>
+              <a:buAutoNum type="arabicPeriod" startAt="5"/>
+            </a:pPr>
+            <a:r>
+              <a:rPr lang="en-US" altLang="zh-TW" dirty="0"/>
+              <a:t>Burst operation – example</a:t>
+            </a:r>
+          </a:p>
+          <a:p>
+            <a:pPr marL="914400" lvl="1" indent="-457200">
+              <a:buFont typeface="+mj-lt"/>
+              <a:buAutoNum type="arabicParenR"/>
+            </a:pPr>
+            <a:r>
+              <a:rPr lang="en-US" altLang="zh-TW" sz="2000" dirty="0"/>
+              <a:t>INCR8</a:t>
+            </a:r>
+          </a:p>
+          <a:p>
+            <a:pPr lvl="2"/>
+            <a:r>
+              <a:rPr lang="zh-TW" altLang="en-US" sz="1600" dirty="0"/>
+              <a:t>因為</a:t>
+            </a:r>
+            <a:r>
+              <a:rPr lang="en-US" altLang="zh-TW" sz="1600" dirty="0"/>
+              <a:t>HSIZE</a:t>
+            </a:r>
+            <a:r>
+              <a:rPr lang="zh-TW" altLang="en-US" sz="1600" dirty="0"/>
+              <a:t> </a:t>
+            </a:r>
+            <a:r>
+              <a:rPr lang="en-US" altLang="zh-TW" sz="1600" dirty="0"/>
+              <a:t>=</a:t>
+            </a:r>
+            <a:r>
+              <a:rPr lang="zh-TW" altLang="en-US" sz="1600" dirty="0"/>
+              <a:t> </a:t>
+            </a:r>
+            <a:r>
+              <a:rPr lang="en-US" altLang="zh-TW" sz="1600" dirty="0"/>
+              <a:t>2</a:t>
+            </a:r>
+            <a:r>
+              <a:rPr lang="zh-TW" altLang="en-US" sz="1600" dirty="0"/>
+              <a:t> </a:t>
+            </a:r>
+            <a:r>
+              <a:rPr lang="en-US" altLang="zh-TW" sz="1600" dirty="0"/>
+              <a:t>bytes (Half WORD)</a:t>
+            </a:r>
+            <a:r>
+              <a:rPr lang="zh-TW" altLang="en-US" sz="1600" dirty="0"/>
+              <a:t>，所以</a:t>
+            </a:r>
+            <a:r>
+              <a:rPr lang="en-US" altLang="zh-TW" sz="1600" dirty="0"/>
+              <a:t>HADDR</a:t>
+            </a:r>
+            <a:r>
+              <a:rPr lang="zh-TW" altLang="en-US" sz="1600" dirty="0"/>
+              <a:t> 每筆加 </a:t>
+            </a:r>
+            <a:r>
+              <a:rPr lang="en-US" altLang="zh-TW" sz="1600" dirty="0"/>
+              <a:t>2</a:t>
+            </a:r>
+          </a:p>
+        </p:txBody>
+      </p:sp>
+      <p:pic>
+        <p:nvPicPr>
+          <p:cNvPr id="6" name="圖片 5">
+            <a:extLst>
+              <a:ext uri="{FF2B5EF4-FFF2-40B4-BE49-F238E27FC236}">
+                <a16:creationId xmlns:a16="http://schemas.microsoft.com/office/drawing/2014/main" id="{03FE0B1C-DAB3-A8E5-4C15-6AAB3B665AD3}"/>
+              </a:ext>
+            </a:extLst>
+          </p:cNvPr>
+          <p:cNvPicPr>
+            <a:picLocks noChangeAspect="1"/>
+          </p:cNvPicPr>
+          <p:nvPr/>
+        </p:nvPicPr>
+        <p:blipFill>
+          <a:blip r:embed="rId2"/>
+          <a:stretch>
+            <a:fillRect/>
+          </a:stretch>
+        </p:blipFill>
+        <p:spPr>
+          <a:xfrm>
+            <a:off x="3124313" y="3291905"/>
+            <a:ext cx="5943374" cy="3200970"/>
+          </a:xfrm>
+          <a:prstGeom prst="rect">
+            <a:avLst/>
+          </a:prstGeom>
+          <a:ln>
+            <a:solidFill>
+              <a:schemeClr val="tx1"/>
+            </a:solidFill>
+          </a:ln>
+        </p:spPr>
+      </p:pic>
+    </p:spTree>
+    <p:extLst>
+      <p:ext uri="{BB962C8B-B14F-4D97-AF65-F5344CB8AC3E}">
+        <p14:creationId xmlns:p14="http://schemas.microsoft.com/office/powerpoint/2010/main" val="999190765"/>
+      </p:ext>
+    </p:extLst>
+  </p:cSld>
+  <p:clrMapOvr>
+    <a:masterClrMapping/>
+  </p:clrMapOvr>
+</p:sld>
+</file>
+
+<file path=ppt/slides/slide36.xml><?xml version="1.0" encoding="utf-8"?>
+<p:sld xmlns:a="http://schemas.openxmlformats.org/drawingml/2006/main" xmlns:r="http://schemas.openxmlformats.org/officeDocument/2006/relationships" xmlns:p="http://schemas.openxmlformats.org/presentationml/2006/main">
+  <p:cSld>
+    <p:spTree>
+      <p:nvGrpSpPr>
+        <p:cNvPr id="1" name="">
+          <a:extLst>
+            <a:ext uri="{FF2B5EF4-FFF2-40B4-BE49-F238E27FC236}">
+              <a16:creationId xmlns:a16="http://schemas.microsoft.com/office/drawing/2014/main" id="{F83DCDA1-3643-EA9C-0B97-3FE88DC698AB}"/>
+            </a:ext>
+          </a:extLst>
+        </p:cNvPr>
+        <p:cNvGrpSpPr/>
+        <p:nvPr/>
+      </p:nvGrpSpPr>
+      <p:grpSpPr>
+        <a:xfrm>
+          <a:off x="0" y="0"/>
+          <a:ext cx="0" cy="0"/>
+          <a:chOff x="0" y="0"/>
+          <a:chExt cx="0" cy="0"/>
+        </a:xfrm>
+      </p:grpSpPr>
+      <p:sp>
+        <p:nvSpPr>
+          <p:cNvPr id="2" name="標題 1">
+            <a:extLst>
+              <a:ext uri="{FF2B5EF4-FFF2-40B4-BE49-F238E27FC236}">
+                <a16:creationId xmlns:a16="http://schemas.microsoft.com/office/drawing/2014/main" id="{25B643BA-00C4-A752-A91B-17E152A7154C}"/>
+              </a:ext>
+            </a:extLst>
+          </p:cNvPr>
+          <p:cNvSpPr>
+            <a:spLocks noGrp="1"/>
+          </p:cNvSpPr>
+          <p:nvPr>
+            <p:ph type="title"/>
+          </p:nvPr>
+        </p:nvSpPr>
+        <p:spPr/>
+        <p:txBody>
+          <a:bodyPr/>
+          <a:lstStyle/>
+          <a:p>
+            <a:r>
+              <a:rPr lang="en-US" altLang="zh-TW" dirty="0"/>
+              <a:t>AHB</a:t>
+            </a:r>
+            <a:r>
+              <a:rPr lang="zh-TW" altLang="en-US" dirty="0"/>
+              <a:t> </a:t>
+            </a:r>
+            <a:r>
+              <a:rPr lang="en-US" altLang="zh-TW" dirty="0"/>
+              <a:t>Transfers (15/)</a:t>
+            </a:r>
+            <a:endParaRPr lang="zh-TW" altLang="en-US" dirty="0"/>
+          </a:p>
+        </p:txBody>
+      </p:sp>
+      <p:sp>
+        <p:nvSpPr>
+          <p:cNvPr id="3" name="內容版面配置區 2">
+            <a:extLst>
+              <a:ext uri="{FF2B5EF4-FFF2-40B4-BE49-F238E27FC236}">
+                <a16:creationId xmlns:a16="http://schemas.microsoft.com/office/drawing/2014/main" id="{E63C14ED-736A-0007-0F63-0058EE079472}"/>
+              </a:ext>
+            </a:extLst>
+          </p:cNvPr>
+          <p:cNvSpPr>
+            <a:spLocks noGrp="1"/>
+          </p:cNvSpPr>
+          <p:nvPr>
+            <p:ph idx="1"/>
+          </p:nvPr>
+        </p:nvSpPr>
+        <p:spPr/>
+        <p:txBody>
+          <a:bodyPr>
+            <a:normAutofit/>
+          </a:bodyPr>
+          <a:lstStyle/>
+          <a:p>
+            <a:pPr marL="514350" indent="-514350">
+              <a:buFont typeface="+mj-lt"/>
+              <a:buAutoNum type="arabicPeriod" startAt="5"/>
+            </a:pPr>
+            <a:r>
+              <a:rPr lang="en-US" altLang="zh-TW" dirty="0"/>
+              <a:t>Burst operation – example</a:t>
+            </a:r>
+          </a:p>
+          <a:p>
+            <a:pPr marL="914400" lvl="1" indent="-457200">
+              <a:buFont typeface="+mj-lt"/>
+              <a:buAutoNum type="arabicParenR"/>
+            </a:pPr>
+            <a:r>
+              <a:rPr lang="en-US" altLang="zh-TW" sz="2000" dirty="0"/>
+              <a:t>INCR</a:t>
+            </a:r>
+          </a:p>
+          <a:p>
+            <a:pPr lvl="2"/>
+            <a:r>
+              <a:rPr lang="zh-TW" altLang="en-US" sz="1600" dirty="0"/>
+              <a:t>在每筆新的 </a:t>
+            </a:r>
+            <a:r>
+              <a:rPr lang="en-US" altLang="zh-TW" sz="1600" dirty="0"/>
+              <a:t>Burst </a:t>
+            </a:r>
+            <a:r>
+              <a:rPr lang="zh-TW" altLang="en-US" sz="1600" dirty="0"/>
+              <a:t>開頭，</a:t>
+            </a:r>
+            <a:r>
+              <a:rPr lang="en-US" altLang="zh-TW" sz="1600" dirty="0"/>
+              <a:t> HTRANS</a:t>
+            </a:r>
+            <a:r>
+              <a:rPr lang="zh-TW" altLang="en-US" sz="1600" dirty="0"/>
+              <a:t> 需要下 </a:t>
+            </a:r>
+            <a:r>
+              <a:rPr lang="en-US" altLang="zh-TW" sz="1600" dirty="0"/>
+              <a:t>NONSEQ</a:t>
+            </a:r>
+            <a:r>
+              <a:rPr lang="zh-TW" altLang="en-US" sz="1600" dirty="0"/>
+              <a:t> 來區分不同筆 </a:t>
+            </a:r>
+            <a:r>
+              <a:rPr lang="en-US" altLang="zh-TW" sz="1600" dirty="0"/>
+              <a:t>BURST</a:t>
+            </a:r>
+          </a:p>
+        </p:txBody>
+      </p:sp>
+      <p:pic>
+        <p:nvPicPr>
+          <p:cNvPr id="5" name="圖片 4">
+            <a:extLst>
+              <a:ext uri="{FF2B5EF4-FFF2-40B4-BE49-F238E27FC236}">
+                <a16:creationId xmlns:a16="http://schemas.microsoft.com/office/drawing/2014/main" id="{7AF266A3-92DA-471B-F7FF-7115C29A070D}"/>
+              </a:ext>
+            </a:extLst>
+          </p:cNvPr>
+          <p:cNvPicPr>
+            <a:picLocks noChangeAspect="1"/>
+          </p:cNvPicPr>
+          <p:nvPr/>
+        </p:nvPicPr>
+        <p:blipFill>
+          <a:blip r:embed="rId2"/>
+          <a:stretch>
+            <a:fillRect/>
+          </a:stretch>
+        </p:blipFill>
+        <p:spPr>
+          <a:xfrm>
+            <a:off x="3194834" y="3259247"/>
+            <a:ext cx="5802331" cy="3322997"/>
+          </a:xfrm>
+          <a:prstGeom prst="rect">
+            <a:avLst/>
+          </a:prstGeom>
+          <a:ln>
+            <a:solidFill>
+              <a:schemeClr val="tx1"/>
+            </a:solidFill>
+          </a:ln>
+        </p:spPr>
+      </p:pic>
+    </p:spTree>
+    <p:extLst>
+      <p:ext uri="{BB962C8B-B14F-4D97-AF65-F5344CB8AC3E}">
+        <p14:creationId xmlns:p14="http://schemas.microsoft.com/office/powerpoint/2010/main" val="833009454"/>
       </p:ext>
     </p:extLst>
   </p:cSld>

</xml_diff>

<commit_message>
Modify: AMBA/AMBA_learning.pptx 1. Add: chapter2 AHB Burst operation 2. Add: chapter2 AHB Waited transfers
</commit_message>
<xml_diff>
--- a/AMBA/AMBA_learning.pptx
+++ b/AMBA/AMBA_learning.pptx
@@ -4,6 +4,9 @@
   <p:sldMasterIdLst>
     <p:sldMasterId id="2147483648" r:id="rId1"/>
   </p:sldMasterIdLst>
+  <p:notesMasterIdLst>
+    <p:notesMasterId r:id="rId41"/>
+  </p:notesMasterIdLst>
   <p:sldIdLst>
     <p:sldId id="256" r:id="rId2"/>
     <p:sldId id="257" r:id="rId3"/>
@@ -41,6 +44,9 @@
     <p:sldId id="301" r:id="rId35"/>
     <p:sldId id="302" r:id="rId36"/>
     <p:sldId id="303" r:id="rId37"/>
+    <p:sldId id="304" r:id="rId38"/>
+    <p:sldId id="305" r:id="rId39"/>
+    <p:sldId id="306" r:id="rId40"/>
   </p:sldIdLst>
   <p:sldSz cx="12192000" cy="6858000"/>
   <p:notesSz cx="6858000" cy="9144000"/>
@@ -147,6 +153,439 @@
 </p:presentation>
 </file>
 
+<file path=ppt/notesMasters/notesMaster1.xml><?xml version="1.0" encoding="utf-8"?>
+<p:notesMaster xmlns:a="http://schemas.openxmlformats.org/drawingml/2006/main" xmlns:r="http://schemas.openxmlformats.org/officeDocument/2006/relationships" xmlns:p="http://schemas.openxmlformats.org/presentationml/2006/main">
+  <p:cSld>
+    <p:bg>
+      <p:bgRef idx="1001">
+        <a:schemeClr val="bg1"/>
+      </p:bgRef>
+    </p:bg>
+    <p:spTree>
+      <p:nvGrpSpPr>
+        <p:cNvPr id="1" name=""/>
+        <p:cNvGrpSpPr/>
+        <p:nvPr/>
+      </p:nvGrpSpPr>
+      <p:grpSpPr>
+        <a:xfrm>
+          <a:off x="0" y="0"/>
+          <a:ext cx="0" cy="0"/>
+          <a:chOff x="0" y="0"/>
+          <a:chExt cx="0" cy="0"/>
+        </a:xfrm>
+      </p:grpSpPr>
+      <p:sp>
+        <p:nvSpPr>
+          <p:cNvPr id="2" name="頁首版面配置區 1"/>
+          <p:cNvSpPr>
+            <a:spLocks noGrp="1"/>
+          </p:cNvSpPr>
+          <p:nvPr>
+            <p:ph type="hdr" sz="quarter"/>
+          </p:nvPr>
+        </p:nvSpPr>
+        <p:spPr>
+          <a:xfrm>
+            <a:off x="0" y="0"/>
+            <a:ext cx="2971800" cy="458788"/>
+          </a:xfrm>
+          <a:prstGeom prst="rect">
+            <a:avLst/>
+          </a:prstGeom>
+        </p:spPr>
+        <p:txBody>
+          <a:bodyPr vert="horz" lIns="91440" tIns="45720" rIns="91440" bIns="45720" rtlCol="0"/>
+          <a:lstStyle>
+            <a:lvl1pPr algn="l">
+              <a:defRPr sz="1200"/>
+            </a:lvl1pPr>
+          </a:lstStyle>
+          <a:p>
+            <a:endParaRPr lang="zh-TW" altLang="en-US"/>
+          </a:p>
+        </p:txBody>
+      </p:sp>
+      <p:sp>
+        <p:nvSpPr>
+          <p:cNvPr id="3" name="日期版面配置區 2"/>
+          <p:cNvSpPr>
+            <a:spLocks noGrp="1"/>
+          </p:cNvSpPr>
+          <p:nvPr>
+            <p:ph type="dt" idx="1"/>
+          </p:nvPr>
+        </p:nvSpPr>
+        <p:spPr>
+          <a:xfrm>
+            <a:off x="3884613" y="0"/>
+            <a:ext cx="2971800" cy="458788"/>
+          </a:xfrm>
+          <a:prstGeom prst="rect">
+            <a:avLst/>
+          </a:prstGeom>
+        </p:spPr>
+        <p:txBody>
+          <a:bodyPr vert="horz" lIns="91440" tIns="45720" rIns="91440" bIns="45720" rtlCol="0"/>
+          <a:lstStyle>
+            <a:lvl1pPr algn="r">
+              <a:defRPr sz="1200"/>
+            </a:lvl1pPr>
+          </a:lstStyle>
+          <a:p>
+            <a:fld id="{942141ED-D3FF-4CAC-8C2D-24848885616A}" type="datetimeFigureOut">
+              <a:rPr lang="zh-TW" altLang="en-US" smtClean="0"/>
+              <a:t>2025/7/10</a:t>
+            </a:fld>
+            <a:endParaRPr lang="zh-TW" altLang="en-US"/>
+          </a:p>
+        </p:txBody>
+      </p:sp>
+      <p:sp>
+        <p:nvSpPr>
+          <p:cNvPr id="4" name="投影片影像版面配置區 3"/>
+          <p:cNvSpPr>
+            <a:spLocks noGrp="1" noRot="1" noChangeAspect="1"/>
+          </p:cNvSpPr>
+          <p:nvPr>
+            <p:ph type="sldImg" idx="2"/>
+          </p:nvPr>
+        </p:nvSpPr>
+        <p:spPr>
+          <a:xfrm>
+            <a:off x="685800" y="1143000"/>
+            <a:ext cx="5486400" cy="3086100"/>
+          </a:xfrm>
+          <a:prstGeom prst="rect">
+            <a:avLst/>
+          </a:prstGeom>
+          <a:noFill/>
+          <a:ln w="12700">
+            <a:solidFill>
+              <a:prstClr val="black"/>
+            </a:solidFill>
+          </a:ln>
+        </p:spPr>
+        <p:txBody>
+          <a:bodyPr vert="horz" lIns="91440" tIns="45720" rIns="91440" bIns="45720" rtlCol="0" anchor="ctr"/>
+          <a:lstStyle/>
+          <a:p>
+            <a:endParaRPr lang="zh-TW" altLang="en-US"/>
+          </a:p>
+        </p:txBody>
+      </p:sp>
+      <p:sp>
+        <p:nvSpPr>
+          <p:cNvPr id="5" name="備忘稿版面配置區 4"/>
+          <p:cNvSpPr>
+            <a:spLocks noGrp="1"/>
+          </p:cNvSpPr>
+          <p:nvPr>
+            <p:ph type="body" sz="quarter" idx="3"/>
+          </p:nvPr>
+        </p:nvSpPr>
+        <p:spPr>
+          <a:xfrm>
+            <a:off x="685800" y="4400550"/>
+            <a:ext cx="5486400" cy="3600450"/>
+          </a:xfrm>
+          <a:prstGeom prst="rect">
+            <a:avLst/>
+          </a:prstGeom>
+        </p:spPr>
+        <p:txBody>
+          <a:bodyPr vert="horz" lIns="91440" tIns="45720" rIns="91440" bIns="45720" rtlCol="0"/>
+          <a:lstStyle/>
+          <a:p>
+            <a:pPr lvl="0"/>
+            <a:r>
+              <a:rPr lang="zh-TW" altLang="en-US"/>
+              <a:t>按一下以編輯母片文字樣式</a:t>
+            </a:r>
+          </a:p>
+          <a:p>
+            <a:pPr lvl="1"/>
+            <a:r>
+              <a:rPr lang="zh-TW" altLang="en-US"/>
+              <a:t>第二層</a:t>
+            </a:r>
+          </a:p>
+          <a:p>
+            <a:pPr lvl="2"/>
+            <a:r>
+              <a:rPr lang="zh-TW" altLang="en-US"/>
+              <a:t>第三層</a:t>
+            </a:r>
+          </a:p>
+          <a:p>
+            <a:pPr lvl="3"/>
+            <a:r>
+              <a:rPr lang="zh-TW" altLang="en-US"/>
+              <a:t>第四層</a:t>
+            </a:r>
+          </a:p>
+          <a:p>
+            <a:pPr lvl="4"/>
+            <a:r>
+              <a:rPr lang="zh-TW" altLang="en-US"/>
+              <a:t>第五層</a:t>
+            </a:r>
+          </a:p>
+        </p:txBody>
+      </p:sp>
+      <p:sp>
+        <p:nvSpPr>
+          <p:cNvPr id="6" name="頁尾版面配置區 5"/>
+          <p:cNvSpPr>
+            <a:spLocks noGrp="1"/>
+          </p:cNvSpPr>
+          <p:nvPr>
+            <p:ph type="ftr" sz="quarter" idx="4"/>
+          </p:nvPr>
+        </p:nvSpPr>
+        <p:spPr>
+          <a:xfrm>
+            <a:off x="0" y="8685213"/>
+            <a:ext cx="2971800" cy="458787"/>
+          </a:xfrm>
+          <a:prstGeom prst="rect">
+            <a:avLst/>
+          </a:prstGeom>
+        </p:spPr>
+        <p:txBody>
+          <a:bodyPr vert="horz" lIns="91440" tIns="45720" rIns="91440" bIns="45720" rtlCol="0" anchor="b"/>
+          <a:lstStyle>
+            <a:lvl1pPr algn="l">
+              <a:defRPr sz="1200"/>
+            </a:lvl1pPr>
+          </a:lstStyle>
+          <a:p>
+            <a:endParaRPr lang="zh-TW" altLang="en-US"/>
+          </a:p>
+        </p:txBody>
+      </p:sp>
+      <p:sp>
+        <p:nvSpPr>
+          <p:cNvPr id="7" name="投影片編號版面配置區 6"/>
+          <p:cNvSpPr>
+            <a:spLocks noGrp="1"/>
+          </p:cNvSpPr>
+          <p:nvPr>
+            <p:ph type="sldNum" sz="quarter" idx="5"/>
+          </p:nvPr>
+        </p:nvSpPr>
+        <p:spPr>
+          <a:xfrm>
+            <a:off x="3884613" y="8685213"/>
+            <a:ext cx="2971800" cy="458787"/>
+          </a:xfrm>
+          <a:prstGeom prst="rect">
+            <a:avLst/>
+          </a:prstGeom>
+        </p:spPr>
+        <p:txBody>
+          <a:bodyPr vert="horz" lIns="91440" tIns="45720" rIns="91440" bIns="45720" rtlCol="0" anchor="b"/>
+          <a:lstStyle>
+            <a:lvl1pPr algn="r">
+              <a:defRPr sz="1200"/>
+            </a:lvl1pPr>
+          </a:lstStyle>
+          <a:p>
+            <a:fld id="{760EAB97-55A0-4DC5-9C4D-2590C5566466}" type="slidenum">
+              <a:rPr lang="zh-TW" altLang="en-US" smtClean="0"/>
+              <a:t>‹#›</a:t>
+            </a:fld>
+            <a:endParaRPr lang="zh-TW" altLang="en-US"/>
+          </a:p>
+        </p:txBody>
+      </p:sp>
+    </p:spTree>
+    <p:extLst>
+      <p:ext uri="{BB962C8B-B14F-4D97-AF65-F5344CB8AC3E}">
+        <p14:creationId xmlns:p14="http://schemas.microsoft.com/office/powerpoint/2010/main" val="2534917749"/>
+      </p:ext>
+    </p:extLst>
+  </p:cSld>
+  <p:clrMap bg1="lt1" tx1="dk1" bg2="lt2" tx2="dk2" accent1="accent1" accent2="accent2" accent3="accent3" accent4="accent4" accent5="accent5" accent6="accent6" hlink="hlink" folHlink="folHlink"/>
+  <p:notesStyle>
+    <a:lvl1pPr marL="0" algn="l" defTabSz="914400" rtl="0" eaLnBrk="1" latinLnBrk="0" hangingPunct="1">
+      <a:defRPr sz="1200" kern="1200">
+        <a:solidFill>
+          <a:schemeClr val="tx1"/>
+        </a:solidFill>
+        <a:latin typeface="+mn-lt"/>
+        <a:ea typeface="+mn-ea"/>
+        <a:cs typeface="+mn-cs"/>
+      </a:defRPr>
+    </a:lvl1pPr>
+    <a:lvl2pPr marL="457200" algn="l" defTabSz="914400" rtl="0" eaLnBrk="1" latinLnBrk="0" hangingPunct="1">
+      <a:defRPr sz="1200" kern="1200">
+        <a:solidFill>
+          <a:schemeClr val="tx1"/>
+        </a:solidFill>
+        <a:latin typeface="+mn-lt"/>
+        <a:ea typeface="+mn-ea"/>
+        <a:cs typeface="+mn-cs"/>
+      </a:defRPr>
+    </a:lvl2pPr>
+    <a:lvl3pPr marL="914400" algn="l" defTabSz="914400" rtl="0" eaLnBrk="1" latinLnBrk="0" hangingPunct="1">
+      <a:defRPr sz="1200" kern="1200">
+        <a:solidFill>
+          <a:schemeClr val="tx1"/>
+        </a:solidFill>
+        <a:latin typeface="+mn-lt"/>
+        <a:ea typeface="+mn-ea"/>
+        <a:cs typeface="+mn-cs"/>
+      </a:defRPr>
+    </a:lvl3pPr>
+    <a:lvl4pPr marL="1371600" algn="l" defTabSz="914400" rtl="0" eaLnBrk="1" latinLnBrk="0" hangingPunct="1">
+      <a:defRPr sz="1200" kern="1200">
+        <a:solidFill>
+          <a:schemeClr val="tx1"/>
+        </a:solidFill>
+        <a:latin typeface="+mn-lt"/>
+        <a:ea typeface="+mn-ea"/>
+        <a:cs typeface="+mn-cs"/>
+      </a:defRPr>
+    </a:lvl4pPr>
+    <a:lvl5pPr marL="1828800" algn="l" defTabSz="914400" rtl="0" eaLnBrk="1" latinLnBrk="0" hangingPunct="1">
+      <a:defRPr sz="1200" kern="1200">
+        <a:solidFill>
+          <a:schemeClr val="tx1"/>
+        </a:solidFill>
+        <a:latin typeface="+mn-lt"/>
+        <a:ea typeface="+mn-ea"/>
+        <a:cs typeface="+mn-cs"/>
+      </a:defRPr>
+    </a:lvl5pPr>
+    <a:lvl6pPr marL="2286000" algn="l" defTabSz="914400" rtl="0" eaLnBrk="1" latinLnBrk="0" hangingPunct="1">
+      <a:defRPr sz="1200" kern="1200">
+        <a:solidFill>
+          <a:schemeClr val="tx1"/>
+        </a:solidFill>
+        <a:latin typeface="+mn-lt"/>
+        <a:ea typeface="+mn-ea"/>
+        <a:cs typeface="+mn-cs"/>
+      </a:defRPr>
+    </a:lvl6pPr>
+    <a:lvl7pPr marL="2743200" algn="l" defTabSz="914400" rtl="0" eaLnBrk="1" latinLnBrk="0" hangingPunct="1">
+      <a:defRPr sz="1200" kern="1200">
+        <a:solidFill>
+          <a:schemeClr val="tx1"/>
+        </a:solidFill>
+        <a:latin typeface="+mn-lt"/>
+        <a:ea typeface="+mn-ea"/>
+        <a:cs typeface="+mn-cs"/>
+      </a:defRPr>
+    </a:lvl7pPr>
+    <a:lvl8pPr marL="3200400" algn="l" defTabSz="914400" rtl="0" eaLnBrk="1" latinLnBrk="0" hangingPunct="1">
+      <a:defRPr sz="1200" kern="1200">
+        <a:solidFill>
+          <a:schemeClr val="tx1"/>
+        </a:solidFill>
+        <a:latin typeface="+mn-lt"/>
+        <a:ea typeface="+mn-ea"/>
+        <a:cs typeface="+mn-cs"/>
+      </a:defRPr>
+    </a:lvl8pPr>
+    <a:lvl9pPr marL="3657600" algn="l" defTabSz="914400" rtl="0" eaLnBrk="1" latinLnBrk="0" hangingPunct="1">
+      <a:defRPr sz="1200" kern="1200">
+        <a:solidFill>
+          <a:schemeClr val="tx1"/>
+        </a:solidFill>
+        <a:latin typeface="+mn-lt"/>
+        <a:ea typeface="+mn-ea"/>
+        <a:cs typeface="+mn-cs"/>
+      </a:defRPr>
+    </a:lvl9pPr>
+  </p:notesStyle>
+</p:notesMaster>
+</file>
+
+<file path=ppt/notesSlides/notesSlide1.xml><?xml version="1.0" encoding="utf-8"?>
+<p:notes xmlns:a="http://schemas.openxmlformats.org/drawingml/2006/main" xmlns:r="http://schemas.openxmlformats.org/officeDocument/2006/relationships" xmlns:p="http://schemas.openxmlformats.org/presentationml/2006/main">
+  <p:cSld>
+    <p:spTree>
+      <p:nvGrpSpPr>
+        <p:cNvPr id="1" name=""/>
+        <p:cNvGrpSpPr/>
+        <p:nvPr/>
+      </p:nvGrpSpPr>
+      <p:grpSpPr>
+        <a:xfrm>
+          <a:off x="0" y="0"/>
+          <a:ext cx="0" cy="0"/>
+          <a:chOff x="0" y="0"/>
+          <a:chExt cx="0" cy="0"/>
+        </a:xfrm>
+      </p:grpSpPr>
+      <p:sp>
+        <p:nvSpPr>
+          <p:cNvPr id="2" name="投影片影像版面配置區 1"/>
+          <p:cNvSpPr>
+            <a:spLocks noGrp="1" noRot="1" noChangeAspect="1"/>
+          </p:cNvSpPr>
+          <p:nvPr>
+            <p:ph type="sldImg"/>
+          </p:nvPr>
+        </p:nvSpPr>
+        <p:spPr/>
+      </p:sp>
+      <p:sp>
+        <p:nvSpPr>
+          <p:cNvPr id="3" name="備忘稿版面配置區 2"/>
+          <p:cNvSpPr>
+            <a:spLocks noGrp="1"/>
+          </p:cNvSpPr>
+          <p:nvPr>
+            <p:ph type="body" idx="1"/>
+          </p:nvPr>
+        </p:nvSpPr>
+        <p:spPr/>
+        <p:txBody>
+          <a:bodyPr/>
+          <a:lstStyle/>
+          <a:p>
+            <a:endParaRPr lang="zh-TW" altLang="en-US"/>
+          </a:p>
+        </p:txBody>
+      </p:sp>
+      <p:sp>
+        <p:nvSpPr>
+          <p:cNvPr id="4" name="投影片編號版面配置區 3"/>
+          <p:cNvSpPr>
+            <a:spLocks noGrp="1"/>
+          </p:cNvSpPr>
+          <p:nvPr>
+            <p:ph type="sldNum" sz="quarter" idx="5"/>
+          </p:nvPr>
+        </p:nvSpPr>
+        <p:spPr/>
+        <p:txBody>
+          <a:bodyPr/>
+          <a:lstStyle/>
+          <a:p>
+            <a:fld id="{760EAB97-55A0-4DC5-9C4D-2590C5566466}" type="slidenum">
+              <a:rPr lang="zh-TW" altLang="en-US" smtClean="0"/>
+              <a:t>39</a:t>
+            </a:fld>
+            <a:endParaRPr lang="zh-TW" altLang="en-US"/>
+          </a:p>
+        </p:txBody>
+      </p:sp>
+    </p:spTree>
+    <p:extLst>
+      <p:ext uri="{BB962C8B-B14F-4D97-AF65-F5344CB8AC3E}">
+        <p14:creationId xmlns:p14="http://schemas.microsoft.com/office/powerpoint/2010/main" val="2741772920"/>
+      </p:ext>
+    </p:extLst>
+  </p:cSld>
+  <p:clrMapOvr>
+    <a:masterClrMapping/>
+  </p:clrMapOvr>
+</p:notes>
+</file>
+
 <file path=ppt/slideLayouts/slideLayout1.xml><?xml version="1.0" encoding="utf-8"?>
 <p:sldLayout xmlns:a="http://schemas.openxmlformats.org/drawingml/2006/main" xmlns:r="http://schemas.openxmlformats.org/officeDocument/2006/relationships" xmlns:p="http://schemas.openxmlformats.org/presentationml/2006/main" type="title" preserve="1">
   <p:cSld name="標題投影片">
@@ -294,7 +733,7 @@
           <a:p>
             <a:fld id="{277B1798-C61C-4271-ABD9-F0F48E058C48}" type="datetimeFigureOut">
               <a:rPr lang="zh-TW" altLang="en-US" smtClean="0"/>
-              <a:t>2025/7/8</a:t>
+              <a:t>2025/7/9</a:t>
             </a:fld>
             <a:endParaRPr lang="zh-TW" altLang="en-US"/>
           </a:p>
@@ -492,7 +931,7 @@
           <a:p>
             <a:fld id="{277B1798-C61C-4271-ABD9-F0F48E058C48}" type="datetimeFigureOut">
               <a:rPr lang="zh-TW" altLang="en-US" smtClean="0"/>
-              <a:t>2025/7/8</a:t>
+              <a:t>2025/7/9</a:t>
             </a:fld>
             <a:endParaRPr lang="zh-TW" altLang="en-US"/>
           </a:p>
@@ -700,7 +1139,7 @@
           <a:p>
             <a:fld id="{277B1798-C61C-4271-ABD9-F0F48E058C48}" type="datetimeFigureOut">
               <a:rPr lang="zh-TW" altLang="en-US" smtClean="0"/>
-              <a:t>2025/7/8</a:t>
+              <a:t>2025/7/9</a:t>
             </a:fld>
             <a:endParaRPr lang="zh-TW" altLang="en-US"/>
           </a:p>
@@ -898,7 +1337,7 @@
           <a:p>
             <a:fld id="{277B1798-C61C-4271-ABD9-F0F48E058C48}" type="datetimeFigureOut">
               <a:rPr lang="zh-TW" altLang="en-US" smtClean="0"/>
-              <a:t>2025/7/8</a:t>
+              <a:t>2025/7/9</a:t>
             </a:fld>
             <a:endParaRPr lang="zh-TW" altLang="en-US"/>
           </a:p>
@@ -1173,7 +1612,7 @@
           <a:p>
             <a:fld id="{277B1798-C61C-4271-ABD9-F0F48E058C48}" type="datetimeFigureOut">
               <a:rPr lang="zh-TW" altLang="en-US" smtClean="0"/>
-              <a:t>2025/7/8</a:t>
+              <a:t>2025/7/9</a:t>
             </a:fld>
             <a:endParaRPr lang="zh-TW" altLang="en-US"/>
           </a:p>
@@ -1438,7 +1877,7 @@
           <a:p>
             <a:fld id="{277B1798-C61C-4271-ABD9-F0F48E058C48}" type="datetimeFigureOut">
               <a:rPr lang="zh-TW" altLang="en-US" smtClean="0"/>
-              <a:t>2025/7/8</a:t>
+              <a:t>2025/7/9</a:t>
             </a:fld>
             <a:endParaRPr lang="zh-TW" altLang="en-US"/>
           </a:p>
@@ -1850,7 +2289,7 @@
           <a:p>
             <a:fld id="{277B1798-C61C-4271-ABD9-F0F48E058C48}" type="datetimeFigureOut">
               <a:rPr lang="zh-TW" altLang="en-US" smtClean="0"/>
-              <a:t>2025/7/8</a:t>
+              <a:t>2025/7/9</a:t>
             </a:fld>
             <a:endParaRPr lang="zh-TW" altLang="en-US"/>
           </a:p>
@@ -1991,7 +2430,7 @@
           <a:p>
             <a:fld id="{277B1798-C61C-4271-ABD9-F0F48E058C48}" type="datetimeFigureOut">
               <a:rPr lang="zh-TW" altLang="en-US" smtClean="0"/>
-              <a:t>2025/7/8</a:t>
+              <a:t>2025/7/9</a:t>
             </a:fld>
             <a:endParaRPr lang="zh-TW" altLang="en-US"/>
           </a:p>
@@ -2104,7 +2543,7 @@
           <a:p>
             <a:fld id="{277B1798-C61C-4271-ABD9-F0F48E058C48}" type="datetimeFigureOut">
               <a:rPr lang="zh-TW" altLang="en-US" smtClean="0"/>
-              <a:t>2025/7/8</a:t>
+              <a:t>2025/7/9</a:t>
             </a:fld>
             <a:endParaRPr lang="zh-TW" altLang="en-US"/>
           </a:p>
@@ -2415,7 +2854,7 @@
           <a:p>
             <a:fld id="{277B1798-C61C-4271-ABD9-F0F48E058C48}" type="datetimeFigureOut">
               <a:rPr lang="zh-TW" altLang="en-US" smtClean="0"/>
-              <a:t>2025/7/8</a:t>
+              <a:t>2025/7/9</a:t>
             </a:fld>
             <a:endParaRPr lang="zh-TW" altLang="en-US"/>
           </a:p>
@@ -2703,7 +3142,7 @@
           <a:p>
             <a:fld id="{277B1798-C61C-4271-ABD9-F0F48E058C48}" type="datetimeFigureOut">
               <a:rPr lang="zh-TW" altLang="en-US" smtClean="0"/>
-              <a:t>2025/7/8</a:t>
+              <a:t>2025/7/9</a:t>
             </a:fld>
             <a:endParaRPr lang="zh-TW" altLang="en-US"/>
           </a:p>
@@ -2944,7 +3383,7 @@
           <a:p>
             <a:fld id="{277B1798-C61C-4271-ABD9-F0F48E058C48}" type="datetimeFigureOut">
               <a:rPr lang="zh-TW" altLang="en-US" smtClean="0"/>
-              <a:t>2025/7/8</a:t>
+              <a:t>2025/7/9</a:t>
             </a:fld>
             <a:endParaRPr lang="zh-TW" altLang="en-US"/>
           </a:p>
@@ -11248,10 +11687,7 @@
             </a:r>
           </a:p>
           <a:p>
-            <a:pPr marL="914400" lvl="1" indent="-457200">
-              <a:buFont typeface="+mj-lt"/>
-              <a:buAutoNum type="arabicParenR"/>
-            </a:pPr>
+            <a:pPr lvl="1"/>
             <a:r>
               <a:rPr lang="en-US" altLang="zh-TW" sz="2000" dirty="0"/>
               <a:t>WRAP4</a:t>
@@ -11538,10 +11974,7 @@
             </a:r>
           </a:p>
           <a:p>
-            <a:pPr marL="914400" lvl="1" indent="-457200">
-              <a:buFont typeface="+mj-lt"/>
-              <a:buAutoNum type="arabicParenR"/>
-            </a:pPr>
+            <a:pPr lvl="1"/>
             <a:r>
               <a:rPr lang="en-US" altLang="zh-TW" sz="2000" dirty="0"/>
               <a:t>INCR4</a:t>
@@ -11690,10 +12123,7 @@
             </a:r>
           </a:p>
           <a:p>
-            <a:pPr marL="914400" lvl="1" indent="-457200">
-              <a:buFont typeface="+mj-lt"/>
-              <a:buAutoNum type="arabicParenR"/>
-            </a:pPr>
+            <a:pPr lvl="1"/>
             <a:r>
               <a:rPr lang="en-US" altLang="zh-TW" sz="2000" dirty="0"/>
               <a:t>WRAP8</a:t>
@@ -11980,10 +12410,7 @@
             </a:r>
           </a:p>
           <a:p>
-            <a:pPr marL="914400" lvl="1" indent="-457200">
-              <a:buFont typeface="+mj-lt"/>
-              <a:buAutoNum type="arabicParenR"/>
-            </a:pPr>
+            <a:pPr lvl="1"/>
             <a:r>
               <a:rPr lang="en-US" altLang="zh-TW" sz="2000" dirty="0"/>
               <a:t>INCR8</a:t>
@@ -12144,7 +12571,11 @@
             </a:r>
             <a:r>
               <a:rPr lang="en-US" altLang="zh-TW" dirty="0"/>
-              <a:t>Transfers (15/)</a:t>
+              <a:t>Transfers </a:t>
+            </a:r>
+            <a:r>
+              <a:rPr lang="en-US" altLang="zh-TW"/>
+              <a:t>(16/)</a:t>
             </a:r>
             <a:endParaRPr lang="zh-TW" altLang="en-US" dirty="0"/>
           </a:p>
@@ -12183,10 +12614,7 @@
             </a:r>
           </a:p>
           <a:p>
-            <a:pPr marL="914400" lvl="1" indent="-457200">
-              <a:buFont typeface="+mj-lt"/>
-              <a:buAutoNum type="arabicParenR"/>
-            </a:pPr>
+            <a:pPr lvl="1"/>
             <a:r>
               <a:rPr lang="en-US" altLang="zh-TW" sz="2000" dirty="0"/>
               <a:t>INCR</a:t>
@@ -12268,6 +12696,1156 @@
     <p:extLst>
       <p:ext uri="{BB962C8B-B14F-4D97-AF65-F5344CB8AC3E}">
         <p14:creationId xmlns:p14="http://schemas.microsoft.com/office/powerpoint/2010/main" val="833009454"/>
+      </p:ext>
+    </p:extLst>
+  </p:cSld>
+  <p:clrMapOvr>
+    <a:masterClrMapping/>
+  </p:clrMapOvr>
+</p:sld>
+</file>
+
+<file path=ppt/slides/slide37.xml><?xml version="1.0" encoding="utf-8"?>
+<p:sld xmlns:a="http://schemas.openxmlformats.org/drawingml/2006/main" xmlns:r="http://schemas.openxmlformats.org/officeDocument/2006/relationships" xmlns:p="http://schemas.openxmlformats.org/presentationml/2006/main">
+  <p:cSld>
+    <p:spTree>
+      <p:nvGrpSpPr>
+        <p:cNvPr id="1" name="">
+          <a:extLst>
+            <a:ext uri="{FF2B5EF4-FFF2-40B4-BE49-F238E27FC236}">
+              <a16:creationId xmlns:a16="http://schemas.microsoft.com/office/drawing/2014/main" id="{F18FDD0B-D283-C70C-5B63-BE21B48BA152}"/>
+            </a:ext>
+          </a:extLst>
+        </p:cNvPr>
+        <p:cNvGrpSpPr/>
+        <p:nvPr/>
+      </p:nvGrpSpPr>
+      <p:grpSpPr>
+        <a:xfrm>
+          <a:off x="0" y="0"/>
+          <a:ext cx="0" cy="0"/>
+          <a:chOff x="0" y="0"/>
+          <a:chExt cx="0" cy="0"/>
+        </a:xfrm>
+      </p:grpSpPr>
+      <p:sp>
+        <p:nvSpPr>
+          <p:cNvPr id="2" name="標題 1">
+            <a:extLst>
+              <a:ext uri="{FF2B5EF4-FFF2-40B4-BE49-F238E27FC236}">
+                <a16:creationId xmlns:a16="http://schemas.microsoft.com/office/drawing/2014/main" id="{EF4F4C65-1BA1-F1B8-EDE6-0425270B3EB2}"/>
+              </a:ext>
+            </a:extLst>
+          </p:cNvPr>
+          <p:cNvSpPr>
+            <a:spLocks noGrp="1"/>
+          </p:cNvSpPr>
+          <p:nvPr>
+            <p:ph type="title"/>
+          </p:nvPr>
+        </p:nvSpPr>
+        <p:spPr/>
+        <p:txBody>
+          <a:bodyPr/>
+          <a:lstStyle/>
+          <a:p>
+            <a:r>
+              <a:rPr lang="en-US" altLang="zh-TW" dirty="0"/>
+              <a:t>AHB</a:t>
+            </a:r>
+            <a:r>
+              <a:rPr lang="zh-TW" altLang="en-US" dirty="0"/>
+              <a:t> </a:t>
+            </a:r>
+            <a:r>
+              <a:rPr lang="en-US" altLang="zh-TW" dirty="0"/>
+              <a:t>Transfers (17/)</a:t>
+            </a:r>
+            <a:endParaRPr lang="zh-TW" altLang="en-US" dirty="0"/>
+          </a:p>
+        </p:txBody>
+      </p:sp>
+      <p:sp>
+        <p:nvSpPr>
+          <p:cNvPr id="3" name="內容版面配置區 2">
+            <a:extLst>
+              <a:ext uri="{FF2B5EF4-FFF2-40B4-BE49-F238E27FC236}">
+                <a16:creationId xmlns:a16="http://schemas.microsoft.com/office/drawing/2014/main" id="{707541CB-00C5-4785-B9A5-B87AC4092503}"/>
+              </a:ext>
+            </a:extLst>
+          </p:cNvPr>
+          <p:cNvSpPr>
+            <a:spLocks noGrp="1"/>
+          </p:cNvSpPr>
+          <p:nvPr>
+            <p:ph idx="1"/>
+          </p:nvPr>
+        </p:nvSpPr>
+        <p:spPr/>
+        <p:txBody>
+          <a:bodyPr>
+            <a:normAutofit/>
+          </a:bodyPr>
+          <a:lstStyle/>
+          <a:p>
+            <a:pPr marL="514350" indent="-514350">
+              <a:buFont typeface="+mj-lt"/>
+              <a:buAutoNum type="arabicPeriod" startAt="5"/>
+            </a:pPr>
+            <a:r>
+              <a:rPr lang="en-US" altLang="zh-TW" dirty="0"/>
+              <a:t>Burst operation</a:t>
+            </a:r>
+          </a:p>
+          <a:p>
+            <a:pPr lvl="1"/>
+            <a:r>
+              <a:rPr lang="en-US" altLang="zh-TW" sz="2000" dirty="0"/>
+              <a:t>Burst termination after a BUSY transfer</a:t>
+            </a:r>
+          </a:p>
+          <a:p>
+            <a:pPr lvl="2"/>
+            <a:r>
+              <a:rPr lang="zh-TW" altLang="en-US" sz="1400" dirty="0"/>
+              <a:t>當</a:t>
+            </a:r>
+            <a:r>
+              <a:rPr lang="en-US" altLang="zh-TW" sz="1400" dirty="0"/>
+              <a:t>Burst</a:t>
+            </a:r>
+            <a:r>
+              <a:rPr lang="zh-TW" altLang="en-US" sz="1400" dirty="0"/>
+              <a:t>開始後，若</a:t>
+            </a:r>
+            <a:r>
+              <a:rPr lang="en-US" altLang="zh-TW" sz="1400" dirty="0"/>
+              <a:t>master</a:t>
+            </a:r>
+            <a:r>
+              <a:rPr lang="zh-TW" altLang="en-US" sz="1400" dirty="0"/>
+              <a:t>繼續下一筆傳輸前需要更多時間，則可以插入 </a:t>
+            </a:r>
+            <a:r>
+              <a:rPr lang="en-US" altLang="zh-TW" sz="1400" dirty="0"/>
+              <a:t>BUSY </a:t>
+            </a:r>
+            <a:r>
+              <a:rPr lang="zh-TW" altLang="en-US" sz="1400" dirty="0"/>
+              <a:t>傳輸。</a:t>
+            </a:r>
+            <a:endParaRPr lang="en-US" altLang="zh-TW" sz="1400" dirty="0"/>
+          </a:p>
+          <a:p>
+            <a:pPr lvl="2"/>
+            <a:r>
+              <a:rPr lang="zh-TW" altLang="en-US" sz="1400" dirty="0"/>
+              <a:t>在 不定長度</a:t>
+            </a:r>
+            <a:r>
+              <a:rPr lang="en-US" altLang="zh-TW" sz="1400" dirty="0"/>
+              <a:t>Burst (INCR)</a:t>
+            </a:r>
+            <a:r>
+              <a:rPr lang="zh-TW" altLang="en-US" sz="1400" dirty="0"/>
+              <a:t>中，</a:t>
+            </a:r>
+            <a:r>
+              <a:rPr lang="en-US" altLang="zh-TW" sz="1400" dirty="0"/>
+              <a:t>master</a:t>
+            </a:r>
+            <a:r>
+              <a:rPr lang="zh-TW" altLang="en-US" sz="1400" dirty="0"/>
+              <a:t>可能插入 </a:t>
+            </a:r>
+            <a:r>
+              <a:rPr lang="en-US" altLang="zh-TW" sz="1400" dirty="0"/>
+              <a:t>BUSY </a:t>
+            </a:r>
+            <a:r>
+              <a:rPr lang="zh-TW" altLang="en-US" sz="1400" dirty="0"/>
+              <a:t>傳輸，然後決定不再進行後續資料傳輸。</a:t>
+            </a:r>
+            <a:br>
+              <a:rPr lang="en-US" altLang="zh-TW" sz="1400" dirty="0"/>
+            </a:br>
+            <a:r>
+              <a:rPr lang="zh-TW" altLang="en-US" sz="1400" dirty="0"/>
+              <a:t>在這種情況下，主裝置可以接著發出 </a:t>
+            </a:r>
+            <a:r>
+              <a:rPr lang="en-US" altLang="zh-TW" sz="1400" dirty="0"/>
+              <a:t>NONSEQ </a:t>
+            </a:r>
+            <a:r>
+              <a:rPr lang="zh-TW" altLang="en-US" sz="1400" dirty="0"/>
+              <a:t>或 </a:t>
+            </a:r>
+            <a:r>
+              <a:rPr lang="en-US" altLang="zh-TW" sz="1400" dirty="0"/>
+              <a:t>IDLE </a:t>
+            </a:r>
+            <a:r>
+              <a:rPr lang="zh-TW" altLang="en-US" sz="1400" dirty="0"/>
+              <a:t>傳輸，藉此有效地終止該不定長度突發傳輸。</a:t>
+            </a:r>
+            <a:endParaRPr lang="en-US" altLang="zh-TW" sz="1400" dirty="0"/>
+          </a:p>
+          <a:p>
+            <a:pPr lvl="2"/>
+            <a:r>
+              <a:rPr lang="zh-TW" altLang="en-US" sz="1400" dirty="0"/>
+              <a:t>禁止</a:t>
+            </a:r>
+            <a:r>
+              <a:rPr lang="en-US" altLang="zh-TW" sz="1400" dirty="0"/>
+              <a:t>master</a:t>
+            </a:r>
+            <a:r>
+              <a:rPr lang="zh-TW" altLang="en-US" sz="1400" dirty="0"/>
+              <a:t>在下列固定長度突發傳輸結尾時使用 </a:t>
+            </a:r>
+            <a:r>
+              <a:rPr lang="en-US" altLang="zh-TW" sz="1400" dirty="0"/>
+              <a:t>BUSY </a:t>
+            </a:r>
+            <a:r>
+              <a:rPr lang="zh-TW" altLang="en-US" sz="1400" dirty="0"/>
+              <a:t>傳輸</a:t>
+            </a:r>
+            <a:endParaRPr lang="en-US" altLang="zh-TW" sz="1400" dirty="0"/>
+          </a:p>
+          <a:p>
+            <a:pPr lvl="3"/>
+            <a:r>
+              <a:rPr lang="zh-TW" altLang="en-US" sz="1050" dirty="0"/>
+              <a:t>遞增式：</a:t>
+            </a:r>
+            <a:r>
+              <a:rPr lang="en-US" altLang="zh-TW" sz="1050" dirty="0"/>
+              <a:t>INCR4</a:t>
+            </a:r>
+            <a:r>
+              <a:rPr lang="zh-TW" altLang="en-US" sz="1050" dirty="0"/>
+              <a:t>、</a:t>
+            </a:r>
+            <a:r>
+              <a:rPr lang="en-US" altLang="zh-TW" sz="1050" dirty="0"/>
+              <a:t>INCR8</a:t>
+            </a:r>
+            <a:r>
+              <a:rPr lang="zh-TW" altLang="en-US" sz="1050" dirty="0"/>
+              <a:t>、</a:t>
+            </a:r>
+            <a:r>
+              <a:rPr lang="en-US" altLang="zh-TW" sz="1050" dirty="0"/>
+              <a:t>INCR16</a:t>
+            </a:r>
+          </a:p>
+          <a:p>
+            <a:pPr lvl="3"/>
+            <a:r>
+              <a:rPr lang="zh-TW" altLang="en-US" sz="1050" dirty="0"/>
+              <a:t>包裝式：</a:t>
+            </a:r>
+            <a:r>
+              <a:rPr lang="en-US" altLang="zh-TW" sz="1050" dirty="0"/>
+              <a:t>WRAP4</a:t>
+            </a:r>
+            <a:r>
+              <a:rPr lang="zh-TW" altLang="en-US" sz="1050" dirty="0"/>
+              <a:t>、</a:t>
+            </a:r>
+            <a:r>
+              <a:rPr lang="en-US" altLang="zh-TW" sz="1050" dirty="0"/>
+              <a:t>WRAP8</a:t>
+            </a:r>
+            <a:r>
+              <a:rPr lang="zh-TW" altLang="en-US" sz="1050" dirty="0"/>
+              <a:t>、</a:t>
+            </a:r>
+            <a:r>
+              <a:rPr lang="en-US" altLang="zh-TW" sz="1050" dirty="0"/>
+              <a:t>WRAP16</a:t>
+            </a:r>
+          </a:p>
+          <a:p>
+            <a:pPr lvl="3"/>
+            <a:r>
+              <a:rPr lang="zh-TW" altLang="en-US" sz="1050" dirty="0">
+                <a:solidFill>
+                  <a:srgbClr val="FF0000"/>
+                </a:solidFill>
+              </a:rPr>
+              <a:t>這些固定長度的</a:t>
+            </a:r>
+            <a:r>
+              <a:rPr lang="en-US" altLang="zh-TW" sz="1050" dirty="0">
+                <a:solidFill>
+                  <a:srgbClr val="FF0000"/>
+                </a:solidFill>
+              </a:rPr>
+              <a:t>Burst</a:t>
+            </a:r>
+            <a:r>
+              <a:rPr lang="zh-TW" altLang="en-US" sz="1050" dirty="0">
+                <a:solidFill>
+                  <a:srgbClr val="FF0000"/>
+                </a:solidFill>
+              </a:rPr>
+              <a:t>必須以 </a:t>
+            </a:r>
+            <a:r>
+              <a:rPr lang="en-US" altLang="zh-TW" sz="1050" dirty="0">
+                <a:solidFill>
+                  <a:srgbClr val="FF0000"/>
+                </a:solidFill>
+              </a:rPr>
+              <a:t>SEQ </a:t>
+            </a:r>
+            <a:r>
+              <a:rPr lang="zh-TW" altLang="en-US" sz="1050" dirty="0">
+                <a:solidFill>
+                  <a:srgbClr val="FF0000"/>
+                </a:solidFill>
+              </a:rPr>
+              <a:t>傳輸作為結束</a:t>
+            </a:r>
+            <a:endParaRPr lang="en-US" altLang="zh-TW" sz="1050" dirty="0">
+              <a:solidFill>
+                <a:srgbClr val="FF0000"/>
+              </a:solidFill>
+            </a:endParaRPr>
+          </a:p>
+          <a:p>
+            <a:pPr lvl="3"/>
+            <a:r>
+              <a:rPr lang="zh-TW" altLang="en-US" sz="1050" dirty="0"/>
+              <a:t>此外，在 </a:t>
+            </a:r>
+            <a:r>
+              <a:rPr lang="en-US" altLang="zh-TW" sz="1050" dirty="0"/>
+              <a:t>SINGLE Burst</a:t>
+            </a:r>
+            <a:r>
+              <a:rPr lang="zh-TW" altLang="en-US" sz="1050" dirty="0"/>
+              <a:t>之後，</a:t>
+            </a:r>
+            <a:r>
+              <a:rPr lang="en-US" altLang="zh-TW" sz="1050" dirty="0"/>
+              <a:t>master</a:t>
+            </a:r>
+            <a:r>
+              <a:rPr lang="zh-TW" altLang="en-US" sz="1050" dirty="0"/>
+              <a:t>不得立即發出 </a:t>
+            </a:r>
+            <a:r>
+              <a:rPr lang="en-US" altLang="zh-TW" sz="1050" dirty="0"/>
+              <a:t>BUSY </a:t>
+            </a:r>
+            <a:r>
+              <a:rPr lang="zh-TW" altLang="en-US" sz="1050" dirty="0"/>
+              <a:t>傳輸，而應該接著發出 </a:t>
+            </a:r>
+            <a:r>
+              <a:rPr lang="en-US" altLang="zh-TW" sz="1050" dirty="0"/>
+              <a:t>IDLE </a:t>
+            </a:r>
+            <a:r>
+              <a:rPr lang="zh-TW" altLang="en-US" sz="1050" dirty="0"/>
+              <a:t>或 </a:t>
+            </a:r>
+            <a:r>
+              <a:rPr lang="en-US" altLang="zh-TW" sz="1050" dirty="0"/>
+              <a:t>NONSEQ </a:t>
+            </a:r>
+            <a:r>
+              <a:rPr lang="zh-TW" altLang="en-US" sz="1050" dirty="0"/>
+              <a:t>傳輸</a:t>
+            </a:r>
+            <a:endParaRPr lang="en-US" altLang="zh-TW" sz="1050" dirty="0"/>
+          </a:p>
+        </p:txBody>
+      </p:sp>
+    </p:spTree>
+    <p:extLst>
+      <p:ext uri="{BB962C8B-B14F-4D97-AF65-F5344CB8AC3E}">
+        <p14:creationId xmlns:p14="http://schemas.microsoft.com/office/powerpoint/2010/main" val="3306894282"/>
+      </p:ext>
+    </p:extLst>
+  </p:cSld>
+  <p:clrMapOvr>
+    <a:masterClrMapping/>
+  </p:clrMapOvr>
+</p:sld>
+</file>
+
+<file path=ppt/slides/slide38.xml><?xml version="1.0" encoding="utf-8"?>
+<p:sld xmlns:a="http://schemas.openxmlformats.org/drawingml/2006/main" xmlns:r="http://schemas.openxmlformats.org/officeDocument/2006/relationships" xmlns:p="http://schemas.openxmlformats.org/presentationml/2006/main">
+  <p:cSld>
+    <p:spTree>
+      <p:nvGrpSpPr>
+        <p:cNvPr id="1" name="">
+          <a:extLst>
+            <a:ext uri="{FF2B5EF4-FFF2-40B4-BE49-F238E27FC236}">
+              <a16:creationId xmlns:a16="http://schemas.microsoft.com/office/drawing/2014/main" id="{32CDF031-AF80-3964-363D-11915D0C7DC1}"/>
+            </a:ext>
+          </a:extLst>
+        </p:cNvPr>
+        <p:cNvGrpSpPr/>
+        <p:nvPr/>
+      </p:nvGrpSpPr>
+      <p:grpSpPr>
+        <a:xfrm>
+          <a:off x="0" y="0"/>
+          <a:ext cx="0" cy="0"/>
+          <a:chOff x="0" y="0"/>
+          <a:chExt cx="0" cy="0"/>
+        </a:xfrm>
+      </p:grpSpPr>
+      <p:sp>
+        <p:nvSpPr>
+          <p:cNvPr id="2" name="標題 1">
+            <a:extLst>
+              <a:ext uri="{FF2B5EF4-FFF2-40B4-BE49-F238E27FC236}">
+                <a16:creationId xmlns:a16="http://schemas.microsoft.com/office/drawing/2014/main" id="{A1D40CE0-6E73-514F-3375-4DCCA6A9F66F}"/>
+              </a:ext>
+            </a:extLst>
+          </p:cNvPr>
+          <p:cNvSpPr>
+            <a:spLocks noGrp="1"/>
+          </p:cNvSpPr>
+          <p:nvPr>
+            <p:ph type="title"/>
+          </p:nvPr>
+        </p:nvSpPr>
+        <p:spPr/>
+        <p:txBody>
+          <a:bodyPr/>
+          <a:lstStyle/>
+          <a:p>
+            <a:r>
+              <a:rPr lang="en-US" altLang="zh-TW" dirty="0"/>
+              <a:t>AHB</a:t>
+            </a:r>
+            <a:r>
+              <a:rPr lang="zh-TW" altLang="en-US" dirty="0"/>
+              <a:t> </a:t>
+            </a:r>
+            <a:r>
+              <a:rPr lang="en-US" altLang="zh-TW" dirty="0"/>
+              <a:t>Transfers (18/)</a:t>
+            </a:r>
+            <a:endParaRPr lang="zh-TW" altLang="en-US" dirty="0"/>
+          </a:p>
+        </p:txBody>
+      </p:sp>
+      <p:sp>
+        <p:nvSpPr>
+          <p:cNvPr id="3" name="內容版面配置區 2">
+            <a:extLst>
+              <a:ext uri="{FF2B5EF4-FFF2-40B4-BE49-F238E27FC236}">
+                <a16:creationId xmlns:a16="http://schemas.microsoft.com/office/drawing/2014/main" id="{3B014CF1-65A1-D452-463F-90E0D6053139}"/>
+              </a:ext>
+            </a:extLst>
+          </p:cNvPr>
+          <p:cNvSpPr>
+            <a:spLocks noGrp="1"/>
+          </p:cNvSpPr>
+          <p:nvPr>
+            <p:ph idx="1"/>
+          </p:nvPr>
+        </p:nvSpPr>
+        <p:spPr/>
+        <p:txBody>
+          <a:bodyPr>
+            <a:normAutofit/>
+          </a:bodyPr>
+          <a:lstStyle/>
+          <a:p>
+            <a:pPr marL="514350" indent="-514350">
+              <a:buFont typeface="+mj-lt"/>
+              <a:buAutoNum type="arabicPeriod" startAt="5"/>
+            </a:pPr>
+            <a:r>
+              <a:rPr lang="en-US" altLang="zh-TW" dirty="0"/>
+              <a:t>Burst operation</a:t>
+            </a:r>
+          </a:p>
+          <a:p>
+            <a:pPr lvl="1"/>
+            <a:r>
+              <a:rPr lang="en-US" altLang="zh-TW" sz="2000" dirty="0"/>
+              <a:t>Early burst termination</a:t>
+            </a:r>
+          </a:p>
+          <a:p>
+            <a:pPr lvl="2"/>
+            <a:r>
+              <a:rPr lang="zh-TW" altLang="en-US" sz="1400" dirty="0"/>
+              <a:t>如果</a:t>
+            </a:r>
+            <a:r>
+              <a:rPr lang="en-US" altLang="zh-TW" sz="1400" dirty="0"/>
+              <a:t>slave</a:t>
+            </a:r>
+            <a:r>
+              <a:rPr lang="zh-TW" altLang="en-US" sz="1400" dirty="0"/>
+              <a:t>回傳 </a:t>
+            </a:r>
+            <a:r>
+              <a:rPr lang="en-US" altLang="zh-TW" sz="1400" dirty="0"/>
+              <a:t>ERROR </a:t>
+            </a:r>
+            <a:r>
+              <a:rPr lang="zh-TW" altLang="en-US" sz="1400" dirty="0"/>
+              <a:t>回應，</a:t>
+            </a:r>
+            <a:r>
+              <a:rPr lang="en-US" altLang="zh-TW" sz="1400" dirty="0"/>
+              <a:t>master</a:t>
+            </a:r>
+            <a:r>
+              <a:rPr lang="zh-TW" altLang="en-US" sz="1400" dirty="0"/>
+              <a:t>可以選擇取消該</a:t>
+            </a:r>
+            <a:r>
+              <a:rPr lang="en-US" altLang="zh-TW" sz="1400" dirty="0"/>
+              <a:t>Burst</a:t>
+            </a:r>
+            <a:r>
+              <a:rPr lang="zh-TW" altLang="en-US" sz="1400" dirty="0"/>
+              <a:t>中剩下的傳輸筆數。</a:t>
+            </a:r>
+            <a:endParaRPr lang="en-US" altLang="zh-TW" sz="1400" dirty="0"/>
+          </a:p>
+          <a:p>
+            <a:pPr lvl="2"/>
+            <a:r>
+              <a:rPr lang="zh-TW" altLang="en-US" sz="1400" dirty="0"/>
+              <a:t>但這不是強制要求，</a:t>
+            </a:r>
+            <a:r>
+              <a:rPr lang="en-US" altLang="zh-TW" sz="1400" dirty="0"/>
+              <a:t> master</a:t>
+            </a:r>
+            <a:r>
+              <a:rPr lang="zh-TW" altLang="en-US" sz="1400" dirty="0"/>
+              <a:t>也可以選擇繼續執行剩下的傳輸。</a:t>
+            </a:r>
+            <a:endParaRPr lang="en-US" altLang="zh-TW" sz="1400" dirty="0"/>
+          </a:p>
+          <a:p>
+            <a:pPr lvl="2"/>
+            <a:r>
+              <a:rPr lang="zh-TW" altLang="en-US" sz="1400" dirty="0"/>
+              <a:t>若</a:t>
+            </a:r>
+            <a:r>
+              <a:rPr lang="en-US" altLang="zh-TW" sz="1400" dirty="0"/>
+              <a:t>master</a:t>
+            </a:r>
+            <a:r>
+              <a:rPr lang="zh-TW" altLang="en-US" sz="1400" dirty="0"/>
+              <a:t>未完成該次</a:t>
+            </a:r>
+            <a:r>
+              <a:rPr lang="en-US" altLang="zh-TW" sz="1400" dirty="0"/>
+              <a:t>Burst</a:t>
+            </a:r>
+            <a:r>
+              <a:rPr lang="zh-TW" altLang="en-US" sz="1400" dirty="0"/>
+              <a:t>，也不需要在下次存取該</a:t>
+            </a:r>
+            <a:r>
+              <a:rPr lang="en-US" altLang="zh-TW" sz="1400" dirty="0"/>
+              <a:t>slave</a:t>
+            </a:r>
+            <a:r>
+              <a:rPr lang="zh-TW" altLang="en-US" sz="1400" dirty="0"/>
+              <a:t>時重新建立或補齊該</a:t>
+            </a:r>
+            <a:r>
+              <a:rPr lang="en-US" altLang="zh-TW" sz="1400" dirty="0"/>
+              <a:t>Burst </a:t>
+            </a:r>
+            <a:r>
+              <a:rPr lang="zh-TW" altLang="en-US" sz="1400" dirty="0"/>
+              <a:t>。</a:t>
+            </a:r>
+            <a:br>
+              <a:rPr lang="en-US" altLang="zh-TW" sz="1400" dirty="0"/>
+            </a:br>
+            <a:r>
+              <a:rPr lang="en-US" altLang="zh-TW" sz="1200" dirty="0"/>
+              <a:t>(ex:</a:t>
+            </a:r>
+            <a:r>
+              <a:rPr lang="zh-TW" altLang="en-US" sz="1200" dirty="0"/>
+              <a:t> 如果</a:t>
+            </a:r>
+            <a:r>
+              <a:rPr lang="en-US" altLang="zh-TW" sz="1200" dirty="0"/>
+              <a:t>master</a:t>
+            </a:r>
+            <a:r>
+              <a:rPr lang="zh-TW" altLang="en-US" sz="1200" dirty="0"/>
+              <a:t>只完成了一個 </a:t>
+            </a:r>
+            <a:r>
+              <a:rPr lang="en-US" altLang="zh-TW" sz="1200" dirty="0"/>
+              <a:t>8 </a:t>
+            </a:r>
+            <a:r>
+              <a:rPr lang="zh-TW" altLang="en-US" sz="1200" dirty="0"/>
+              <a:t>筆</a:t>
+            </a:r>
+            <a:r>
+              <a:rPr lang="en-US" altLang="zh-TW" sz="1200" dirty="0"/>
+              <a:t>Burst</a:t>
+            </a:r>
+            <a:r>
+              <a:rPr lang="zh-TW" altLang="en-US" sz="1200" dirty="0"/>
+              <a:t>中的前三筆，那麼在下次對該</a:t>
+            </a:r>
+            <a:r>
+              <a:rPr lang="en-US" altLang="zh-TW" sz="1200" dirty="0"/>
+              <a:t>slave</a:t>
+            </a:r>
+            <a:r>
+              <a:rPr lang="zh-TW" altLang="en-US" sz="1200" dirty="0"/>
+              <a:t>進行存取時，不需要補完剩下的五筆傳輸</a:t>
+            </a:r>
+            <a:r>
+              <a:rPr lang="en-US" altLang="zh-TW" sz="1200" dirty="0"/>
+              <a:t>)</a:t>
+            </a:r>
+          </a:p>
+          <a:p>
+            <a:pPr lvl="3"/>
+            <a:endParaRPr lang="en-US" altLang="zh-TW" sz="1050" dirty="0"/>
+          </a:p>
+        </p:txBody>
+      </p:sp>
+      <p:pic>
+        <p:nvPicPr>
+          <p:cNvPr id="5" name="圖片 4">
+            <a:extLst>
+              <a:ext uri="{FF2B5EF4-FFF2-40B4-BE49-F238E27FC236}">
+                <a16:creationId xmlns:a16="http://schemas.microsoft.com/office/drawing/2014/main" id="{F11873E8-EACA-4079-C56A-C2CBCAD9C1F7}"/>
+              </a:ext>
+            </a:extLst>
+          </p:cNvPr>
+          <p:cNvPicPr>
+            <a:picLocks noChangeAspect="1"/>
+          </p:cNvPicPr>
+          <p:nvPr/>
+        </p:nvPicPr>
+        <p:blipFill>
+          <a:blip r:embed="rId2"/>
+          <a:stretch>
+            <a:fillRect/>
+          </a:stretch>
+        </p:blipFill>
+        <p:spPr>
+          <a:xfrm>
+            <a:off x="2313019" y="3985466"/>
+            <a:ext cx="7565962" cy="2507409"/>
+          </a:xfrm>
+          <a:prstGeom prst="rect">
+            <a:avLst/>
+          </a:prstGeom>
+          <a:ln>
+            <a:solidFill>
+              <a:schemeClr val="tx1"/>
+            </a:solidFill>
+          </a:ln>
+        </p:spPr>
+      </p:pic>
+      <p:sp>
+        <p:nvSpPr>
+          <p:cNvPr id="6" name="橢圓 5">
+            <a:extLst>
+              <a:ext uri="{FF2B5EF4-FFF2-40B4-BE49-F238E27FC236}">
+                <a16:creationId xmlns:a16="http://schemas.microsoft.com/office/drawing/2014/main" id="{1FCD7786-E51D-B48A-1DFE-7FD5B0E49BA7}"/>
+              </a:ext>
+            </a:extLst>
+          </p:cNvPr>
+          <p:cNvSpPr/>
+          <p:nvPr/>
+        </p:nvSpPr>
+        <p:spPr>
+          <a:xfrm>
+            <a:off x="6545655" y="6080266"/>
+            <a:ext cx="2190939" cy="463267"/>
+          </a:xfrm>
+          <a:prstGeom prst="ellipse">
+            <a:avLst/>
+          </a:prstGeom>
+          <a:noFill/>
+          <a:ln w="28575">
+            <a:solidFill>
+              <a:srgbClr val="FF0000"/>
+            </a:solidFill>
+          </a:ln>
+        </p:spPr>
+        <p:style>
+          <a:lnRef idx="2">
+            <a:schemeClr val="accent1">
+              <a:shade val="15000"/>
+            </a:schemeClr>
+          </a:lnRef>
+          <a:fillRef idx="1">
+            <a:schemeClr val="accent1"/>
+          </a:fillRef>
+          <a:effectRef idx="0">
+            <a:schemeClr val="accent1"/>
+          </a:effectRef>
+          <a:fontRef idx="minor">
+            <a:schemeClr val="lt1"/>
+          </a:fontRef>
+        </p:style>
+        <p:txBody>
+          <a:bodyPr rtlCol="0" anchor="ctr"/>
+          <a:lstStyle/>
+          <a:p>
+            <a:pPr algn="ctr"/>
+            <a:endParaRPr lang="zh-TW" altLang="en-US"/>
+          </a:p>
+        </p:txBody>
+      </p:sp>
+      <p:cxnSp>
+        <p:nvCxnSpPr>
+          <p:cNvPr id="8" name="直線單箭頭接點 7">
+            <a:extLst>
+              <a:ext uri="{FF2B5EF4-FFF2-40B4-BE49-F238E27FC236}">
+                <a16:creationId xmlns:a16="http://schemas.microsoft.com/office/drawing/2014/main" id="{0B3690B5-CAD4-FAEE-D108-99028201F858}"/>
+              </a:ext>
+            </a:extLst>
+          </p:cNvPr>
+          <p:cNvCxnSpPr>
+            <a:cxnSpLocks/>
+            <a:stCxn id="6" idx="6"/>
+          </p:cNvCxnSpPr>
+          <p:nvPr/>
+        </p:nvCxnSpPr>
+        <p:spPr>
+          <a:xfrm flipV="1">
+            <a:off x="8736594" y="5408582"/>
+            <a:ext cx="1484768" cy="903318"/>
+          </a:xfrm>
+          <a:prstGeom prst="straightConnector1">
+            <a:avLst/>
+          </a:prstGeom>
+          <a:ln>
+            <a:tailEnd type="triangle"/>
+          </a:ln>
+        </p:spPr>
+        <p:style>
+          <a:lnRef idx="2">
+            <a:schemeClr val="accent1"/>
+          </a:lnRef>
+          <a:fillRef idx="0">
+            <a:schemeClr val="accent1"/>
+          </a:fillRef>
+          <a:effectRef idx="1">
+            <a:schemeClr val="accent1"/>
+          </a:effectRef>
+          <a:fontRef idx="minor">
+            <a:schemeClr val="tx1"/>
+          </a:fontRef>
+        </p:style>
+      </p:cxnSp>
+      <p:sp>
+        <p:nvSpPr>
+          <p:cNvPr id="10" name="文字方塊 9">
+            <a:extLst>
+              <a:ext uri="{FF2B5EF4-FFF2-40B4-BE49-F238E27FC236}">
+                <a16:creationId xmlns:a16="http://schemas.microsoft.com/office/drawing/2014/main" id="{2D39E016-940B-E896-EE5F-8C364B4B6FEA}"/>
+              </a:ext>
+            </a:extLst>
+          </p:cNvPr>
+          <p:cNvSpPr txBox="1"/>
+          <p:nvPr/>
+        </p:nvSpPr>
+        <p:spPr>
+          <a:xfrm>
+            <a:off x="9967865" y="5131583"/>
+            <a:ext cx="2224136" cy="276999"/>
+          </a:xfrm>
+          <a:prstGeom prst="rect">
+            <a:avLst/>
+          </a:prstGeom>
+          <a:noFill/>
+          <a:ln>
+            <a:solidFill>
+              <a:schemeClr val="tx1"/>
+            </a:solidFill>
+          </a:ln>
+        </p:spPr>
+        <p:txBody>
+          <a:bodyPr wrap="square" rtlCol="0">
+            <a:spAutoFit/>
+          </a:bodyPr>
+          <a:lstStyle/>
+          <a:p>
+            <a:r>
+              <a:rPr lang="en-US" altLang="zh-TW" sz="1200" dirty="0"/>
+              <a:t>Slave </a:t>
+            </a:r>
+            <a:r>
+              <a:rPr lang="zh-TW" altLang="en-US" sz="1200" dirty="0"/>
+              <a:t>發 </a:t>
+            </a:r>
+            <a:r>
+              <a:rPr lang="en-US" altLang="zh-TW" sz="1200" dirty="0"/>
+              <a:t>Error </a:t>
+            </a:r>
+            <a:r>
+              <a:rPr lang="zh-TW" altLang="en-US" sz="1200" dirty="0"/>
+              <a:t>必須為兩個周期</a:t>
+            </a:r>
+          </a:p>
+        </p:txBody>
+      </p:sp>
+    </p:spTree>
+    <p:extLst>
+      <p:ext uri="{BB962C8B-B14F-4D97-AF65-F5344CB8AC3E}">
+        <p14:creationId xmlns:p14="http://schemas.microsoft.com/office/powerpoint/2010/main" val="3424417597"/>
+      </p:ext>
+    </p:extLst>
+  </p:cSld>
+  <p:clrMapOvr>
+    <a:masterClrMapping/>
+  </p:clrMapOvr>
+</p:sld>
+</file>
+
+<file path=ppt/slides/slide39.xml><?xml version="1.0" encoding="utf-8"?>
+<p:sld xmlns:a="http://schemas.openxmlformats.org/drawingml/2006/main" xmlns:r="http://schemas.openxmlformats.org/officeDocument/2006/relationships" xmlns:p="http://schemas.openxmlformats.org/presentationml/2006/main">
+  <p:cSld>
+    <p:spTree>
+      <p:nvGrpSpPr>
+        <p:cNvPr id="1" name="">
+          <a:extLst>
+            <a:ext uri="{FF2B5EF4-FFF2-40B4-BE49-F238E27FC236}">
+              <a16:creationId xmlns:a16="http://schemas.microsoft.com/office/drawing/2014/main" id="{F378EA38-9C68-C941-B155-DBCA8F991279}"/>
+            </a:ext>
+          </a:extLst>
+        </p:cNvPr>
+        <p:cNvGrpSpPr/>
+        <p:nvPr/>
+      </p:nvGrpSpPr>
+      <p:grpSpPr>
+        <a:xfrm>
+          <a:off x="0" y="0"/>
+          <a:ext cx="0" cy="0"/>
+          <a:chOff x="0" y="0"/>
+          <a:chExt cx="0" cy="0"/>
+        </a:xfrm>
+      </p:grpSpPr>
+      <p:sp>
+        <p:nvSpPr>
+          <p:cNvPr id="2" name="標題 1">
+            <a:extLst>
+              <a:ext uri="{FF2B5EF4-FFF2-40B4-BE49-F238E27FC236}">
+                <a16:creationId xmlns:a16="http://schemas.microsoft.com/office/drawing/2014/main" id="{194509BD-708D-13C7-F2A8-5DECA2198B18}"/>
+              </a:ext>
+            </a:extLst>
+          </p:cNvPr>
+          <p:cNvSpPr>
+            <a:spLocks noGrp="1"/>
+          </p:cNvSpPr>
+          <p:nvPr>
+            <p:ph type="title"/>
+          </p:nvPr>
+        </p:nvSpPr>
+        <p:spPr/>
+        <p:txBody>
+          <a:bodyPr/>
+          <a:lstStyle/>
+          <a:p>
+            <a:r>
+              <a:rPr lang="en-US" altLang="zh-TW" dirty="0"/>
+              <a:t>AHB</a:t>
+            </a:r>
+            <a:r>
+              <a:rPr lang="zh-TW" altLang="en-US" dirty="0"/>
+              <a:t> </a:t>
+            </a:r>
+            <a:r>
+              <a:rPr lang="en-US" altLang="zh-TW" dirty="0"/>
+              <a:t>Transfers (19/)</a:t>
+            </a:r>
+            <a:endParaRPr lang="zh-TW" altLang="en-US" dirty="0"/>
+          </a:p>
+        </p:txBody>
+      </p:sp>
+      <p:sp>
+        <p:nvSpPr>
+          <p:cNvPr id="3" name="內容版面配置區 2">
+            <a:extLst>
+              <a:ext uri="{FF2B5EF4-FFF2-40B4-BE49-F238E27FC236}">
+                <a16:creationId xmlns:a16="http://schemas.microsoft.com/office/drawing/2014/main" id="{61C12F6C-CCA0-0D95-1C56-FF4A2C6711E9}"/>
+              </a:ext>
+            </a:extLst>
+          </p:cNvPr>
+          <p:cNvSpPr>
+            <a:spLocks noGrp="1"/>
+          </p:cNvSpPr>
+          <p:nvPr>
+            <p:ph idx="1"/>
+          </p:nvPr>
+        </p:nvSpPr>
+        <p:spPr/>
+        <p:txBody>
+          <a:bodyPr>
+            <a:normAutofit lnSpcReduction="10000"/>
+          </a:bodyPr>
+          <a:lstStyle/>
+          <a:p>
+            <a:pPr marL="514350" indent="-514350">
+              <a:buFont typeface="+mj-lt"/>
+              <a:buAutoNum type="arabicPeriod" startAt="6"/>
+            </a:pPr>
+            <a:r>
+              <a:rPr lang="en-US" altLang="zh-TW" dirty="0"/>
+              <a:t>Waited transfers</a:t>
+            </a:r>
+          </a:p>
+          <a:p>
+            <a:pPr lvl="1"/>
+            <a:r>
+              <a:rPr lang="zh-TW" altLang="en-US" sz="2000" dirty="0"/>
+              <a:t>當</a:t>
+            </a:r>
+            <a:r>
+              <a:rPr lang="en-US" altLang="zh-TW" sz="2000" dirty="0"/>
+              <a:t>Slave</a:t>
+            </a:r>
+            <a:r>
+              <a:rPr lang="zh-TW" altLang="en-US" sz="2000" dirty="0"/>
+              <a:t>需要更多時間來提供資料或取樣資料時，會利用 </a:t>
+            </a:r>
+            <a:r>
+              <a:rPr lang="en-US" altLang="zh-TW" sz="2000" dirty="0"/>
+              <a:t>HREADY </a:t>
+            </a:r>
+            <a:r>
+              <a:rPr lang="zh-TW" altLang="en-US" sz="2000" dirty="0"/>
+              <a:t>訊號 插入等待狀態 </a:t>
+            </a:r>
+            <a:r>
+              <a:rPr lang="en-US" altLang="zh-TW" sz="2000" dirty="0"/>
+              <a:t>(wait states)</a:t>
+            </a:r>
+          </a:p>
+          <a:p>
+            <a:pPr lvl="1"/>
+            <a:endParaRPr lang="en-US" altLang="zh-TW" sz="2000" dirty="0"/>
+          </a:p>
+          <a:p>
+            <a:pPr lvl="1"/>
+            <a:r>
+              <a:rPr lang="en-US" altLang="zh-TW" sz="2000" dirty="0"/>
+              <a:t> Transfer type</a:t>
+            </a:r>
+            <a:r>
+              <a:rPr lang="zh-TW" altLang="en-US" sz="2000" dirty="0"/>
+              <a:t> </a:t>
+            </a:r>
+            <a:r>
+              <a:rPr lang="en-US" altLang="zh-TW" sz="2000" dirty="0"/>
+              <a:t>(HTRANS) changes during wait states</a:t>
+            </a:r>
+          </a:p>
+          <a:p>
+            <a:pPr lvl="2"/>
+            <a:r>
+              <a:rPr lang="zh-TW" altLang="en-US" sz="1600" dirty="0"/>
+              <a:t>當</a:t>
+            </a:r>
+            <a:r>
+              <a:rPr lang="en-US" altLang="zh-TW" sz="1600" dirty="0"/>
+              <a:t>slave</a:t>
+            </a:r>
+            <a:r>
+              <a:rPr lang="zh-TW" altLang="en-US" sz="1600" dirty="0"/>
+              <a:t>正在要求插入等待狀態 </a:t>
+            </a:r>
+            <a:r>
+              <a:rPr lang="en-US" altLang="zh-TW" sz="1600" dirty="0"/>
+              <a:t>(wait states)</a:t>
+            </a:r>
+            <a:r>
+              <a:rPr lang="zh-TW" altLang="en-US" sz="1600" dirty="0"/>
+              <a:t> 時，</a:t>
+            </a:r>
+            <a:r>
+              <a:rPr lang="en-US" altLang="zh-TW" sz="1600" dirty="0"/>
+              <a:t>master</a:t>
+            </a:r>
+            <a:r>
+              <a:rPr lang="zh-TW" altLang="en-US" sz="1600" dirty="0"/>
+              <a:t>不得改變傳輸類型 </a:t>
+            </a:r>
+            <a:r>
+              <a:rPr lang="en-US" altLang="zh-TW" sz="1600" dirty="0"/>
+              <a:t>(HTRANS)</a:t>
+            </a:r>
+            <a:r>
+              <a:rPr lang="zh-TW" altLang="en-US" sz="1600" dirty="0"/>
+              <a:t>，</a:t>
+            </a:r>
+            <a:br>
+              <a:rPr lang="en-US" altLang="zh-TW" sz="1600" dirty="0"/>
+            </a:br>
+            <a:r>
+              <a:rPr lang="zh-TW" altLang="en-US" sz="1600" dirty="0"/>
+              <a:t>除非符合以下情況</a:t>
+            </a:r>
+            <a:endParaRPr lang="en-US" altLang="zh-TW" sz="1600" dirty="0"/>
+          </a:p>
+          <a:p>
+            <a:pPr marL="1714500" lvl="3" indent="-342900">
+              <a:buFont typeface="+mj-lt"/>
+              <a:buAutoNum type="arabicPeriod"/>
+            </a:pPr>
+            <a:r>
+              <a:rPr lang="en-US" altLang="zh-TW" sz="1400" dirty="0"/>
+              <a:t>IDLE transfer</a:t>
+            </a:r>
+          </a:p>
+          <a:p>
+            <a:pPr marL="1714500" lvl="3" indent="-342900">
+              <a:buFont typeface="+mj-lt"/>
+              <a:buAutoNum type="arabicPeriod"/>
+            </a:pPr>
+            <a:r>
+              <a:rPr lang="en-US" altLang="zh-TW" sz="1400" dirty="0"/>
+              <a:t>BUSY transfer (</a:t>
+            </a:r>
+            <a:r>
+              <a:rPr lang="zh-TW" altLang="en-US" sz="1400" dirty="0"/>
+              <a:t>固定長度</a:t>
+            </a:r>
+            <a:r>
+              <a:rPr lang="en-US" altLang="zh-TW" sz="1400" dirty="0"/>
+              <a:t>burst)</a:t>
+            </a:r>
+          </a:p>
+          <a:p>
+            <a:pPr marL="1714500" lvl="3" indent="-342900">
+              <a:buFont typeface="+mj-lt"/>
+              <a:buAutoNum type="arabicPeriod"/>
+            </a:pPr>
+            <a:r>
+              <a:rPr lang="en-US" altLang="zh-TW" sz="1400" dirty="0"/>
+              <a:t>BUSY transfer</a:t>
+            </a:r>
+            <a:r>
+              <a:rPr lang="zh-TW" altLang="en-US" sz="1400" dirty="0"/>
+              <a:t> </a:t>
+            </a:r>
+            <a:r>
+              <a:rPr lang="en-US" altLang="zh-TW" sz="1400" dirty="0"/>
+              <a:t>(</a:t>
+            </a:r>
+            <a:r>
+              <a:rPr lang="zh-TW" altLang="en-US" sz="1400" dirty="0"/>
+              <a:t>不固定長度</a:t>
+            </a:r>
+            <a:r>
+              <a:rPr lang="en-US" altLang="zh-TW" sz="1400" dirty="0"/>
+              <a:t>burst)</a:t>
+            </a:r>
+          </a:p>
+          <a:p>
+            <a:pPr marL="1714500" lvl="3" indent="-342900">
+              <a:buFont typeface="+mj-lt"/>
+              <a:buAutoNum type="arabicPeriod"/>
+            </a:pPr>
+            <a:endParaRPr lang="en-US" altLang="zh-TW" sz="1400" dirty="0"/>
+          </a:p>
+          <a:p>
+            <a:pPr lvl="1"/>
+            <a:r>
+              <a:rPr lang="en-US" altLang="zh-TW" sz="2000" dirty="0"/>
+              <a:t>Address (HADDR) changes during wait states</a:t>
+            </a:r>
+          </a:p>
+          <a:p>
+            <a:pPr lvl="2"/>
+            <a:r>
+              <a:rPr lang="zh-TW" altLang="en-US" sz="1600" dirty="0"/>
+              <a:t>當</a:t>
+            </a:r>
+            <a:r>
+              <a:rPr lang="en-US" altLang="zh-TW" sz="1600" dirty="0"/>
+              <a:t>slave</a:t>
+            </a:r>
+            <a:r>
+              <a:rPr lang="zh-TW" altLang="en-US" sz="1600" dirty="0"/>
+              <a:t>正在要求插入等待狀態 </a:t>
+            </a:r>
+            <a:r>
+              <a:rPr lang="en-US" altLang="zh-TW" sz="1600" dirty="0"/>
+              <a:t>(wait states) </a:t>
+            </a:r>
+            <a:r>
+              <a:rPr lang="zh-TW" altLang="en-US" sz="1600" dirty="0"/>
+              <a:t>時，</a:t>
+            </a:r>
+            <a:r>
+              <a:rPr lang="en-US" altLang="zh-TW" sz="1600" dirty="0"/>
+              <a:t>master</a:t>
+            </a:r>
+            <a:r>
+              <a:rPr lang="zh-TW" altLang="en-US" sz="1600" dirty="0"/>
+              <a:t>只能變更位址一次，</a:t>
+            </a:r>
+            <a:br>
+              <a:rPr lang="en-US" altLang="zh-TW" sz="1600" dirty="0"/>
+            </a:br>
+            <a:r>
+              <a:rPr lang="zh-TW" altLang="en-US" sz="1600" dirty="0"/>
+              <a:t>除非符合以下情況的說明</a:t>
+            </a:r>
+            <a:endParaRPr lang="en-US" altLang="zh-TW" sz="1600" dirty="0"/>
+          </a:p>
+          <a:p>
+            <a:pPr marL="1714500" lvl="3" indent="-342900">
+              <a:buFont typeface="+mj-lt"/>
+              <a:buAutoNum type="arabicPeriod"/>
+            </a:pPr>
+            <a:r>
+              <a:rPr lang="en-US" altLang="zh-TW" sz="1400" dirty="0"/>
+              <a:t>During an IDLE transfer</a:t>
+            </a:r>
+          </a:p>
+          <a:p>
+            <a:pPr marL="1714500" lvl="3" indent="-342900">
+              <a:buFont typeface="+mj-lt"/>
+              <a:buAutoNum type="arabicPeriod"/>
+            </a:pPr>
+            <a:r>
+              <a:rPr lang="en-US" altLang="zh-TW" sz="1400" dirty="0"/>
+              <a:t>After an ERROR response</a:t>
+            </a:r>
+          </a:p>
+          <a:p>
+            <a:pPr marL="1257300" lvl="2" indent="-342900">
+              <a:buFont typeface="+mj-lt"/>
+              <a:buAutoNum type="arabicPeriod"/>
+            </a:pPr>
+            <a:endParaRPr lang="en-US" altLang="zh-TW" sz="1600" dirty="0"/>
+          </a:p>
+        </p:txBody>
+      </p:sp>
+    </p:spTree>
+    <p:extLst>
+      <p:ext uri="{BB962C8B-B14F-4D97-AF65-F5344CB8AC3E}">
+        <p14:creationId xmlns:p14="http://schemas.microsoft.com/office/powerpoint/2010/main" val="3468681907"/>
       </p:ext>
     </p:extLst>
   </p:cSld>
@@ -14134,4 +15712,319 @@
     </a:ext>
   </a:extLst>
 </a:theme>
+</file>
+
+<file path=ppt/theme/theme2.xml><?xml version="1.0" encoding="utf-8"?>
+<a:theme xmlns:a="http://schemas.openxmlformats.org/drawingml/2006/main" name="Office 佈景主題">
+  <a:themeElements>
+    <a:clrScheme name="Office">
+      <a:dk1>
+        <a:sysClr val="windowText" lastClr="000000"/>
+      </a:dk1>
+      <a:lt1>
+        <a:sysClr val="window" lastClr="FFFFFF"/>
+      </a:lt1>
+      <a:dk2>
+        <a:srgbClr val="0E2841"/>
+      </a:dk2>
+      <a:lt2>
+        <a:srgbClr val="E8E8E8"/>
+      </a:lt2>
+      <a:accent1>
+        <a:srgbClr val="156082"/>
+      </a:accent1>
+      <a:accent2>
+        <a:srgbClr val="E97132"/>
+      </a:accent2>
+      <a:accent3>
+        <a:srgbClr val="196B24"/>
+      </a:accent3>
+      <a:accent4>
+        <a:srgbClr val="0F9ED5"/>
+      </a:accent4>
+      <a:accent5>
+        <a:srgbClr val="A02B93"/>
+      </a:accent5>
+      <a:accent6>
+        <a:srgbClr val="4EA72E"/>
+      </a:accent6>
+      <a:hlink>
+        <a:srgbClr val="467886"/>
+      </a:hlink>
+      <a:folHlink>
+        <a:srgbClr val="96607D"/>
+      </a:folHlink>
+    </a:clrScheme>
+    <a:fontScheme name="Office">
+      <a:majorFont>
+        <a:latin typeface="Aptos Display" panose="02110004020202020204"/>
+        <a:ea typeface=""/>
+        <a:cs typeface=""/>
+        <a:font script="Jpan" typeface="游ゴシック Light"/>
+        <a:font script="Hang" typeface="맑은 고딕"/>
+        <a:font script="Hans" typeface="等线 Light"/>
+        <a:font script="Hant" typeface="新細明體"/>
+        <a:font script="Arab" typeface="Times New Roman"/>
+        <a:font script="Hebr" typeface="Times New Roman"/>
+        <a:font script="Thai" typeface="Angsana New"/>
+        <a:font script="Ethi" typeface="Nyala"/>
+        <a:font script="Beng" typeface="Vrinda"/>
+        <a:font script="Gujr" typeface="Shruti"/>
+        <a:font script="Khmr" typeface="MoolBoran"/>
+        <a:font script="Knda" typeface="Tunga"/>
+        <a:font script="Guru" typeface="Raavi"/>
+        <a:font script="Cans" typeface="Euphemia"/>
+        <a:font script="Cher" typeface="Plantagenet Cherokee"/>
+        <a:font script="Yiii" typeface="Microsoft Yi Baiti"/>
+        <a:font script="Tibt" typeface="Microsoft Himalaya"/>
+        <a:font script="Thaa" typeface="MV Boli"/>
+        <a:font script="Deva" typeface="Mangal"/>
+        <a:font script="Telu" typeface="Gautami"/>
+        <a:font script="Taml" typeface="Latha"/>
+        <a:font script="Syrc" typeface="Estrangelo Edessa"/>
+        <a:font script="Orya" typeface="Kalinga"/>
+        <a:font script="Mlym" typeface="Kartika"/>
+        <a:font script="Laoo" typeface="DokChampa"/>
+        <a:font script="Sinh" typeface="Iskoola Pota"/>
+        <a:font script="Mong" typeface="Mongolian Baiti"/>
+        <a:font script="Viet" typeface="Times New Roman"/>
+        <a:font script="Uigh" typeface="Microsoft Uighur"/>
+        <a:font script="Geor" typeface="Sylfaen"/>
+        <a:font script="Armn" typeface="Arial"/>
+        <a:font script="Bugi" typeface="Leelawadee UI"/>
+        <a:font script="Bopo" typeface="Microsoft JhengHei"/>
+        <a:font script="Java" typeface="Javanese Text"/>
+        <a:font script="Lisu" typeface="Segoe UI"/>
+        <a:font script="Mymr" typeface="Myanmar Text"/>
+        <a:font script="Nkoo" typeface="Ebrima"/>
+        <a:font script="Olck" typeface="Nirmala UI"/>
+        <a:font script="Osma" typeface="Ebrima"/>
+        <a:font script="Phag" typeface="Phagspa"/>
+        <a:font script="Syrn" typeface="Estrangelo Edessa"/>
+        <a:font script="Syrj" typeface="Estrangelo Edessa"/>
+        <a:font script="Syre" typeface="Estrangelo Edessa"/>
+        <a:font script="Sora" typeface="Nirmala UI"/>
+        <a:font script="Tale" typeface="Microsoft Tai Le"/>
+        <a:font script="Talu" typeface="Microsoft New Tai Lue"/>
+        <a:font script="Tfng" typeface="Ebrima"/>
+      </a:majorFont>
+      <a:minorFont>
+        <a:latin typeface="Aptos" panose="02110004020202020204"/>
+        <a:ea typeface=""/>
+        <a:cs typeface=""/>
+        <a:font script="Jpan" typeface="游ゴシック"/>
+        <a:font script="Hang" typeface="맑은 고딕"/>
+        <a:font script="Hans" typeface="等线"/>
+        <a:font script="Hant" typeface="新細明體"/>
+        <a:font script="Arab" typeface="Arial"/>
+        <a:font script="Hebr" typeface="Arial"/>
+        <a:font script="Thai" typeface="Cordia New"/>
+        <a:font script="Ethi" typeface="Nyala"/>
+        <a:font script="Beng" typeface="Vrinda"/>
+        <a:font script="Gujr" typeface="Shruti"/>
+        <a:font script="Khmr" typeface="DaunPenh"/>
+        <a:font script="Knda" typeface="Tunga"/>
+        <a:font script="Guru" typeface="Raavi"/>
+        <a:font script="Cans" typeface="Euphemia"/>
+        <a:font script="Cher" typeface="Plantagenet Cherokee"/>
+        <a:font script="Yiii" typeface="Microsoft Yi Baiti"/>
+        <a:font script="Tibt" typeface="Microsoft Himalaya"/>
+        <a:font script="Thaa" typeface="MV Boli"/>
+        <a:font script="Deva" typeface="Mangal"/>
+        <a:font script="Telu" typeface="Gautami"/>
+        <a:font script="Taml" typeface="Latha"/>
+        <a:font script="Syrc" typeface="Estrangelo Edessa"/>
+        <a:font script="Orya" typeface="Kalinga"/>
+        <a:font script="Mlym" typeface="Kartika"/>
+        <a:font script="Laoo" typeface="DokChampa"/>
+        <a:font script="Sinh" typeface="Iskoola Pota"/>
+        <a:font script="Mong" typeface="Mongolian Baiti"/>
+        <a:font script="Viet" typeface="Arial"/>
+        <a:font script="Uigh" typeface="Microsoft Uighur"/>
+        <a:font script="Geor" typeface="Sylfaen"/>
+        <a:font script="Armn" typeface="Arial"/>
+        <a:font script="Bugi" typeface="Leelawadee UI"/>
+        <a:font script="Bopo" typeface="Microsoft JhengHei"/>
+        <a:font script="Java" typeface="Javanese Text"/>
+        <a:font script="Lisu" typeface="Segoe UI"/>
+        <a:font script="Mymr" typeface="Myanmar Text"/>
+        <a:font script="Nkoo" typeface="Ebrima"/>
+        <a:font script="Olck" typeface="Nirmala UI"/>
+        <a:font script="Osma" typeface="Ebrima"/>
+        <a:font script="Phag" typeface="Phagspa"/>
+        <a:font script="Syrn" typeface="Estrangelo Edessa"/>
+        <a:font script="Syrj" typeface="Estrangelo Edessa"/>
+        <a:font script="Syre" typeface="Estrangelo Edessa"/>
+        <a:font script="Sora" typeface="Nirmala UI"/>
+        <a:font script="Tale" typeface="Microsoft Tai Le"/>
+        <a:font script="Talu" typeface="Microsoft New Tai Lue"/>
+        <a:font script="Tfng" typeface="Ebrima"/>
+      </a:minorFont>
+    </a:fontScheme>
+    <a:fmtScheme name="Office">
+      <a:fillStyleLst>
+        <a:solidFill>
+          <a:schemeClr val="phClr"/>
+        </a:solidFill>
+        <a:gradFill rotWithShape="1">
+          <a:gsLst>
+            <a:gs pos="0">
+              <a:schemeClr val="phClr">
+                <a:lumMod val="110000"/>
+                <a:satMod val="105000"/>
+                <a:tint val="67000"/>
+              </a:schemeClr>
+            </a:gs>
+            <a:gs pos="50000">
+              <a:schemeClr val="phClr">
+                <a:lumMod val="105000"/>
+                <a:satMod val="103000"/>
+                <a:tint val="73000"/>
+              </a:schemeClr>
+            </a:gs>
+            <a:gs pos="100000">
+              <a:schemeClr val="phClr">
+                <a:lumMod val="105000"/>
+                <a:satMod val="109000"/>
+                <a:tint val="81000"/>
+              </a:schemeClr>
+            </a:gs>
+          </a:gsLst>
+          <a:lin ang="5400000" scaled="0"/>
+        </a:gradFill>
+        <a:gradFill rotWithShape="1">
+          <a:gsLst>
+            <a:gs pos="0">
+              <a:schemeClr val="phClr">
+                <a:satMod val="103000"/>
+                <a:lumMod val="102000"/>
+                <a:tint val="94000"/>
+              </a:schemeClr>
+            </a:gs>
+            <a:gs pos="50000">
+              <a:schemeClr val="phClr">
+                <a:satMod val="110000"/>
+                <a:lumMod val="100000"/>
+                <a:shade val="100000"/>
+              </a:schemeClr>
+            </a:gs>
+            <a:gs pos="100000">
+              <a:schemeClr val="phClr">
+                <a:lumMod val="99000"/>
+                <a:satMod val="120000"/>
+                <a:shade val="78000"/>
+              </a:schemeClr>
+            </a:gs>
+          </a:gsLst>
+          <a:lin ang="5400000" scaled="0"/>
+        </a:gradFill>
+      </a:fillStyleLst>
+      <a:lnStyleLst>
+        <a:ln w="12700" cap="flat" cmpd="sng" algn="ctr">
+          <a:solidFill>
+            <a:schemeClr val="phClr"/>
+          </a:solidFill>
+          <a:prstDash val="solid"/>
+          <a:miter lim="800000"/>
+        </a:ln>
+        <a:ln w="19050" cap="flat" cmpd="sng" algn="ctr">
+          <a:solidFill>
+            <a:schemeClr val="phClr"/>
+          </a:solidFill>
+          <a:prstDash val="solid"/>
+          <a:miter lim="800000"/>
+        </a:ln>
+        <a:ln w="25400" cap="flat" cmpd="sng" algn="ctr">
+          <a:solidFill>
+            <a:schemeClr val="phClr"/>
+          </a:solidFill>
+          <a:prstDash val="solid"/>
+          <a:miter lim="800000"/>
+        </a:ln>
+      </a:lnStyleLst>
+      <a:effectStyleLst>
+        <a:effectStyle>
+          <a:effectLst/>
+        </a:effectStyle>
+        <a:effectStyle>
+          <a:effectLst/>
+        </a:effectStyle>
+        <a:effectStyle>
+          <a:effectLst>
+            <a:outerShdw blurRad="57150" dist="19050" dir="5400000" algn="ctr" rotWithShape="0">
+              <a:srgbClr val="000000">
+                <a:alpha val="63000"/>
+              </a:srgbClr>
+            </a:outerShdw>
+          </a:effectLst>
+        </a:effectStyle>
+      </a:effectStyleLst>
+      <a:bgFillStyleLst>
+        <a:solidFill>
+          <a:schemeClr val="phClr"/>
+        </a:solidFill>
+        <a:solidFill>
+          <a:schemeClr val="phClr">
+            <a:tint val="95000"/>
+            <a:satMod val="170000"/>
+          </a:schemeClr>
+        </a:solidFill>
+        <a:gradFill rotWithShape="1">
+          <a:gsLst>
+            <a:gs pos="0">
+              <a:schemeClr val="phClr">
+                <a:tint val="93000"/>
+                <a:satMod val="150000"/>
+                <a:shade val="98000"/>
+                <a:lumMod val="102000"/>
+              </a:schemeClr>
+            </a:gs>
+            <a:gs pos="50000">
+              <a:schemeClr val="phClr">
+                <a:tint val="98000"/>
+                <a:satMod val="130000"/>
+                <a:shade val="90000"/>
+                <a:lumMod val="103000"/>
+              </a:schemeClr>
+            </a:gs>
+            <a:gs pos="100000">
+              <a:schemeClr val="phClr">
+                <a:shade val="63000"/>
+                <a:satMod val="120000"/>
+              </a:schemeClr>
+            </a:gs>
+          </a:gsLst>
+          <a:lin ang="5400000" scaled="0"/>
+        </a:gradFill>
+      </a:bgFillStyleLst>
+    </a:fmtScheme>
+  </a:themeElements>
+  <a:objectDefaults>
+    <a:lnDef>
+      <a:spPr/>
+      <a:bodyPr/>
+      <a:lstStyle/>
+      <a:style>
+        <a:lnRef idx="2">
+          <a:schemeClr val="accent1"/>
+        </a:lnRef>
+        <a:fillRef idx="0">
+          <a:schemeClr val="accent1"/>
+        </a:fillRef>
+        <a:effectRef idx="1">
+          <a:schemeClr val="accent1"/>
+        </a:effectRef>
+        <a:fontRef idx="minor">
+          <a:schemeClr val="tx1"/>
+        </a:fontRef>
+      </a:style>
+    </a:lnDef>
+  </a:objectDefaults>
+  <a:extraClrSchemeLst/>
+  <a:extLst>
+    <a:ext uri="{05A4C25C-085E-4340-85A3-A5531E510DB2}">
+      <thm15:themeFamily xmlns:thm15="http://schemas.microsoft.com/office/thememl/2012/main" name="Office Theme" id="{2E142A2C-CD16-42D6-873A-C26D2A0506FA}" vid="{1BDDFF52-6CD6-40A5-AB3C-68EB2F1E4D0A}"/>
+    </a:ext>
+  </a:extLst>
+</a:theme>
 </file>
</xml_diff>

<commit_message>
Modify: AMBA/AMBA_learning.pptx 1. Add chapter2 AHB Waited transfers 2. Add chapter2 AHB Protection control
</commit_message>
<xml_diff>
--- a/AMBA/AMBA_learning.pptx
+++ b/AMBA/AMBA_learning.pptx
@@ -5,7 +5,7 @@
     <p:sldMasterId id="2147483648" r:id="rId1"/>
   </p:sldMasterIdLst>
   <p:notesMasterIdLst>
-    <p:notesMasterId r:id="rId41"/>
+    <p:notesMasterId r:id="rId47"/>
   </p:notesMasterIdLst>
   <p:sldIdLst>
     <p:sldId id="256" r:id="rId2"/>
@@ -47,6 +47,12 @@
     <p:sldId id="304" r:id="rId38"/>
     <p:sldId id="305" r:id="rId39"/>
     <p:sldId id="306" r:id="rId40"/>
+    <p:sldId id="307" r:id="rId41"/>
+    <p:sldId id="308" r:id="rId42"/>
+    <p:sldId id="309" r:id="rId43"/>
+    <p:sldId id="310" r:id="rId44"/>
+    <p:sldId id="311" r:id="rId45"/>
+    <p:sldId id="312" r:id="rId46"/>
   </p:sldIdLst>
   <p:sldSz cx="12192000" cy="6858000"/>
   <p:notesSz cx="6858000" cy="9144000"/>
@@ -586,6 +592,654 @@
 </p:notes>
 </file>
 
+<file path=ppt/notesSlides/notesSlide2.xml><?xml version="1.0" encoding="utf-8"?>
+<p:notes xmlns:a="http://schemas.openxmlformats.org/drawingml/2006/main" xmlns:r="http://schemas.openxmlformats.org/officeDocument/2006/relationships" xmlns:p="http://schemas.openxmlformats.org/presentationml/2006/main">
+  <p:cSld>
+    <p:spTree>
+      <p:nvGrpSpPr>
+        <p:cNvPr id="1" name="">
+          <a:extLst>
+            <a:ext uri="{FF2B5EF4-FFF2-40B4-BE49-F238E27FC236}">
+              <a16:creationId xmlns:a16="http://schemas.microsoft.com/office/drawing/2014/main" id="{0E0F886D-BC97-01F3-7238-A1FB6C395CAE}"/>
+            </a:ext>
+          </a:extLst>
+        </p:cNvPr>
+        <p:cNvGrpSpPr/>
+        <p:nvPr/>
+      </p:nvGrpSpPr>
+      <p:grpSpPr>
+        <a:xfrm>
+          <a:off x="0" y="0"/>
+          <a:ext cx="0" cy="0"/>
+          <a:chOff x="0" y="0"/>
+          <a:chExt cx="0" cy="0"/>
+        </a:xfrm>
+      </p:grpSpPr>
+      <p:sp>
+        <p:nvSpPr>
+          <p:cNvPr id="2" name="投影片影像版面配置區 1">
+            <a:extLst>
+              <a:ext uri="{FF2B5EF4-FFF2-40B4-BE49-F238E27FC236}">
+                <a16:creationId xmlns:a16="http://schemas.microsoft.com/office/drawing/2014/main" id="{9B6160EC-AF7B-3FCB-8FB7-99C6FD79369C}"/>
+              </a:ext>
+            </a:extLst>
+          </p:cNvPr>
+          <p:cNvSpPr>
+            <a:spLocks noGrp="1" noRot="1" noChangeAspect="1"/>
+          </p:cNvSpPr>
+          <p:nvPr>
+            <p:ph type="sldImg"/>
+          </p:nvPr>
+        </p:nvSpPr>
+        <p:spPr/>
+      </p:sp>
+      <p:sp>
+        <p:nvSpPr>
+          <p:cNvPr id="3" name="備忘稿版面配置區 2">
+            <a:extLst>
+              <a:ext uri="{FF2B5EF4-FFF2-40B4-BE49-F238E27FC236}">
+                <a16:creationId xmlns:a16="http://schemas.microsoft.com/office/drawing/2014/main" id="{E3E3C0D6-94EE-7381-62CD-54431D630D2D}"/>
+              </a:ext>
+            </a:extLst>
+          </p:cNvPr>
+          <p:cNvSpPr>
+            <a:spLocks noGrp="1"/>
+          </p:cNvSpPr>
+          <p:nvPr>
+            <p:ph type="body" idx="1"/>
+          </p:nvPr>
+        </p:nvSpPr>
+        <p:spPr/>
+        <p:txBody>
+          <a:bodyPr/>
+          <a:lstStyle/>
+          <a:p>
+            <a:endParaRPr lang="zh-TW" altLang="en-US"/>
+          </a:p>
+        </p:txBody>
+      </p:sp>
+      <p:sp>
+        <p:nvSpPr>
+          <p:cNvPr id="4" name="投影片編號版面配置區 3">
+            <a:extLst>
+              <a:ext uri="{FF2B5EF4-FFF2-40B4-BE49-F238E27FC236}">
+                <a16:creationId xmlns:a16="http://schemas.microsoft.com/office/drawing/2014/main" id="{F9689280-35E0-6D1A-FE29-657D0B2D7908}"/>
+              </a:ext>
+            </a:extLst>
+          </p:cNvPr>
+          <p:cNvSpPr>
+            <a:spLocks noGrp="1"/>
+          </p:cNvSpPr>
+          <p:nvPr>
+            <p:ph type="sldNum" sz="quarter" idx="5"/>
+          </p:nvPr>
+        </p:nvSpPr>
+        <p:spPr/>
+        <p:txBody>
+          <a:bodyPr/>
+          <a:lstStyle/>
+          <a:p>
+            <a:fld id="{760EAB97-55A0-4DC5-9C4D-2590C5566466}" type="slidenum">
+              <a:rPr lang="zh-TW" altLang="en-US" smtClean="0"/>
+              <a:t>40</a:t>
+            </a:fld>
+            <a:endParaRPr lang="zh-TW" altLang="en-US"/>
+          </a:p>
+        </p:txBody>
+      </p:sp>
+    </p:spTree>
+    <p:extLst>
+      <p:ext uri="{BB962C8B-B14F-4D97-AF65-F5344CB8AC3E}">
+        <p14:creationId xmlns:p14="http://schemas.microsoft.com/office/powerpoint/2010/main" val="70750201"/>
+      </p:ext>
+    </p:extLst>
+  </p:cSld>
+  <p:clrMapOvr>
+    <a:masterClrMapping/>
+  </p:clrMapOvr>
+</p:notes>
+</file>
+
+<file path=ppt/notesSlides/notesSlide3.xml><?xml version="1.0" encoding="utf-8"?>
+<p:notes xmlns:a="http://schemas.openxmlformats.org/drawingml/2006/main" xmlns:r="http://schemas.openxmlformats.org/officeDocument/2006/relationships" xmlns:p="http://schemas.openxmlformats.org/presentationml/2006/main">
+  <p:cSld>
+    <p:spTree>
+      <p:nvGrpSpPr>
+        <p:cNvPr id="1" name="">
+          <a:extLst>
+            <a:ext uri="{FF2B5EF4-FFF2-40B4-BE49-F238E27FC236}">
+              <a16:creationId xmlns:a16="http://schemas.microsoft.com/office/drawing/2014/main" id="{D778BA42-008F-B892-0803-939E951CCDA2}"/>
+            </a:ext>
+          </a:extLst>
+        </p:cNvPr>
+        <p:cNvGrpSpPr/>
+        <p:nvPr/>
+      </p:nvGrpSpPr>
+      <p:grpSpPr>
+        <a:xfrm>
+          <a:off x="0" y="0"/>
+          <a:ext cx="0" cy="0"/>
+          <a:chOff x="0" y="0"/>
+          <a:chExt cx="0" cy="0"/>
+        </a:xfrm>
+      </p:grpSpPr>
+      <p:sp>
+        <p:nvSpPr>
+          <p:cNvPr id="2" name="投影片影像版面配置區 1">
+            <a:extLst>
+              <a:ext uri="{FF2B5EF4-FFF2-40B4-BE49-F238E27FC236}">
+                <a16:creationId xmlns:a16="http://schemas.microsoft.com/office/drawing/2014/main" id="{69A9E3F1-AF27-9715-9200-D6CE5001A470}"/>
+              </a:ext>
+            </a:extLst>
+          </p:cNvPr>
+          <p:cNvSpPr>
+            <a:spLocks noGrp="1" noRot="1" noChangeAspect="1"/>
+          </p:cNvSpPr>
+          <p:nvPr>
+            <p:ph type="sldImg"/>
+          </p:nvPr>
+        </p:nvSpPr>
+        <p:spPr/>
+      </p:sp>
+      <p:sp>
+        <p:nvSpPr>
+          <p:cNvPr id="3" name="備忘稿版面配置區 2">
+            <a:extLst>
+              <a:ext uri="{FF2B5EF4-FFF2-40B4-BE49-F238E27FC236}">
+                <a16:creationId xmlns:a16="http://schemas.microsoft.com/office/drawing/2014/main" id="{02EC0C1C-F002-ED7A-074D-113A00989BD3}"/>
+              </a:ext>
+            </a:extLst>
+          </p:cNvPr>
+          <p:cNvSpPr>
+            <a:spLocks noGrp="1"/>
+          </p:cNvSpPr>
+          <p:nvPr>
+            <p:ph type="body" idx="1"/>
+          </p:nvPr>
+        </p:nvSpPr>
+        <p:spPr/>
+        <p:txBody>
+          <a:bodyPr/>
+          <a:lstStyle/>
+          <a:p>
+            <a:endParaRPr lang="zh-TW" altLang="en-US"/>
+          </a:p>
+        </p:txBody>
+      </p:sp>
+      <p:sp>
+        <p:nvSpPr>
+          <p:cNvPr id="4" name="投影片編號版面配置區 3">
+            <a:extLst>
+              <a:ext uri="{FF2B5EF4-FFF2-40B4-BE49-F238E27FC236}">
+                <a16:creationId xmlns:a16="http://schemas.microsoft.com/office/drawing/2014/main" id="{C14D0072-2620-8F93-2553-1E2D1A8DC5BC}"/>
+              </a:ext>
+            </a:extLst>
+          </p:cNvPr>
+          <p:cNvSpPr>
+            <a:spLocks noGrp="1"/>
+          </p:cNvSpPr>
+          <p:nvPr>
+            <p:ph type="sldNum" sz="quarter" idx="5"/>
+          </p:nvPr>
+        </p:nvSpPr>
+        <p:spPr/>
+        <p:txBody>
+          <a:bodyPr/>
+          <a:lstStyle/>
+          <a:p>
+            <a:fld id="{760EAB97-55A0-4DC5-9C4D-2590C5566466}" type="slidenum">
+              <a:rPr lang="zh-TW" altLang="en-US" smtClean="0"/>
+              <a:t>41</a:t>
+            </a:fld>
+            <a:endParaRPr lang="zh-TW" altLang="en-US"/>
+          </a:p>
+        </p:txBody>
+      </p:sp>
+    </p:spTree>
+    <p:extLst>
+      <p:ext uri="{BB962C8B-B14F-4D97-AF65-F5344CB8AC3E}">
+        <p14:creationId xmlns:p14="http://schemas.microsoft.com/office/powerpoint/2010/main" val="1705704155"/>
+      </p:ext>
+    </p:extLst>
+  </p:cSld>
+  <p:clrMapOvr>
+    <a:masterClrMapping/>
+  </p:clrMapOvr>
+</p:notes>
+</file>
+
+<file path=ppt/notesSlides/notesSlide4.xml><?xml version="1.0" encoding="utf-8"?>
+<p:notes xmlns:a="http://schemas.openxmlformats.org/drawingml/2006/main" xmlns:r="http://schemas.openxmlformats.org/officeDocument/2006/relationships" xmlns:p="http://schemas.openxmlformats.org/presentationml/2006/main">
+  <p:cSld>
+    <p:spTree>
+      <p:nvGrpSpPr>
+        <p:cNvPr id="1" name="">
+          <a:extLst>
+            <a:ext uri="{FF2B5EF4-FFF2-40B4-BE49-F238E27FC236}">
+              <a16:creationId xmlns:a16="http://schemas.microsoft.com/office/drawing/2014/main" id="{EE98DE9A-66B8-0B2D-4B0E-AA8197AD2ACC}"/>
+            </a:ext>
+          </a:extLst>
+        </p:cNvPr>
+        <p:cNvGrpSpPr/>
+        <p:nvPr/>
+      </p:nvGrpSpPr>
+      <p:grpSpPr>
+        <a:xfrm>
+          <a:off x="0" y="0"/>
+          <a:ext cx="0" cy="0"/>
+          <a:chOff x="0" y="0"/>
+          <a:chExt cx="0" cy="0"/>
+        </a:xfrm>
+      </p:grpSpPr>
+      <p:sp>
+        <p:nvSpPr>
+          <p:cNvPr id="2" name="投影片影像版面配置區 1">
+            <a:extLst>
+              <a:ext uri="{FF2B5EF4-FFF2-40B4-BE49-F238E27FC236}">
+                <a16:creationId xmlns:a16="http://schemas.microsoft.com/office/drawing/2014/main" id="{413B9E21-5D25-C5F3-C460-237A3709A18A}"/>
+              </a:ext>
+            </a:extLst>
+          </p:cNvPr>
+          <p:cNvSpPr>
+            <a:spLocks noGrp="1" noRot="1" noChangeAspect="1"/>
+          </p:cNvSpPr>
+          <p:nvPr>
+            <p:ph type="sldImg"/>
+          </p:nvPr>
+        </p:nvSpPr>
+        <p:spPr/>
+      </p:sp>
+      <p:sp>
+        <p:nvSpPr>
+          <p:cNvPr id="3" name="備忘稿版面配置區 2">
+            <a:extLst>
+              <a:ext uri="{FF2B5EF4-FFF2-40B4-BE49-F238E27FC236}">
+                <a16:creationId xmlns:a16="http://schemas.microsoft.com/office/drawing/2014/main" id="{4D4B084D-A33D-042B-CA97-516E6B85BA3C}"/>
+              </a:ext>
+            </a:extLst>
+          </p:cNvPr>
+          <p:cNvSpPr>
+            <a:spLocks noGrp="1"/>
+          </p:cNvSpPr>
+          <p:nvPr>
+            <p:ph type="body" idx="1"/>
+          </p:nvPr>
+        </p:nvSpPr>
+        <p:spPr/>
+        <p:txBody>
+          <a:bodyPr/>
+          <a:lstStyle/>
+          <a:p>
+            <a:endParaRPr lang="zh-TW" altLang="en-US"/>
+          </a:p>
+        </p:txBody>
+      </p:sp>
+      <p:sp>
+        <p:nvSpPr>
+          <p:cNvPr id="4" name="投影片編號版面配置區 3">
+            <a:extLst>
+              <a:ext uri="{FF2B5EF4-FFF2-40B4-BE49-F238E27FC236}">
+                <a16:creationId xmlns:a16="http://schemas.microsoft.com/office/drawing/2014/main" id="{96AEC3BE-FF37-8B23-95C4-5BBD748D00B7}"/>
+              </a:ext>
+            </a:extLst>
+          </p:cNvPr>
+          <p:cNvSpPr>
+            <a:spLocks noGrp="1"/>
+          </p:cNvSpPr>
+          <p:nvPr>
+            <p:ph type="sldNum" sz="quarter" idx="5"/>
+          </p:nvPr>
+        </p:nvSpPr>
+        <p:spPr/>
+        <p:txBody>
+          <a:bodyPr/>
+          <a:lstStyle/>
+          <a:p>
+            <a:fld id="{760EAB97-55A0-4DC5-9C4D-2590C5566466}" type="slidenum">
+              <a:rPr lang="zh-TW" altLang="en-US" smtClean="0"/>
+              <a:t>42</a:t>
+            </a:fld>
+            <a:endParaRPr lang="zh-TW" altLang="en-US"/>
+          </a:p>
+        </p:txBody>
+      </p:sp>
+    </p:spTree>
+    <p:extLst>
+      <p:ext uri="{BB962C8B-B14F-4D97-AF65-F5344CB8AC3E}">
+        <p14:creationId xmlns:p14="http://schemas.microsoft.com/office/powerpoint/2010/main" val="10470355"/>
+      </p:ext>
+    </p:extLst>
+  </p:cSld>
+  <p:clrMapOvr>
+    <a:masterClrMapping/>
+  </p:clrMapOvr>
+</p:notes>
+</file>
+
+<file path=ppt/notesSlides/notesSlide5.xml><?xml version="1.0" encoding="utf-8"?>
+<p:notes xmlns:a="http://schemas.openxmlformats.org/drawingml/2006/main" xmlns:r="http://schemas.openxmlformats.org/officeDocument/2006/relationships" xmlns:p="http://schemas.openxmlformats.org/presentationml/2006/main">
+  <p:cSld>
+    <p:spTree>
+      <p:nvGrpSpPr>
+        <p:cNvPr id="1" name="">
+          <a:extLst>
+            <a:ext uri="{FF2B5EF4-FFF2-40B4-BE49-F238E27FC236}">
+              <a16:creationId xmlns:a16="http://schemas.microsoft.com/office/drawing/2014/main" id="{025C1FFF-A0E3-97D1-D9F1-E6938E5854C0}"/>
+            </a:ext>
+          </a:extLst>
+        </p:cNvPr>
+        <p:cNvGrpSpPr/>
+        <p:nvPr/>
+      </p:nvGrpSpPr>
+      <p:grpSpPr>
+        <a:xfrm>
+          <a:off x="0" y="0"/>
+          <a:ext cx="0" cy="0"/>
+          <a:chOff x="0" y="0"/>
+          <a:chExt cx="0" cy="0"/>
+        </a:xfrm>
+      </p:grpSpPr>
+      <p:sp>
+        <p:nvSpPr>
+          <p:cNvPr id="2" name="投影片影像版面配置區 1">
+            <a:extLst>
+              <a:ext uri="{FF2B5EF4-FFF2-40B4-BE49-F238E27FC236}">
+                <a16:creationId xmlns:a16="http://schemas.microsoft.com/office/drawing/2014/main" id="{87F980CB-8D05-A7FA-F8B2-908DF2DD892B}"/>
+              </a:ext>
+            </a:extLst>
+          </p:cNvPr>
+          <p:cNvSpPr>
+            <a:spLocks noGrp="1" noRot="1" noChangeAspect="1"/>
+          </p:cNvSpPr>
+          <p:nvPr>
+            <p:ph type="sldImg"/>
+          </p:nvPr>
+        </p:nvSpPr>
+        <p:spPr/>
+      </p:sp>
+      <p:sp>
+        <p:nvSpPr>
+          <p:cNvPr id="3" name="備忘稿版面配置區 2">
+            <a:extLst>
+              <a:ext uri="{FF2B5EF4-FFF2-40B4-BE49-F238E27FC236}">
+                <a16:creationId xmlns:a16="http://schemas.microsoft.com/office/drawing/2014/main" id="{1FBE6861-9B9A-88AC-6FF3-E005A96C1281}"/>
+              </a:ext>
+            </a:extLst>
+          </p:cNvPr>
+          <p:cNvSpPr>
+            <a:spLocks noGrp="1"/>
+          </p:cNvSpPr>
+          <p:nvPr>
+            <p:ph type="body" idx="1"/>
+          </p:nvPr>
+        </p:nvSpPr>
+        <p:spPr/>
+        <p:txBody>
+          <a:bodyPr/>
+          <a:lstStyle/>
+          <a:p>
+            <a:endParaRPr lang="zh-TW" altLang="en-US"/>
+          </a:p>
+        </p:txBody>
+      </p:sp>
+      <p:sp>
+        <p:nvSpPr>
+          <p:cNvPr id="4" name="投影片編號版面配置區 3">
+            <a:extLst>
+              <a:ext uri="{FF2B5EF4-FFF2-40B4-BE49-F238E27FC236}">
+                <a16:creationId xmlns:a16="http://schemas.microsoft.com/office/drawing/2014/main" id="{C314F07B-E61A-3D20-DE81-7932A48EDF49}"/>
+              </a:ext>
+            </a:extLst>
+          </p:cNvPr>
+          <p:cNvSpPr>
+            <a:spLocks noGrp="1"/>
+          </p:cNvSpPr>
+          <p:nvPr>
+            <p:ph type="sldNum" sz="quarter" idx="5"/>
+          </p:nvPr>
+        </p:nvSpPr>
+        <p:spPr/>
+        <p:txBody>
+          <a:bodyPr/>
+          <a:lstStyle/>
+          <a:p>
+            <a:fld id="{760EAB97-55A0-4DC5-9C4D-2590C5566466}" type="slidenum">
+              <a:rPr lang="zh-TW" altLang="en-US" smtClean="0"/>
+              <a:t>43</a:t>
+            </a:fld>
+            <a:endParaRPr lang="zh-TW" altLang="en-US"/>
+          </a:p>
+        </p:txBody>
+      </p:sp>
+    </p:spTree>
+    <p:extLst>
+      <p:ext uri="{BB962C8B-B14F-4D97-AF65-F5344CB8AC3E}">
+        <p14:creationId xmlns:p14="http://schemas.microsoft.com/office/powerpoint/2010/main" val="2096956058"/>
+      </p:ext>
+    </p:extLst>
+  </p:cSld>
+  <p:clrMapOvr>
+    <a:masterClrMapping/>
+  </p:clrMapOvr>
+</p:notes>
+</file>
+
+<file path=ppt/notesSlides/notesSlide6.xml><?xml version="1.0" encoding="utf-8"?>
+<p:notes xmlns:a="http://schemas.openxmlformats.org/drawingml/2006/main" xmlns:r="http://schemas.openxmlformats.org/officeDocument/2006/relationships" xmlns:p="http://schemas.openxmlformats.org/presentationml/2006/main">
+  <p:cSld>
+    <p:spTree>
+      <p:nvGrpSpPr>
+        <p:cNvPr id="1" name="">
+          <a:extLst>
+            <a:ext uri="{FF2B5EF4-FFF2-40B4-BE49-F238E27FC236}">
+              <a16:creationId xmlns:a16="http://schemas.microsoft.com/office/drawing/2014/main" id="{E0983D8E-3C2D-F7BE-EAB1-64CDE1425FCB}"/>
+            </a:ext>
+          </a:extLst>
+        </p:cNvPr>
+        <p:cNvGrpSpPr/>
+        <p:nvPr/>
+      </p:nvGrpSpPr>
+      <p:grpSpPr>
+        <a:xfrm>
+          <a:off x="0" y="0"/>
+          <a:ext cx="0" cy="0"/>
+          <a:chOff x="0" y="0"/>
+          <a:chExt cx="0" cy="0"/>
+        </a:xfrm>
+      </p:grpSpPr>
+      <p:sp>
+        <p:nvSpPr>
+          <p:cNvPr id="2" name="投影片影像版面配置區 1">
+            <a:extLst>
+              <a:ext uri="{FF2B5EF4-FFF2-40B4-BE49-F238E27FC236}">
+                <a16:creationId xmlns:a16="http://schemas.microsoft.com/office/drawing/2014/main" id="{9F526D11-ABA4-0BE9-ADBF-91D66D01061E}"/>
+              </a:ext>
+            </a:extLst>
+          </p:cNvPr>
+          <p:cNvSpPr>
+            <a:spLocks noGrp="1" noRot="1" noChangeAspect="1"/>
+          </p:cNvSpPr>
+          <p:nvPr>
+            <p:ph type="sldImg"/>
+          </p:nvPr>
+        </p:nvSpPr>
+        <p:spPr/>
+      </p:sp>
+      <p:sp>
+        <p:nvSpPr>
+          <p:cNvPr id="3" name="備忘稿版面配置區 2">
+            <a:extLst>
+              <a:ext uri="{FF2B5EF4-FFF2-40B4-BE49-F238E27FC236}">
+                <a16:creationId xmlns:a16="http://schemas.microsoft.com/office/drawing/2014/main" id="{91FD90E1-63C8-C4F1-C39F-84D80C517290}"/>
+              </a:ext>
+            </a:extLst>
+          </p:cNvPr>
+          <p:cNvSpPr>
+            <a:spLocks noGrp="1"/>
+          </p:cNvSpPr>
+          <p:nvPr>
+            <p:ph type="body" idx="1"/>
+          </p:nvPr>
+        </p:nvSpPr>
+        <p:spPr/>
+        <p:txBody>
+          <a:bodyPr/>
+          <a:lstStyle/>
+          <a:p>
+            <a:endParaRPr lang="zh-TW" altLang="en-US"/>
+          </a:p>
+        </p:txBody>
+      </p:sp>
+      <p:sp>
+        <p:nvSpPr>
+          <p:cNvPr id="4" name="投影片編號版面配置區 3">
+            <a:extLst>
+              <a:ext uri="{FF2B5EF4-FFF2-40B4-BE49-F238E27FC236}">
+                <a16:creationId xmlns:a16="http://schemas.microsoft.com/office/drawing/2014/main" id="{C5A2D5C7-A56F-A28B-6786-13892A6DEEC9}"/>
+              </a:ext>
+            </a:extLst>
+          </p:cNvPr>
+          <p:cNvSpPr>
+            <a:spLocks noGrp="1"/>
+          </p:cNvSpPr>
+          <p:nvPr>
+            <p:ph type="sldNum" sz="quarter" idx="5"/>
+          </p:nvPr>
+        </p:nvSpPr>
+        <p:spPr/>
+        <p:txBody>
+          <a:bodyPr/>
+          <a:lstStyle/>
+          <a:p>
+            <a:fld id="{760EAB97-55A0-4DC5-9C4D-2590C5566466}" type="slidenum">
+              <a:rPr lang="zh-TW" altLang="en-US" smtClean="0"/>
+              <a:t>44</a:t>
+            </a:fld>
+            <a:endParaRPr lang="zh-TW" altLang="en-US"/>
+          </a:p>
+        </p:txBody>
+      </p:sp>
+    </p:spTree>
+    <p:extLst>
+      <p:ext uri="{BB962C8B-B14F-4D97-AF65-F5344CB8AC3E}">
+        <p14:creationId xmlns:p14="http://schemas.microsoft.com/office/powerpoint/2010/main" val="796996264"/>
+      </p:ext>
+    </p:extLst>
+  </p:cSld>
+  <p:clrMapOvr>
+    <a:masterClrMapping/>
+  </p:clrMapOvr>
+</p:notes>
+</file>
+
+<file path=ppt/notesSlides/notesSlide7.xml><?xml version="1.0" encoding="utf-8"?>
+<p:notes xmlns:a="http://schemas.openxmlformats.org/drawingml/2006/main" xmlns:r="http://schemas.openxmlformats.org/officeDocument/2006/relationships" xmlns:p="http://schemas.openxmlformats.org/presentationml/2006/main">
+  <p:cSld>
+    <p:spTree>
+      <p:nvGrpSpPr>
+        <p:cNvPr id="1" name="">
+          <a:extLst>
+            <a:ext uri="{FF2B5EF4-FFF2-40B4-BE49-F238E27FC236}">
+              <a16:creationId xmlns:a16="http://schemas.microsoft.com/office/drawing/2014/main" id="{3BDB3EFD-4593-71E8-4552-D76B67517B9D}"/>
+            </a:ext>
+          </a:extLst>
+        </p:cNvPr>
+        <p:cNvGrpSpPr/>
+        <p:nvPr/>
+      </p:nvGrpSpPr>
+      <p:grpSpPr>
+        <a:xfrm>
+          <a:off x="0" y="0"/>
+          <a:ext cx="0" cy="0"/>
+          <a:chOff x="0" y="0"/>
+          <a:chExt cx="0" cy="0"/>
+        </a:xfrm>
+      </p:grpSpPr>
+      <p:sp>
+        <p:nvSpPr>
+          <p:cNvPr id="2" name="投影片影像版面配置區 1">
+            <a:extLst>
+              <a:ext uri="{FF2B5EF4-FFF2-40B4-BE49-F238E27FC236}">
+                <a16:creationId xmlns:a16="http://schemas.microsoft.com/office/drawing/2014/main" id="{8092EAEB-D89C-3EFF-6062-68B0D5C79871}"/>
+              </a:ext>
+            </a:extLst>
+          </p:cNvPr>
+          <p:cNvSpPr>
+            <a:spLocks noGrp="1" noRot="1" noChangeAspect="1"/>
+          </p:cNvSpPr>
+          <p:nvPr>
+            <p:ph type="sldImg"/>
+          </p:nvPr>
+        </p:nvSpPr>
+        <p:spPr/>
+      </p:sp>
+      <p:sp>
+        <p:nvSpPr>
+          <p:cNvPr id="3" name="備忘稿版面配置區 2">
+            <a:extLst>
+              <a:ext uri="{FF2B5EF4-FFF2-40B4-BE49-F238E27FC236}">
+                <a16:creationId xmlns:a16="http://schemas.microsoft.com/office/drawing/2014/main" id="{77823AF5-BD05-36D4-7A68-9E11097E3E16}"/>
+              </a:ext>
+            </a:extLst>
+          </p:cNvPr>
+          <p:cNvSpPr>
+            <a:spLocks noGrp="1"/>
+          </p:cNvSpPr>
+          <p:nvPr>
+            <p:ph type="body" idx="1"/>
+          </p:nvPr>
+        </p:nvSpPr>
+        <p:spPr/>
+        <p:txBody>
+          <a:bodyPr/>
+          <a:lstStyle/>
+          <a:p>
+            <a:endParaRPr lang="zh-TW" altLang="en-US"/>
+          </a:p>
+        </p:txBody>
+      </p:sp>
+      <p:sp>
+        <p:nvSpPr>
+          <p:cNvPr id="4" name="投影片編號版面配置區 3">
+            <a:extLst>
+              <a:ext uri="{FF2B5EF4-FFF2-40B4-BE49-F238E27FC236}">
+                <a16:creationId xmlns:a16="http://schemas.microsoft.com/office/drawing/2014/main" id="{1821151B-EFC8-D0E9-0EE3-9EDB3341FF90}"/>
+              </a:ext>
+            </a:extLst>
+          </p:cNvPr>
+          <p:cNvSpPr>
+            <a:spLocks noGrp="1"/>
+          </p:cNvSpPr>
+          <p:nvPr>
+            <p:ph type="sldNum" sz="quarter" idx="5"/>
+          </p:nvPr>
+        </p:nvSpPr>
+        <p:spPr/>
+        <p:txBody>
+          <a:bodyPr/>
+          <a:lstStyle/>
+          <a:p>
+            <a:fld id="{760EAB97-55A0-4DC5-9C4D-2590C5566466}" type="slidenum">
+              <a:rPr lang="zh-TW" altLang="en-US" smtClean="0"/>
+              <a:t>45</a:t>
+            </a:fld>
+            <a:endParaRPr lang="zh-TW" altLang="en-US"/>
+          </a:p>
+        </p:txBody>
+      </p:sp>
+    </p:spTree>
+    <p:extLst>
+      <p:ext uri="{BB962C8B-B14F-4D97-AF65-F5344CB8AC3E}">
+        <p14:creationId xmlns:p14="http://schemas.microsoft.com/office/powerpoint/2010/main" val="3694975189"/>
+      </p:ext>
+    </p:extLst>
+  </p:cSld>
+  <p:clrMapOvr>
+    <a:masterClrMapping/>
+  </p:clrMapOvr>
+</p:notes>
+</file>
+
 <file path=ppt/slideLayouts/slideLayout1.xml><?xml version="1.0" encoding="utf-8"?>
 <p:sldLayout xmlns:a="http://schemas.openxmlformats.org/drawingml/2006/main" xmlns:r="http://schemas.openxmlformats.org/officeDocument/2006/relationships" xmlns:p="http://schemas.openxmlformats.org/presentationml/2006/main" type="title" preserve="1">
   <p:cSld name="標題投影片">
@@ -733,7 +1387,7 @@
           <a:p>
             <a:fld id="{277B1798-C61C-4271-ABD9-F0F48E058C48}" type="datetimeFigureOut">
               <a:rPr lang="zh-TW" altLang="en-US" smtClean="0"/>
-              <a:t>2025/7/9</a:t>
+              <a:t>2025/7/10</a:t>
             </a:fld>
             <a:endParaRPr lang="zh-TW" altLang="en-US"/>
           </a:p>
@@ -931,7 +1585,7 @@
           <a:p>
             <a:fld id="{277B1798-C61C-4271-ABD9-F0F48E058C48}" type="datetimeFigureOut">
               <a:rPr lang="zh-TW" altLang="en-US" smtClean="0"/>
-              <a:t>2025/7/9</a:t>
+              <a:t>2025/7/10</a:t>
             </a:fld>
             <a:endParaRPr lang="zh-TW" altLang="en-US"/>
           </a:p>
@@ -1139,7 +1793,7 @@
           <a:p>
             <a:fld id="{277B1798-C61C-4271-ABD9-F0F48E058C48}" type="datetimeFigureOut">
               <a:rPr lang="zh-TW" altLang="en-US" smtClean="0"/>
-              <a:t>2025/7/9</a:t>
+              <a:t>2025/7/10</a:t>
             </a:fld>
             <a:endParaRPr lang="zh-TW" altLang="en-US"/>
           </a:p>
@@ -1337,7 +1991,7 @@
           <a:p>
             <a:fld id="{277B1798-C61C-4271-ABD9-F0F48E058C48}" type="datetimeFigureOut">
               <a:rPr lang="zh-TW" altLang="en-US" smtClean="0"/>
-              <a:t>2025/7/9</a:t>
+              <a:t>2025/7/10</a:t>
             </a:fld>
             <a:endParaRPr lang="zh-TW" altLang="en-US"/>
           </a:p>
@@ -1612,7 +2266,7 @@
           <a:p>
             <a:fld id="{277B1798-C61C-4271-ABD9-F0F48E058C48}" type="datetimeFigureOut">
               <a:rPr lang="zh-TW" altLang="en-US" smtClean="0"/>
-              <a:t>2025/7/9</a:t>
+              <a:t>2025/7/10</a:t>
             </a:fld>
             <a:endParaRPr lang="zh-TW" altLang="en-US"/>
           </a:p>
@@ -1877,7 +2531,7 @@
           <a:p>
             <a:fld id="{277B1798-C61C-4271-ABD9-F0F48E058C48}" type="datetimeFigureOut">
               <a:rPr lang="zh-TW" altLang="en-US" smtClean="0"/>
-              <a:t>2025/7/9</a:t>
+              <a:t>2025/7/10</a:t>
             </a:fld>
             <a:endParaRPr lang="zh-TW" altLang="en-US"/>
           </a:p>
@@ -2289,7 +2943,7 @@
           <a:p>
             <a:fld id="{277B1798-C61C-4271-ABD9-F0F48E058C48}" type="datetimeFigureOut">
               <a:rPr lang="zh-TW" altLang="en-US" smtClean="0"/>
-              <a:t>2025/7/9</a:t>
+              <a:t>2025/7/10</a:t>
             </a:fld>
             <a:endParaRPr lang="zh-TW" altLang="en-US"/>
           </a:p>
@@ -2430,7 +3084,7 @@
           <a:p>
             <a:fld id="{277B1798-C61C-4271-ABD9-F0F48E058C48}" type="datetimeFigureOut">
               <a:rPr lang="zh-TW" altLang="en-US" smtClean="0"/>
-              <a:t>2025/7/9</a:t>
+              <a:t>2025/7/10</a:t>
             </a:fld>
             <a:endParaRPr lang="zh-TW" altLang="en-US"/>
           </a:p>
@@ -2543,7 +3197,7 @@
           <a:p>
             <a:fld id="{277B1798-C61C-4271-ABD9-F0F48E058C48}" type="datetimeFigureOut">
               <a:rPr lang="zh-TW" altLang="en-US" smtClean="0"/>
-              <a:t>2025/7/9</a:t>
+              <a:t>2025/7/10</a:t>
             </a:fld>
             <a:endParaRPr lang="zh-TW" altLang="en-US"/>
           </a:p>
@@ -2854,7 +3508,7 @@
           <a:p>
             <a:fld id="{277B1798-C61C-4271-ABD9-F0F48E058C48}" type="datetimeFigureOut">
               <a:rPr lang="zh-TW" altLang="en-US" smtClean="0"/>
-              <a:t>2025/7/9</a:t>
+              <a:t>2025/7/10</a:t>
             </a:fld>
             <a:endParaRPr lang="zh-TW" altLang="en-US"/>
           </a:p>
@@ -3142,7 +3796,7 @@
           <a:p>
             <a:fld id="{277B1798-C61C-4271-ABD9-F0F48E058C48}" type="datetimeFigureOut">
               <a:rPr lang="zh-TW" altLang="en-US" smtClean="0"/>
-              <a:t>2025/7/9</a:t>
+              <a:t>2025/7/10</a:t>
             </a:fld>
             <a:endParaRPr lang="zh-TW" altLang="en-US"/>
           </a:p>
@@ -3383,7 +4037,7 @@
           <a:p>
             <a:fld id="{277B1798-C61C-4271-ABD9-F0F48E058C48}" type="datetimeFigureOut">
               <a:rPr lang="zh-TW" altLang="en-US" smtClean="0"/>
-              <a:t>2025/7/9</a:t>
+              <a:t>2025/7/10</a:t>
             </a:fld>
             <a:endParaRPr lang="zh-TW" altLang="en-US"/>
           </a:p>
@@ -14128,6 +14782,1542 @@
     <p:extLst>
       <p:ext uri="{BB962C8B-B14F-4D97-AF65-F5344CB8AC3E}">
         <p14:creationId xmlns:p14="http://schemas.microsoft.com/office/powerpoint/2010/main" val="4195171812"/>
+      </p:ext>
+    </p:extLst>
+  </p:cSld>
+  <p:clrMapOvr>
+    <a:masterClrMapping/>
+  </p:clrMapOvr>
+</p:sld>
+</file>
+
+<file path=ppt/slides/slide40.xml><?xml version="1.0" encoding="utf-8"?>
+<p:sld xmlns:a="http://schemas.openxmlformats.org/drawingml/2006/main" xmlns:r="http://schemas.openxmlformats.org/officeDocument/2006/relationships" xmlns:p="http://schemas.openxmlformats.org/presentationml/2006/main">
+  <p:cSld>
+    <p:spTree>
+      <p:nvGrpSpPr>
+        <p:cNvPr id="1" name="">
+          <a:extLst>
+            <a:ext uri="{FF2B5EF4-FFF2-40B4-BE49-F238E27FC236}">
+              <a16:creationId xmlns:a16="http://schemas.microsoft.com/office/drawing/2014/main" id="{B8217BE4-2ABB-9CF4-A7C7-14AFD4804A0A}"/>
+            </a:ext>
+          </a:extLst>
+        </p:cNvPr>
+        <p:cNvGrpSpPr/>
+        <p:nvPr/>
+      </p:nvGrpSpPr>
+      <p:grpSpPr>
+        <a:xfrm>
+          <a:off x="0" y="0"/>
+          <a:ext cx="0" cy="0"/>
+          <a:chOff x="0" y="0"/>
+          <a:chExt cx="0" cy="0"/>
+        </a:xfrm>
+      </p:grpSpPr>
+      <p:sp>
+        <p:nvSpPr>
+          <p:cNvPr id="2" name="標題 1">
+            <a:extLst>
+              <a:ext uri="{FF2B5EF4-FFF2-40B4-BE49-F238E27FC236}">
+                <a16:creationId xmlns:a16="http://schemas.microsoft.com/office/drawing/2014/main" id="{DC56ECB1-4ABD-3853-AAD1-D8F17CD49006}"/>
+              </a:ext>
+            </a:extLst>
+          </p:cNvPr>
+          <p:cNvSpPr>
+            <a:spLocks noGrp="1"/>
+          </p:cNvSpPr>
+          <p:nvPr>
+            <p:ph type="title"/>
+          </p:nvPr>
+        </p:nvSpPr>
+        <p:spPr/>
+        <p:txBody>
+          <a:bodyPr/>
+          <a:lstStyle/>
+          <a:p>
+            <a:r>
+              <a:rPr lang="en-US" altLang="zh-TW" dirty="0"/>
+              <a:t>AHB</a:t>
+            </a:r>
+            <a:r>
+              <a:rPr lang="zh-TW" altLang="en-US" dirty="0"/>
+              <a:t> </a:t>
+            </a:r>
+            <a:r>
+              <a:rPr lang="en-US" altLang="zh-TW" dirty="0"/>
+              <a:t>Transfers (20/)</a:t>
+            </a:r>
+            <a:endParaRPr lang="zh-TW" altLang="en-US" dirty="0"/>
+          </a:p>
+        </p:txBody>
+      </p:sp>
+      <p:sp>
+        <p:nvSpPr>
+          <p:cNvPr id="3" name="內容版面配置區 2">
+            <a:extLst>
+              <a:ext uri="{FF2B5EF4-FFF2-40B4-BE49-F238E27FC236}">
+                <a16:creationId xmlns:a16="http://schemas.microsoft.com/office/drawing/2014/main" id="{2276402F-4B72-5A6C-1930-D43BC90B1A6C}"/>
+              </a:ext>
+            </a:extLst>
+          </p:cNvPr>
+          <p:cNvSpPr>
+            <a:spLocks noGrp="1"/>
+          </p:cNvSpPr>
+          <p:nvPr>
+            <p:ph idx="1"/>
+          </p:nvPr>
+        </p:nvSpPr>
+        <p:spPr/>
+        <p:txBody>
+          <a:bodyPr>
+            <a:normAutofit/>
+          </a:bodyPr>
+          <a:lstStyle/>
+          <a:p>
+            <a:pPr marL="514350" indent="-514350">
+              <a:buFont typeface="+mj-lt"/>
+              <a:buAutoNum type="arabicPeriod" startAt="6"/>
+            </a:pPr>
+            <a:r>
+              <a:rPr lang="en-US" altLang="zh-TW" dirty="0"/>
+              <a:t>Waited transfers</a:t>
+            </a:r>
+            <a:endParaRPr lang="en-US" altLang="zh-TW" sz="2000" dirty="0"/>
+          </a:p>
+          <a:p>
+            <a:pPr lvl="1"/>
+            <a:r>
+              <a:rPr lang="en-US" altLang="zh-TW" sz="2000" dirty="0"/>
+              <a:t> Transfer type</a:t>
+            </a:r>
+            <a:r>
+              <a:rPr lang="zh-TW" altLang="en-US" sz="2000" dirty="0"/>
+              <a:t> </a:t>
+            </a:r>
+            <a:r>
+              <a:rPr lang="en-US" altLang="zh-TW" sz="2000" dirty="0"/>
+              <a:t>(HTRANS) changes during wait states</a:t>
+            </a:r>
+          </a:p>
+          <a:p>
+            <a:pPr marL="1257300" lvl="2" indent="-342900">
+              <a:buFont typeface="+mj-lt"/>
+              <a:buAutoNum type="arabicPeriod"/>
+            </a:pPr>
+            <a:r>
+              <a:rPr lang="en-US" altLang="zh-TW" sz="1600" dirty="0"/>
+              <a:t>IDLE transfer</a:t>
+            </a:r>
+          </a:p>
+          <a:p>
+            <a:pPr lvl="3"/>
+            <a:r>
+              <a:rPr lang="zh-TW" altLang="en-US" sz="1400" dirty="0"/>
+              <a:t>在等待中的傳輸期間 </a:t>
+            </a:r>
+            <a:r>
+              <a:rPr lang="en-US" altLang="zh-TW" sz="1400" dirty="0"/>
+              <a:t>(</a:t>
+            </a:r>
+            <a:r>
+              <a:rPr lang="zh-TW" altLang="en-US" sz="1400" dirty="0"/>
+              <a:t>即 </a:t>
+            </a:r>
+            <a:r>
+              <a:rPr lang="en-US" altLang="zh-TW" sz="1400" dirty="0"/>
+              <a:t>HREADY </a:t>
+            </a:r>
+            <a:r>
+              <a:rPr lang="zh-TW" altLang="en-US" sz="1400" dirty="0"/>
+              <a:t>為 </a:t>
+            </a:r>
+            <a:r>
+              <a:rPr lang="en-US" altLang="zh-TW" sz="1400" dirty="0"/>
+              <a:t>LOW </a:t>
+            </a:r>
+            <a:r>
+              <a:rPr lang="zh-TW" altLang="en-US" sz="1400" dirty="0"/>
+              <a:t>時</a:t>
+            </a:r>
+            <a:r>
+              <a:rPr lang="en-US" altLang="zh-TW" sz="1400" dirty="0"/>
+              <a:t>)</a:t>
+            </a:r>
+            <a:r>
+              <a:rPr lang="zh-TW" altLang="en-US" sz="1400" dirty="0"/>
+              <a:t>，允許</a:t>
+            </a:r>
+            <a:r>
+              <a:rPr lang="en-US" altLang="zh-TW" sz="1400" dirty="0"/>
+              <a:t>master</a:t>
+            </a:r>
+            <a:r>
+              <a:rPr lang="zh-TW" altLang="en-US" sz="1400" dirty="0"/>
+              <a:t>將傳輸類型從 </a:t>
+            </a:r>
+            <a:r>
+              <a:rPr lang="en-US" altLang="zh-TW" sz="1400" dirty="0"/>
+              <a:t>IDLE </a:t>
+            </a:r>
+            <a:r>
+              <a:rPr lang="zh-TW" altLang="en-US" sz="1400" dirty="0"/>
+              <a:t>改為 </a:t>
+            </a:r>
+            <a:r>
+              <a:rPr lang="en-US" altLang="zh-TW" sz="1400" dirty="0"/>
+              <a:t>NONSEQ</a:t>
+            </a:r>
+            <a:r>
+              <a:rPr lang="zh-TW" altLang="en-US" sz="1400" dirty="0"/>
+              <a:t>。</a:t>
+            </a:r>
+            <a:endParaRPr lang="en-US" altLang="zh-TW" sz="1400" dirty="0"/>
+          </a:p>
+          <a:p>
+            <a:pPr lvl="3"/>
+            <a:r>
+              <a:rPr lang="zh-TW" altLang="en-US" sz="1400" dirty="0"/>
+              <a:t>一旦 </a:t>
+            </a:r>
+            <a:r>
+              <a:rPr lang="en-US" altLang="zh-TW" sz="1400" dirty="0"/>
+              <a:t>HTRANS </a:t>
+            </a:r>
+            <a:r>
+              <a:rPr lang="zh-TW" altLang="en-US" sz="1400" dirty="0"/>
+              <a:t>變為 </a:t>
+            </a:r>
+            <a:r>
+              <a:rPr lang="en-US" altLang="zh-TW" sz="1400" dirty="0"/>
+              <a:t>NONSEQ</a:t>
+            </a:r>
+            <a:r>
+              <a:rPr lang="zh-TW" altLang="en-US" sz="1400" dirty="0"/>
+              <a:t>，</a:t>
+            </a:r>
+            <a:r>
+              <a:rPr lang="en-US" altLang="zh-TW" sz="1400" dirty="0"/>
+              <a:t> master</a:t>
+            </a:r>
+            <a:r>
+              <a:rPr lang="zh-TW" altLang="en-US" sz="1400" dirty="0"/>
+              <a:t>必須保持 </a:t>
+            </a:r>
+            <a:r>
+              <a:rPr lang="en-US" altLang="zh-TW" sz="1400" dirty="0"/>
+              <a:t>HTRANS </a:t>
+            </a:r>
+            <a:r>
+              <a:rPr lang="zh-TW" altLang="en-US" sz="1400" dirty="0"/>
+              <a:t>不變，直到 </a:t>
+            </a:r>
+            <a:r>
+              <a:rPr lang="en-US" altLang="zh-TW" sz="1400" dirty="0"/>
+              <a:t>HREADY </a:t>
+            </a:r>
+            <a:r>
+              <a:rPr lang="zh-TW" altLang="en-US" sz="1400" dirty="0"/>
+              <a:t>為 </a:t>
+            </a:r>
+            <a:r>
+              <a:rPr lang="en-US" altLang="zh-TW" sz="1400" dirty="0"/>
+              <a:t>HIGH</a:t>
+            </a:r>
+            <a:r>
+              <a:rPr lang="zh-TW" altLang="en-US" sz="1400" dirty="0"/>
+              <a:t>，表示傳輸完成。</a:t>
+            </a:r>
+            <a:endParaRPr lang="en-US" altLang="zh-TW" sz="1400" dirty="0"/>
+          </a:p>
+        </p:txBody>
+      </p:sp>
+      <p:pic>
+        <p:nvPicPr>
+          <p:cNvPr id="5" name="圖片 4">
+            <a:extLst>
+              <a:ext uri="{FF2B5EF4-FFF2-40B4-BE49-F238E27FC236}">
+                <a16:creationId xmlns:a16="http://schemas.microsoft.com/office/drawing/2014/main" id="{3C4BC27D-CBDF-321F-E416-10B8315A0670}"/>
+              </a:ext>
+            </a:extLst>
+          </p:cNvPr>
+          <p:cNvPicPr>
+            <a:picLocks noChangeAspect="1"/>
+          </p:cNvPicPr>
+          <p:nvPr/>
+        </p:nvPicPr>
+        <p:blipFill>
+          <a:blip r:embed="rId3"/>
+          <a:stretch>
+            <a:fillRect/>
+          </a:stretch>
+        </p:blipFill>
+        <p:spPr>
+          <a:xfrm>
+            <a:off x="2507507" y="3756323"/>
+            <a:ext cx="7176986" cy="2555577"/>
+          </a:xfrm>
+          <a:prstGeom prst="rect">
+            <a:avLst/>
+          </a:prstGeom>
+          <a:ln>
+            <a:solidFill>
+              <a:schemeClr val="tx1"/>
+            </a:solidFill>
+          </a:ln>
+        </p:spPr>
+      </p:pic>
+    </p:spTree>
+    <p:extLst>
+      <p:ext uri="{BB962C8B-B14F-4D97-AF65-F5344CB8AC3E}">
+        <p14:creationId xmlns:p14="http://schemas.microsoft.com/office/powerpoint/2010/main" val="1348862514"/>
+      </p:ext>
+    </p:extLst>
+  </p:cSld>
+  <p:clrMapOvr>
+    <a:masterClrMapping/>
+  </p:clrMapOvr>
+</p:sld>
+</file>
+
+<file path=ppt/slides/slide41.xml><?xml version="1.0" encoding="utf-8"?>
+<p:sld xmlns:a="http://schemas.openxmlformats.org/drawingml/2006/main" xmlns:r="http://schemas.openxmlformats.org/officeDocument/2006/relationships" xmlns:p="http://schemas.openxmlformats.org/presentationml/2006/main">
+  <p:cSld>
+    <p:spTree>
+      <p:nvGrpSpPr>
+        <p:cNvPr id="1" name="">
+          <a:extLst>
+            <a:ext uri="{FF2B5EF4-FFF2-40B4-BE49-F238E27FC236}">
+              <a16:creationId xmlns:a16="http://schemas.microsoft.com/office/drawing/2014/main" id="{FF63FAC6-68D2-23E5-02C4-9DF3334E6A09}"/>
+            </a:ext>
+          </a:extLst>
+        </p:cNvPr>
+        <p:cNvGrpSpPr/>
+        <p:nvPr/>
+      </p:nvGrpSpPr>
+      <p:grpSpPr>
+        <a:xfrm>
+          <a:off x="0" y="0"/>
+          <a:ext cx="0" cy="0"/>
+          <a:chOff x="0" y="0"/>
+          <a:chExt cx="0" cy="0"/>
+        </a:xfrm>
+      </p:grpSpPr>
+      <p:sp>
+        <p:nvSpPr>
+          <p:cNvPr id="2" name="標題 1">
+            <a:extLst>
+              <a:ext uri="{FF2B5EF4-FFF2-40B4-BE49-F238E27FC236}">
+                <a16:creationId xmlns:a16="http://schemas.microsoft.com/office/drawing/2014/main" id="{4E2016BD-977F-AB0D-8C52-852D15E69786}"/>
+              </a:ext>
+            </a:extLst>
+          </p:cNvPr>
+          <p:cNvSpPr>
+            <a:spLocks noGrp="1"/>
+          </p:cNvSpPr>
+          <p:nvPr>
+            <p:ph type="title"/>
+          </p:nvPr>
+        </p:nvSpPr>
+        <p:spPr/>
+        <p:txBody>
+          <a:bodyPr/>
+          <a:lstStyle/>
+          <a:p>
+            <a:r>
+              <a:rPr lang="en-US" altLang="zh-TW" dirty="0"/>
+              <a:t>AHB</a:t>
+            </a:r>
+            <a:r>
+              <a:rPr lang="zh-TW" altLang="en-US" dirty="0"/>
+              <a:t> </a:t>
+            </a:r>
+            <a:r>
+              <a:rPr lang="en-US" altLang="zh-TW" dirty="0"/>
+              <a:t>Transfers (21/)</a:t>
+            </a:r>
+            <a:endParaRPr lang="zh-TW" altLang="en-US" dirty="0"/>
+          </a:p>
+        </p:txBody>
+      </p:sp>
+      <p:sp>
+        <p:nvSpPr>
+          <p:cNvPr id="3" name="內容版面配置區 2">
+            <a:extLst>
+              <a:ext uri="{FF2B5EF4-FFF2-40B4-BE49-F238E27FC236}">
+                <a16:creationId xmlns:a16="http://schemas.microsoft.com/office/drawing/2014/main" id="{52C2729E-B6F7-3CFD-74B1-1A5F82681F7C}"/>
+              </a:ext>
+            </a:extLst>
+          </p:cNvPr>
+          <p:cNvSpPr>
+            <a:spLocks noGrp="1"/>
+          </p:cNvSpPr>
+          <p:nvPr>
+            <p:ph idx="1"/>
+          </p:nvPr>
+        </p:nvSpPr>
+        <p:spPr/>
+        <p:txBody>
+          <a:bodyPr>
+            <a:normAutofit/>
+          </a:bodyPr>
+          <a:lstStyle/>
+          <a:p>
+            <a:pPr marL="514350" indent="-514350">
+              <a:buFont typeface="+mj-lt"/>
+              <a:buAutoNum type="arabicPeriod" startAt="6"/>
+            </a:pPr>
+            <a:r>
+              <a:rPr lang="en-US" altLang="zh-TW" dirty="0"/>
+              <a:t>Waited transfers</a:t>
+            </a:r>
+            <a:endParaRPr lang="en-US" altLang="zh-TW" sz="2000" dirty="0"/>
+          </a:p>
+          <a:p>
+            <a:pPr lvl="1"/>
+            <a:r>
+              <a:rPr lang="en-US" altLang="zh-TW" sz="2000" dirty="0"/>
+              <a:t> Transfer type</a:t>
+            </a:r>
+            <a:r>
+              <a:rPr lang="zh-TW" altLang="en-US" sz="2000" dirty="0"/>
+              <a:t> </a:t>
+            </a:r>
+            <a:r>
+              <a:rPr lang="en-US" altLang="zh-TW" sz="2000" dirty="0"/>
+              <a:t>(HTRANS) changes during wait states</a:t>
+            </a:r>
+          </a:p>
+          <a:p>
+            <a:pPr marL="1257300" lvl="2" indent="-342900">
+              <a:buFont typeface="+mj-lt"/>
+              <a:buAutoNum type="arabicPeriod" startAt="2"/>
+            </a:pPr>
+            <a:r>
+              <a:rPr lang="en-US" altLang="zh-TW" sz="1600" dirty="0"/>
+              <a:t>BUSY transfer (</a:t>
+            </a:r>
+            <a:r>
+              <a:rPr lang="zh-TW" altLang="en-US" sz="1600" dirty="0"/>
+              <a:t>固定長度</a:t>
+            </a:r>
+            <a:r>
+              <a:rPr lang="en-US" altLang="zh-TW" sz="1600" dirty="0"/>
+              <a:t>burst)</a:t>
+            </a:r>
+          </a:p>
+          <a:p>
+            <a:pPr lvl="3"/>
+            <a:r>
+              <a:rPr lang="zh-TW" altLang="en-US" sz="1400" dirty="0"/>
+              <a:t>在固定長度</a:t>
+            </a:r>
+            <a:r>
+              <a:rPr lang="en-US" altLang="zh-TW" sz="1400" dirty="0"/>
+              <a:t>burst</a:t>
+            </a:r>
+            <a:r>
+              <a:rPr lang="zh-TW" altLang="en-US" sz="1400" dirty="0"/>
+              <a:t>的等待期間 </a:t>
+            </a:r>
+            <a:r>
+              <a:rPr lang="en-US" altLang="zh-TW" sz="1400" dirty="0"/>
+              <a:t>(</a:t>
+            </a:r>
+            <a:r>
+              <a:rPr lang="zh-TW" altLang="en-US" sz="1400" dirty="0"/>
+              <a:t>即 </a:t>
+            </a:r>
+            <a:r>
+              <a:rPr lang="en-US" altLang="zh-TW" sz="1400" dirty="0"/>
+              <a:t>HREADY </a:t>
+            </a:r>
+            <a:r>
+              <a:rPr lang="zh-TW" altLang="en-US" sz="1400" dirty="0"/>
+              <a:t>為 </a:t>
+            </a:r>
+            <a:r>
+              <a:rPr lang="en-US" altLang="zh-TW" sz="1400" dirty="0"/>
+              <a:t>LOW </a:t>
+            </a:r>
+            <a:r>
+              <a:rPr lang="zh-TW" altLang="en-US" sz="1400" dirty="0"/>
+              <a:t>時</a:t>
+            </a:r>
+            <a:r>
+              <a:rPr lang="en-US" altLang="zh-TW" sz="1400" dirty="0"/>
+              <a:t>)</a:t>
+            </a:r>
+            <a:r>
+              <a:rPr lang="zh-TW" altLang="en-US" sz="1400" dirty="0"/>
+              <a:t>，</a:t>
+            </a:r>
+            <a:r>
+              <a:rPr lang="en-US" altLang="zh-TW" sz="1400" dirty="0"/>
+              <a:t>master</a:t>
+            </a:r>
+            <a:r>
+              <a:rPr lang="zh-TW" altLang="en-US" sz="1400" dirty="0"/>
+              <a:t>允許將傳輸類型從 </a:t>
+            </a:r>
+            <a:r>
+              <a:rPr lang="en-US" altLang="zh-TW" sz="1400" dirty="0"/>
+              <a:t>BUSY </a:t>
+            </a:r>
+            <a:r>
+              <a:rPr lang="zh-TW" altLang="en-US" sz="1400" dirty="0"/>
+              <a:t>變更為 </a:t>
+            </a:r>
+            <a:r>
+              <a:rPr lang="en-US" altLang="zh-TW" sz="1400" dirty="0"/>
+              <a:t>SEQ</a:t>
+            </a:r>
+            <a:r>
+              <a:rPr lang="zh-TW" altLang="en-US" sz="1400" dirty="0"/>
+              <a:t>。</a:t>
+            </a:r>
+            <a:endParaRPr lang="en-US" altLang="zh-TW" sz="1400" dirty="0"/>
+          </a:p>
+          <a:p>
+            <a:pPr lvl="3"/>
+            <a:r>
+              <a:rPr lang="zh-TW" altLang="en-US" sz="1400" dirty="0"/>
+              <a:t>一旦 </a:t>
+            </a:r>
+            <a:r>
+              <a:rPr lang="en-US" altLang="zh-TW" sz="1400" dirty="0"/>
+              <a:t>HTRANS </a:t>
+            </a:r>
+            <a:r>
+              <a:rPr lang="zh-TW" altLang="en-US" sz="1400" dirty="0"/>
+              <a:t>變為 </a:t>
+            </a:r>
+            <a:r>
+              <a:rPr lang="en-US" altLang="zh-TW" sz="1400" dirty="0"/>
+              <a:t>SEQ</a:t>
+            </a:r>
+            <a:r>
+              <a:rPr lang="zh-TW" altLang="en-US" sz="1400" dirty="0"/>
+              <a:t>，主裝置必須保持 </a:t>
+            </a:r>
+            <a:r>
+              <a:rPr lang="en-US" altLang="zh-TW" sz="1400" dirty="0"/>
+              <a:t>HTRANS </a:t>
+            </a:r>
+            <a:r>
+              <a:rPr lang="zh-TW" altLang="en-US" sz="1400" dirty="0"/>
+              <a:t>不變，直到 </a:t>
+            </a:r>
+            <a:r>
+              <a:rPr lang="en-US" altLang="zh-TW" sz="1400" dirty="0"/>
+              <a:t>HREADY </a:t>
+            </a:r>
+            <a:r>
+              <a:rPr lang="zh-TW" altLang="en-US" sz="1400" dirty="0"/>
+              <a:t>為 </a:t>
+            </a:r>
+            <a:r>
+              <a:rPr lang="en-US" altLang="zh-TW" sz="1400" dirty="0"/>
+              <a:t>HIGH</a:t>
+            </a:r>
+            <a:r>
+              <a:rPr lang="zh-TW" altLang="en-US" sz="1400" dirty="0"/>
+              <a:t>，表示該次傳輸完成。</a:t>
+            </a:r>
+            <a:endParaRPr lang="en-US" altLang="zh-TW" sz="1400" dirty="0"/>
+          </a:p>
+        </p:txBody>
+      </p:sp>
+      <p:pic>
+        <p:nvPicPr>
+          <p:cNvPr id="6" name="圖片 5">
+            <a:extLst>
+              <a:ext uri="{FF2B5EF4-FFF2-40B4-BE49-F238E27FC236}">
+                <a16:creationId xmlns:a16="http://schemas.microsoft.com/office/drawing/2014/main" id="{9E27BFC2-45CB-CD22-9DCF-19C9FF3874E0}"/>
+              </a:ext>
+            </a:extLst>
+          </p:cNvPr>
+          <p:cNvPicPr>
+            <a:picLocks noChangeAspect="1"/>
+          </p:cNvPicPr>
+          <p:nvPr/>
+        </p:nvPicPr>
+        <p:blipFill>
+          <a:blip r:embed="rId3"/>
+          <a:stretch>
+            <a:fillRect/>
+          </a:stretch>
+        </p:blipFill>
+        <p:spPr>
+          <a:xfrm>
+            <a:off x="2813293" y="3773599"/>
+            <a:ext cx="6565413" cy="2538301"/>
+          </a:xfrm>
+          <a:prstGeom prst="rect">
+            <a:avLst/>
+          </a:prstGeom>
+          <a:ln>
+            <a:solidFill>
+              <a:schemeClr val="tx1"/>
+            </a:solidFill>
+          </a:ln>
+        </p:spPr>
+      </p:pic>
+    </p:spTree>
+    <p:extLst>
+      <p:ext uri="{BB962C8B-B14F-4D97-AF65-F5344CB8AC3E}">
+        <p14:creationId xmlns:p14="http://schemas.microsoft.com/office/powerpoint/2010/main" val="2272125524"/>
+      </p:ext>
+    </p:extLst>
+  </p:cSld>
+  <p:clrMapOvr>
+    <a:masterClrMapping/>
+  </p:clrMapOvr>
+</p:sld>
+</file>
+
+<file path=ppt/slides/slide42.xml><?xml version="1.0" encoding="utf-8"?>
+<p:sld xmlns:a="http://schemas.openxmlformats.org/drawingml/2006/main" xmlns:r="http://schemas.openxmlformats.org/officeDocument/2006/relationships" xmlns:p="http://schemas.openxmlformats.org/presentationml/2006/main">
+  <p:cSld>
+    <p:spTree>
+      <p:nvGrpSpPr>
+        <p:cNvPr id="1" name="">
+          <a:extLst>
+            <a:ext uri="{FF2B5EF4-FFF2-40B4-BE49-F238E27FC236}">
+              <a16:creationId xmlns:a16="http://schemas.microsoft.com/office/drawing/2014/main" id="{E5512D0A-AED1-09DA-B784-7E6FF89D8880}"/>
+            </a:ext>
+          </a:extLst>
+        </p:cNvPr>
+        <p:cNvGrpSpPr/>
+        <p:nvPr/>
+      </p:nvGrpSpPr>
+      <p:grpSpPr>
+        <a:xfrm>
+          <a:off x="0" y="0"/>
+          <a:ext cx="0" cy="0"/>
+          <a:chOff x="0" y="0"/>
+          <a:chExt cx="0" cy="0"/>
+        </a:xfrm>
+      </p:grpSpPr>
+      <p:sp>
+        <p:nvSpPr>
+          <p:cNvPr id="2" name="標題 1">
+            <a:extLst>
+              <a:ext uri="{FF2B5EF4-FFF2-40B4-BE49-F238E27FC236}">
+                <a16:creationId xmlns:a16="http://schemas.microsoft.com/office/drawing/2014/main" id="{241EE58A-B782-7B7F-B31B-9943D9D34B0D}"/>
+              </a:ext>
+            </a:extLst>
+          </p:cNvPr>
+          <p:cNvSpPr>
+            <a:spLocks noGrp="1"/>
+          </p:cNvSpPr>
+          <p:nvPr>
+            <p:ph type="title"/>
+          </p:nvPr>
+        </p:nvSpPr>
+        <p:spPr/>
+        <p:txBody>
+          <a:bodyPr/>
+          <a:lstStyle/>
+          <a:p>
+            <a:r>
+              <a:rPr lang="en-US" altLang="zh-TW" dirty="0"/>
+              <a:t>AHB</a:t>
+            </a:r>
+            <a:r>
+              <a:rPr lang="zh-TW" altLang="en-US" dirty="0"/>
+              <a:t> </a:t>
+            </a:r>
+            <a:r>
+              <a:rPr lang="en-US" altLang="zh-TW" dirty="0"/>
+              <a:t>Transfers (22/)</a:t>
+            </a:r>
+            <a:endParaRPr lang="zh-TW" altLang="en-US" dirty="0"/>
+          </a:p>
+        </p:txBody>
+      </p:sp>
+      <p:sp>
+        <p:nvSpPr>
+          <p:cNvPr id="3" name="內容版面配置區 2">
+            <a:extLst>
+              <a:ext uri="{FF2B5EF4-FFF2-40B4-BE49-F238E27FC236}">
+                <a16:creationId xmlns:a16="http://schemas.microsoft.com/office/drawing/2014/main" id="{AF68FEC9-F243-B9C4-06E8-69A88E5B549A}"/>
+              </a:ext>
+            </a:extLst>
+          </p:cNvPr>
+          <p:cNvSpPr>
+            <a:spLocks noGrp="1"/>
+          </p:cNvSpPr>
+          <p:nvPr>
+            <p:ph idx="1"/>
+          </p:nvPr>
+        </p:nvSpPr>
+        <p:spPr/>
+        <p:txBody>
+          <a:bodyPr>
+            <a:normAutofit/>
+          </a:bodyPr>
+          <a:lstStyle/>
+          <a:p>
+            <a:pPr marL="514350" indent="-514350">
+              <a:buFont typeface="+mj-lt"/>
+              <a:buAutoNum type="arabicPeriod" startAt="6"/>
+            </a:pPr>
+            <a:r>
+              <a:rPr lang="en-US" altLang="zh-TW" dirty="0"/>
+              <a:t>Waited transfers</a:t>
+            </a:r>
+            <a:endParaRPr lang="en-US" altLang="zh-TW" sz="2000" dirty="0"/>
+          </a:p>
+          <a:p>
+            <a:pPr lvl="1"/>
+            <a:r>
+              <a:rPr lang="en-US" altLang="zh-TW" sz="2000" dirty="0"/>
+              <a:t> Transfer type</a:t>
+            </a:r>
+            <a:r>
+              <a:rPr lang="zh-TW" altLang="en-US" sz="2000" dirty="0"/>
+              <a:t> </a:t>
+            </a:r>
+            <a:r>
+              <a:rPr lang="en-US" altLang="zh-TW" sz="2000" dirty="0"/>
+              <a:t>(HTRANS) changes during wait states</a:t>
+            </a:r>
+          </a:p>
+          <a:p>
+            <a:pPr marL="1257300" lvl="2" indent="-342900">
+              <a:buFont typeface="+mj-lt"/>
+              <a:buAutoNum type="arabicPeriod" startAt="3"/>
+            </a:pPr>
+            <a:r>
+              <a:rPr lang="en-US" altLang="zh-TW" sz="1600" dirty="0"/>
+              <a:t>BUSY transfer (</a:t>
+            </a:r>
+            <a:r>
+              <a:rPr lang="zh-TW" altLang="en-US" sz="1600" dirty="0"/>
+              <a:t>不固定長度</a:t>
+            </a:r>
+            <a:r>
+              <a:rPr lang="en-US" altLang="zh-TW" sz="1600" dirty="0"/>
+              <a:t>burst)</a:t>
+            </a:r>
+          </a:p>
+          <a:p>
+            <a:pPr lvl="3"/>
+            <a:r>
+              <a:rPr lang="zh-TW" altLang="en-US" sz="1400" dirty="0"/>
+              <a:t>在不定長度</a:t>
+            </a:r>
+            <a:r>
+              <a:rPr lang="en-US" altLang="zh-TW" sz="1400" dirty="0"/>
+              <a:t>burst (INCR)</a:t>
+            </a:r>
+            <a:r>
+              <a:rPr lang="zh-TW" altLang="en-US" sz="1400" dirty="0"/>
+              <a:t> 的等待期間（即 </a:t>
+            </a:r>
+            <a:r>
+              <a:rPr lang="en-US" altLang="zh-TW" sz="1400" dirty="0"/>
+              <a:t>HREADY </a:t>
+            </a:r>
+            <a:r>
+              <a:rPr lang="zh-TW" altLang="en-US" sz="1400" dirty="0"/>
+              <a:t>為 </a:t>
+            </a:r>
+            <a:r>
+              <a:rPr lang="en-US" altLang="zh-TW" sz="1400" dirty="0"/>
+              <a:t>LOW </a:t>
+            </a:r>
+            <a:r>
+              <a:rPr lang="zh-TW" altLang="en-US" sz="1400" dirty="0"/>
+              <a:t>時），</a:t>
+            </a:r>
+            <a:r>
+              <a:rPr lang="en-US" altLang="zh-TW" sz="1400" dirty="0"/>
+              <a:t>master</a:t>
+            </a:r>
+            <a:r>
+              <a:rPr lang="zh-TW" altLang="en-US" sz="1400" dirty="0"/>
+              <a:t>可以將傳輸類型從 </a:t>
+            </a:r>
+            <a:r>
+              <a:rPr lang="en-US" altLang="zh-TW" sz="1400" dirty="0"/>
+              <a:t>BUSY </a:t>
+            </a:r>
+            <a:r>
+              <a:rPr lang="zh-TW" altLang="en-US" sz="1400" dirty="0"/>
+              <a:t>改為任意其他類型。</a:t>
+            </a:r>
+            <a:endParaRPr lang="en-US" altLang="zh-TW" sz="1400" dirty="0"/>
+          </a:p>
+          <a:p>
+            <a:pPr marL="2171700" lvl="4" indent="-342900">
+              <a:buFont typeface="+mj-lt"/>
+              <a:buAutoNum type="arabicParenR"/>
+            </a:pPr>
+            <a:r>
+              <a:rPr lang="zh-TW" altLang="en-US" sz="1400" dirty="0"/>
+              <a:t>若改為 </a:t>
+            </a:r>
+            <a:r>
+              <a:rPr lang="en-US" altLang="zh-TW" sz="1400" dirty="0"/>
+              <a:t>SEQ </a:t>
+            </a:r>
+            <a:r>
+              <a:rPr lang="zh-TW" altLang="en-US" sz="1400" dirty="0"/>
+              <a:t>傳輸，則突發傳輸繼續進行。</a:t>
+            </a:r>
+            <a:endParaRPr lang="en-US" altLang="zh-TW" sz="1400" dirty="0"/>
+          </a:p>
+          <a:p>
+            <a:pPr marL="2171700" lvl="4" indent="-342900">
+              <a:buFont typeface="+mj-lt"/>
+              <a:buAutoNum type="arabicParenR"/>
+            </a:pPr>
+            <a:r>
+              <a:rPr lang="zh-TW" altLang="en-US" sz="1400" dirty="0"/>
+              <a:t>若改為 </a:t>
+            </a:r>
+            <a:r>
+              <a:rPr lang="en-US" altLang="zh-TW" sz="1400" dirty="0"/>
+              <a:t>IDLE </a:t>
+            </a:r>
+            <a:r>
+              <a:rPr lang="zh-TW" altLang="en-US" sz="1400" dirty="0"/>
+              <a:t>或 </a:t>
+            </a:r>
+            <a:r>
+              <a:rPr lang="en-US" altLang="zh-TW" sz="1400" dirty="0"/>
+              <a:t>NONSEQ </a:t>
+            </a:r>
+            <a:r>
+              <a:rPr lang="zh-TW" altLang="en-US" sz="1400" dirty="0"/>
+              <a:t>傳輸，則前一個</a:t>
+            </a:r>
+            <a:r>
+              <a:rPr lang="en-US" altLang="zh-TW" sz="1400" dirty="0"/>
+              <a:t>burst</a:t>
+            </a:r>
+            <a:r>
+              <a:rPr lang="zh-TW" altLang="en-US" sz="1400" dirty="0"/>
+              <a:t>終止，換成新的</a:t>
+            </a:r>
+            <a:r>
+              <a:rPr lang="en-US" altLang="zh-TW" sz="1400" dirty="0"/>
+              <a:t>burst </a:t>
+            </a:r>
+            <a:r>
+              <a:rPr lang="zh-TW" altLang="en-US" sz="1400" dirty="0"/>
+              <a:t>。</a:t>
+            </a:r>
+            <a:endParaRPr lang="en-US" altLang="zh-TW" sz="1400" dirty="0"/>
+          </a:p>
+        </p:txBody>
+      </p:sp>
+      <p:pic>
+        <p:nvPicPr>
+          <p:cNvPr id="5" name="圖片 4">
+            <a:extLst>
+              <a:ext uri="{FF2B5EF4-FFF2-40B4-BE49-F238E27FC236}">
+                <a16:creationId xmlns:a16="http://schemas.microsoft.com/office/drawing/2014/main" id="{5860C4E6-3A84-D6CF-4E3E-BF5AA1E1E83E}"/>
+              </a:ext>
+            </a:extLst>
+          </p:cNvPr>
+          <p:cNvPicPr>
+            <a:picLocks noChangeAspect="1"/>
+          </p:cNvPicPr>
+          <p:nvPr/>
+        </p:nvPicPr>
+        <p:blipFill>
+          <a:blip r:embed="rId3"/>
+          <a:stretch>
+            <a:fillRect/>
+          </a:stretch>
+        </p:blipFill>
+        <p:spPr>
+          <a:xfrm>
+            <a:off x="2851888" y="4139924"/>
+            <a:ext cx="6488223" cy="2471321"/>
+          </a:xfrm>
+          <a:prstGeom prst="rect">
+            <a:avLst/>
+          </a:prstGeom>
+          <a:ln>
+            <a:solidFill>
+              <a:schemeClr val="tx1"/>
+            </a:solidFill>
+          </a:ln>
+        </p:spPr>
+      </p:pic>
+    </p:spTree>
+    <p:extLst>
+      <p:ext uri="{BB962C8B-B14F-4D97-AF65-F5344CB8AC3E}">
+        <p14:creationId xmlns:p14="http://schemas.microsoft.com/office/powerpoint/2010/main" val="1459945389"/>
+      </p:ext>
+    </p:extLst>
+  </p:cSld>
+  <p:clrMapOvr>
+    <a:masterClrMapping/>
+  </p:clrMapOvr>
+</p:sld>
+</file>
+
+<file path=ppt/slides/slide43.xml><?xml version="1.0" encoding="utf-8"?>
+<p:sld xmlns:a="http://schemas.openxmlformats.org/drawingml/2006/main" xmlns:r="http://schemas.openxmlformats.org/officeDocument/2006/relationships" xmlns:p="http://schemas.openxmlformats.org/presentationml/2006/main">
+  <p:cSld>
+    <p:spTree>
+      <p:nvGrpSpPr>
+        <p:cNvPr id="1" name="">
+          <a:extLst>
+            <a:ext uri="{FF2B5EF4-FFF2-40B4-BE49-F238E27FC236}">
+              <a16:creationId xmlns:a16="http://schemas.microsoft.com/office/drawing/2014/main" id="{C089B8A9-CF56-F020-56DD-73C9FF60ABF5}"/>
+            </a:ext>
+          </a:extLst>
+        </p:cNvPr>
+        <p:cNvGrpSpPr/>
+        <p:nvPr/>
+      </p:nvGrpSpPr>
+      <p:grpSpPr>
+        <a:xfrm>
+          <a:off x="0" y="0"/>
+          <a:ext cx="0" cy="0"/>
+          <a:chOff x="0" y="0"/>
+          <a:chExt cx="0" cy="0"/>
+        </a:xfrm>
+      </p:grpSpPr>
+      <p:sp>
+        <p:nvSpPr>
+          <p:cNvPr id="2" name="標題 1">
+            <a:extLst>
+              <a:ext uri="{FF2B5EF4-FFF2-40B4-BE49-F238E27FC236}">
+                <a16:creationId xmlns:a16="http://schemas.microsoft.com/office/drawing/2014/main" id="{FA3935C3-85F8-66A0-808A-610510DFACD5}"/>
+              </a:ext>
+            </a:extLst>
+          </p:cNvPr>
+          <p:cNvSpPr>
+            <a:spLocks noGrp="1"/>
+          </p:cNvSpPr>
+          <p:nvPr>
+            <p:ph type="title"/>
+          </p:nvPr>
+        </p:nvSpPr>
+        <p:spPr/>
+        <p:txBody>
+          <a:bodyPr/>
+          <a:lstStyle/>
+          <a:p>
+            <a:r>
+              <a:rPr lang="en-US" altLang="zh-TW" dirty="0"/>
+              <a:t>AHB</a:t>
+            </a:r>
+            <a:r>
+              <a:rPr lang="zh-TW" altLang="en-US" dirty="0"/>
+              <a:t> </a:t>
+            </a:r>
+            <a:r>
+              <a:rPr lang="en-US" altLang="zh-TW" dirty="0"/>
+              <a:t>Transfers (23/)</a:t>
+            </a:r>
+            <a:endParaRPr lang="zh-TW" altLang="en-US" dirty="0"/>
+          </a:p>
+        </p:txBody>
+      </p:sp>
+      <p:sp>
+        <p:nvSpPr>
+          <p:cNvPr id="3" name="內容版面配置區 2">
+            <a:extLst>
+              <a:ext uri="{FF2B5EF4-FFF2-40B4-BE49-F238E27FC236}">
+                <a16:creationId xmlns:a16="http://schemas.microsoft.com/office/drawing/2014/main" id="{05BDEFC0-38F5-96BD-436B-531449AA6C58}"/>
+              </a:ext>
+            </a:extLst>
+          </p:cNvPr>
+          <p:cNvSpPr>
+            <a:spLocks noGrp="1"/>
+          </p:cNvSpPr>
+          <p:nvPr>
+            <p:ph idx="1"/>
+          </p:nvPr>
+        </p:nvSpPr>
+        <p:spPr/>
+        <p:txBody>
+          <a:bodyPr>
+            <a:normAutofit/>
+          </a:bodyPr>
+          <a:lstStyle/>
+          <a:p>
+            <a:pPr marL="514350" indent="-514350">
+              <a:buFont typeface="+mj-lt"/>
+              <a:buAutoNum type="arabicPeriod" startAt="6"/>
+            </a:pPr>
+            <a:r>
+              <a:rPr lang="en-US" altLang="zh-TW" dirty="0"/>
+              <a:t>Waited transfers</a:t>
+            </a:r>
+            <a:endParaRPr lang="en-US" altLang="zh-TW" sz="2000" dirty="0"/>
+          </a:p>
+          <a:p>
+            <a:pPr lvl="1"/>
+            <a:r>
+              <a:rPr lang="en-US" altLang="zh-TW" sz="2000" dirty="0"/>
+              <a:t> Address (HADDR) changes during wait states</a:t>
+            </a:r>
+          </a:p>
+          <a:p>
+            <a:pPr marL="1257300" lvl="2" indent="-342900">
+              <a:buFont typeface="+mj-lt"/>
+              <a:buAutoNum type="arabicPeriod"/>
+            </a:pPr>
+            <a:r>
+              <a:rPr lang="en-US" altLang="zh-TW" sz="1600" dirty="0"/>
+              <a:t>During an IDLE transfer</a:t>
+            </a:r>
+          </a:p>
+          <a:p>
+            <a:pPr lvl="3"/>
+            <a:r>
+              <a:rPr lang="zh-TW" altLang="en-US" sz="1400" dirty="0"/>
+              <a:t>在等待中的傳輸期間，</a:t>
+            </a:r>
+            <a:r>
+              <a:rPr lang="en-US" altLang="zh-TW" sz="1400" dirty="0"/>
+              <a:t>master</a:t>
+            </a:r>
+            <a:r>
+              <a:rPr lang="zh-TW" altLang="en-US" sz="1400" dirty="0"/>
+              <a:t>可以變更 </a:t>
+            </a:r>
+            <a:r>
+              <a:rPr lang="en-US" altLang="zh-TW" sz="1400" dirty="0"/>
+              <a:t>IDLE </a:t>
+            </a:r>
+            <a:r>
+              <a:rPr lang="zh-TW" altLang="en-US" sz="1400" dirty="0"/>
+              <a:t>傳輸的位址。</a:t>
+            </a:r>
+            <a:endParaRPr lang="en-US" altLang="zh-TW" sz="1400" dirty="0"/>
+          </a:p>
+          <a:p>
+            <a:pPr lvl="3"/>
+            <a:r>
+              <a:rPr lang="zh-TW" altLang="en-US" sz="1400" dirty="0"/>
+              <a:t>但當 </a:t>
+            </a:r>
+            <a:r>
+              <a:rPr lang="en-US" altLang="zh-TW" sz="1400" dirty="0"/>
+              <a:t>HTRANS </a:t>
+            </a:r>
+            <a:r>
+              <a:rPr lang="zh-TW" altLang="en-US" sz="1400" dirty="0"/>
+              <a:t>傳輸類型從 </a:t>
+            </a:r>
+            <a:r>
+              <a:rPr lang="en-US" altLang="zh-TW" sz="1400" dirty="0"/>
+              <a:t>IDLE </a:t>
+            </a:r>
+            <a:r>
+              <a:rPr lang="zh-TW" altLang="en-US" sz="1400" dirty="0"/>
+              <a:t>變為 </a:t>
+            </a:r>
+            <a:r>
+              <a:rPr lang="en-US" altLang="zh-TW" sz="1400" dirty="0"/>
+              <a:t>NONSEQ </a:t>
+            </a:r>
+            <a:r>
+              <a:rPr lang="zh-TW" altLang="en-US" sz="1400" dirty="0"/>
+              <a:t>時，</a:t>
+            </a:r>
+            <a:r>
+              <a:rPr lang="en-US" altLang="zh-TW" sz="1400" dirty="0"/>
+              <a:t> master</a:t>
+            </a:r>
+            <a:r>
+              <a:rPr lang="zh-TW" altLang="en-US" sz="1400" dirty="0"/>
+              <a:t>必須將位址保持不變，</a:t>
+            </a:r>
+            <a:br>
+              <a:rPr lang="en-US" altLang="zh-TW" sz="1400" dirty="0"/>
+            </a:br>
+            <a:r>
+              <a:rPr lang="zh-TW" altLang="en-US" sz="1400" dirty="0"/>
+              <a:t>直到 </a:t>
+            </a:r>
+            <a:r>
+              <a:rPr lang="en-US" altLang="zh-TW" sz="1400" dirty="0"/>
+              <a:t>HREADY </a:t>
+            </a:r>
+            <a:r>
+              <a:rPr lang="zh-TW" altLang="en-US" sz="1400" dirty="0"/>
+              <a:t>為 </a:t>
+            </a:r>
+            <a:r>
+              <a:rPr lang="en-US" altLang="zh-TW" sz="1400" dirty="0"/>
+              <a:t>HIGH</a:t>
+            </a:r>
+            <a:r>
+              <a:rPr lang="zh-TW" altLang="en-US" sz="1400" dirty="0"/>
+              <a:t>（表示傳輸完成）。</a:t>
+            </a:r>
+            <a:endParaRPr lang="en-US" altLang="zh-TW" sz="1400" dirty="0"/>
+          </a:p>
+        </p:txBody>
+      </p:sp>
+      <p:pic>
+        <p:nvPicPr>
+          <p:cNvPr id="6" name="圖片 5">
+            <a:extLst>
+              <a:ext uri="{FF2B5EF4-FFF2-40B4-BE49-F238E27FC236}">
+                <a16:creationId xmlns:a16="http://schemas.microsoft.com/office/drawing/2014/main" id="{6A7DD2D4-2833-263B-E6E8-3A737A737583}"/>
+              </a:ext>
+            </a:extLst>
+          </p:cNvPr>
+          <p:cNvPicPr>
+            <a:picLocks noChangeAspect="1"/>
+          </p:cNvPicPr>
+          <p:nvPr/>
+        </p:nvPicPr>
+        <p:blipFill>
+          <a:blip r:embed="rId3"/>
+          <a:stretch>
+            <a:fillRect/>
+          </a:stretch>
+        </p:blipFill>
+        <p:spPr>
+          <a:xfrm>
+            <a:off x="2539780" y="3954395"/>
+            <a:ext cx="7112440" cy="2556586"/>
+          </a:xfrm>
+          <a:prstGeom prst="rect">
+            <a:avLst/>
+          </a:prstGeom>
+          <a:ln>
+            <a:solidFill>
+              <a:schemeClr val="tx1"/>
+            </a:solidFill>
+          </a:ln>
+        </p:spPr>
+      </p:pic>
+    </p:spTree>
+    <p:extLst>
+      <p:ext uri="{BB962C8B-B14F-4D97-AF65-F5344CB8AC3E}">
+        <p14:creationId xmlns:p14="http://schemas.microsoft.com/office/powerpoint/2010/main" val="2426581736"/>
+      </p:ext>
+    </p:extLst>
+  </p:cSld>
+  <p:clrMapOvr>
+    <a:masterClrMapping/>
+  </p:clrMapOvr>
+</p:sld>
+</file>
+
+<file path=ppt/slides/slide44.xml><?xml version="1.0" encoding="utf-8"?>
+<p:sld xmlns:a="http://schemas.openxmlformats.org/drawingml/2006/main" xmlns:r="http://schemas.openxmlformats.org/officeDocument/2006/relationships" xmlns:p="http://schemas.openxmlformats.org/presentationml/2006/main">
+  <p:cSld>
+    <p:spTree>
+      <p:nvGrpSpPr>
+        <p:cNvPr id="1" name="">
+          <a:extLst>
+            <a:ext uri="{FF2B5EF4-FFF2-40B4-BE49-F238E27FC236}">
+              <a16:creationId xmlns:a16="http://schemas.microsoft.com/office/drawing/2014/main" id="{B558393F-5D50-9A30-275F-526A6504147F}"/>
+            </a:ext>
+          </a:extLst>
+        </p:cNvPr>
+        <p:cNvGrpSpPr/>
+        <p:nvPr/>
+      </p:nvGrpSpPr>
+      <p:grpSpPr>
+        <a:xfrm>
+          <a:off x="0" y="0"/>
+          <a:ext cx="0" cy="0"/>
+          <a:chOff x="0" y="0"/>
+          <a:chExt cx="0" cy="0"/>
+        </a:xfrm>
+      </p:grpSpPr>
+      <p:sp>
+        <p:nvSpPr>
+          <p:cNvPr id="2" name="標題 1">
+            <a:extLst>
+              <a:ext uri="{FF2B5EF4-FFF2-40B4-BE49-F238E27FC236}">
+                <a16:creationId xmlns:a16="http://schemas.microsoft.com/office/drawing/2014/main" id="{CC15FD92-ED09-04CF-AC98-74688E59F72E}"/>
+              </a:ext>
+            </a:extLst>
+          </p:cNvPr>
+          <p:cNvSpPr>
+            <a:spLocks noGrp="1"/>
+          </p:cNvSpPr>
+          <p:nvPr>
+            <p:ph type="title"/>
+          </p:nvPr>
+        </p:nvSpPr>
+        <p:spPr/>
+        <p:txBody>
+          <a:bodyPr/>
+          <a:lstStyle/>
+          <a:p>
+            <a:r>
+              <a:rPr lang="en-US" altLang="zh-TW" dirty="0"/>
+              <a:t>AHB</a:t>
+            </a:r>
+            <a:r>
+              <a:rPr lang="zh-TW" altLang="en-US" dirty="0"/>
+              <a:t> </a:t>
+            </a:r>
+            <a:r>
+              <a:rPr lang="en-US" altLang="zh-TW" dirty="0"/>
+              <a:t>Transfers (24/)</a:t>
+            </a:r>
+            <a:endParaRPr lang="zh-TW" altLang="en-US" dirty="0"/>
+          </a:p>
+        </p:txBody>
+      </p:sp>
+      <p:sp>
+        <p:nvSpPr>
+          <p:cNvPr id="3" name="內容版面配置區 2">
+            <a:extLst>
+              <a:ext uri="{FF2B5EF4-FFF2-40B4-BE49-F238E27FC236}">
+                <a16:creationId xmlns:a16="http://schemas.microsoft.com/office/drawing/2014/main" id="{51D60763-0643-1D91-693F-85341F36E336}"/>
+              </a:ext>
+            </a:extLst>
+          </p:cNvPr>
+          <p:cNvSpPr>
+            <a:spLocks noGrp="1"/>
+          </p:cNvSpPr>
+          <p:nvPr>
+            <p:ph idx="1"/>
+          </p:nvPr>
+        </p:nvSpPr>
+        <p:spPr/>
+        <p:txBody>
+          <a:bodyPr>
+            <a:normAutofit/>
+          </a:bodyPr>
+          <a:lstStyle/>
+          <a:p>
+            <a:pPr marL="514350" indent="-514350">
+              <a:buFont typeface="+mj-lt"/>
+              <a:buAutoNum type="arabicPeriod" startAt="6"/>
+            </a:pPr>
+            <a:r>
+              <a:rPr lang="en-US" altLang="zh-TW" dirty="0"/>
+              <a:t>Waited transfers</a:t>
+            </a:r>
+            <a:endParaRPr lang="en-US" altLang="zh-TW" sz="2000" dirty="0"/>
+          </a:p>
+          <a:p>
+            <a:pPr lvl="1"/>
+            <a:r>
+              <a:rPr lang="en-US" altLang="zh-TW" sz="2000" dirty="0"/>
+              <a:t> Address (HADDR) changes during wait states</a:t>
+            </a:r>
+          </a:p>
+          <a:p>
+            <a:pPr marL="1257300" lvl="2" indent="-342900">
+              <a:buFont typeface="+mj-lt"/>
+              <a:buAutoNum type="arabicPeriod" startAt="2"/>
+            </a:pPr>
+            <a:r>
+              <a:rPr lang="en-US" altLang="zh-TW" sz="1600" dirty="0"/>
+              <a:t>After an ERROR response</a:t>
+            </a:r>
+          </a:p>
+          <a:p>
+            <a:pPr lvl="3"/>
+            <a:r>
+              <a:rPr lang="zh-TW" altLang="en-US" sz="1400" dirty="0"/>
+              <a:t>在等待中的傳輸期間，如果</a:t>
+            </a:r>
+            <a:r>
+              <a:rPr lang="en-US" altLang="zh-TW" sz="1400" dirty="0"/>
+              <a:t>slave</a:t>
+            </a:r>
+            <a:r>
+              <a:rPr lang="zh-TW" altLang="en-US" sz="1400" dirty="0"/>
+              <a:t>回應 </a:t>
+            </a:r>
+            <a:r>
+              <a:rPr lang="en-US" altLang="zh-TW" sz="1400" dirty="0"/>
+              <a:t>ERROR</a:t>
+            </a:r>
+            <a:r>
+              <a:rPr lang="zh-TW" altLang="en-US" sz="1400" dirty="0"/>
+              <a:t>，則當 </a:t>
+            </a:r>
+            <a:r>
+              <a:rPr lang="en-US" altLang="zh-TW" sz="1400" dirty="0"/>
+              <a:t>HREADY </a:t>
+            </a:r>
+            <a:r>
+              <a:rPr lang="zh-TW" altLang="en-US" sz="1400" dirty="0"/>
+              <a:t>為 </a:t>
+            </a:r>
+            <a:r>
+              <a:rPr lang="en-US" altLang="zh-TW" sz="1400" dirty="0"/>
+              <a:t>LOW </a:t>
+            </a:r>
+            <a:r>
+              <a:rPr lang="zh-TW" altLang="en-US" sz="1400" dirty="0"/>
+              <a:t>時，主裝置允許變更位址。</a:t>
+            </a:r>
+            <a:endParaRPr lang="en-US" altLang="zh-TW" sz="1400" dirty="0"/>
+          </a:p>
+        </p:txBody>
+      </p:sp>
+      <p:pic>
+        <p:nvPicPr>
+          <p:cNvPr id="5" name="圖片 4">
+            <a:extLst>
+              <a:ext uri="{FF2B5EF4-FFF2-40B4-BE49-F238E27FC236}">
+                <a16:creationId xmlns:a16="http://schemas.microsoft.com/office/drawing/2014/main" id="{174FFE45-0A20-16B7-C26A-DD7C92366114}"/>
+              </a:ext>
+            </a:extLst>
+          </p:cNvPr>
+          <p:cNvPicPr>
+            <a:picLocks noChangeAspect="1"/>
+          </p:cNvPicPr>
+          <p:nvPr/>
+        </p:nvPicPr>
+        <p:blipFill>
+          <a:blip r:embed="rId3"/>
+          <a:stretch>
+            <a:fillRect/>
+          </a:stretch>
+        </p:blipFill>
+        <p:spPr>
+          <a:xfrm>
+            <a:off x="2826051" y="3629339"/>
+            <a:ext cx="6539897" cy="2682561"/>
+          </a:xfrm>
+          <a:prstGeom prst="rect">
+            <a:avLst/>
+          </a:prstGeom>
+          <a:ln>
+            <a:solidFill>
+              <a:schemeClr val="tx1"/>
+            </a:solidFill>
+          </a:ln>
+        </p:spPr>
+      </p:pic>
+    </p:spTree>
+    <p:extLst>
+      <p:ext uri="{BB962C8B-B14F-4D97-AF65-F5344CB8AC3E}">
+        <p14:creationId xmlns:p14="http://schemas.microsoft.com/office/powerpoint/2010/main" val="121671444"/>
+      </p:ext>
+    </p:extLst>
+  </p:cSld>
+  <p:clrMapOvr>
+    <a:masterClrMapping/>
+  </p:clrMapOvr>
+</p:sld>
+</file>
+
+<file path=ppt/slides/slide45.xml><?xml version="1.0" encoding="utf-8"?>
+<p:sld xmlns:a="http://schemas.openxmlformats.org/drawingml/2006/main" xmlns:r="http://schemas.openxmlformats.org/officeDocument/2006/relationships" xmlns:p="http://schemas.openxmlformats.org/presentationml/2006/main">
+  <p:cSld>
+    <p:spTree>
+      <p:nvGrpSpPr>
+        <p:cNvPr id="1" name="">
+          <a:extLst>
+            <a:ext uri="{FF2B5EF4-FFF2-40B4-BE49-F238E27FC236}">
+              <a16:creationId xmlns:a16="http://schemas.microsoft.com/office/drawing/2014/main" id="{7B9B8817-5166-6177-060B-5C0D117D1B24}"/>
+            </a:ext>
+          </a:extLst>
+        </p:cNvPr>
+        <p:cNvGrpSpPr/>
+        <p:nvPr/>
+      </p:nvGrpSpPr>
+      <p:grpSpPr>
+        <a:xfrm>
+          <a:off x="0" y="0"/>
+          <a:ext cx="0" cy="0"/>
+          <a:chOff x="0" y="0"/>
+          <a:chExt cx="0" cy="0"/>
+        </a:xfrm>
+      </p:grpSpPr>
+      <p:sp>
+        <p:nvSpPr>
+          <p:cNvPr id="2" name="標題 1">
+            <a:extLst>
+              <a:ext uri="{FF2B5EF4-FFF2-40B4-BE49-F238E27FC236}">
+                <a16:creationId xmlns:a16="http://schemas.microsoft.com/office/drawing/2014/main" id="{A0C6CF94-F867-32F3-B10D-3D5FF2F2366E}"/>
+              </a:ext>
+            </a:extLst>
+          </p:cNvPr>
+          <p:cNvSpPr>
+            <a:spLocks noGrp="1"/>
+          </p:cNvSpPr>
+          <p:nvPr>
+            <p:ph type="title"/>
+          </p:nvPr>
+        </p:nvSpPr>
+        <p:spPr/>
+        <p:txBody>
+          <a:bodyPr/>
+          <a:lstStyle/>
+          <a:p>
+            <a:r>
+              <a:rPr lang="en-US" altLang="zh-TW" dirty="0"/>
+              <a:t>AHB</a:t>
+            </a:r>
+            <a:r>
+              <a:rPr lang="zh-TW" altLang="en-US" dirty="0"/>
+              <a:t> </a:t>
+            </a:r>
+            <a:r>
+              <a:rPr lang="en-US" altLang="zh-TW" dirty="0"/>
+              <a:t>Transfers (25/)</a:t>
+            </a:r>
+            <a:endParaRPr lang="zh-TW" altLang="en-US" dirty="0"/>
+          </a:p>
+        </p:txBody>
+      </p:sp>
+      <p:sp>
+        <p:nvSpPr>
+          <p:cNvPr id="3" name="內容版面配置區 2">
+            <a:extLst>
+              <a:ext uri="{FF2B5EF4-FFF2-40B4-BE49-F238E27FC236}">
+                <a16:creationId xmlns:a16="http://schemas.microsoft.com/office/drawing/2014/main" id="{9FE20FC8-A4A4-E2F2-647F-70196FA002BD}"/>
+              </a:ext>
+            </a:extLst>
+          </p:cNvPr>
+          <p:cNvSpPr>
+            <a:spLocks noGrp="1"/>
+          </p:cNvSpPr>
+          <p:nvPr>
+            <p:ph idx="1"/>
+          </p:nvPr>
+        </p:nvSpPr>
+        <p:spPr/>
+        <p:txBody>
+          <a:bodyPr>
+            <a:normAutofit/>
+          </a:bodyPr>
+          <a:lstStyle/>
+          <a:p>
+            <a:pPr marL="514350" indent="-514350">
+              <a:buFont typeface="+mj-lt"/>
+              <a:buAutoNum type="arabicPeriod" startAt="7"/>
+            </a:pPr>
+            <a:r>
+              <a:rPr lang="en-US" altLang="zh-TW" dirty="0"/>
+              <a:t>Protection control</a:t>
+            </a:r>
+          </a:p>
+          <a:p>
+            <a:pPr lvl="1"/>
+            <a:r>
+              <a:rPr lang="zh-TW" altLang="en-US" sz="2000" dirty="0"/>
+              <a:t>保護控制訊號 </a:t>
+            </a:r>
+            <a:r>
+              <a:rPr lang="en-US" altLang="zh-TW" sz="2000" dirty="0"/>
+              <a:t>HPROT[3:0] </a:t>
+            </a:r>
+            <a:r>
+              <a:rPr lang="zh-TW" altLang="en-US" sz="2000" dirty="0"/>
+              <a:t>提供了有關匯流排存取的額外資訊，主要是供具有某種存取保護機制的模組使用。</a:t>
+            </a:r>
+            <a:endParaRPr lang="en-US" altLang="zh-TW" sz="2000" dirty="0"/>
+          </a:p>
+          <a:p>
+            <a:pPr lvl="1"/>
+            <a:endParaRPr lang="en-US" altLang="zh-TW" sz="2000" dirty="0"/>
+          </a:p>
+          <a:p>
+            <a:pPr lvl="1"/>
+            <a:r>
+              <a:rPr lang="zh-TW" altLang="en-US" sz="2000" dirty="0"/>
+              <a:t>這些訊號可用來表示該次傳輸是否為：</a:t>
+            </a:r>
+            <a:endParaRPr lang="en-US" altLang="zh-TW" sz="2000" dirty="0"/>
+          </a:p>
+          <a:p>
+            <a:pPr marL="1257300" lvl="2" indent="-342900">
+              <a:buFont typeface="+mj-lt"/>
+              <a:buAutoNum type="arabicPeriod"/>
+            </a:pPr>
+            <a:r>
+              <a:rPr lang="zh-TW" altLang="en-US" sz="1600" dirty="0"/>
+              <a:t>指令擷取 </a:t>
+            </a:r>
+            <a:r>
+              <a:rPr lang="en-US" altLang="zh-TW" sz="1600" dirty="0"/>
+              <a:t>(opcode fetch)</a:t>
+            </a:r>
+            <a:r>
+              <a:rPr lang="zh-TW" altLang="en-US" sz="1600" dirty="0"/>
+              <a:t> 或 資料存取</a:t>
+            </a:r>
+            <a:r>
+              <a:rPr lang="en-US" altLang="zh-TW" sz="1600" dirty="0"/>
+              <a:t>(data access)</a:t>
+            </a:r>
+          </a:p>
+          <a:p>
+            <a:pPr marL="1257300" lvl="2" indent="-342900">
+              <a:buFont typeface="+mj-lt"/>
+              <a:buAutoNum type="arabicPeriod"/>
+            </a:pPr>
+            <a:r>
+              <a:rPr lang="zh-TW" altLang="en-US" sz="1600" dirty="0"/>
+              <a:t>特權模式 </a:t>
+            </a:r>
+            <a:r>
+              <a:rPr lang="en-US" altLang="zh-TW" sz="1600" dirty="0"/>
+              <a:t>(privileged mode)</a:t>
+            </a:r>
+            <a:r>
+              <a:rPr lang="zh-TW" altLang="en-US" sz="1600" dirty="0"/>
+              <a:t> 或 使用者模式</a:t>
+            </a:r>
+            <a:r>
+              <a:rPr lang="en-US" altLang="zh-TW" sz="1600" dirty="0"/>
+              <a:t>(user mode)</a:t>
+            </a:r>
+            <a:r>
+              <a:rPr lang="zh-TW" altLang="en-US" sz="1600" dirty="0"/>
+              <a:t> 的存取</a:t>
+            </a:r>
+            <a:endParaRPr lang="en-US" altLang="zh-TW" sz="1600" dirty="0"/>
+          </a:p>
+        </p:txBody>
+      </p:sp>
+      <p:pic>
+        <p:nvPicPr>
+          <p:cNvPr id="6" name="圖片 5">
+            <a:extLst>
+              <a:ext uri="{FF2B5EF4-FFF2-40B4-BE49-F238E27FC236}">
+                <a16:creationId xmlns:a16="http://schemas.microsoft.com/office/drawing/2014/main" id="{E40557C9-49FD-D6E2-CDDA-0C27BC260046}"/>
+              </a:ext>
+            </a:extLst>
+          </p:cNvPr>
+          <p:cNvPicPr>
+            <a:picLocks noChangeAspect="1"/>
+          </p:cNvPicPr>
+          <p:nvPr/>
+        </p:nvPicPr>
+        <p:blipFill>
+          <a:blip r:embed="rId3"/>
+          <a:stretch>
+            <a:fillRect/>
+          </a:stretch>
+        </p:blipFill>
+        <p:spPr>
+          <a:xfrm>
+            <a:off x="7721542" y="3748135"/>
+            <a:ext cx="4218645" cy="2744740"/>
+          </a:xfrm>
+          <a:prstGeom prst="rect">
+            <a:avLst/>
+          </a:prstGeom>
+          <a:ln>
+            <a:solidFill>
+              <a:schemeClr val="tx1"/>
+            </a:solidFill>
+          </a:ln>
+        </p:spPr>
+      </p:pic>
+    </p:spTree>
+    <p:extLst>
+      <p:ext uri="{BB962C8B-B14F-4D97-AF65-F5344CB8AC3E}">
+        <p14:creationId xmlns:p14="http://schemas.microsoft.com/office/powerpoint/2010/main" val="3683146374"/>
       </p:ext>
     </p:extLst>
   </p:cSld>

</xml_diff>